<commit_message>
Update PPT and minor graph changes in Rmd
</commit_message>
<xml_diff>
--- a/Group4_CaseStudy1.pptx
+++ b/Group4_CaseStudy1.pptx
@@ -4,6 +4,9 @@
   <p:sldMasterIdLst>
     <p:sldMasterId id="2147483648" r:id="rId1"/>
   </p:sldMasterIdLst>
+  <p:notesMasterIdLst>
+    <p:notesMasterId r:id="rId14"/>
+  </p:notesMasterIdLst>
   <p:sldIdLst>
     <p:sldId id="256" r:id="rId2"/>
     <p:sldId id="257" r:id="rId3"/>
@@ -18,9 +21,6 @@
     <p:sldId id="266" r:id="rId12"/>
     <p:sldId id="267" r:id="rId13"/>
   </p:sldIdLst>
-  <p:notesMasterIdLst>
-    <p:notesMasterId r:id="rId18"/>
-  </p:notesMasterIdLst>
   <p:sldSz cx="9144000" cy="5143500" type="screen16x9"/>
   <p:notesSz cx="5143500" cy="9144000"/>
   <p:defaultTextStyle>
@@ -115,7 +115,56 @@
       </a:defRPr>
     </a:lvl9pPr>
   </p:defaultTextStyle>
+  <p:extLst>
+    <p:ext uri="{EFAFB233-063F-42B5-8137-9DF3F51BA10A}">
+      <p15:sldGuideLst xmlns:p15="http://schemas.microsoft.com/office/powerpoint/2012/main"/>
+    </p:ext>
+  </p:extLst>
 </p:presentation>
+</file>
+
+<file path=ppt/changesInfos/changesInfo1.xml><?xml version="1.0" encoding="utf-8"?>
+<pc:chgInfo xmlns:a="http://schemas.openxmlformats.org/drawingml/2006/main" xmlns:r="http://schemas.openxmlformats.org/officeDocument/2006/relationships" xmlns:ac="http://schemas.microsoft.com/office/drawing/2013/main/command" xmlns:pc="http://schemas.microsoft.com/office/powerpoint/2013/main/command">
+  <pc:docChgLst>
+    <pc:chgData name="Cox, Steven" userId="d4828730-847f-4569-a521-753674d89216" providerId="ADAL" clId="{2E46F3A8-4ECB-FD4E-8011-9679C07EBC23}"/>
+    <pc:docChg chg="undo custSel modSld">
+      <pc:chgData name="Cox, Steven" userId="d4828730-847f-4569-a521-753674d89216" providerId="ADAL" clId="{2E46F3A8-4ECB-FD4E-8011-9679C07EBC23}" dt="2023-02-26T01:59:30.148" v="3" actId="1076"/>
+      <pc:docMkLst>
+        <pc:docMk/>
+      </pc:docMkLst>
+      <pc:sldChg chg="modSp mod">
+        <pc:chgData name="Cox, Steven" userId="d4828730-847f-4569-a521-753674d89216" providerId="ADAL" clId="{2E46F3A8-4ECB-FD4E-8011-9679C07EBC23}" dt="2023-02-26T01:59:30.148" v="3" actId="1076"/>
+        <pc:sldMkLst>
+          <pc:docMk/>
+          <pc:sldMk cId="0" sldId="259"/>
+        </pc:sldMkLst>
+        <pc:picChg chg="mod">
+          <ac:chgData name="Cox, Steven" userId="d4828730-847f-4569-a521-753674d89216" providerId="ADAL" clId="{2E46F3A8-4ECB-FD4E-8011-9679C07EBC23}" dt="2023-02-26T01:59:30.148" v="3" actId="1076"/>
+          <ac:picMkLst>
+            <pc:docMk/>
+            <pc:sldMk cId="0" sldId="259"/>
+            <ac:picMk id="2" creationId="{00000000-0000-0000-0000-000000000000}"/>
+          </ac:picMkLst>
+        </pc:picChg>
+      </pc:sldChg>
+      <pc:sldChg chg="modSp mod">
+        <pc:chgData name="Cox, Steven" userId="d4828730-847f-4569-a521-753674d89216" providerId="ADAL" clId="{2E46F3A8-4ECB-FD4E-8011-9679C07EBC23}" dt="2023-02-25T22:52:23.427" v="1" actId="14100"/>
+        <pc:sldMkLst>
+          <pc:docMk/>
+          <pc:sldMk cId="0" sldId="260"/>
+        </pc:sldMkLst>
+        <pc:picChg chg="mod">
+          <ac:chgData name="Cox, Steven" userId="d4828730-847f-4569-a521-753674d89216" providerId="ADAL" clId="{2E46F3A8-4ECB-FD4E-8011-9679C07EBC23}" dt="2023-02-25T22:52:23.427" v="1" actId="14100"/>
+          <ac:picMkLst>
+            <pc:docMk/>
+            <pc:sldMk cId="0" sldId="260"/>
+            <ac:picMk id="2" creationId="{00000000-0000-0000-0000-000000000000}"/>
+          </ac:picMkLst>
+        </pc:picChg>
+      </pc:sldChg>
+    </pc:docChg>
+  </pc:docChgLst>
+</pc:chgInfo>
 </file>
 
 <file path=ppt/notesMasters/notesMaster1.xml><?xml version="1.0" encoding="utf-8"?>
@@ -140,235 +189,10 @@
           <a:chExt cx="0" cy="0"/>
         </a:xfrm>
       </p:grpSpPr>
-      <p:sp>
-        <p:nvSpPr>
-          <p:cNvPr id="2" name="Header Placeholder 1"/>
-          <p:cNvSpPr>
-            <a:spLocks noGrp="1"/>
-          </p:cNvSpPr>
-          <p:nvPr>
-            <p:ph type="hdr" sz="quarter"/>
-          </p:nvPr>
-        </p:nvSpPr>
-        <p:spPr>
-          <a:xfrm>
-            <a:off x="0" y="0"/>
-            <a:ext cx="2971800" cy="458788"/>
-          </a:xfrm>
-          <a:prstGeom prst="rect">
-            <a:avLst/>
-          </a:prstGeom>
-        </p:spPr>
-        <p:txBody>
-          <a:bodyPr vert="horz" lIns="91440" tIns="45720" rIns="91440" bIns="45720" rtlCol="0"/>
-          <a:lstStyle>
-            <a:lvl1pPr algn="l">
-              <a:defRPr sz="1200"/>
-            </a:lvl1pPr>
-          </a:lstStyle>
-          <a:p>
-            <a:endParaRPr lang="en-US"/>
-          </a:p>
-        </p:txBody>
-      </p:sp>
-      <p:sp>
-        <p:nvSpPr>
-          <p:cNvPr id="3" name="Date Placeholder 2"/>
-          <p:cNvSpPr>
-            <a:spLocks noGrp="1"/>
-          </p:cNvSpPr>
-          <p:nvPr>
-            <p:ph type="dt" idx="1"/>
-          </p:nvPr>
-        </p:nvSpPr>
-        <p:spPr>
-          <a:xfrm>
-            <a:off x="3884613" y="0"/>
-            <a:ext cx="2971800" cy="458788"/>
-          </a:xfrm>
-          <a:prstGeom prst="rect">
-            <a:avLst/>
-          </a:prstGeom>
-        </p:spPr>
-        <p:txBody>
-          <a:bodyPr vert="horz" lIns="91440" tIns="45720" rIns="91440" bIns="45720" rtlCol="0"/>
-          <a:lstStyle>
-            <a:lvl1pPr algn="r">
-              <a:defRPr sz="1200"/>
-            </a:lvl1pPr>
-          </a:lstStyle>
-          <a:p>
-            <a:fld id="{5282F153-3F37-0F45-9E97-73ACFA13230C}" type="datetimeFigureOut">
-              <a:rPr lang="en-US" smtClean="0"/>
-              <a:t>6/20/18</a:t>
-            </a:fld>
-            <a:endParaRPr lang="en-US"/>
-          </a:p>
-        </p:txBody>
-      </p:sp>
-      <p:sp>
-        <p:nvSpPr>
-          <p:cNvPr id="4" name="Slide Image Placeholder 3"/>
-          <p:cNvSpPr>
-            <a:spLocks noGrp="1" noRot="1" noChangeAspect="1"/>
-          </p:cNvSpPr>
-          <p:nvPr>
-            <p:ph type="sldImg" idx="2"/>
-          </p:nvPr>
-        </p:nvSpPr>
-        <p:spPr>
-          <a:xfrm>
-            <a:off x="685800" y="1143000"/>
-            <a:ext cx="5486400" cy="3086100"/>
-          </a:xfrm>
-          <a:prstGeom prst="rect">
-            <a:avLst/>
-          </a:prstGeom>
-          <a:noFill/>
-          <a:ln w="12700">
-            <a:solidFill>
-              <a:prstClr val="black"/>
-            </a:solidFill>
-          </a:ln>
-        </p:spPr>
-        <p:txBody>
-          <a:bodyPr vert="horz" lIns="91440" tIns="45720" rIns="91440" bIns="45720" rtlCol="0" anchor="ctr"/>
-          <a:lstStyle/>
-          <a:p>
-            <a:endParaRPr lang="en-US"/>
-          </a:p>
-        </p:txBody>
-      </p:sp>
-      <p:sp>
-        <p:nvSpPr>
-          <p:cNvPr id="5" name="Notes Placeholder 4"/>
-          <p:cNvSpPr>
-            <a:spLocks noGrp="1"/>
-          </p:cNvSpPr>
-          <p:nvPr>
-            <p:ph type="body" sz="quarter" idx="3"/>
-          </p:nvPr>
-        </p:nvSpPr>
-        <p:spPr>
-          <a:xfrm>
-            <a:off x="685800" y="4400550"/>
-            <a:ext cx="5486400" cy="3600450"/>
-          </a:xfrm>
-          <a:prstGeom prst="rect">
-            <a:avLst/>
-          </a:prstGeom>
-        </p:spPr>
-        <p:txBody>
-          <a:bodyPr vert="horz" lIns="91440" tIns="45720" rIns="91440" bIns="45720" rtlCol="0"/>
-          <a:lstStyle/>
-          <a:p>
-            <a:pPr lvl="0"/>
-            <a:r>
-              <a:rPr lang="en-US" smtClean="0"/>
-              <a:t>Click to edit Master text styles</a:t>
-            </a:r>
-          </a:p>
-          <a:p>
-            <a:pPr lvl="1"/>
-            <a:r>
-              <a:rPr lang="en-US" smtClean="0"/>
-              <a:t>Second level</a:t>
-            </a:r>
-          </a:p>
-          <a:p>
-            <a:pPr lvl="2"/>
-            <a:r>
-              <a:rPr lang="en-US" smtClean="0"/>
-              <a:t>Third level</a:t>
-            </a:r>
-          </a:p>
-          <a:p>
-            <a:pPr lvl="3"/>
-            <a:r>
-              <a:rPr lang="en-US" smtClean="0"/>
-              <a:t>Fourth level</a:t>
-            </a:r>
-          </a:p>
-          <a:p>
-            <a:pPr lvl="4"/>
-            <a:r>
-              <a:rPr lang="en-US" smtClean="0"/>
-              <a:t>Fifth level</a:t>
-            </a:r>
-            <a:endParaRPr lang="en-US"/>
-          </a:p>
-        </p:txBody>
-      </p:sp>
-      <p:sp>
-        <p:nvSpPr>
-          <p:cNvPr id="6" name="Footer Placeholder 5"/>
-          <p:cNvSpPr>
-            <a:spLocks noGrp="1"/>
-          </p:cNvSpPr>
-          <p:nvPr>
-            <p:ph type="ftr" sz="quarter" idx="4"/>
-          </p:nvPr>
-        </p:nvSpPr>
-        <p:spPr>
-          <a:xfrm>
-            <a:off x="0" y="8685213"/>
-            <a:ext cx="2971800" cy="458787"/>
-          </a:xfrm>
-          <a:prstGeom prst="rect">
-            <a:avLst/>
-          </a:prstGeom>
-        </p:spPr>
-        <p:txBody>
-          <a:bodyPr vert="horz" lIns="91440" tIns="45720" rIns="91440" bIns="45720" rtlCol="0" anchor="b"/>
-          <a:lstStyle>
-            <a:lvl1pPr algn="l">
-              <a:defRPr sz="1200"/>
-            </a:lvl1pPr>
-          </a:lstStyle>
-          <a:p>
-            <a:endParaRPr lang="en-US"/>
-          </a:p>
-        </p:txBody>
-      </p:sp>
-      <p:sp>
-        <p:nvSpPr>
-          <p:cNvPr id="7" name="Slide Number Placeholder 6"/>
-          <p:cNvSpPr>
-            <a:spLocks noGrp="1"/>
-          </p:cNvSpPr>
-          <p:nvPr>
-            <p:ph type="sldNum" sz="quarter" idx="5"/>
-          </p:nvPr>
-        </p:nvSpPr>
-        <p:spPr>
-          <a:xfrm>
-            <a:off x="3884613" y="8685213"/>
-            <a:ext cx="2971800" cy="458787"/>
-          </a:xfrm>
-          <a:prstGeom prst="rect">
-            <a:avLst/>
-          </a:prstGeom>
-        </p:spPr>
-        <p:txBody>
-          <a:bodyPr vert="horz" lIns="91440" tIns="45720" rIns="91440" bIns="45720" rtlCol="0" anchor="b"/>
-          <a:lstStyle>
-            <a:lvl1pPr algn="r">
-              <a:defRPr sz="1200"/>
-            </a:lvl1pPr>
-          </a:lstStyle>
-          <a:p>
-            <a:fld id="{CE5E9CC1-C706-0F49-92D6-E571CC5EEA8F}" type="slidenum">
-              <a:rPr lang="en-US" smtClean="0"/>
-              <a:t>‹#›</a:t>
-            </a:fld>
-            <a:endParaRPr lang="en-US"/>
-          </a:p>
-        </p:txBody>
-      </p:sp>
     </p:spTree>
     <p:extLst>
       <p:ext uri="{BB962C8B-B14F-4D97-AF65-F5344CB8AC3E}">
-        <p14:creationId xmlns:p14="http://schemas.microsoft.com/office/powerpoint/2010/main" val="1024086991"/>
+        <p14:creationId xmlns:p14="http://schemas.microsoft.com/office/powerpoint/2010/main" val="566665820"/>
       </p:ext>
     </p:extLst>
   </p:cSld>
@@ -512,10 +336,6 @@
           <a:bodyPr/>
           <a:lstStyle/>
           <a:p>
-            <a:r>
-              <a:rPr lang="en-US" dirty="0" smtClean="0"/>
-              <a:t/>
-            </a:r>
             <a:endParaRPr lang="en-US" dirty="0"/>
           </a:p>
         </p:txBody>
@@ -601,10 +421,9 @@
           <a:lstStyle/>
           <a:p>
             <a:r>
-              <a:rPr lang="en-US" dirty="0" smtClean="0"/>
+              <a:rPr lang="en-US" dirty="0"/>
               <a:t>The mean ABV for beers in this data set is 5.97%, and the median is 5.6%. This is notable for being much higher than anything Budweiser is currently producing. There may be room for product line expansion in this direction based on market preferences.</a:t>
             </a:r>
-            <a:endParaRPr lang="en-US" dirty="0"/>
           </a:p>
         </p:txBody>
       </p:sp>
@@ -688,10 +507,6 @@
           <a:bodyPr/>
           <a:lstStyle/>
           <a:p>
-            <a:r>
-              <a:rPr lang="en-US" dirty="0" smtClean="0"/>
-              <a:t/>
-            </a:r>
             <a:endParaRPr lang="en-US" dirty="0"/>
           </a:p>
         </p:txBody>
@@ -776,10 +591,6 @@
           <a:bodyPr/>
           <a:lstStyle/>
           <a:p>
-            <a:r>
-              <a:rPr lang="en-US" dirty="0" smtClean="0"/>
-              <a:t/>
-            </a:r>
             <a:endParaRPr lang="en-US" dirty="0"/>
           </a:p>
         </p:txBody>
@@ -864,10 +675,6 @@
           <a:bodyPr/>
           <a:lstStyle/>
           <a:p>
-            <a:r>
-              <a:rPr lang="en-US" dirty="0" smtClean="0"/>
-              <a:t/>
-            </a:r>
             <a:endParaRPr lang="en-US" dirty="0"/>
           </a:p>
         </p:txBody>
@@ -953,11 +760,10 @@
           <a:lstStyle/>
           <a:p>
             <a:r>
-              <a:rPr lang="en-US" dirty="0" smtClean="0"/>
+              <a:rPr lang="en-US" dirty="0"/>
               <a:t>Here, we can see that there are 558 brewery ids in the data set, but only 551 unique brewery names. This means that there are some breweries with multiple ids. We will need to investigate this further.
 </a:t>
             </a:r>
-            <a:endParaRPr lang="en-US" dirty="0"/>
           </a:p>
         </p:txBody>
       </p:sp>
@@ -1041,10 +847,6 @@
           <a:bodyPr/>
           <a:lstStyle/>
           <a:p>
-            <a:r>
-              <a:rPr lang="en-US" dirty="0" smtClean="0"/>
-              <a:t/>
-            </a:r>
             <a:endParaRPr lang="en-US" dirty="0"/>
           </a:p>
         </p:txBody>
@@ -1130,11 +932,10 @@
           <a:lstStyle/>
           <a:p>
             <a:r>
-              <a:rPr lang="en-US" dirty="0" smtClean="0"/>
+              <a:rPr lang="en-US" dirty="0"/>
               <a:t>There are 62 missing ABV values, 1005, missing IBU values, and 5 missing beer Style values, which are not reflected in the output above.
 Note: We have pending requests for APIs to handle missing data in the future. </a:t>
             </a:r>
-            <a:endParaRPr lang="en-US" dirty="0"/>
           </a:p>
         </p:txBody>
       </p:sp>
@@ -1219,10 +1020,9 @@
           <a:lstStyle/>
           <a:p>
             <a:r>
-              <a:rPr lang="en-US" dirty="0" smtClean="0"/>
+              <a:rPr lang="en-US" dirty="0"/>
               <a:t>IBU values appear to be missing at random. The amount differs by style of beer, but we have no reason to believe it differs base on the actual value of IBU. American IPA’s have the highest number of missing IBU values but, as we will see later, the have a unique range of IBU values, so the imputation should be accurate.</a:t>
             </a:r>
-            <a:endParaRPr lang="en-US" dirty="0"/>
           </a:p>
         </p:txBody>
       </p:sp>
@@ -1307,10 +1107,9 @@
           <a:lstStyle/>
           <a:p>
             <a:r>
-              <a:rPr lang="en-US" dirty="0" smtClean="0"/>
+              <a:rPr lang="en-US" dirty="0"/>
               <a:t>Because our analysis is concerned with Ales, more effort could be put into finding these missing values if more time or money becomes available and a more accurate analysis is desired.</a:t>
             </a:r>
-            <a:endParaRPr lang="en-US" dirty="0"/>
           </a:p>
         </p:txBody>
       </p:sp>
@@ -1395,10 +1194,9 @@
           <a:lstStyle/>
           <a:p>
             <a:r>
-              <a:rPr lang="en-US" dirty="0" smtClean="0"/>
+              <a:rPr lang="en-US" dirty="0"/>
               <a:t>There doesn’t seem to be excessive variation in median IBU or ABV across states. The notable exception to this is the much lower median ABV for Utah, which may be an artifact of the state laws. ABV of all beer sold in Utah was previously limited to 3.2%. That law has been repealed and one of the authors, who lives in Utah, can confirm that the beer situation is slowly improving.</a:t>
             </a:r>
-            <a:endParaRPr lang="en-US" dirty="0"/>
           </a:p>
         </p:txBody>
       </p:sp>
@@ -1482,10 +1280,6 @@
           <a:bodyPr/>
           <a:lstStyle/>
           <a:p>
-            <a:r>
-              <a:rPr lang="en-US" dirty="0" smtClean="0"/>
-              <a:t/>
-            </a:r>
             <a:endParaRPr lang="en-US" dirty="0"/>
           </a:p>
         </p:txBody>
@@ -1554,6 +1348,11 @@
 <file path=ppt/slideMasters/slideMaster1.xml><?xml version="1.0" encoding="utf-8"?>
 <p:sldMaster xmlns:a="http://schemas.openxmlformats.org/drawingml/2006/main" xmlns:r="http://schemas.openxmlformats.org/officeDocument/2006/relationships" xmlns:p="http://schemas.openxmlformats.org/presentationml/2006/main">
   <p:cSld>
+    <p:bg>
+      <p:bgRef idx="1001">
+        <a:schemeClr val="bg1"/>
+      </p:bgRef>
+    </p:bg>
     <p:spTree>
       <p:nvGrpSpPr>
         <p:cNvPr id="1" name=""/>
@@ -1847,15 +1646,15 @@
       </p:grpSpPr>
       <p:pic>
         <p:nvPicPr>
-          <p:cNvPr id="2" name="Object 1" descr="/tmp/beautiful_ai_exports/44754fef-dfc1-4132-928d-9e0e7ab62028.jpg">    </p:cNvPr>
+          <p:cNvPr id="2" name="Object 1" descr="/tmp/beautiful_ai_exports/44754fef-dfc1-4132-928d-9e0e7ab62028.jpg"/>
           <p:cNvPicPr>
             <a:picLocks noChangeAspect="1"/>
           </p:cNvPicPr>
           <p:nvPr/>
         </p:nvPicPr>
         <p:blipFill>
-          <a:blip r:embed="rId1"/>
-          <a:srcRect l="0" r="0" t="0" b="0"/>
+          <a:blip r:embed="rId3"/>
+          <a:srcRect/>
           <a:stretch/>
         </p:blipFill>
         <p:spPr>
@@ -1895,15 +1694,15 @@
       </p:grpSpPr>
       <p:pic>
         <p:nvPicPr>
-          <p:cNvPr id="2" name="Object 1" descr="/tmp/beautiful_ai_exports/aef12a44-ff8b-4ac2-93fe-636b3bc322d0.jpg">    </p:cNvPr>
+          <p:cNvPr id="2" name="Object 1" descr="/tmp/beautiful_ai_exports/aef12a44-ff8b-4ac2-93fe-636b3bc322d0.jpg"/>
           <p:cNvPicPr>
             <a:picLocks noChangeAspect="1"/>
           </p:cNvPicPr>
           <p:nvPr/>
         </p:nvPicPr>
         <p:blipFill>
-          <a:blip r:embed="rId1"/>
-          <a:srcRect l="0" r="0" t="0" b="0"/>
+          <a:blip r:embed="rId3"/>
+          <a:srcRect/>
           <a:stretch/>
         </p:blipFill>
         <p:spPr>
@@ -1943,15 +1742,15 @@
       </p:grpSpPr>
       <p:pic>
         <p:nvPicPr>
-          <p:cNvPr id="2" name="Object 1" descr="/tmp/beautiful_ai_exports/7c461147-d7de-4445-931e-44c3a7c854e4.jpg">    </p:cNvPr>
+          <p:cNvPr id="2" name="Object 1" descr="/tmp/beautiful_ai_exports/7c461147-d7de-4445-931e-44c3a7c854e4.jpg"/>
           <p:cNvPicPr>
             <a:picLocks noChangeAspect="1"/>
           </p:cNvPicPr>
           <p:nvPr/>
         </p:nvPicPr>
         <p:blipFill>
-          <a:blip r:embed="rId1"/>
-          <a:srcRect l="0" r="0" t="0" b="0"/>
+          <a:blip r:embed="rId3"/>
+          <a:srcRect/>
           <a:stretch/>
         </p:blipFill>
         <p:spPr>
@@ -1991,15 +1790,15 @@
       </p:grpSpPr>
       <p:pic>
         <p:nvPicPr>
-          <p:cNvPr id="2" name="Object 1" descr="/tmp/beautiful_ai_exports/d0d9eaee-c65f-4be9-a1c6-616b9c3e5e2a.jpg">    </p:cNvPr>
+          <p:cNvPr id="2" name="Object 1" descr="/tmp/beautiful_ai_exports/d0d9eaee-c65f-4be9-a1c6-616b9c3e5e2a.jpg"/>
           <p:cNvPicPr>
             <a:picLocks noChangeAspect="1"/>
           </p:cNvPicPr>
           <p:nvPr/>
         </p:nvPicPr>
         <p:blipFill>
-          <a:blip r:embed="rId1"/>
-          <a:srcRect l="0" r="0" t="0" b="0"/>
+          <a:blip r:embed="rId3"/>
+          <a:srcRect/>
           <a:stretch/>
         </p:blipFill>
         <p:spPr>
@@ -2039,15 +1838,15 @@
       </p:grpSpPr>
       <p:pic>
         <p:nvPicPr>
-          <p:cNvPr id="2" name="Object 1" descr="/tmp/beautiful_ai_exports/c81d0cf0-bd35-43bb-80b5-f21dabc7cda9.jpg">    </p:cNvPr>
+          <p:cNvPr id="2" name="Object 1" descr="/tmp/beautiful_ai_exports/c81d0cf0-bd35-43bb-80b5-f21dabc7cda9.jpg"/>
           <p:cNvPicPr>
             <a:picLocks noChangeAspect="1"/>
           </p:cNvPicPr>
           <p:nvPr/>
         </p:nvPicPr>
         <p:blipFill>
-          <a:blip r:embed="rId1"/>
-          <a:srcRect l="0" r="0" t="0" b="0"/>
+          <a:blip r:embed="rId3"/>
+          <a:srcRect/>
           <a:stretch/>
         </p:blipFill>
         <p:spPr>
@@ -2087,15 +1886,15 @@
       </p:grpSpPr>
       <p:pic>
         <p:nvPicPr>
-          <p:cNvPr id="2" name="Object 1" descr="/tmp/beautiful_ai_exports/e843b409-fc55-4cb2-aaa8-37b0f2697fd3.jpg">    </p:cNvPr>
+          <p:cNvPr id="2" name="Object 1" descr="/tmp/beautiful_ai_exports/e843b409-fc55-4cb2-aaa8-37b0f2697fd3.jpg"/>
           <p:cNvPicPr>
             <a:picLocks noChangeAspect="1"/>
           </p:cNvPicPr>
           <p:nvPr/>
         </p:nvPicPr>
         <p:blipFill>
-          <a:blip r:embed="rId1"/>
-          <a:srcRect l="0" r="0" t="0" b="0"/>
+          <a:blip r:embed="rId3"/>
+          <a:srcRect/>
           <a:stretch/>
         </p:blipFill>
         <p:spPr>
@@ -2135,20 +1934,20 @@
       </p:grpSpPr>
       <p:pic>
         <p:nvPicPr>
-          <p:cNvPr id="2" name="Object 1" descr="/tmp/beautiful_ai_exports/316a30a9-88ff-4e94-9915-49b4b18ed20f.jpg">    </p:cNvPr>
+          <p:cNvPr id="2" name="Object 1" descr="/tmp/beautiful_ai_exports/316a30a9-88ff-4e94-9915-49b4b18ed20f.jpg"/>
           <p:cNvPicPr>
             <a:picLocks noChangeAspect="1"/>
           </p:cNvPicPr>
           <p:nvPr/>
         </p:nvPicPr>
         <p:blipFill>
-          <a:blip r:embed="rId1"/>
-          <a:srcRect l="0" r="0" t="0" b="0"/>
+          <a:blip r:embed="rId3"/>
+          <a:srcRect/>
           <a:stretch/>
         </p:blipFill>
         <p:spPr>
           <a:xfrm>
-            <a:off x="0" y="0"/>
+            <a:off x="352926" y="0"/>
             <a:ext cx="9144000" cy="5143500"/>
           </a:xfrm>
           <a:prstGeom prst="rect">
@@ -2183,15 +1982,15 @@
       </p:grpSpPr>
       <p:pic>
         <p:nvPicPr>
-          <p:cNvPr id="2" name="Object 1" descr="/tmp/beautiful_ai_exports/b0f8e972-57f8-485c-94bf-0752f678fb7e.jpg">    </p:cNvPr>
+          <p:cNvPr id="2" name="Object 1" descr="/tmp/beautiful_ai_exports/b0f8e972-57f8-485c-94bf-0752f678fb7e.jpg"/>
           <p:cNvPicPr>
             <a:picLocks noChangeAspect="1"/>
           </p:cNvPicPr>
           <p:nvPr/>
         </p:nvPicPr>
         <p:blipFill>
-          <a:blip r:embed="rId1"/>
-          <a:srcRect l="0" r="0" t="0" b="0"/>
+          <a:blip r:embed="rId3"/>
+          <a:srcRect/>
           <a:stretch/>
         </p:blipFill>
         <p:spPr>
@@ -2231,15 +2030,15 @@
       </p:grpSpPr>
       <p:pic>
         <p:nvPicPr>
-          <p:cNvPr id="2" name="Object 1" descr="/tmp/beautiful_ai_exports/34bcc7c3-da9a-4192-999d-e06916366eb5.jpg">    </p:cNvPr>
+          <p:cNvPr id="2" name="Object 1" descr="/tmp/beautiful_ai_exports/34bcc7c3-da9a-4192-999d-e06916366eb5.jpg"/>
           <p:cNvPicPr>
             <a:picLocks noChangeAspect="1"/>
           </p:cNvPicPr>
           <p:nvPr/>
         </p:nvPicPr>
         <p:blipFill>
-          <a:blip r:embed="rId1"/>
-          <a:srcRect l="0" r="0" t="0" b="0"/>
+          <a:blip r:embed="rId3"/>
+          <a:srcRect/>
           <a:stretch/>
         </p:blipFill>
         <p:spPr>
@@ -2279,15 +2078,15 @@
       </p:grpSpPr>
       <p:pic>
         <p:nvPicPr>
-          <p:cNvPr id="2" name="Object 1" descr="/tmp/beautiful_ai_exports/79a8df28-5c64-4088-a5b8-f7efd6ff42bf.jpg">    </p:cNvPr>
+          <p:cNvPr id="2" name="Object 1" descr="/tmp/beautiful_ai_exports/79a8df28-5c64-4088-a5b8-f7efd6ff42bf.jpg"/>
           <p:cNvPicPr>
             <a:picLocks noChangeAspect="1"/>
           </p:cNvPicPr>
           <p:nvPr/>
         </p:nvPicPr>
         <p:blipFill>
-          <a:blip r:embed="rId1"/>
-          <a:srcRect l="0" r="0" t="0" b="0"/>
+          <a:blip r:embed="rId3"/>
+          <a:srcRect/>
           <a:stretch/>
         </p:blipFill>
         <p:spPr>
@@ -2327,15 +2126,15 @@
       </p:grpSpPr>
       <p:pic>
         <p:nvPicPr>
-          <p:cNvPr id="2" name="Object 1" descr="/tmp/beautiful_ai_exports/cdf8c8ac-d42b-4241-9120-7836a0a2ffdc.jpg">    </p:cNvPr>
+          <p:cNvPr id="2" name="Object 1" descr="/tmp/beautiful_ai_exports/cdf8c8ac-d42b-4241-9120-7836a0a2ffdc.jpg"/>
           <p:cNvPicPr>
             <a:picLocks noChangeAspect="1"/>
           </p:cNvPicPr>
           <p:nvPr/>
         </p:nvPicPr>
         <p:blipFill>
-          <a:blip r:embed="rId1"/>
-          <a:srcRect l="0" r="0" t="0" b="0"/>
+          <a:blip r:embed="rId3"/>
+          <a:srcRect/>
           <a:stretch/>
         </p:blipFill>
         <p:spPr>
@@ -2375,15 +2174,15 @@
       </p:grpSpPr>
       <p:pic>
         <p:nvPicPr>
-          <p:cNvPr id="2" name="Object 1" descr="/tmp/beautiful_ai_exports/55276a06-d25f-44a0-b852-0131b40bf61f.jpg">    </p:cNvPr>
+          <p:cNvPr id="2" name="Object 1" descr="/tmp/beautiful_ai_exports/55276a06-d25f-44a0-b852-0131b40bf61f.jpg"/>
           <p:cNvPicPr>
             <a:picLocks noChangeAspect="1"/>
           </p:cNvPicPr>
           <p:nvPr/>
         </p:nvPicPr>
         <p:blipFill>
-          <a:blip r:embed="rId1"/>
-          <a:srcRect l="0" r="0" t="0" b="0"/>
+          <a:blip r:embed="rId3"/>
+          <a:srcRect/>
           <a:stretch/>
         </p:blipFill>
         <p:spPr>
@@ -2685,4 +2484,299 @@
   <a:objectDefaults/>
   <a:extraClrSchemeLst/>
 </a:theme>
+</file>
+
+<file path=ppt/theme/theme2.xml><?xml version="1.0" encoding="utf-8"?>
+<a:theme xmlns:a="http://schemas.openxmlformats.org/drawingml/2006/main" name="Office Theme">
+  <a:themeElements>
+    <a:clrScheme name="Office">
+      <a:dk1>
+        <a:sysClr val="windowText" lastClr="000000"/>
+      </a:dk1>
+      <a:lt1>
+        <a:sysClr val="window" lastClr="FFFFFF"/>
+      </a:lt1>
+      <a:dk2>
+        <a:srgbClr val="44546A"/>
+      </a:dk2>
+      <a:lt2>
+        <a:srgbClr val="E7E6E6"/>
+      </a:lt2>
+      <a:accent1>
+        <a:srgbClr val="4472C4"/>
+      </a:accent1>
+      <a:accent2>
+        <a:srgbClr val="ED7D31"/>
+      </a:accent2>
+      <a:accent3>
+        <a:srgbClr val="A5A5A5"/>
+      </a:accent3>
+      <a:accent4>
+        <a:srgbClr val="FFC000"/>
+      </a:accent4>
+      <a:accent5>
+        <a:srgbClr val="5B9BD5"/>
+      </a:accent5>
+      <a:accent6>
+        <a:srgbClr val="70AD47"/>
+      </a:accent6>
+      <a:hlink>
+        <a:srgbClr val="0563C1"/>
+      </a:hlink>
+      <a:folHlink>
+        <a:srgbClr val="954F72"/>
+      </a:folHlink>
+    </a:clrScheme>
+    <a:fontScheme name="Office">
+      <a:majorFont>
+        <a:latin typeface="Calibri Light" panose="020F0302020204030204"/>
+        <a:ea typeface=""/>
+        <a:cs typeface=""/>
+        <a:font script="Jpan" typeface="游ゴシック Light"/>
+        <a:font script="Hang" typeface="맑은 고딕"/>
+        <a:font script="Hans" typeface="等线 Light"/>
+        <a:font script="Hant" typeface="新細明體"/>
+        <a:font script="Arab" typeface="Times New Roman"/>
+        <a:font script="Hebr" typeface="Times New Roman"/>
+        <a:font script="Thai" typeface="Angsana New"/>
+        <a:font script="Ethi" typeface="Nyala"/>
+        <a:font script="Beng" typeface="Vrinda"/>
+        <a:font script="Gujr" typeface="Shruti"/>
+        <a:font script="Khmr" typeface="MoolBoran"/>
+        <a:font script="Knda" typeface="Tunga"/>
+        <a:font script="Guru" typeface="Raavi"/>
+        <a:font script="Cans" typeface="Euphemia"/>
+        <a:font script="Cher" typeface="Plantagenet Cherokee"/>
+        <a:font script="Yiii" typeface="Microsoft Yi Baiti"/>
+        <a:font script="Tibt" typeface="Microsoft Himalaya"/>
+        <a:font script="Thaa" typeface="MV Boli"/>
+        <a:font script="Deva" typeface="Mangal"/>
+        <a:font script="Telu" typeface="Gautami"/>
+        <a:font script="Taml" typeface="Latha"/>
+        <a:font script="Syrc" typeface="Estrangelo Edessa"/>
+        <a:font script="Orya" typeface="Kalinga"/>
+        <a:font script="Mlym" typeface="Kartika"/>
+        <a:font script="Laoo" typeface="DokChampa"/>
+        <a:font script="Sinh" typeface="Iskoola Pota"/>
+        <a:font script="Mong" typeface="Mongolian Baiti"/>
+        <a:font script="Viet" typeface="Times New Roman"/>
+        <a:font script="Uigh" typeface="Microsoft Uighur"/>
+        <a:font script="Geor" typeface="Sylfaen"/>
+        <a:font script="Armn" typeface="Arial"/>
+        <a:font script="Bugi" typeface="Leelawadee UI"/>
+        <a:font script="Bopo" typeface="Microsoft JhengHei"/>
+        <a:font script="Java" typeface="Javanese Text"/>
+        <a:font script="Lisu" typeface="Segoe UI"/>
+        <a:font script="Mymr" typeface="Myanmar Text"/>
+        <a:font script="Nkoo" typeface="Ebrima"/>
+        <a:font script="Olck" typeface="Nirmala UI"/>
+        <a:font script="Osma" typeface="Ebrima"/>
+        <a:font script="Phag" typeface="Phagspa"/>
+        <a:font script="Syrn" typeface="Estrangelo Edessa"/>
+        <a:font script="Syrj" typeface="Estrangelo Edessa"/>
+        <a:font script="Syre" typeface="Estrangelo Edessa"/>
+        <a:font script="Sora" typeface="Nirmala UI"/>
+        <a:font script="Tale" typeface="Microsoft Tai Le"/>
+        <a:font script="Talu" typeface="Microsoft New Tai Lue"/>
+        <a:font script="Tfng" typeface="Ebrima"/>
+      </a:majorFont>
+      <a:minorFont>
+        <a:latin typeface="Calibri" panose="020F0502020204030204"/>
+        <a:ea typeface=""/>
+        <a:cs typeface=""/>
+        <a:font script="Jpan" typeface="游ゴシック"/>
+        <a:font script="Hang" typeface="맑은 고딕"/>
+        <a:font script="Hans" typeface="等线"/>
+        <a:font script="Hant" typeface="新細明體"/>
+        <a:font script="Arab" typeface="Arial"/>
+        <a:font script="Hebr" typeface="Arial"/>
+        <a:font script="Thai" typeface="Cordia New"/>
+        <a:font script="Ethi" typeface="Nyala"/>
+        <a:font script="Beng" typeface="Vrinda"/>
+        <a:font script="Gujr" typeface="Shruti"/>
+        <a:font script="Khmr" typeface="DaunPenh"/>
+        <a:font script="Knda" typeface="Tunga"/>
+        <a:font script="Guru" typeface="Raavi"/>
+        <a:font script="Cans" typeface="Euphemia"/>
+        <a:font script="Cher" typeface="Plantagenet Cherokee"/>
+        <a:font script="Yiii" typeface="Microsoft Yi Baiti"/>
+        <a:font script="Tibt" typeface="Microsoft Himalaya"/>
+        <a:font script="Thaa" typeface="MV Boli"/>
+        <a:font script="Deva" typeface="Mangal"/>
+        <a:font script="Telu" typeface="Gautami"/>
+        <a:font script="Taml" typeface="Latha"/>
+        <a:font script="Syrc" typeface="Estrangelo Edessa"/>
+        <a:font script="Orya" typeface="Kalinga"/>
+        <a:font script="Mlym" typeface="Kartika"/>
+        <a:font script="Laoo" typeface="DokChampa"/>
+        <a:font script="Sinh" typeface="Iskoola Pota"/>
+        <a:font script="Mong" typeface="Mongolian Baiti"/>
+        <a:font script="Viet" typeface="Arial"/>
+        <a:font script="Uigh" typeface="Microsoft Uighur"/>
+        <a:font script="Geor" typeface="Sylfaen"/>
+        <a:font script="Armn" typeface="Arial"/>
+        <a:font script="Bugi" typeface="Leelawadee UI"/>
+        <a:font script="Bopo" typeface="Microsoft JhengHei"/>
+        <a:font script="Java" typeface="Javanese Text"/>
+        <a:font script="Lisu" typeface="Segoe UI"/>
+        <a:font script="Mymr" typeface="Myanmar Text"/>
+        <a:font script="Nkoo" typeface="Ebrima"/>
+        <a:font script="Olck" typeface="Nirmala UI"/>
+        <a:font script="Osma" typeface="Ebrima"/>
+        <a:font script="Phag" typeface="Phagspa"/>
+        <a:font script="Syrn" typeface="Estrangelo Edessa"/>
+        <a:font script="Syrj" typeface="Estrangelo Edessa"/>
+        <a:font script="Syre" typeface="Estrangelo Edessa"/>
+        <a:font script="Sora" typeface="Nirmala UI"/>
+        <a:font script="Tale" typeface="Microsoft Tai Le"/>
+        <a:font script="Talu" typeface="Microsoft New Tai Lue"/>
+        <a:font script="Tfng" typeface="Ebrima"/>
+      </a:minorFont>
+    </a:fontScheme>
+    <a:fmtScheme name="Office">
+      <a:fillStyleLst>
+        <a:solidFill>
+          <a:schemeClr val="phClr"/>
+        </a:solidFill>
+        <a:gradFill rotWithShape="1">
+          <a:gsLst>
+            <a:gs pos="0">
+              <a:schemeClr val="phClr">
+                <a:lumMod val="110000"/>
+                <a:satMod val="105000"/>
+                <a:tint val="67000"/>
+              </a:schemeClr>
+            </a:gs>
+            <a:gs pos="50000">
+              <a:schemeClr val="phClr">
+                <a:lumMod val="105000"/>
+                <a:satMod val="103000"/>
+                <a:tint val="73000"/>
+              </a:schemeClr>
+            </a:gs>
+            <a:gs pos="100000">
+              <a:schemeClr val="phClr">
+                <a:lumMod val="105000"/>
+                <a:satMod val="109000"/>
+                <a:tint val="81000"/>
+              </a:schemeClr>
+            </a:gs>
+          </a:gsLst>
+          <a:lin ang="5400000" scaled="0"/>
+        </a:gradFill>
+        <a:gradFill rotWithShape="1">
+          <a:gsLst>
+            <a:gs pos="0">
+              <a:schemeClr val="phClr">
+                <a:satMod val="103000"/>
+                <a:lumMod val="102000"/>
+                <a:tint val="94000"/>
+              </a:schemeClr>
+            </a:gs>
+            <a:gs pos="50000">
+              <a:schemeClr val="phClr">
+                <a:satMod val="110000"/>
+                <a:lumMod val="100000"/>
+                <a:shade val="100000"/>
+              </a:schemeClr>
+            </a:gs>
+            <a:gs pos="100000">
+              <a:schemeClr val="phClr">
+                <a:lumMod val="99000"/>
+                <a:satMod val="120000"/>
+                <a:shade val="78000"/>
+              </a:schemeClr>
+            </a:gs>
+          </a:gsLst>
+          <a:lin ang="5400000" scaled="0"/>
+        </a:gradFill>
+      </a:fillStyleLst>
+      <a:lnStyleLst>
+        <a:ln w="6350" cap="flat" cmpd="sng" algn="ctr">
+          <a:solidFill>
+            <a:schemeClr val="phClr"/>
+          </a:solidFill>
+          <a:prstDash val="solid"/>
+          <a:miter lim="800000"/>
+        </a:ln>
+        <a:ln w="12700" cap="flat" cmpd="sng" algn="ctr">
+          <a:solidFill>
+            <a:schemeClr val="phClr"/>
+          </a:solidFill>
+          <a:prstDash val="solid"/>
+          <a:miter lim="800000"/>
+        </a:ln>
+        <a:ln w="19050" cap="flat" cmpd="sng" algn="ctr">
+          <a:solidFill>
+            <a:schemeClr val="phClr"/>
+          </a:solidFill>
+          <a:prstDash val="solid"/>
+          <a:miter lim="800000"/>
+        </a:ln>
+      </a:lnStyleLst>
+      <a:effectStyleLst>
+        <a:effectStyle>
+          <a:effectLst/>
+        </a:effectStyle>
+        <a:effectStyle>
+          <a:effectLst/>
+        </a:effectStyle>
+        <a:effectStyle>
+          <a:effectLst>
+            <a:outerShdw blurRad="57150" dist="19050" dir="5400000" algn="ctr" rotWithShape="0">
+              <a:srgbClr val="000000">
+                <a:alpha val="63000"/>
+              </a:srgbClr>
+            </a:outerShdw>
+          </a:effectLst>
+        </a:effectStyle>
+      </a:effectStyleLst>
+      <a:bgFillStyleLst>
+        <a:solidFill>
+          <a:schemeClr val="phClr"/>
+        </a:solidFill>
+        <a:solidFill>
+          <a:schemeClr val="phClr">
+            <a:tint val="95000"/>
+            <a:satMod val="170000"/>
+          </a:schemeClr>
+        </a:solidFill>
+        <a:gradFill rotWithShape="1">
+          <a:gsLst>
+            <a:gs pos="0">
+              <a:schemeClr val="phClr">
+                <a:tint val="93000"/>
+                <a:satMod val="150000"/>
+                <a:shade val="98000"/>
+                <a:lumMod val="102000"/>
+              </a:schemeClr>
+            </a:gs>
+            <a:gs pos="50000">
+              <a:schemeClr val="phClr">
+                <a:tint val="98000"/>
+                <a:satMod val="130000"/>
+                <a:shade val="90000"/>
+                <a:lumMod val="103000"/>
+              </a:schemeClr>
+            </a:gs>
+            <a:gs pos="100000">
+              <a:schemeClr val="phClr">
+                <a:shade val="63000"/>
+                <a:satMod val="120000"/>
+              </a:schemeClr>
+            </a:gs>
+          </a:gsLst>
+          <a:lin ang="5400000" scaled="0"/>
+        </a:gradFill>
+      </a:bgFillStyleLst>
+    </a:fmtScheme>
+  </a:themeElements>
+  <a:objectDefaults/>
+  <a:extraClrSchemeLst/>
+  <a:extLst>
+    <a:ext uri="{05A4C25C-085E-4340-85A3-A5531E510DB2}">
+      <thm15:themeFamily xmlns:thm15="http://schemas.microsoft.com/office/thememl/2012/main" name="Office Theme" id="{62F939B6-93AF-4DB8-9C6B-D6C7DFDC589F}" vid="{4A3C46E8-61CC-4603-A589-7422A47A8E4A}"/>
+    </a:ext>
+  </a:extLst>
+</a:theme>
 </file>
</xml_diff>

<commit_message>
Revisited question 9 and cleaned up ppt
</commit_message>
<xml_diff>
--- a/Group4_CaseStudy1.pptx
+++ b/Group4_CaseStudy1.pptx
@@ -155,8 +155,165 @@
 <p1510:revInfo xmlns:a="http://schemas.openxmlformats.org/drawingml/2006/main" xmlns:r="http://schemas.openxmlformats.org/officeDocument/2006/relationships" xmlns:p1510="http://schemas.microsoft.com/office/powerpoint/2015/10/main">
   <p1510:revLst>
     <p1510:client id="{6F1C8413-048E-6348-8840-96068DEAACA4}" v="395" dt="2023-02-26T19:17:12.034"/>
+    <p1510:client id="{95A7744D-8E6F-0444-BE1D-0193AF195432}" v="106" dt="2023-02-26T19:54:32.796"/>
   </p1510:revLst>
 </p1510:revInfo>
+</file>
+
+<file path=ppt/changesInfos/changesInfo1.xml><?xml version="1.0" encoding="utf-8"?>
+<pc:chgInfo xmlns:a="http://schemas.openxmlformats.org/drawingml/2006/main" xmlns:r="http://schemas.openxmlformats.org/officeDocument/2006/relationships" xmlns:ac="http://schemas.microsoft.com/office/drawing/2013/main/command" xmlns:pc="http://schemas.microsoft.com/office/powerpoint/2013/main/command">
+  <pc:docChgLst>
+    <pc:chgData name="Cox, Steven" userId="d4828730-847f-4569-a521-753674d89216" providerId="ADAL" clId="{95A7744D-8E6F-0444-BE1D-0193AF195432}"/>
+    <pc:docChg chg="undo custSel modSld">
+      <pc:chgData name="Cox, Steven" userId="d4828730-847f-4569-a521-753674d89216" providerId="ADAL" clId="{95A7744D-8E6F-0444-BE1D-0193AF195432}" dt="2023-02-26T19:54:32.796" v="208"/>
+      <pc:docMkLst>
+        <pc:docMk/>
+      </pc:docMkLst>
+      <pc:sldChg chg="addSp delSp modSp mod delAnim modAnim">
+        <pc:chgData name="Cox, Steven" userId="d4828730-847f-4569-a521-753674d89216" providerId="ADAL" clId="{95A7744D-8E6F-0444-BE1D-0193AF195432}" dt="2023-02-26T19:50:01.626" v="169"/>
+        <pc:sldMkLst>
+          <pc:docMk/>
+          <pc:sldMk cId="2993181200" sldId="2581"/>
+        </pc:sldMkLst>
+        <pc:spChg chg="add del mod">
+          <ac:chgData name="Cox, Steven" userId="d4828730-847f-4569-a521-753674d89216" providerId="ADAL" clId="{95A7744D-8E6F-0444-BE1D-0193AF195432}" dt="2023-02-26T19:50:01.626" v="169"/>
+          <ac:spMkLst>
+            <pc:docMk/>
+            <pc:sldMk cId="2993181200" sldId="2581"/>
+            <ac:spMk id="3" creationId="{C8E9A096-3A28-C4B1-E7D3-9104EF35CDE0}"/>
+          </ac:spMkLst>
+        </pc:spChg>
+        <pc:spChg chg="mod">
+          <ac:chgData name="Cox, Steven" userId="d4828730-847f-4569-a521-753674d89216" providerId="ADAL" clId="{95A7744D-8E6F-0444-BE1D-0193AF195432}" dt="2023-02-26T19:48:56.187" v="76" actId="20577"/>
+          <ac:spMkLst>
+            <pc:docMk/>
+            <pc:sldMk cId="2993181200" sldId="2581"/>
+            <ac:spMk id="6" creationId="{1044D83D-C6D1-011B-B6B7-4FB2B0DB3747}"/>
+          </ac:spMkLst>
+        </pc:spChg>
+        <pc:spChg chg="mod">
+          <ac:chgData name="Cox, Steven" userId="d4828730-847f-4569-a521-753674d89216" providerId="ADAL" clId="{95A7744D-8E6F-0444-BE1D-0193AF195432}" dt="2023-02-26T19:49:38.593" v="163" actId="20577"/>
+          <ac:spMkLst>
+            <pc:docMk/>
+            <pc:sldMk cId="2993181200" sldId="2581"/>
+            <ac:spMk id="7" creationId="{8BD0DB13-E229-CDF1-11CD-D7D93D9FEF39}"/>
+          </ac:spMkLst>
+        </pc:spChg>
+        <pc:spChg chg="del">
+          <ac:chgData name="Cox, Steven" userId="d4828730-847f-4569-a521-753674d89216" providerId="ADAL" clId="{95A7744D-8E6F-0444-BE1D-0193AF195432}" dt="2023-02-26T19:48:22.128" v="10" actId="21"/>
+          <ac:spMkLst>
+            <pc:docMk/>
+            <pc:sldMk cId="2993181200" sldId="2581"/>
+            <ac:spMk id="8" creationId="{7804ECD1-99C5-9142-5AA2-F40F0989C450}"/>
+          </ac:spMkLst>
+        </pc:spChg>
+        <pc:picChg chg="add mod">
+          <ac:chgData name="Cox, Steven" userId="d4828730-847f-4569-a521-753674d89216" providerId="ADAL" clId="{95A7744D-8E6F-0444-BE1D-0193AF195432}" dt="2023-02-26T19:48:04.450" v="6" actId="1076"/>
+          <ac:picMkLst>
+            <pc:docMk/>
+            <pc:sldMk cId="2993181200" sldId="2581"/>
+            <ac:picMk id="2" creationId="{6B1A469D-033A-0FC7-59F1-319E81118579}"/>
+          </ac:picMkLst>
+        </pc:picChg>
+        <pc:picChg chg="del">
+          <ac:chgData name="Cox, Steven" userId="d4828730-847f-4569-a521-753674d89216" providerId="ADAL" clId="{95A7744D-8E6F-0444-BE1D-0193AF195432}" dt="2023-02-26T19:48:01.885" v="5" actId="21"/>
+          <ac:picMkLst>
+            <pc:docMk/>
+            <pc:sldMk cId="2993181200" sldId="2581"/>
+            <ac:picMk id="9" creationId="{279FB6D2-DDE2-26CA-5A39-15E2A8FDC358}"/>
+          </ac:picMkLst>
+        </pc:picChg>
+      </pc:sldChg>
+      <pc:sldChg chg="addSp delSp modSp mod delAnim modAnim">
+        <pc:chgData name="Cox, Steven" userId="d4828730-847f-4569-a521-753674d89216" providerId="ADAL" clId="{95A7744D-8E6F-0444-BE1D-0193AF195432}" dt="2023-02-26T19:54:32.796" v="208"/>
+        <pc:sldMkLst>
+          <pc:docMk/>
+          <pc:sldMk cId="3312396601" sldId="2583"/>
+        </pc:sldMkLst>
+        <pc:spChg chg="add mod">
+          <ac:chgData name="Cox, Steven" userId="d4828730-847f-4569-a521-753674d89216" providerId="ADAL" clId="{95A7744D-8E6F-0444-BE1D-0193AF195432}" dt="2023-02-26T19:52:49.900" v="197" actId="1076"/>
+          <ac:spMkLst>
+            <pc:docMk/>
+            <pc:sldMk cId="3312396601" sldId="2583"/>
+            <ac:spMk id="4" creationId="{E9A80576-7D0B-5866-65F5-2F8574D0A188}"/>
+          </ac:spMkLst>
+        </pc:spChg>
+        <pc:spChg chg="mod">
+          <ac:chgData name="Cox, Steven" userId="d4828730-847f-4569-a521-753674d89216" providerId="ADAL" clId="{95A7744D-8E6F-0444-BE1D-0193AF195432}" dt="2023-02-26T19:48:38.435" v="35" actId="20577"/>
+          <ac:spMkLst>
+            <pc:docMk/>
+            <pc:sldMk cId="3312396601" sldId="2583"/>
+            <ac:spMk id="6" creationId="{1044D83D-C6D1-011B-B6B7-4FB2B0DB3747}"/>
+          </ac:spMkLst>
+        </pc:spChg>
+        <pc:spChg chg="del">
+          <ac:chgData name="Cox, Steven" userId="d4828730-847f-4569-a521-753674d89216" providerId="ADAL" clId="{95A7744D-8E6F-0444-BE1D-0193AF195432}" dt="2023-02-26T19:48:12.876" v="7" actId="21"/>
+          <ac:spMkLst>
+            <pc:docMk/>
+            <pc:sldMk cId="3312396601" sldId="2583"/>
+            <ac:spMk id="7" creationId="{8BD0DB13-E229-CDF1-11CD-D7D93D9FEF39}"/>
+          </ac:spMkLst>
+        </pc:spChg>
+        <pc:spChg chg="mod">
+          <ac:chgData name="Cox, Steven" userId="d4828730-847f-4569-a521-753674d89216" providerId="ADAL" clId="{95A7744D-8E6F-0444-BE1D-0193AF195432}" dt="2023-02-26T19:52:46.233" v="196" actId="1076"/>
+          <ac:spMkLst>
+            <pc:docMk/>
+            <pc:sldMk cId="3312396601" sldId="2583"/>
+            <ac:spMk id="8" creationId="{7804ECD1-99C5-9142-5AA2-F40F0989C450}"/>
+          </ac:spMkLst>
+        </pc:spChg>
+        <pc:spChg chg="add del mod">
+          <ac:chgData name="Cox, Steven" userId="d4828730-847f-4569-a521-753674d89216" providerId="ADAL" clId="{95A7744D-8E6F-0444-BE1D-0193AF195432}" dt="2023-02-26T19:52:01.747" v="186"/>
+          <ac:spMkLst>
+            <pc:docMk/>
+            <pc:sldMk cId="3312396601" sldId="2583"/>
+            <ac:spMk id="9" creationId="{160C509F-A178-3287-2551-B2AD202D3A43}"/>
+          </ac:spMkLst>
+        </pc:spChg>
+        <pc:spChg chg="add mod">
+          <ac:chgData name="Cox, Steven" userId="d4828730-847f-4569-a521-753674d89216" providerId="ADAL" clId="{95A7744D-8E6F-0444-BE1D-0193AF195432}" dt="2023-02-26T19:54:11.768" v="206" actId="1076"/>
+          <ac:spMkLst>
+            <pc:docMk/>
+            <pc:sldMk cId="3312396601" sldId="2583"/>
+            <ac:spMk id="12" creationId="{653FB081-8D31-2BDC-9D87-ACE2026F74FF}"/>
+          </ac:spMkLst>
+        </pc:spChg>
+        <pc:picChg chg="add mod">
+          <ac:chgData name="Cox, Steven" userId="d4828730-847f-4569-a521-753674d89216" providerId="ADAL" clId="{95A7744D-8E6F-0444-BE1D-0193AF195432}" dt="2023-02-26T19:50:30.272" v="176" actId="14100"/>
+          <ac:picMkLst>
+            <pc:docMk/>
+            <pc:sldMk cId="3312396601" sldId="2583"/>
+            <ac:picMk id="2" creationId="{77D67A25-040A-CD6C-E320-2BB7AEA266A2}"/>
+          </ac:picMkLst>
+        </pc:picChg>
+        <pc:picChg chg="mod">
+          <ac:chgData name="Cox, Steven" userId="d4828730-847f-4569-a521-753674d89216" providerId="ADAL" clId="{95A7744D-8E6F-0444-BE1D-0193AF195432}" dt="2023-02-26T19:50:35.212" v="178" actId="1076"/>
+          <ac:picMkLst>
+            <pc:docMk/>
+            <pc:sldMk cId="3312396601" sldId="2583"/>
+            <ac:picMk id="3" creationId="{9F9E42E0-363A-3168-87B9-03FE4CDBC334}"/>
+          </ac:picMkLst>
+        </pc:picChg>
+        <pc:picChg chg="del mod">
+          <ac:chgData name="Cox, Steven" userId="d4828730-847f-4569-a521-753674d89216" providerId="ADAL" clId="{95A7744D-8E6F-0444-BE1D-0193AF195432}" dt="2023-02-26T19:47:55.692" v="3" actId="21"/>
+          <ac:picMkLst>
+            <pc:docMk/>
+            <pc:sldMk cId="3312396601" sldId="2583"/>
+            <ac:picMk id="5" creationId="{BFBE3718-3BD8-16EA-F283-B444B032C914}"/>
+          </ac:picMkLst>
+        </pc:picChg>
+        <pc:picChg chg="add mod">
+          <ac:chgData name="Cox, Steven" userId="d4828730-847f-4569-a521-753674d89216" providerId="ADAL" clId="{95A7744D-8E6F-0444-BE1D-0193AF195432}" dt="2023-02-26T19:52:36.206" v="195" actId="14100"/>
+          <ac:picMkLst>
+            <pc:docMk/>
+            <pc:sldMk cId="3312396601" sldId="2583"/>
+            <ac:picMk id="11" creationId="{0D03068F-D6C7-F755-FAE7-57A54A9AD174}"/>
+          </ac:picMkLst>
+        </pc:picChg>
+      </pc:sldChg>
+    </pc:docChg>
+  </pc:docChgLst>
+</pc:chgInfo>
 </file>
 
 <file path=ppt/handoutMasters/handoutMaster1.xml><?xml version="1.0" encoding="utf-8"?>
@@ -253,7 +410,7 @@
           <a:p>
             <a:fld id="{0248B25D-8766-427E-8C9E-4845048D8DFC}" type="datetimeFigureOut">
               <a:rPr lang="en-US" smtClean="0"/>
-              <a:t>2/25/23</a:t>
+              <a:t>2/26/23</a:t>
             </a:fld>
             <a:endParaRPr lang="en-US" dirty="0"/>
           </a:p>
@@ -430,7 +587,7 @@
           <a:p>
             <a:fld id="{426F439B-391B-4B41-826A-951FCF412C34}" type="datetimeFigureOut">
               <a:rPr lang="en-US" smtClean="0"/>
-              <a:t>2/25/23</a:t>
+              <a:t>2/26/23</a:t>
             </a:fld>
             <a:endParaRPr lang="en-US" dirty="0"/>
           </a:p>
@@ -17896,7 +18053,7 @@
             <a:pPr algn="ctr"/>
             <a:r>
               <a:rPr lang="en-US" b="1" dirty="0"/>
-              <a:t>Comparing the ABV Between the Different Styles of Beer</a:t>
+              <a:t>Comparing the ABV and Bitterness  Between the Between Ales and IPAs</a:t>
             </a:r>
           </a:p>
         </p:txBody>
@@ -17915,8 +18072,8 @@
         </p:nvSpPr>
         <p:spPr>
           <a:xfrm>
-            <a:off x="126999" y="4865985"/>
-            <a:ext cx="4521200" cy="646331"/>
+            <a:off x="126998" y="4865985"/>
+            <a:ext cx="8229601" cy="646331"/>
           </a:xfrm>
           <a:prstGeom prst="rect">
             <a:avLst/>
@@ -17931,58 +18088,17 @@
           <a:p>
             <a:r>
               <a:rPr lang="en-US" dirty="0"/>
-              <a:t>Here we can clearly see the difference in </a:t>
-            </a:r>
-          </a:p>
-          <a:p>
-            <a:r>
-              <a:rPr lang="en-US" dirty="0"/>
-              <a:t>ABV between Ales and IPAs</a:t>
-            </a:r>
-          </a:p>
-        </p:txBody>
-      </p:sp>
-      <p:sp>
-        <p:nvSpPr>
-          <p:cNvPr id="8" name="TextBox 7">
-            <a:extLst>
-              <a:ext uri="{FF2B5EF4-FFF2-40B4-BE49-F238E27FC236}">
-                <a16:creationId xmlns:a16="http://schemas.microsoft.com/office/drawing/2014/main" id="{7804ECD1-99C5-9142-5AA2-F40F0989C450}"/>
-              </a:ext>
-            </a:extLst>
-          </p:cNvPr>
-          <p:cNvSpPr txBox="1"/>
-          <p:nvPr/>
-        </p:nvSpPr>
-        <p:spPr>
-          <a:xfrm>
-            <a:off x="5848350" y="4865985"/>
-            <a:ext cx="4013200" cy="1200329"/>
-          </a:xfrm>
-          <a:prstGeom prst="rect">
-            <a:avLst/>
-          </a:prstGeom>
-          <a:noFill/>
-        </p:spPr>
-        <p:txBody>
-          <a:bodyPr wrap="square" rtlCol="0">
-            <a:spAutoFit/>
-          </a:bodyPr>
-          <a:lstStyle/>
-          <a:p>
-            <a:r>
-              <a:rPr lang="en-US" dirty="0"/>
-              <a:t>After expanding the ABV’s over the different beer styles, we can better visualize how to group the alcohol content . </a:t>
+              <a:t>Here we can clearly see the difference in the ABV and IBU values between Ales and IPAs as we did previously.</a:t>
             </a:r>
           </a:p>
         </p:txBody>
       </p:sp>
       <p:pic>
         <p:nvPicPr>
-          <p:cNvPr id="9" name="Picture 8">
-            <a:extLst>
-              <a:ext uri="{FF2B5EF4-FFF2-40B4-BE49-F238E27FC236}">
-                <a16:creationId xmlns:a16="http://schemas.microsoft.com/office/drawing/2014/main" id="{279FB6D2-DDE2-26CA-5A39-15E2A8FDC358}"/>
+          <p:cNvPr id="10" name="Picture 9">
+            <a:extLst>
+              <a:ext uri="{FF2B5EF4-FFF2-40B4-BE49-F238E27FC236}">
+                <a16:creationId xmlns:a16="http://schemas.microsoft.com/office/drawing/2014/main" id="{884891EF-E476-41E4-67BA-0E325B3DB0C8}"/>
               </a:ext>
             </a:extLst>
           </p:cNvPr>
@@ -17999,7 +18115,7 @@
         </p:blipFill>
         <p:spPr>
           <a:xfrm>
-            <a:off x="5808833" y="1200150"/>
+            <a:off x="126999" y="1200150"/>
             <a:ext cx="5341767" cy="3409950"/>
           </a:xfrm>
           <a:prstGeom prst="rect">
@@ -18009,10 +18125,10 @@
       </p:pic>
       <p:pic>
         <p:nvPicPr>
-          <p:cNvPr id="10" name="Picture 9">
-            <a:extLst>
-              <a:ext uri="{FF2B5EF4-FFF2-40B4-BE49-F238E27FC236}">
-                <a16:creationId xmlns:a16="http://schemas.microsoft.com/office/drawing/2014/main" id="{884891EF-E476-41E4-67BA-0E325B3DB0C8}"/>
+          <p:cNvPr id="2" name="Picture 1">
+            <a:extLst>
+              <a:ext uri="{FF2B5EF4-FFF2-40B4-BE49-F238E27FC236}">
+                <a16:creationId xmlns:a16="http://schemas.microsoft.com/office/drawing/2014/main" id="{6B1A469D-033A-0FC7-59F1-319E81118579}"/>
               </a:ext>
             </a:extLst>
           </p:cNvPr>
@@ -18029,7 +18145,7 @@
         </p:blipFill>
         <p:spPr>
           <a:xfrm>
-            <a:off x="126999" y="1200150"/>
+            <a:off x="5848350" y="1200150"/>
             <a:ext cx="5341767" cy="3409950"/>
           </a:xfrm>
           <a:prstGeom prst="rect">
@@ -18047,184 +18163,6 @@
   <p:clrMapOvr>
     <a:masterClrMapping/>
   </p:clrMapOvr>
-  <p:timing>
-    <p:tnLst>
-      <p:par>
-        <p:cTn id="1" dur="indefinite" restart="never" nodeType="tmRoot">
-          <p:childTnLst>
-            <p:seq concurrent="1" nextAc="seek">
-              <p:cTn id="2" dur="indefinite" nodeType="mainSeq">
-                <p:childTnLst>
-                  <p:par>
-                    <p:cTn id="3" fill="hold">
-                      <p:stCondLst>
-                        <p:cond delay="indefinite"/>
-                      </p:stCondLst>
-                      <p:childTnLst>
-                        <p:par>
-                          <p:cTn id="4" fill="hold">
-                            <p:stCondLst>
-                              <p:cond delay="0"/>
-                            </p:stCondLst>
-                            <p:childTnLst>
-                              <p:par>
-                                <p:cTn id="5" presetID="1" presetClass="entr" presetSubtype="0" fill="hold" nodeType="clickEffect">
-                                  <p:stCondLst>
-                                    <p:cond delay="0"/>
-                                  </p:stCondLst>
-                                  <p:childTnLst>
-                                    <p:set>
-                                      <p:cBhvr>
-                                        <p:cTn id="6" dur="1" fill="hold">
-                                          <p:stCondLst>
-                                            <p:cond delay="0"/>
-                                          </p:stCondLst>
-                                        </p:cTn>
-                                        <p:tgtEl>
-                                          <p:spTgt spid="10"/>
-                                        </p:tgtEl>
-                                        <p:attrNameLst>
-                                          <p:attrName>style.visibility</p:attrName>
-                                        </p:attrNameLst>
-                                      </p:cBhvr>
-                                      <p:to>
-                                        <p:strVal val="visible"/>
-                                      </p:to>
-                                    </p:set>
-                                  </p:childTnLst>
-                                </p:cTn>
-                              </p:par>
-                              <p:par>
-                                <p:cTn id="7" presetID="1" presetClass="entr" presetSubtype="0" fill="hold" grpId="0" nodeType="withEffect">
-                                  <p:stCondLst>
-                                    <p:cond delay="0"/>
-                                  </p:stCondLst>
-                                  <p:childTnLst>
-                                    <p:set>
-                                      <p:cBhvr>
-                                        <p:cTn id="8" dur="1" fill="hold">
-                                          <p:stCondLst>
-                                            <p:cond delay="0"/>
-                                          </p:stCondLst>
-                                        </p:cTn>
-                                        <p:tgtEl>
-                                          <p:spTgt spid="7"/>
-                                        </p:tgtEl>
-                                        <p:attrNameLst>
-                                          <p:attrName>style.visibility</p:attrName>
-                                        </p:attrNameLst>
-                                      </p:cBhvr>
-                                      <p:to>
-                                        <p:strVal val="visible"/>
-                                      </p:to>
-                                    </p:set>
-                                  </p:childTnLst>
-                                </p:cTn>
-                              </p:par>
-                            </p:childTnLst>
-                          </p:cTn>
-                        </p:par>
-                      </p:childTnLst>
-                    </p:cTn>
-                  </p:par>
-                  <p:par>
-                    <p:cTn id="9" fill="hold">
-                      <p:stCondLst>
-                        <p:cond delay="indefinite"/>
-                      </p:stCondLst>
-                      <p:childTnLst>
-                        <p:par>
-                          <p:cTn id="10" fill="hold">
-                            <p:stCondLst>
-                              <p:cond delay="0"/>
-                            </p:stCondLst>
-                            <p:childTnLst>
-                              <p:par>
-                                <p:cTn id="11" presetID="1" presetClass="entr" presetSubtype="0" fill="hold" grpId="0" nodeType="clickEffect">
-                                  <p:stCondLst>
-                                    <p:cond delay="0"/>
-                                  </p:stCondLst>
-                                  <p:childTnLst>
-                                    <p:set>
-                                      <p:cBhvr>
-                                        <p:cTn id="12" dur="1" fill="hold">
-                                          <p:stCondLst>
-                                            <p:cond delay="0"/>
-                                          </p:stCondLst>
-                                        </p:cTn>
-                                        <p:tgtEl>
-                                          <p:spTgt spid="8"/>
-                                        </p:tgtEl>
-                                        <p:attrNameLst>
-                                          <p:attrName>style.visibility</p:attrName>
-                                        </p:attrNameLst>
-                                      </p:cBhvr>
-                                      <p:to>
-                                        <p:strVal val="visible"/>
-                                      </p:to>
-                                    </p:set>
-                                  </p:childTnLst>
-                                </p:cTn>
-                              </p:par>
-                              <p:par>
-                                <p:cTn id="13" presetID="1" presetClass="entr" presetSubtype="0" fill="hold" nodeType="withEffect">
-                                  <p:stCondLst>
-                                    <p:cond delay="0"/>
-                                  </p:stCondLst>
-                                  <p:childTnLst>
-                                    <p:set>
-                                      <p:cBhvr>
-                                        <p:cTn id="14" dur="1" fill="hold">
-                                          <p:stCondLst>
-                                            <p:cond delay="0"/>
-                                          </p:stCondLst>
-                                        </p:cTn>
-                                        <p:tgtEl>
-                                          <p:spTgt spid="9"/>
-                                        </p:tgtEl>
-                                        <p:attrNameLst>
-                                          <p:attrName>style.visibility</p:attrName>
-                                        </p:attrNameLst>
-                                      </p:cBhvr>
-                                      <p:to>
-                                        <p:strVal val="visible"/>
-                                      </p:to>
-                                    </p:set>
-                                  </p:childTnLst>
-                                </p:cTn>
-                              </p:par>
-                            </p:childTnLst>
-                          </p:cTn>
-                        </p:par>
-                      </p:childTnLst>
-                    </p:cTn>
-                  </p:par>
-                </p:childTnLst>
-              </p:cTn>
-              <p:prevCondLst>
-                <p:cond evt="onPrev" delay="0">
-                  <p:tgtEl>
-                    <p:sldTgt/>
-                  </p:tgtEl>
-                </p:cond>
-              </p:prevCondLst>
-              <p:nextCondLst>
-                <p:cond evt="onNext" delay="0">
-                  <p:tgtEl>
-                    <p:sldTgt/>
-                  </p:tgtEl>
-                </p:cond>
-              </p:nextCondLst>
-            </p:seq>
-          </p:childTnLst>
-        </p:cTn>
-      </p:par>
-    </p:tnLst>
-    <p:bldLst>
-      <p:bldP spid="7" grpId="0"/>
-      <p:bldP spid="8" grpId="0"/>
-    </p:bldLst>
-  </p:timing>
 </p:sld>
 </file>
 
@@ -18301,20 +18239,91 @@
         </p:blipFill>
         <p:spPr>
           <a:xfrm>
-            <a:off x="5727699" y="1200150"/>
-            <a:ext cx="5341767" cy="3409950"/>
+            <a:off x="4228932" y="1200150"/>
+            <a:ext cx="3734135" cy="2383708"/>
           </a:xfrm>
           <a:prstGeom prst="rect">
             <a:avLst/>
           </a:prstGeom>
         </p:spPr>
       </p:pic>
+      <p:sp>
+        <p:nvSpPr>
+          <p:cNvPr id="6" name="TextBox 5">
+            <a:extLst>
+              <a:ext uri="{FF2B5EF4-FFF2-40B4-BE49-F238E27FC236}">
+                <a16:creationId xmlns:a16="http://schemas.microsoft.com/office/drawing/2014/main" id="{1044D83D-C6D1-011B-B6B7-4FB2B0DB3747}"/>
+              </a:ext>
+            </a:extLst>
+          </p:cNvPr>
+          <p:cNvSpPr txBox="1"/>
+          <p:nvPr/>
+        </p:nvSpPr>
+        <p:spPr>
+          <a:xfrm>
+            <a:off x="317500" y="482600"/>
+            <a:ext cx="10833100" cy="369332"/>
+          </a:xfrm>
+          <a:prstGeom prst="rect">
+            <a:avLst/>
+          </a:prstGeom>
+          <a:noFill/>
+        </p:spPr>
+        <p:txBody>
+          <a:bodyPr wrap="square" rtlCol="0">
+            <a:spAutoFit/>
+          </a:bodyPr>
+          <a:lstStyle/>
+          <a:p>
+            <a:pPr algn="ctr"/>
+            <a:r>
+              <a:rPr lang="en-US" b="1" dirty="0"/>
+              <a:t>Comparing the ABV and Bitterness Between the Different Styles of Beer</a:t>
+            </a:r>
+          </a:p>
+        </p:txBody>
+      </p:sp>
+      <p:sp>
+        <p:nvSpPr>
+          <p:cNvPr id="8" name="TextBox 7">
+            <a:extLst>
+              <a:ext uri="{FF2B5EF4-FFF2-40B4-BE49-F238E27FC236}">
+                <a16:creationId xmlns:a16="http://schemas.microsoft.com/office/drawing/2014/main" id="{7804ECD1-99C5-9142-5AA2-F40F0989C450}"/>
+              </a:ext>
+            </a:extLst>
+          </p:cNvPr>
+          <p:cNvSpPr txBox="1"/>
+          <p:nvPr/>
+        </p:nvSpPr>
+        <p:spPr>
+          <a:xfrm>
+            <a:off x="4228932" y="3725638"/>
+            <a:ext cx="3734135" cy="954107"/>
+          </a:xfrm>
+          <a:prstGeom prst="rect">
+            <a:avLst/>
+          </a:prstGeom>
+          <a:noFill/>
+        </p:spPr>
+        <p:txBody>
+          <a:bodyPr wrap="square" rtlCol="0">
+            <a:spAutoFit/>
+          </a:bodyPr>
+          <a:lstStyle/>
+          <a:p>
+            <a:r>
+              <a:rPr lang="en-US" sz="1400" dirty="0"/>
+              <a:t>Expanding the beer styles, we can see that other styles of beer are more closely aligned with Ales than IPAs.  With Ales, Pilsners, and Porters statistically the same. </a:t>
+            </a:r>
+          </a:p>
+        </p:txBody>
+      </p:sp>
       <p:pic>
         <p:nvPicPr>
-          <p:cNvPr id="5" name="Picture 4">
-            <a:extLst>
-              <a:ext uri="{FF2B5EF4-FFF2-40B4-BE49-F238E27FC236}">
-                <a16:creationId xmlns:a16="http://schemas.microsoft.com/office/drawing/2014/main" id="{BFBE3718-3BD8-16EA-F283-B444B032C914}"/>
+          <p:cNvPr id="2" name="Picture 1">
+            <a:extLst>
+              <a:ext uri="{FF2B5EF4-FFF2-40B4-BE49-F238E27FC236}">
+                <a16:creationId xmlns:a16="http://schemas.microsoft.com/office/drawing/2014/main" id="{77D67A25-040A-CD6C-E320-2BB7AEA266A2}"/>
               </a:ext>
             </a:extLst>
           </p:cNvPr>
@@ -18331,8 +18340,8 @@
         </p:blipFill>
         <p:spPr>
           <a:xfrm>
-            <a:off x="146049" y="1200150"/>
-            <a:ext cx="5341767" cy="3409950"/>
+            <a:off x="311150" y="1200150"/>
+            <a:ext cx="3734135" cy="2383708"/>
           </a:xfrm>
           <a:prstGeom prst="rect">
             <a:avLst/>
@@ -18341,10 +18350,10 @@
       </p:pic>
       <p:sp>
         <p:nvSpPr>
-          <p:cNvPr id="6" name="TextBox 5">
-            <a:extLst>
-              <a:ext uri="{FF2B5EF4-FFF2-40B4-BE49-F238E27FC236}">
-                <a16:creationId xmlns:a16="http://schemas.microsoft.com/office/drawing/2014/main" id="{1044D83D-C6D1-011B-B6B7-4FB2B0DB3747}"/>
+          <p:cNvPr id="4" name="TextBox 3">
+            <a:extLst>
+              <a:ext uri="{FF2B5EF4-FFF2-40B4-BE49-F238E27FC236}">
+                <a16:creationId xmlns:a16="http://schemas.microsoft.com/office/drawing/2014/main" id="{E9A80576-7D0B-5866-65F5-2F8574D0A188}"/>
               </a:ext>
             </a:extLst>
           </p:cNvPr>
@@ -18353,8 +18362,8 @@
         </p:nvSpPr>
         <p:spPr>
           <a:xfrm>
-            <a:off x="317500" y="482600"/>
-            <a:ext cx="10833100" cy="369332"/>
+            <a:off x="215732" y="3725638"/>
+            <a:ext cx="4013200" cy="738664"/>
           </a:xfrm>
           <a:prstGeom prst="rect">
             <a:avLst/>
@@ -18367,20 +18376,49 @@
           </a:bodyPr>
           <a:lstStyle/>
           <a:p>
-            <a:pPr algn="ctr"/>
-            <a:r>
-              <a:rPr lang="en-US" b="1" dirty="0"/>
-              <a:t>Comparing the Bitterness Between the Different Styles of Beer</a:t>
-            </a:r>
-          </a:p>
-        </p:txBody>
-      </p:sp>
-      <p:sp>
-        <p:nvSpPr>
-          <p:cNvPr id="7" name="TextBox 6">
-            <a:extLst>
-              <a:ext uri="{FF2B5EF4-FFF2-40B4-BE49-F238E27FC236}">
-                <a16:creationId xmlns:a16="http://schemas.microsoft.com/office/drawing/2014/main" id="{8BD0DB13-E229-CDF1-11CD-D7D93D9FEF39}"/>
+            <a:r>
+              <a:rPr lang="en-US" sz="1400" dirty="0"/>
+              <a:t>After expanding the ABV’s over the different beer styles, we can better visualize how to group the alcohol content . </a:t>
+            </a:r>
+          </a:p>
+        </p:txBody>
+      </p:sp>
+      <p:pic>
+        <p:nvPicPr>
+          <p:cNvPr id="11" name="Picture 10" descr="Table&#10;&#10;Description automatically generated">
+            <a:extLst>
+              <a:ext uri="{FF2B5EF4-FFF2-40B4-BE49-F238E27FC236}">
+                <a16:creationId xmlns:a16="http://schemas.microsoft.com/office/drawing/2014/main" id="{0D03068F-D6C7-F755-FAE7-57A54A9AD174}"/>
+              </a:ext>
+            </a:extLst>
+          </p:cNvPr>
+          <p:cNvPicPr>
+            <a:picLocks noChangeAspect="1"/>
+          </p:cNvPicPr>
+          <p:nvPr/>
+        </p:nvPicPr>
+        <p:blipFill>
+          <a:blip r:embed="rId4"/>
+          <a:stretch>
+            <a:fillRect/>
+          </a:stretch>
+        </p:blipFill>
+        <p:spPr>
+          <a:xfrm>
+            <a:off x="8266135" y="1200150"/>
+            <a:ext cx="3734135" cy="2633161"/>
+          </a:xfrm>
+          <a:prstGeom prst="rect">
+            <a:avLst/>
+          </a:prstGeom>
+        </p:spPr>
+      </p:pic>
+      <p:sp>
+        <p:nvSpPr>
+          <p:cNvPr id="12" name="TextBox 11">
+            <a:extLst>
+              <a:ext uri="{FF2B5EF4-FFF2-40B4-BE49-F238E27FC236}">
+                <a16:creationId xmlns:a16="http://schemas.microsoft.com/office/drawing/2014/main" id="{653FB081-8D31-2BDC-9D87-ACE2026F74FF}"/>
               </a:ext>
             </a:extLst>
           </p:cNvPr>
@@ -18389,8 +18427,8 @@
         </p:nvSpPr>
         <p:spPr>
           <a:xfrm>
-            <a:off x="184150" y="4958318"/>
-            <a:ext cx="4521200" cy="646331"/>
+            <a:off x="8421280" y="4089888"/>
+            <a:ext cx="3423843" cy="1169551"/>
           </a:xfrm>
           <a:prstGeom prst="rect">
             <a:avLst/>
@@ -18404,49 +18442,8 @@
           <a:lstStyle/>
           <a:p>
             <a:r>
-              <a:rPr lang="en-US" dirty="0"/>
-              <a:t>Here we can clearly see the difference in </a:t>
-            </a:r>
-          </a:p>
-          <a:p>
-            <a:r>
-              <a:rPr lang="en-US" dirty="0"/>
-              <a:t>Bitterness between Ales and IPAs</a:t>
-            </a:r>
-          </a:p>
-        </p:txBody>
-      </p:sp>
-      <p:sp>
-        <p:nvSpPr>
-          <p:cNvPr id="8" name="TextBox 7">
-            <a:extLst>
-              <a:ext uri="{FF2B5EF4-FFF2-40B4-BE49-F238E27FC236}">
-                <a16:creationId xmlns:a16="http://schemas.microsoft.com/office/drawing/2014/main" id="{7804ECD1-99C5-9142-5AA2-F40F0989C450}"/>
-              </a:ext>
-            </a:extLst>
-          </p:cNvPr>
-          <p:cNvSpPr txBox="1"/>
-          <p:nvPr/>
-        </p:nvSpPr>
-        <p:spPr>
-          <a:xfrm>
-            <a:off x="5848350" y="4865985"/>
-            <a:ext cx="4013200" cy="1477328"/>
-          </a:xfrm>
-          <a:prstGeom prst="rect">
-            <a:avLst/>
-          </a:prstGeom>
-          <a:noFill/>
-        </p:spPr>
-        <p:txBody>
-          <a:bodyPr wrap="square" rtlCol="0">
-            <a:spAutoFit/>
-          </a:bodyPr>
-          <a:lstStyle/>
-          <a:p>
-            <a:r>
-              <a:rPr lang="en-US" dirty="0"/>
-              <a:t>Expanding the beer styles, we can see that other styles of beer are more closely aligned with Ales than IPAs.  With Ales, Pilsners, and Porters statistically the same. </a:t>
+              <a:rPr lang="en-US" sz="1400" dirty="0"/>
+              <a:t>The model does pretty well. Overall accuracy is 0.71, meaning that it correctly classifies 71% beers. Considering that there are 7 categories, this is a very usable result.</a:t>
             </a:r>
           </a:p>
         </p:txBody>
@@ -18495,7 +18492,7 @@
                                           </p:stCondLst>
                                         </p:cTn>
                                         <p:tgtEl>
-                                          <p:spTgt spid="5"/>
+                                          <p:spTgt spid="11"/>
                                         </p:tgtEl>
                                         <p:attrNameLst>
                                           <p:attrName>style.visibility</p:attrName>
@@ -18522,79 +18519,7 @@
                                           </p:stCondLst>
                                         </p:cTn>
                                         <p:tgtEl>
-                                          <p:spTgt spid="7"/>
-                                        </p:tgtEl>
-                                        <p:attrNameLst>
-                                          <p:attrName>style.visibility</p:attrName>
-                                        </p:attrNameLst>
-                                      </p:cBhvr>
-                                      <p:to>
-                                        <p:strVal val="visible"/>
-                                      </p:to>
-                                    </p:set>
-                                  </p:childTnLst>
-                                </p:cTn>
-                              </p:par>
-                            </p:childTnLst>
-                          </p:cTn>
-                        </p:par>
-                      </p:childTnLst>
-                    </p:cTn>
-                  </p:par>
-                  <p:par>
-                    <p:cTn id="9" fill="hold">
-                      <p:stCondLst>
-                        <p:cond delay="indefinite"/>
-                      </p:stCondLst>
-                      <p:childTnLst>
-                        <p:par>
-                          <p:cTn id="10" fill="hold">
-                            <p:stCondLst>
-                              <p:cond delay="0"/>
-                            </p:stCondLst>
-                            <p:childTnLst>
-                              <p:par>
-                                <p:cTn id="11" presetID="1" presetClass="entr" presetSubtype="0" fill="hold" nodeType="clickEffect">
-                                  <p:stCondLst>
-                                    <p:cond delay="0"/>
-                                  </p:stCondLst>
-                                  <p:childTnLst>
-                                    <p:set>
-                                      <p:cBhvr>
-                                        <p:cTn id="12" dur="1" fill="hold">
-                                          <p:stCondLst>
-                                            <p:cond delay="0"/>
-                                          </p:stCondLst>
-                                        </p:cTn>
-                                        <p:tgtEl>
-                                          <p:spTgt spid="3"/>
-                                        </p:tgtEl>
-                                        <p:attrNameLst>
-                                          <p:attrName>style.visibility</p:attrName>
-                                        </p:attrNameLst>
-                                      </p:cBhvr>
-                                      <p:to>
-                                        <p:strVal val="visible"/>
-                                      </p:to>
-                                    </p:set>
-                                  </p:childTnLst>
-                                </p:cTn>
-                              </p:par>
-                              <p:par>
-                                <p:cTn id="13" presetID="1" presetClass="entr" presetSubtype="0" fill="hold" grpId="0" nodeType="withEffect">
-                                  <p:stCondLst>
-                                    <p:cond delay="0"/>
-                                  </p:stCondLst>
-                                  <p:childTnLst>
-                                    <p:set>
-                                      <p:cBhvr>
-                                        <p:cTn id="14" dur="1" fill="hold">
-                                          <p:stCondLst>
-                                            <p:cond delay="0"/>
-                                          </p:stCondLst>
-                                        </p:cTn>
-                                        <p:tgtEl>
-                                          <p:spTgt spid="8"/>
+                                          <p:spTgt spid="12"/>
                                         </p:tgtEl>
                                         <p:attrNameLst>
                                           <p:attrName>style.visibility</p:attrName>
@@ -18635,8 +18560,7 @@
       </p:par>
     </p:tnLst>
     <p:bldLst>
-      <p:bldP spid="7" grpId="0"/>
-      <p:bldP spid="8" grpId="0"/>
+      <p:bldP spid="12" grpId="0"/>
     </p:bldLst>
   </p:timing>
 </p:sld>
@@ -20686,7 +20610,7 @@
                                 </p:cTn>
                               </p:par>
                               <p:par>
-                                <p:cTn id="13" presetID="1" presetClass="entr" presetSubtype="0" fill="hold" grpId="1" nodeType="withEffect">
+                                <p:cTn id="13" presetID="1" presetClass="entr" presetSubtype="0" fill="hold" grpId="0" nodeType="withEffect">
                                   <p:stCondLst>
                                     <p:cond delay="0"/>
                                   </p:stCondLst>
@@ -20818,7 +20742,7 @@
     <p:bldLst>
       <p:bldP spid="21" grpId="0" build="p"/>
       <p:bldP spid="7" grpId="0" build="p"/>
-      <p:bldP spid="19" grpId="1"/>
+      <p:bldP spid="19" grpId="0"/>
     </p:bldLst>
   </p:timing>
 </p:sld>

</xml_diff>

<commit_message>
Minor Adjustments after rehearsing the presentation a few times.
Same power point, just with minor presentation adjustments if you choose to use them.
</commit_message>
<xml_diff>
--- a/Group4_CaseStudy1.pptx
+++ b/Group4_CaseStudy1.pptx
@@ -2,29 +2,29 @@
 <file path=ppt/presentation.xml><?xml version="1.0" encoding="utf-8"?>
 <p:presentation xmlns:a="http://schemas.openxmlformats.org/drawingml/2006/main" xmlns:r="http://schemas.openxmlformats.org/officeDocument/2006/relationships" xmlns:p="http://schemas.openxmlformats.org/presentationml/2006/main" saveSubsetFonts="1" autoCompressPictures="0">
   <p:sldMasterIdLst>
-    <p:sldMasterId id="2147483648" r:id="rId1"/>
+    <p:sldMasterId id="2147483648" r:id="rId3"/>
   </p:sldMasterIdLst>
   <p:notesMasterIdLst>
-    <p:notesMasterId r:id="rId16"/>
+    <p:notesMasterId r:id="rId18"/>
   </p:notesMasterIdLst>
   <p:handoutMasterIdLst>
-    <p:handoutMasterId r:id="rId17"/>
+    <p:handoutMasterId r:id="rId19"/>
   </p:handoutMasterIdLst>
   <p:sldIdLst>
-    <p:sldId id="2524" r:id="rId2"/>
-    <p:sldId id="2542" r:id="rId3"/>
-    <p:sldId id="2554" r:id="rId4"/>
-    <p:sldId id="2575" r:id="rId5"/>
-    <p:sldId id="2576" r:id="rId6"/>
-    <p:sldId id="2577" r:id="rId7"/>
-    <p:sldId id="2578" r:id="rId8"/>
-    <p:sldId id="2579" r:id="rId9"/>
-    <p:sldId id="2580" r:id="rId10"/>
-    <p:sldId id="2582" r:id="rId11"/>
-    <p:sldId id="2581" r:id="rId12"/>
-    <p:sldId id="2583" r:id="rId13"/>
-    <p:sldId id="2584" r:id="rId14"/>
-    <p:sldId id="2574" r:id="rId15"/>
+    <p:sldId id="2524" r:id="rId4"/>
+    <p:sldId id="2542" r:id="rId5"/>
+    <p:sldId id="2554" r:id="rId6"/>
+    <p:sldId id="2575" r:id="rId7"/>
+    <p:sldId id="2576" r:id="rId8"/>
+    <p:sldId id="2577" r:id="rId9"/>
+    <p:sldId id="2578" r:id="rId10"/>
+    <p:sldId id="2579" r:id="rId11"/>
+    <p:sldId id="2580" r:id="rId12"/>
+    <p:sldId id="2581" r:id="rId13"/>
+    <p:sldId id="2582" r:id="rId14"/>
+    <p:sldId id="2583" r:id="rId15"/>
+    <p:sldId id="2584" r:id="rId16"/>
+    <p:sldId id="2574" r:id="rId17"/>
   </p:sldIdLst>
   <p:sldSz cx="12192000" cy="6858000"/>
   <p:notesSz cx="6858000" cy="9144000"/>
@@ -457,7 +457,7 @@
           <a:p>
             <a:fld id="{0248B25D-8766-427E-8C9E-4845048D8DFC}" type="datetimeFigureOut">
               <a:rPr lang="en-US" smtClean="0"/>
-              <a:t>2/26/23</a:t>
+              <a:t>2/27/2023</a:t>
             </a:fld>
             <a:endParaRPr lang="en-US" dirty="0"/>
           </a:p>
@@ -634,7 +634,7 @@
           <a:p>
             <a:fld id="{426F439B-391B-4B41-826A-951FCF412C34}" type="datetimeFigureOut">
               <a:rPr lang="en-US" smtClean="0"/>
-              <a:t>2/26/23</a:t>
+              <a:t>2/27/2023</a:t>
             </a:fld>
             <a:endParaRPr lang="en-US" dirty="0"/>
           </a:p>
@@ -806,6 +806,7 @@
     </p:extLst>
   </p:cSld>
   <p:clrMap bg1="lt1" tx1="dk1" bg2="lt2" tx2="dk2" accent1="accent1" accent2="accent2" accent3="accent3" accent4="accent4" accent5="accent5" accent6="accent6" hlink="hlink" folHlink="folHlink"/>
+  <p:hf dt="0"/>
   <p:notesStyle>
     <a:lvl1pPr marL="0" algn="l" defTabSz="914400" rtl="0" eaLnBrk="1" latinLnBrk="0" hangingPunct="1">
       <a:defRPr sz="1200" kern="1200">
@@ -1013,6 +1014,458 @@
           <a:p>
             <a:r>
               <a:rPr lang="en-US" dirty="0"/>
+              <a:t>We can see that the mean ABV of IPA's is significantly higher than the mean ABV of Ales. The error bars indicate that we can be 95% confident that their ranges are not even close to overlapping.</a:t>
+            </a:r>
+          </a:p>
+          <a:p>
+            <a:endParaRPr lang="en-US" dirty="0"/>
+          </a:p>
+          <a:p>
+            <a:endParaRPr lang="en-US" dirty="0"/>
+          </a:p>
+          <a:p>
+            <a:endParaRPr lang="en-US" dirty="0"/>
+          </a:p>
+        </p:txBody>
+      </p:sp>
+      <p:sp>
+        <p:nvSpPr>
+          <p:cNvPr id="4" name="Slide Number Placeholder 3"/>
+          <p:cNvSpPr>
+            <a:spLocks noGrp="1"/>
+          </p:cNvSpPr>
+          <p:nvPr>
+            <p:ph type="sldNum" sz="quarter" idx="5"/>
+          </p:nvPr>
+        </p:nvSpPr>
+        <p:spPr/>
+        <p:txBody>
+          <a:bodyPr/>
+          <a:lstStyle/>
+          <a:p>
+            <a:fld id="{3CFA0038-7055-434C-B6C4-B8C69565C600}" type="slidenum">
+              <a:rPr lang="en-US" smtClean="0"/>
+              <a:t>10</a:t>
+            </a:fld>
+            <a:endParaRPr lang="en-US" dirty="0"/>
+          </a:p>
+        </p:txBody>
+      </p:sp>
+    </p:spTree>
+    <p:extLst>
+      <p:ext uri="{BB962C8B-B14F-4D97-AF65-F5344CB8AC3E}">
+        <p14:creationId xmlns:p14="http://schemas.microsoft.com/office/powerpoint/2010/main" val="488637022"/>
+      </p:ext>
+    </p:extLst>
+  </p:cSld>
+  <p:clrMapOvr>
+    <a:masterClrMapping/>
+  </p:clrMapOvr>
+</p:notes>
+</file>
+
+<file path=ppt/notesSlides/notesSlide11.xml><?xml version="1.0" encoding="utf-8"?>
+<p:notes xmlns:a="http://schemas.openxmlformats.org/drawingml/2006/main" xmlns:r="http://schemas.openxmlformats.org/officeDocument/2006/relationships" xmlns:p="http://schemas.openxmlformats.org/presentationml/2006/main">
+  <p:cSld>
+    <p:spTree>
+      <p:nvGrpSpPr>
+        <p:cNvPr id="1" name=""/>
+        <p:cNvGrpSpPr/>
+        <p:nvPr/>
+      </p:nvGrpSpPr>
+      <p:grpSpPr>
+        <a:xfrm>
+          <a:off x="0" y="0"/>
+          <a:ext cx="0" cy="0"/>
+          <a:chOff x="0" y="0"/>
+          <a:chExt cx="0" cy="0"/>
+        </a:xfrm>
+      </p:grpSpPr>
+      <p:sp>
+        <p:nvSpPr>
+          <p:cNvPr id="2" name="Slide Image Placeholder 1"/>
+          <p:cNvSpPr>
+            <a:spLocks noGrp="1" noRot="1" noChangeAspect="1"/>
+          </p:cNvSpPr>
+          <p:nvPr>
+            <p:ph type="sldImg"/>
+          </p:nvPr>
+        </p:nvSpPr>
+        <p:spPr/>
+      </p:sp>
+      <p:sp>
+        <p:nvSpPr>
+          <p:cNvPr id="3" name="Notes Placeholder 2"/>
+          <p:cNvSpPr>
+            <a:spLocks noGrp="1"/>
+          </p:cNvSpPr>
+          <p:nvPr>
+            <p:ph type="body" idx="1"/>
+          </p:nvPr>
+        </p:nvSpPr>
+        <p:spPr/>
+        <p:txBody>
+          <a:bodyPr/>
+          <a:lstStyle/>
+          <a:p>
+            <a:endParaRPr lang="en-US" sz="1200" dirty="0">
+              <a:solidFill>
+                <a:srgbClr val="333333"/>
+              </a:solidFill>
+              <a:effectLst/>
+            </a:endParaRPr>
+          </a:p>
+        </p:txBody>
+      </p:sp>
+      <p:sp>
+        <p:nvSpPr>
+          <p:cNvPr id="4" name="Slide Number Placeholder 3"/>
+          <p:cNvSpPr>
+            <a:spLocks noGrp="1"/>
+          </p:cNvSpPr>
+          <p:nvPr>
+            <p:ph type="sldNum" sz="quarter" idx="5"/>
+          </p:nvPr>
+        </p:nvSpPr>
+        <p:spPr/>
+        <p:txBody>
+          <a:bodyPr/>
+          <a:lstStyle/>
+          <a:p>
+            <a:fld id="{3CFA0038-7055-434C-B6C4-B8C69565C600}" type="slidenum">
+              <a:rPr lang="en-US" smtClean="0"/>
+              <a:t>11</a:t>
+            </a:fld>
+            <a:endParaRPr lang="en-US" dirty="0"/>
+          </a:p>
+        </p:txBody>
+      </p:sp>
+    </p:spTree>
+    <p:extLst>
+      <p:ext uri="{BB962C8B-B14F-4D97-AF65-F5344CB8AC3E}">
+        <p14:creationId xmlns:p14="http://schemas.microsoft.com/office/powerpoint/2010/main" val="2620726275"/>
+      </p:ext>
+    </p:extLst>
+  </p:cSld>
+  <p:clrMapOvr>
+    <a:masterClrMapping/>
+  </p:clrMapOvr>
+</p:notes>
+</file>
+
+<file path=ppt/notesSlides/notesSlide12.xml><?xml version="1.0" encoding="utf-8"?>
+<p:notes xmlns:a="http://schemas.openxmlformats.org/drawingml/2006/main" xmlns:r="http://schemas.openxmlformats.org/officeDocument/2006/relationships" xmlns:p="http://schemas.openxmlformats.org/presentationml/2006/main">
+  <p:cSld>
+    <p:spTree>
+      <p:nvGrpSpPr>
+        <p:cNvPr id="1" name=""/>
+        <p:cNvGrpSpPr/>
+        <p:nvPr/>
+      </p:nvGrpSpPr>
+      <p:grpSpPr>
+        <a:xfrm>
+          <a:off x="0" y="0"/>
+          <a:ext cx="0" cy="0"/>
+          <a:chOff x="0" y="0"/>
+          <a:chExt cx="0" cy="0"/>
+        </a:xfrm>
+      </p:grpSpPr>
+      <p:sp>
+        <p:nvSpPr>
+          <p:cNvPr id="2" name="Slide Image Placeholder 1"/>
+          <p:cNvSpPr>
+            <a:spLocks noGrp="1" noRot="1" noChangeAspect="1"/>
+          </p:cNvSpPr>
+          <p:nvPr>
+            <p:ph type="sldImg"/>
+          </p:nvPr>
+        </p:nvSpPr>
+        <p:spPr/>
+      </p:sp>
+      <p:sp>
+        <p:nvSpPr>
+          <p:cNvPr id="3" name="Notes Placeholder 2"/>
+          <p:cNvSpPr>
+            <a:spLocks noGrp="1"/>
+          </p:cNvSpPr>
+          <p:nvPr>
+            <p:ph type="body" idx="1"/>
+          </p:nvPr>
+        </p:nvSpPr>
+        <p:spPr/>
+        <p:txBody>
+          <a:bodyPr/>
+          <a:lstStyle/>
+          <a:p>
+            <a:pPr marL="0" marR="0" lvl="0" indent="0" algn="l" defTabSz="914400" rtl="0" eaLnBrk="1" fontAlgn="auto" latinLnBrk="0" hangingPunct="1">
+              <a:lnSpc>
+                <a:spcPct val="100000"/>
+              </a:lnSpc>
+              <a:spcBef>
+                <a:spcPts val="0"/>
+              </a:spcBef>
+              <a:spcAft>
+                <a:spcPts val="0"/>
+              </a:spcAft>
+              <a:buClrTx/>
+              <a:buSzTx/>
+              <a:buFontTx/>
+              <a:buNone/>
+              <a:tabLst/>
+              <a:defRPr/>
+            </a:pPr>
+            <a:r>
+              <a:rPr lang="en-US" dirty="0"/>
+              <a:t>We can see that, while some categories have overlapping confidence intervals, most are different. The only categories that do not have a significant difference in their mean ABV values (p &gt; 0.05 including Bonferroni adjustment for post-hoc comparisons) are Ale and Other, IPA and Stout, Lager and Pilsner, and Other and Porter.</a:t>
+            </a:r>
+          </a:p>
+          <a:p>
+            <a:endParaRPr lang="en-US" dirty="0"/>
+          </a:p>
+        </p:txBody>
+      </p:sp>
+      <p:sp>
+        <p:nvSpPr>
+          <p:cNvPr id="4" name="Header Placeholder 3"/>
+          <p:cNvSpPr>
+            <a:spLocks noGrp="1"/>
+          </p:cNvSpPr>
+          <p:nvPr>
+            <p:ph type="hdr" sz="quarter"/>
+          </p:nvPr>
+        </p:nvSpPr>
+        <p:spPr/>
+        <p:txBody>
+          <a:bodyPr/>
+          <a:lstStyle/>
+          <a:p>
+            <a:endParaRPr lang="en-US" dirty="0"/>
+          </a:p>
+        </p:txBody>
+      </p:sp>
+      <p:sp>
+        <p:nvSpPr>
+          <p:cNvPr id="5" name="Footer Placeholder 4"/>
+          <p:cNvSpPr>
+            <a:spLocks noGrp="1"/>
+          </p:cNvSpPr>
+          <p:nvPr>
+            <p:ph type="ftr" sz="quarter" idx="4"/>
+          </p:nvPr>
+        </p:nvSpPr>
+        <p:spPr/>
+        <p:txBody>
+          <a:bodyPr/>
+          <a:lstStyle/>
+          <a:p>
+            <a:endParaRPr lang="en-US" dirty="0"/>
+          </a:p>
+        </p:txBody>
+      </p:sp>
+      <p:sp>
+        <p:nvSpPr>
+          <p:cNvPr id="6" name="Slide Number Placeholder 5"/>
+          <p:cNvSpPr>
+            <a:spLocks noGrp="1"/>
+          </p:cNvSpPr>
+          <p:nvPr>
+            <p:ph type="sldNum" sz="quarter" idx="5"/>
+          </p:nvPr>
+        </p:nvSpPr>
+        <p:spPr/>
+        <p:txBody>
+          <a:bodyPr/>
+          <a:lstStyle/>
+          <a:p>
+            <a:fld id="{3CFA0038-7055-434C-B6C4-B8C69565C600}" type="slidenum">
+              <a:rPr lang="en-US" smtClean="0"/>
+              <a:t>12</a:t>
+            </a:fld>
+            <a:endParaRPr lang="en-US" dirty="0"/>
+          </a:p>
+        </p:txBody>
+      </p:sp>
+    </p:spTree>
+    <p:extLst>
+      <p:ext uri="{BB962C8B-B14F-4D97-AF65-F5344CB8AC3E}">
+        <p14:creationId xmlns:p14="http://schemas.microsoft.com/office/powerpoint/2010/main" val="4137922853"/>
+      </p:ext>
+    </p:extLst>
+  </p:cSld>
+  <p:clrMapOvr>
+    <a:masterClrMapping/>
+  </p:clrMapOvr>
+</p:notes>
+</file>
+
+<file path=ppt/notesSlides/notesSlide13.xml><?xml version="1.0" encoding="utf-8"?>
+<p:notes xmlns:a="http://schemas.openxmlformats.org/drawingml/2006/main" xmlns:r="http://schemas.openxmlformats.org/officeDocument/2006/relationships" xmlns:p="http://schemas.openxmlformats.org/presentationml/2006/main">
+  <p:cSld>
+    <p:spTree>
+      <p:nvGrpSpPr>
+        <p:cNvPr id="1" name=""/>
+        <p:cNvGrpSpPr/>
+        <p:nvPr/>
+      </p:nvGrpSpPr>
+      <p:grpSpPr>
+        <a:xfrm>
+          <a:off x="0" y="0"/>
+          <a:ext cx="0" cy="0"/>
+          <a:chOff x="0" y="0"/>
+          <a:chExt cx="0" cy="0"/>
+        </a:xfrm>
+      </p:grpSpPr>
+      <p:sp>
+        <p:nvSpPr>
+          <p:cNvPr id="2" name="Slide Image Placeholder 1"/>
+          <p:cNvSpPr>
+            <a:spLocks noGrp="1" noRot="1" noChangeAspect="1"/>
+          </p:cNvSpPr>
+          <p:nvPr>
+            <p:ph type="sldImg"/>
+          </p:nvPr>
+        </p:nvSpPr>
+        <p:spPr/>
+      </p:sp>
+      <p:sp>
+        <p:nvSpPr>
+          <p:cNvPr id="3" name="Notes Placeholder 2"/>
+          <p:cNvSpPr>
+            <a:spLocks noGrp="1"/>
+          </p:cNvSpPr>
+          <p:nvPr>
+            <p:ph type="body" idx="1"/>
+          </p:nvPr>
+        </p:nvSpPr>
+        <p:spPr/>
+        <p:txBody>
+          <a:bodyPr/>
+          <a:lstStyle/>
+          <a:p>
+            <a:endParaRPr lang="en-US"/>
+          </a:p>
+        </p:txBody>
+      </p:sp>
+      <p:sp>
+        <p:nvSpPr>
+          <p:cNvPr id="4" name="Header Placeholder 3"/>
+          <p:cNvSpPr>
+            <a:spLocks noGrp="1"/>
+          </p:cNvSpPr>
+          <p:nvPr>
+            <p:ph type="hdr" sz="quarter"/>
+          </p:nvPr>
+        </p:nvSpPr>
+        <p:spPr/>
+        <p:txBody>
+          <a:bodyPr/>
+          <a:lstStyle/>
+          <a:p>
+            <a:endParaRPr lang="en-US" dirty="0"/>
+          </a:p>
+        </p:txBody>
+      </p:sp>
+      <p:sp>
+        <p:nvSpPr>
+          <p:cNvPr id="5" name="Footer Placeholder 4"/>
+          <p:cNvSpPr>
+            <a:spLocks noGrp="1"/>
+          </p:cNvSpPr>
+          <p:nvPr>
+            <p:ph type="ftr" sz="quarter" idx="4"/>
+          </p:nvPr>
+        </p:nvSpPr>
+        <p:spPr/>
+        <p:txBody>
+          <a:bodyPr/>
+          <a:lstStyle/>
+          <a:p>
+            <a:endParaRPr lang="en-US" dirty="0"/>
+          </a:p>
+        </p:txBody>
+      </p:sp>
+      <p:sp>
+        <p:nvSpPr>
+          <p:cNvPr id="6" name="Slide Number Placeholder 5"/>
+          <p:cNvSpPr>
+            <a:spLocks noGrp="1"/>
+          </p:cNvSpPr>
+          <p:nvPr>
+            <p:ph type="sldNum" sz="quarter" idx="5"/>
+          </p:nvPr>
+        </p:nvSpPr>
+        <p:spPr/>
+        <p:txBody>
+          <a:bodyPr/>
+          <a:lstStyle/>
+          <a:p>
+            <a:fld id="{3CFA0038-7055-434C-B6C4-B8C69565C600}" type="slidenum">
+              <a:rPr lang="en-US" smtClean="0"/>
+              <a:t>13</a:t>
+            </a:fld>
+            <a:endParaRPr lang="en-US" dirty="0"/>
+          </a:p>
+        </p:txBody>
+      </p:sp>
+    </p:spTree>
+    <p:extLst>
+      <p:ext uri="{BB962C8B-B14F-4D97-AF65-F5344CB8AC3E}">
+        <p14:creationId xmlns:p14="http://schemas.microsoft.com/office/powerpoint/2010/main" val="1055719338"/>
+      </p:ext>
+    </p:extLst>
+  </p:cSld>
+  <p:clrMapOvr>
+    <a:masterClrMapping/>
+  </p:clrMapOvr>
+</p:notes>
+</file>
+
+<file path=ppt/notesSlides/notesSlide14.xml><?xml version="1.0" encoding="utf-8"?>
+<p:notes xmlns:a="http://schemas.openxmlformats.org/drawingml/2006/main" xmlns:r="http://schemas.openxmlformats.org/officeDocument/2006/relationships" xmlns:p="http://schemas.openxmlformats.org/presentationml/2006/main">
+  <p:cSld>
+    <p:spTree>
+      <p:nvGrpSpPr>
+        <p:cNvPr id="1" name=""/>
+        <p:cNvGrpSpPr/>
+        <p:nvPr/>
+      </p:nvGrpSpPr>
+      <p:grpSpPr>
+        <a:xfrm>
+          <a:off x="0" y="0"/>
+          <a:ext cx="0" cy="0"/>
+          <a:chOff x="0" y="0"/>
+          <a:chExt cx="0" cy="0"/>
+        </a:xfrm>
+      </p:grpSpPr>
+      <p:sp>
+        <p:nvSpPr>
+          <p:cNvPr id="2" name="Slide Image Placeholder 1"/>
+          <p:cNvSpPr>
+            <a:spLocks noGrp="1" noRot="1" noChangeAspect="1"/>
+          </p:cNvSpPr>
+          <p:nvPr>
+            <p:ph type="sldImg"/>
+          </p:nvPr>
+        </p:nvSpPr>
+        <p:spPr/>
+      </p:sp>
+      <p:sp>
+        <p:nvSpPr>
+          <p:cNvPr id="3" name="Notes Placeholder 2"/>
+          <p:cNvSpPr>
+            <a:spLocks noGrp="1"/>
+          </p:cNvSpPr>
+          <p:nvPr>
+            <p:ph type="body" idx="1"/>
+          </p:nvPr>
+        </p:nvSpPr>
+        <p:spPr/>
+        <p:txBody>
+          <a:bodyPr/>
+          <a:lstStyle/>
+          <a:p>
+            <a:r>
+              <a:rPr lang="en-US" dirty="0"/>
               <a:t>Thank you for the opportunity to evaluate your beer data and we hope that we shed some insight into your questions</a:t>
             </a:r>
           </a:p>
@@ -1537,26 +1990,18 @@
           <a:bodyPr/>
           <a:lstStyle/>
           <a:p>
-            <a:r>
-              <a:rPr lang="en-US" sz="1200" dirty="0">
-                <a:solidFill>
-                  <a:srgbClr val="333333"/>
-                </a:solidFill>
-                <a:effectLst/>
-              </a:rPr>
-              <a:t>The KNN model using only Ales (IPAs and other Ales) has more than a 91% accuracy rate. For identifying an Ale, the sensitivity of the model is 92.3% and the specificity is 88.3%. </a:t>
-            </a:r>
-          </a:p>
-        </p:txBody>
-      </p:sp>
-      <p:sp>
-        <p:nvSpPr>
-          <p:cNvPr id="4" name="Slide Number Placeholder 3"/>
-          <p:cNvSpPr>
-            <a:spLocks noGrp="1"/>
-          </p:cNvSpPr>
-          <p:nvPr>
-            <p:ph type="sldNum" sz="quarter" idx="5"/>
+            <a:endParaRPr lang="en-US"/>
+          </a:p>
+        </p:txBody>
+      </p:sp>
+      <p:sp>
+        <p:nvSpPr>
+          <p:cNvPr id="4" name="Header Placeholder 3"/>
+          <p:cNvSpPr>
+            <a:spLocks noGrp="1"/>
+          </p:cNvSpPr>
+          <p:nvPr>
+            <p:ph type="hdr" sz="quarter"/>
           </p:nvPr>
         </p:nvSpPr>
         <p:spPr/>
@@ -1564,9 +2009,47 @@
           <a:bodyPr/>
           <a:lstStyle/>
           <a:p>
+            <a:endParaRPr lang="en-US" dirty="0"/>
+          </a:p>
+        </p:txBody>
+      </p:sp>
+      <p:sp>
+        <p:nvSpPr>
+          <p:cNvPr id="5" name="Footer Placeholder 4"/>
+          <p:cNvSpPr>
+            <a:spLocks noGrp="1"/>
+          </p:cNvSpPr>
+          <p:nvPr>
+            <p:ph type="ftr" sz="quarter" idx="4"/>
+          </p:nvPr>
+        </p:nvSpPr>
+        <p:spPr/>
+        <p:txBody>
+          <a:bodyPr/>
+          <a:lstStyle/>
+          <a:p>
+            <a:endParaRPr lang="en-US" dirty="0"/>
+          </a:p>
+        </p:txBody>
+      </p:sp>
+      <p:sp>
+        <p:nvSpPr>
+          <p:cNvPr id="6" name="Slide Number Placeholder 5"/>
+          <p:cNvSpPr>
+            <a:spLocks noGrp="1"/>
+          </p:cNvSpPr>
+          <p:nvPr>
+            <p:ph type="sldNum" sz="quarter" idx="5"/>
+          </p:nvPr>
+        </p:nvSpPr>
+        <p:spPr/>
+        <p:txBody>
+          <a:bodyPr/>
+          <a:lstStyle/>
+          <a:p>
             <a:fld id="{3CFA0038-7055-434C-B6C4-B8C69565C600}" type="slidenum">
               <a:rPr lang="en-US" smtClean="0"/>
-              <a:t>9</a:t>
+              <a:t>7</a:t>
             </a:fld>
             <a:endParaRPr lang="en-US" dirty="0"/>
           </a:p>
@@ -1575,7 +2058,7 @@
     </p:spTree>
     <p:extLst>
       <p:ext uri="{BB962C8B-B14F-4D97-AF65-F5344CB8AC3E}">
-        <p14:creationId xmlns:p14="http://schemas.microsoft.com/office/powerpoint/2010/main" val="3811435515"/>
+        <p14:creationId xmlns:p14="http://schemas.microsoft.com/office/powerpoint/2010/main" val="997565212"/>
       </p:ext>
     </p:extLst>
   </p:cSld>
@@ -1629,23 +2112,18 @@
           <a:bodyPr/>
           <a:lstStyle/>
           <a:p>
-            <a:endParaRPr lang="en-US" sz="1200" dirty="0">
-              <a:solidFill>
-                <a:srgbClr val="333333"/>
-              </a:solidFill>
-              <a:effectLst/>
-            </a:endParaRPr>
-          </a:p>
-        </p:txBody>
-      </p:sp>
-      <p:sp>
-        <p:nvSpPr>
-          <p:cNvPr id="4" name="Slide Number Placeholder 3"/>
-          <p:cNvSpPr>
-            <a:spLocks noGrp="1"/>
-          </p:cNvSpPr>
-          <p:nvPr>
-            <p:ph type="sldNum" sz="quarter" idx="5"/>
+            <a:endParaRPr lang="en-US"/>
+          </a:p>
+        </p:txBody>
+      </p:sp>
+      <p:sp>
+        <p:nvSpPr>
+          <p:cNvPr id="4" name="Header Placeholder 3"/>
+          <p:cNvSpPr>
+            <a:spLocks noGrp="1"/>
+          </p:cNvSpPr>
+          <p:nvPr>
+            <p:ph type="hdr" sz="quarter"/>
           </p:nvPr>
         </p:nvSpPr>
         <p:spPr/>
@@ -1653,9 +2131,47 @@
           <a:bodyPr/>
           <a:lstStyle/>
           <a:p>
+            <a:endParaRPr lang="en-US" dirty="0"/>
+          </a:p>
+        </p:txBody>
+      </p:sp>
+      <p:sp>
+        <p:nvSpPr>
+          <p:cNvPr id="5" name="Footer Placeholder 4"/>
+          <p:cNvSpPr>
+            <a:spLocks noGrp="1"/>
+          </p:cNvSpPr>
+          <p:nvPr>
+            <p:ph type="ftr" sz="quarter" idx="4"/>
+          </p:nvPr>
+        </p:nvSpPr>
+        <p:spPr/>
+        <p:txBody>
+          <a:bodyPr/>
+          <a:lstStyle/>
+          <a:p>
+            <a:endParaRPr lang="en-US" dirty="0"/>
+          </a:p>
+        </p:txBody>
+      </p:sp>
+      <p:sp>
+        <p:nvSpPr>
+          <p:cNvPr id="6" name="Slide Number Placeholder 5"/>
+          <p:cNvSpPr>
+            <a:spLocks noGrp="1"/>
+          </p:cNvSpPr>
+          <p:nvPr>
+            <p:ph type="sldNum" sz="quarter" idx="5"/>
+          </p:nvPr>
+        </p:nvSpPr>
+        <p:spPr/>
+        <p:txBody>
+          <a:bodyPr/>
+          <a:lstStyle/>
+          <a:p>
             <a:fld id="{3CFA0038-7055-434C-B6C4-B8C69565C600}" type="slidenum">
               <a:rPr lang="en-US" smtClean="0"/>
-              <a:t>10</a:t>
+              <a:t>8</a:t>
             </a:fld>
             <a:endParaRPr lang="en-US" dirty="0"/>
           </a:p>
@@ -1664,7 +2180,7 @@
     </p:spTree>
     <p:extLst>
       <p:ext uri="{BB962C8B-B14F-4D97-AF65-F5344CB8AC3E}">
-        <p14:creationId xmlns:p14="http://schemas.microsoft.com/office/powerpoint/2010/main" val="2620726275"/>
+        <p14:creationId xmlns:p14="http://schemas.microsoft.com/office/powerpoint/2010/main" val="1708132352"/>
       </p:ext>
     </p:extLst>
   </p:cSld>
@@ -1719,24 +2235,14 @@
           <a:lstStyle/>
           <a:p>
             <a:r>
-              <a:rPr lang="en-US" dirty="0"/>
-              <a:t>We can see that the mean ABV of IPA's is significantly higher than the mean ABV of Ales. The error bars indicate that we can be 95% confident that their ranges are not even close to overlapping.</a:t>
-            </a:r>
-          </a:p>
-          <a:p>
-            <a:endParaRPr lang="en-US" dirty="0"/>
-          </a:p>
-          <a:p>
-            <a:r>
-              <a:rPr lang="en-US" dirty="0"/>
-              <a:t>We can see that, while some categories have overlapping confidence intervals, most are different. The only categories that do not have a significant difference in their mean ABV values (p &gt; 0.05 including Bonferroni adjustment for post-hoc comparisons) are Ale and Other, IPA and Stout, Lager and Pilsner, and Other and Porter.</a:t>
-            </a:r>
-          </a:p>
-          <a:p>
-            <a:endParaRPr lang="en-US" dirty="0"/>
-          </a:p>
-          <a:p>
-            <a:endParaRPr lang="en-US" dirty="0"/>
+              <a:rPr lang="en-US" sz="1200" dirty="0">
+                <a:solidFill>
+                  <a:srgbClr val="333333"/>
+                </a:solidFill>
+                <a:effectLst/>
+              </a:rPr>
+              <a:t>The KNN model using only Ales (IPAs and other Ales) has more than a 91% accuracy rate. 888 Ales were identified correctly giving us a sensitivity of 93% and 503 IPAs were also correctly identified, leading to a specificity of 88.3%. </a:t>
+            </a:r>
           </a:p>
         </p:txBody>
       </p:sp>
@@ -1757,7 +2263,7 @@
           <a:p>
             <a:fld id="{3CFA0038-7055-434C-B6C4-B8C69565C600}" type="slidenum">
               <a:rPr lang="en-US" smtClean="0"/>
-              <a:t>11</a:t>
+              <a:t>9</a:t>
             </a:fld>
             <a:endParaRPr lang="en-US" dirty="0"/>
           </a:p>
@@ -1766,7 +2272,7 @@
     </p:spTree>
     <p:extLst>
       <p:ext uri="{BB962C8B-B14F-4D97-AF65-F5344CB8AC3E}">
-        <p14:creationId xmlns:p14="http://schemas.microsoft.com/office/powerpoint/2010/main" val="488637022"/>
+        <p14:creationId xmlns:p14="http://schemas.microsoft.com/office/powerpoint/2010/main" val="3811435515"/>
       </p:ext>
     </p:extLst>
   </p:cSld>
@@ -17971,21 +18477,90 @@
           <a:chExt cx="0" cy="0"/>
         </a:xfrm>
       </p:grpSpPr>
+      <p:sp>
+        <p:nvSpPr>
+          <p:cNvPr id="6" name="TextBox 5">
+            <a:extLst>
+              <a:ext uri="{FF2B5EF4-FFF2-40B4-BE49-F238E27FC236}">
+                <a16:creationId xmlns:a16="http://schemas.microsoft.com/office/drawing/2014/main" id="{1044D83D-C6D1-011B-B6B7-4FB2B0DB3747}"/>
+              </a:ext>
+            </a:extLst>
+          </p:cNvPr>
+          <p:cNvSpPr txBox="1"/>
+          <p:nvPr/>
+        </p:nvSpPr>
+        <p:spPr>
+          <a:xfrm>
+            <a:off x="317500" y="482600"/>
+            <a:ext cx="10833100" cy="369332"/>
+          </a:xfrm>
+          <a:prstGeom prst="rect">
+            <a:avLst/>
+          </a:prstGeom>
+          <a:noFill/>
+        </p:spPr>
+        <p:txBody>
+          <a:bodyPr wrap="square" rtlCol="0">
+            <a:spAutoFit/>
+          </a:bodyPr>
+          <a:lstStyle/>
+          <a:p>
+            <a:pPr algn="ctr"/>
+            <a:r>
+              <a:rPr lang="en-US" b="1" dirty="0"/>
+              <a:t>Comparing the ABV and Bitterness  Between the Between Ales and IPAs</a:t>
+            </a:r>
+          </a:p>
+        </p:txBody>
+      </p:sp>
+      <p:sp>
+        <p:nvSpPr>
+          <p:cNvPr id="7" name="TextBox 6">
+            <a:extLst>
+              <a:ext uri="{FF2B5EF4-FFF2-40B4-BE49-F238E27FC236}">
+                <a16:creationId xmlns:a16="http://schemas.microsoft.com/office/drawing/2014/main" id="{8BD0DB13-E229-CDF1-11CD-D7D93D9FEF39}"/>
+              </a:ext>
+            </a:extLst>
+          </p:cNvPr>
+          <p:cNvSpPr txBox="1"/>
+          <p:nvPr/>
+        </p:nvSpPr>
+        <p:spPr>
+          <a:xfrm>
+            <a:off x="126998" y="4865985"/>
+            <a:ext cx="8229601" cy="646331"/>
+          </a:xfrm>
+          <a:prstGeom prst="rect">
+            <a:avLst/>
+          </a:prstGeom>
+          <a:noFill/>
+        </p:spPr>
+        <p:txBody>
+          <a:bodyPr wrap="square" rtlCol="0">
+            <a:spAutoFit/>
+          </a:bodyPr>
+          <a:lstStyle/>
+          <a:p>
+            <a:r>
+              <a:rPr lang="en-US" dirty="0"/>
+              <a:t>Here we can clearly see the difference in the ABV and IBU values between Ales and IPAs as we did previously.</a:t>
+            </a:r>
+          </a:p>
+        </p:txBody>
+      </p:sp>
       <p:pic>
         <p:nvPicPr>
-          <p:cNvPr id="6" name="Picture Placeholder 5">
-            <a:extLst>
-              <a:ext uri="{FF2B5EF4-FFF2-40B4-BE49-F238E27FC236}">
-                <a16:creationId xmlns:a16="http://schemas.microsoft.com/office/drawing/2014/main" id="{C8F0628C-A617-40A3-CD12-294884766271}"/>
+          <p:cNvPr id="10" name="Picture 9">
+            <a:extLst>
+              <a:ext uri="{FF2B5EF4-FFF2-40B4-BE49-F238E27FC236}">
+                <a16:creationId xmlns:a16="http://schemas.microsoft.com/office/drawing/2014/main" id="{884891EF-E476-41E4-67BA-0E325B3DB0C8}"/>
               </a:ext>
             </a:extLst>
           </p:cNvPr>
           <p:cNvPicPr>
-            <a:picLocks noGrp="1" noChangeAspect="1"/>
+            <a:picLocks noChangeAspect="1"/>
           </p:cNvPicPr>
-          <p:nvPr>
-            <p:ph type="pic" sz="quarter" idx="10"/>
-          </p:nvPr>
+          <p:nvPr/>
         </p:nvPicPr>
         <p:blipFill>
           <a:blip r:embed="rId3"/>
@@ -17995,97 +18570,48 @@
         </p:blipFill>
         <p:spPr>
           <a:xfrm>
-            <a:off x="205739" y="1428686"/>
-            <a:ext cx="7510407" cy="4794314"/>
+            <a:off x="126999" y="1200150"/>
+            <a:ext cx="5341767" cy="3409950"/>
           </a:xfrm>
           <a:prstGeom prst="rect">
             <a:avLst/>
           </a:prstGeom>
         </p:spPr>
       </p:pic>
-      <p:sp>
-        <p:nvSpPr>
-          <p:cNvPr id="8" name="Title 2">
-            <a:extLst>
-              <a:ext uri="{FF2B5EF4-FFF2-40B4-BE49-F238E27FC236}">
-                <a16:creationId xmlns:a16="http://schemas.microsoft.com/office/drawing/2014/main" id="{4FE77C49-433A-1AB3-B4E0-ABA20E13EE35}"/>
-              </a:ext>
-            </a:extLst>
-          </p:cNvPr>
-          <p:cNvSpPr>
-            <a:spLocks noGrp="1"/>
-          </p:cNvSpPr>
-          <p:nvPr>
-            <p:ph type="title"/>
-          </p:nvPr>
-        </p:nvSpPr>
-        <p:spPr>
-          <a:xfrm>
-            <a:off x="205740" y="167744"/>
-            <a:ext cx="11122660" cy="708556"/>
-          </a:xfrm>
-        </p:spPr>
-        <p:txBody>
-          <a:bodyPr anchor="ctr">
-            <a:normAutofit/>
-          </a:bodyPr>
-          <a:lstStyle/>
-          <a:p>
-            <a:pPr algn="ctr"/>
-            <a:r>
-              <a:rPr lang="en-US" dirty="0"/>
-              <a:t>Expanding Beer Classifications</a:t>
-            </a:r>
-          </a:p>
-        </p:txBody>
-      </p:sp>
-      <p:sp>
-        <p:nvSpPr>
-          <p:cNvPr id="9" name="TextBox 8">
-            <a:extLst>
-              <a:ext uri="{FF2B5EF4-FFF2-40B4-BE49-F238E27FC236}">
-                <a16:creationId xmlns:a16="http://schemas.microsoft.com/office/drawing/2014/main" id="{1FF2422F-E6DD-EB96-9B5E-9E1FFA5C5334}"/>
-              </a:ext>
-            </a:extLst>
-          </p:cNvPr>
-          <p:cNvSpPr txBox="1"/>
+      <p:pic>
+        <p:nvPicPr>
+          <p:cNvPr id="2" name="Picture 1">
+            <a:extLst>
+              <a:ext uri="{FF2B5EF4-FFF2-40B4-BE49-F238E27FC236}">
+                <a16:creationId xmlns:a16="http://schemas.microsoft.com/office/drawing/2014/main" id="{6B1A469D-033A-0FC7-59F1-319E81118579}"/>
+              </a:ext>
+            </a:extLst>
+          </p:cNvPr>
+          <p:cNvPicPr>
+            <a:picLocks noChangeAspect="1"/>
+          </p:cNvPicPr>
           <p:nvPr/>
-        </p:nvSpPr>
-        <p:spPr>
-          <a:xfrm>
-            <a:off x="7848600" y="1422400"/>
-            <a:ext cx="3200400" cy="3970318"/>
+        </p:nvPicPr>
+        <p:blipFill>
+          <a:blip r:embed="rId4"/>
+          <a:stretch>
+            <a:fillRect/>
+          </a:stretch>
+        </p:blipFill>
+        <p:spPr>
+          <a:xfrm>
+            <a:off x="5848350" y="1200150"/>
+            <a:ext cx="5341767" cy="3409950"/>
           </a:xfrm>
           <a:prstGeom prst="rect">
             <a:avLst/>
           </a:prstGeom>
-          <a:noFill/>
-        </p:spPr>
-        <p:txBody>
-          <a:bodyPr wrap="square" rtlCol="0">
-            <a:spAutoFit/>
-          </a:bodyPr>
-          <a:lstStyle/>
-          <a:p>
-            <a:r>
-              <a:rPr lang="en-US" sz="1800" dirty="0">
-                <a:solidFill>
-                  <a:srgbClr val="333333"/>
-                </a:solidFill>
-                <a:effectLst/>
-              </a:rPr>
-              <a:t>Since the analysis of Ales vs IPAs, was so effective, we decided to investigate the difference between other styles of beer. This may be useful for Budweiser to determine what specific profiles of ABV and IBU are associated with each style of beer. Such information could help with positioning their beers relative to the existing markets.</a:t>
-            </a:r>
-          </a:p>
-          <a:p>
-            <a:endParaRPr lang="en-US" dirty="0"/>
-          </a:p>
-        </p:txBody>
-      </p:sp>
+        </p:spPr>
+      </p:pic>
     </p:spTree>
     <p:extLst>
       <p:ext uri="{BB962C8B-B14F-4D97-AF65-F5344CB8AC3E}">
-        <p14:creationId xmlns:p14="http://schemas.microsoft.com/office/powerpoint/2010/main" val="2233035253"/>
+        <p14:creationId xmlns:p14="http://schemas.microsoft.com/office/powerpoint/2010/main" val="2993181200"/>
       </p:ext>
     </p:extLst>
   </p:cSld>
@@ -18146,90 +18672,21 @@
           <a:chExt cx="0" cy="0"/>
         </a:xfrm>
       </p:grpSpPr>
-      <p:sp>
-        <p:nvSpPr>
-          <p:cNvPr id="6" name="TextBox 5">
-            <a:extLst>
-              <a:ext uri="{FF2B5EF4-FFF2-40B4-BE49-F238E27FC236}">
-                <a16:creationId xmlns:a16="http://schemas.microsoft.com/office/drawing/2014/main" id="{1044D83D-C6D1-011B-B6B7-4FB2B0DB3747}"/>
-              </a:ext>
-            </a:extLst>
-          </p:cNvPr>
-          <p:cNvSpPr txBox="1"/>
-          <p:nvPr/>
-        </p:nvSpPr>
-        <p:spPr>
-          <a:xfrm>
-            <a:off x="317500" y="482600"/>
-            <a:ext cx="10833100" cy="369332"/>
-          </a:xfrm>
-          <a:prstGeom prst="rect">
-            <a:avLst/>
-          </a:prstGeom>
-          <a:noFill/>
-        </p:spPr>
-        <p:txBody>
-          <a:bodyPr wrap="square" rtlCol="0">
-            <a:spAutoFit/>
-          </a:bodyPr>
-          <a:lstStyle/>
-          <a:p>
-            <a:pPr algn="ctr"/>
-            <a:r>
-              <a:rPr lang="en-US" b="1" dirty="0"/>
-              <a:t>Comparing the ABV and Bitterness  Between the Between Ales and IPAs</a:t>
-            </a:r>
-          </a:p>
-        </p:txBody>
-      </p:sp>
-      <p:sp>
-        <p:nvSpPr>
-          <p:cNvPr id="7" name="TextBox 6">
-            <a:extLst>
-              <a:ext uri="{FF2B5EF4-FFF2-40B4-BE49-F238E27FC236}">
-                <a16:creationId xmlns:a16="http://schemas.microsoft.com/office/drawing/2014/main" id="{8BD0DB13-E229-CDF1-11CD-D7D93D9FEF39}"/>
-              </a:ext>
-            </a:extLst>
-          </p:cNvPr>
-          <p:cNvSpPr txBox="1"/>
-          <p:nvPr/>
-        </p:nvSpPr>
-        <p:spPr>
-          <a:xfrm>
-            <a:off x="126998" y="4865985"/>
-            <a:ext cx="8229601" cy="646331"/>
-          </a:xfrm>
-          <a:prstGeom prst="rect">
-            <a:avLst/>
-          </a:prstGeom>
-          <a:noFill/>
-        </p:spPr>
-        <p:txBody>
-          <a:bodyPr wrap="square" rtlCol="0">
-            <a:spAutoFit/>
-          </a:bodyPr>
-          <a:lstStyle/>
-          <a:p>
-            <a:r>
-              <a:rPr lang="en-US" dirty="0"/>
-              <a:t>Here we can clearly see the difference in the ABV and IBU values between Ales and IPAs as we did previously.</a:t>
-            </a:r>
-          </a:p>
-        </p:txBody>
-      </p:sp>
       <p:pic>
         <p:nvPicPr>
-          <p:cNvPr id="10" name="Picture 9">
-            <a:extLst>
-              <a:ext uri="{FF2B5EF4-FFF2-40B4-BE49-F238E27FC236}">
-                <a16:creationId xmlns:a16="http://schemas.microsoft.com/office/drawing/2014/main" id="{884891EF-E476-41E4-67BA-0E325B3DB0C8}"/>
+          <p:cNvPr id="6" name="Picture Placeholder 5">
+            <a:extLst>
+              <a:ext uri="{FF2B5EF4-FFF2-40B4-BE49-F238E27FC236}">
+                <a16:creationId xmlns:a16="http://schemas.microsoft.com/office/drawing/2014/main" id="{C8F0628C-A617-40A3-CD12-294884766271}"/>
               </a:ext>
             </a:extLst>
           </p:cNvPr>
           <p:cNvPicPr>
-            <a:picLocks noChangeAspect="1"/>
+            <a:picLocks noGrp="1" noChangeAspect="1"/>
           </p:cNvPicPr>
-          <p:nvPr/>
+          <p:nvPr>
+            <p:ph type="pic" sz="quarter" idx="10"/>
+          </p:nvPr>
         </p:nvPicPr>
         <p:blipFill>
           <a:blip r:embed="rId3"/>
@@ -18239,48 +18696,97 @@
         </p:blipFill>
         <p:spPr>
           <a:xfrm>
-            <a:off x="126999" y="1200150"/>
-            <a:ext cx="5341767" cy="3409950"/>
+            <a:off x="205739" y="1428686"/>
+            <a:ext cx="7510407" cy="4794314"/>
           </a:xfrm>
           <a:prstGeom prst="rect">
             <a:avLst/>
           </a:prstGeom>
         </p:spPr>
       </p:pic>
-      <p:pic>
-        <p:nvPicPr>
-          <p:cNvPr id="2" name="Picture 1">
-            <a:extLst>
-              <a:ext uri="{FF2B5EF4-FFF2-40B4-BE49-F238E27FC236}">
-                <a16:creationId xmlns:a16="http://schemas.microsoft.com/office/drawing/2014/main" id="{6B1A469D-033A-0FC7-59F1-319E81118579}"/>
-              </a:ext>
-            </a:extLst>
-          </p:cNvPr>
-          <p:cNvPicPr>
-            <a:picLocks noChangeAspect="1"/>
-          </p:cNvPicPr>
+      <p:sp>
+        <p:nvSpPr>
+          <p:cNvPr id="8" name="Title 2">
+            <a:extLst>
+              <a:ext uri="{FF2B5EF4-FFF2-40B4-BE49-F238E27FC236}">
+                <a16:creationId xmlns:a16="http://schemas.microsoft.com/office/drawing/2014/main" id="{4FE77C49-433A-1AB3-B4E0-ABA20E13EE35}"/>
+              </a:ext>
+            </a:extLst>
+          </p:cNvPr>
+          <p:cNvSpPr>
+            <a:spLocks noGrp="1"/>
+          </p:cNvSpPr>
+          <p:nvPr>
+            <p:ph type="title"/>
+          </p:nvPr>
+        </p:nvSpPr>
+        <p:spPr>
+          <a:xfrm>
+            <a:off x="205740" y="167744"/>
+            <a:ext cx="11122660" cy="708556"/>
+          </a:xfrm>
+        </p:spPr>
+        <p:txBody>
+          <a:bodyPr anchor="ctr">
+            <a:normAutofit/>
+          </a:bodyPr>
+          <a:lstStyle/>
+          <a:p>
+            <a:pPr algn="ctr"/>
+            <a:r>
+              <a:rPr lang="en-US" dirty="0"/>
+              <a:t>Expanding Beer Classifications</a:t>
+            </a:r>
+          </a:p>
+        </p:txBody>
+      </p:sp>
+      <p:sp>
+        <p:nvSpPr>
+          <p:cNvPr id="9" name="TextBox 8">
+            <a:extLst>
+              <a:ext uri="{FF2B5EF4-FFF2-40B4-BE49-F238E27FC236}">
+                <a16:creationId xmlns:a16="http://schemas.microsoft.com/office/drawing/2014/main" id="{1FF2422F-E6DD-EB96-9B5E-9E1FFA5C5334}"/>
+              </a:ext>
+            </a:extLst>
+          </p:cNvPr>
+          <p:cNvSpPr txBox="1"/>
           <p:nvPr/>
-        </p:nvPicPr>
-        <p:blipFill>
-          <a:blip r:embed="rId4"/>
-          <a:stretch>
-            <a:fillRect/>
-          </a:stretch>
-        </p:blipFill>
-        <p:spPr>
-          <a:xfrm>
-            <a:off x="5848350" y="1200150"/>
-            <a:ext cx="5341767" cy="3409950"/>
+        </p:nvSpPr>
+        <p:spPr>
+          <a:xfrm>
+            <a:off x="7848600" y="1422400"/>
+            <a:ext cx="3200400" cy="3970318"/>
           </a:xfrm>
           <a:prstGeom prst="rect">
             <a:avLst/>
           </a:prstGeom>
-        </p:spPr>
-      </p:pic>
+          <a:noFill/>
+        </p:spPr>
+        <p:txBody>
+          <a:bodyPr wrap="square" rtlCol="0">
+            <a:spAutoFit/>
+          </a:bodyPr>
+          <a:lstStyle/>
+          <a:p>
+            <a:r>
+              <a:rPr lang="en-US" sz="1800" dirty="0">
+                <a:solidFill>
+                  <a:srgbClr val="333333"/>
+                </a:solidFill>
+                <a:effectLst/>
+              </a:rPr>
+              <a:t>Since the analysis of Ales vs IPAs, was so effective, we decided to investigate the difference between other styles of beer. This may be useful for Budweiser to determine what specific profiles of ABV and IBU are associated with each style of beer. Such information could help with positioning their beers relative to the existing markets.</a:t>
+            </a:r>
+          </a:p>
+          <a:p>
+            <a:endParaRPr lang="en-US" dirty="0"/>
+          </a:p>
+        </p:txBody>
+      </p:sp>
     </p:spTree>
     <p:extLst>
       <p:ext uri="{BB962C8B-B14F-4D97-AF65-F5344CB8AC3E}">
-        <p14:creationId xmlns:p14="http://schemas.microsoft.com/office/powerpoint/2010/main" val="2993181200"/>
+        <p14:creationId xmlns:p14="http://schemas.microsoft.com/office/powerpoint/2010/main" val="2233035253"/>
       </p:ext>
     </p:extLst>
   </p:cSld>
@@ -18356,107 +18862,6 @@
           <p:nvPr/>
         </p:nvPicPr>
         <p:blipFill>
-          <a:blip r:embed="rId2"/>
-          <a:stretch>
-            <a:fillRect/>
-          </a:stretch>
-        </p:blipFill>
-        <p:spPr>
-          <a:xfrm>
-            <a:off x="4228932" y="1200150"/>
-            <a:ext cx="3734135" cy="2383708"/>
-          </a:xfrm>
-          <a:prstGeom prst="rect">
-            <a:avLst/>
-          </a:prstGeom>
-        </p:spPr>
-      </p:pic>
-      <p:sp>
-        <p:nvSpPr>
-          <p:cNvPr id="6" name="TextBox 5">
-            <a:extLst>
-              <a:ext uri="{FF2B5EF4-FFF2-40B4-BE49-F238E27FC236}">
-                <a16:creationId xmlns:a16="http://schemas.microsoft.com/office/drawing/2014/main" id="{1044D83D-C6D1-011B-B6B7-4FB2B0DB3747}"/>
-              </a:ext>
-            </a:extLst>
-          </p:cNvPr>
-          <p:cNvSpPr txBox="1"/>
-          <p:nvPr/>
-        </p:nvSpPr>
-        <p:spPr>
-          <a:xfrm>
-            <a:off x="317500" y="482600"/>
-            <a:ext cx="10833100" cy="369332"/>
-          </a:xfrm>
-          <a:prstGeom prst="rect">
-            <a:avLst/>
-          </a:prstGeom>
-          <a:noFill/>
-        </p:spPr>
-        <p:txBody>
-          <a:bodyPr wrap="square" rtlCol="0">
-            <a:spAutoFit/>
-          </a:bodyPr>
-          <a:lstStyle/>
-          <a:p>
-            <a:pPr algn="ctr"/>
-            <a:r>
-              <a:rPr lang="en-US" b="1" dirty="0"/>
-              <a:t>Comparing the ABV and Bitterness Between the Different Styles of Beer</a:t>
-            </a:r>
-          </a:p>
-        </p:txBody>
-      </p:sp>
-      <p:sp>
-        <p:nvSpPr>
-          <p:cNvPr id="8" name="TextBox 7">
-            <a:extLst>
-              <a:ext uri="{FF2B5EF4-FFF2-40B4-BE49-F238E27FC236}">
-                <a16:creationId xmlns:a16="http://schemas.microsoft.com/office/drawing/2014/main" id="{7804ECD1-99C5-9142-5AA2-F40F0989C450}"/>
-              </a:ext>
-            </a:extLst>
-          </p:cNvPr>
-          <p:cNvSpPr txBox="1"/>
-          <p:nvPr/>
-        </p:nvSpPr>
-        <p:spPr>
-          <a:xfrm>
-            <a:off x="4228932" y="3725638"/>
-            <a:ext cx="3734135" cy="954107"/>
-          </a:xfrm>
-          <a:prstGeom prst="rect">
-            <a:avLst/>
-          </a:prstGeom>
-          <a:noFill/>
-        </p:spPr>
-        <p:txBody>
-          <a:bodyPr wrap="square" rtlCol="0">
-            <a:spAutoFit/>
-          </a:bodyPr>
-          <a:lstStyle/>
-          <a:p>
-            <a:r>
-              <a:rPr lang="en-US" sz="1400" dirty="0"/>
-              <a:t>Expanding the beer styles, we can see that other styles of beer are more closely aligned with Ales than IPAs.  With Ales, Pilsners, and Porters statistically the same. </a:t>
-            </a:r>
-          </a:p>
-        </p:txBody>
-      </p:sp>
-      <p:pic>
-        <p:nvPicPr>
-          <p:cNvPr id="2" name="Picture 1">
-            <a:extLst>
-              <a:ext uri="{FF2B5EF4-FFF2-40B4-BE49-F238E27FC236}">
-                <a16:creationId xmlns:a16="http://schemas.microsoft.com/office/drawing/2014/main" id="{77D67A25-040A-CD6C-E320-2BB7AEA266A2}"/>
-              </a:ext>
-            </a:extLst>
-          </p:cNvPr>
-          <p:cNvPicPr>
-            <a:picLocks noChangeAspect="1"/>
-          </p:cNvPicPr>
-          <p:nvPr/>
-        </p:nvPicPr>
-        <p:blipFill>
           <a:blip r:embed="rId3"/>
           <a:stretch>
             <a:fillRect/>
@@ -18464,7 +18869,7 @@
         </p:blipFill>
         <p:spPr>
           <a:xfrm>
-            <a:off x="311150" y="1200150"/>
+            <a:off x="4228932" y="1200150"/>
             <a:ext cx="3734135" cy="2383708"/>
           </a:xfrm>
           <a:prstGeom prst="rect">
@@ -18474,10 +18879,10 @@
       </p:pic>
       <p:sp>
         <p:nvSpPr>
-          <p:cNvPr id="4" name="TextBox 3">
-            <a:extLst>
-              <a:ext uri="{FF2B5EF4-FFF2-40B4-BE49-F238E27FC236}">
-                <a16:creationId xmlns:a16="http://schemas.microsoft.com/office/drawing/2014/main" id="{E9A80576-7D0B-5866-65F5-2F8574D0A188}"/>
+          <p:cNvPr id="6" name="TextBox 5">
+            <a:extLst>
+              <a:ext uri="{FF2B5EF4-FFF2-40B4-BE49-F238E27FC236}">
+                <a16:creationId xmlns:a16="http://schemas.microsoft.com/office/drawing/2014/main" id="{1044D83D-C6D1-011B-B6B7-4FB2B0DB3747}"/>
               </a:ext>
             </a:extLst>
           </p:cNvPr>
@@ -18486,8 +18891,8 @@
         </p:nvSpPr>
         <p:spPr>
           <a:xfrm>
-            <a:off x="215732" y="3725638"/>
-            <a:ext cx="4013200" cy="738664"/>
+            <a:off x="317500" y="482600"/>
+            <a:ext cx="10833100" cy="369332"/>
           </a:xfrm>
           <a:prstGeom prst="rect">
             <a:avLst/>
@@ -18500,19 +18905,55 @@
           </a:bodyPr>
           <a:lstStyle/>
           <a:p>
+            <a:pPr algn="ctr"/>
+            <a:r>
+              <a:rPr lang="en-US" b="1" dirty="0"/>
+              <a:t>Comparing the ABV and Bitterness Between the Different Styles of Beer</a:t>
+            </a:r>
+          </a:p>
+        </p:txBody>
+      </p:sp>
+      <p:sp>
+        <p:nvSpPr>
+          <p:cNvPr id="8" name="TextBox 7">
+            <a:extLst>
+              <a:ext uri="{FF2B5EF4-FFF2-40B4-BE49-F238E27FC236}">
+                <a16:creationId xmlns:a16="http://schemas.microsoft.com/office/drawing/2014/main" id="{7804ECD1-99C5-9142-5AA2-F40F0989C450}"/>
+              </a:ext>
+            </a:extLst>
+          </p:cNvPr>
+          <p:cNvSpPr txBox="1"/>
+          <p:nvPr/>
+        </p:nvSpPr>
+        <p:spPr>
+          <a:xfrm>
+            <a:off x="4228932" y="3725638"/>
+            <a:ext cx="3734135" cy="954107"/>
+          </a:xfrm>
+          <a:prstGeom prst="rect">
+            <a:avLst/>
+          </a:prstGeom>
+          <a:noFill/>
+        </p:spPr>
+        <p:txBody>
+          <a:bodyPr wrap="square" rtlCol="0">
+            <a:spAutoFit/>
+          </a:bodyPr>
+          <a:lstStyle/>
+          <a:p>
             <a:r>
               <a:rPr lang="en-US" sz="1400" dirty="0"/>
-              <a:t>After expanding the ABV’s over the different beer styles, we can better visualize how to group the alcohol content . </a:t>
+              <a:t>Expanding the beer styles, we can see that other styles of beer are more closely aligned with Ales than IPAs.  With Ales, Pilsners, and Porters statistically the same. </a:t>
             </a:r>
           </a:p>
         </p:txBody>
       </p:sp>
       <p:pic>
         <p:nvPicPr>
-          <p:cNvPr id="11" name="Picture 10" descr="Table&#10;&#10;Description automatically generated">
-            <a:extLst>
-              <a:ext uri="{FF2B5EF4-FFF2-40B4-BE49-F238E27FC236}">
-                <a16:creationId xmlns:a16="http://schemas.microsoft.com/office/drawing/2014/main" id="{0D03068F-D6C7-F755-FAE7-57A54A9AD174}"/>
+          <p:cNvPr id="2" name="Picture 1">
+            <a:extLst>
+              <a:ext uri="{FF2B5EF4-FFF2-40B4-BE49-F238E27FC236}">
+                <a16:creationId xmlns:a16="http://schemas.microsoft.com/office/drawing/2014/main" id="{77D67A25-040A-CD6C-E320-2BB7AEA266A2}"/>
               </a:ext>
             </a:extLst>
           </p:cNvPr>
@@ -18529,8 +18970,8 @@
         </p:blipFill>
         <p:spPr>
           <a:xfrm>
-            <a:off x="8266135" y="1200150"/>
-            <a:ext cx="3734135" cy="2633161"/>
+            <a:off x="311150" y="1200150"/>
+            <a:ext cx="3734135" cy="2383708"/>
           </a:xfrm>
           <a:prstGeom prst="rect">
             <a:avLst/>
@@ -18539,10 +18980,10 @@
       </p:pic>
       <p:sp>
         <p:nvSpPr>
-          <p:cNvPr id="12" name="TextBox 11">
-            <a:extLst>
-              <a:ext uri="{FF2B5EF4-FFF2-40B4-BE49-F238E27FC236}">
-                <a16:creationId xmlns:a16="http://schemas.microsoft.com/office/drawing/2014/main" id="{653FB081-8D31-2BDC-9D87-ACE2026F74FF}"/>
+          <p:cNvPr id="4" name="TextBox 3">
+            <a:extLst>
+              <a:ext uri="{FF2B5EF4-FFF2-40B4-BE49-F238E27FC236}">
+                <a16:creationId xmlns:a16="http://schemas.microsoft.com/office/drawing/2014/main" id="{E9A80576-7D0B-5866-65F5-2F8574D0A188}"/>
               </a:ext>
             </a:extLst>
           </p:cNvPr>
@@ -18551,8 +18992,8 @@
         </p:nvSpPr>
         <p:spPr>
           <a:xfrm>
-            <a:off x="8421280" y="4089888"/>
-            <a:ext cx="3423843" cy="1169551"/>
+            <a:off x="215732" y="3725638"/>
+            <a:ext cx="4013200" cy="738664"/>
           </a:xfrm>
           <a:prstGeom prst="rect">
             <a:avLst/>
@@ -18567,8 +19008,194 @@
           <a:p>
             <a:r>
               <a:rPr lang="en-US" sz="1400" dirty="0"/>
-              <a:t>The model does very well. Overall accuracy is 0.71, meaning that it correctly classifies 71% beers. Considering that there are 7 categories, this is a very usable result.</a:t>
-            </a:r>
+              <a:t>After expanding the ABV’s over the different beer styles, we can better visualize how to group the alcohol content . </a:t>
+            </a:r>
+          </a:p>
+        </p:txBody>
+      </p:sp>
+      <p:pic>
+        <p:nvPicPr>
+          <p:cNvPr id="11" name="Picture 10" descr="Table&#10;&#10;Description automatically generated">
+            <a:extLst>
+              <a:ext uri="{FF2B5EF4-FFF2-40B4-BE49-F238E27FC236}">
+                <a16:creationId xmlns:a16="http://schemas.microsoft.com/office/drawing/2014/main" id="{0D03068F-D6C7-F755-FAE7-57A54A9AD174}"/>
+              </a:ext>
+            </a:extLst>
+          </p:cNvPr>
+          <p:cNvPicPr>
+            <a:picLocks noChangeAspect="1"/>
+          </p:cNvPicPr>
+          <p:nvPr/>
+        </p:nvPicPr>
+        <p:blipFill>
+          <a:blip r:embed="rId5"/>
+          <a:stretch>
+            <a:fillRect/>
+          </a:stretch>
+        </p:blipFill>
+        <p:spPr>
+          <a:xfrm>
+            <a:off x="8266135" y="1200150"/>
+            <a:ext cx="3734135" cy="2633161"/>
+          </a:xfrm>
+          <a:prstGeom prst="rect">
+            <a:avLst/>
+          </a:prstGeom>
+        </p:spPr>
+      </p:pic>
+      <p:sp>
+        <p:nvSpPr>
+          <p:cNvPr id="12" name="TextBox 11">
+            <a:extLst>
+              <a:ext uri="{FF2B5EF4-FFF2-40B4-BE49-F238E27FC236}">
+                <a16:creationId xmlns:a16="http://schemas.microsoft.com/office/drawing/2014/main" id="{653FB081-8D31-2BDC-9D87-ACE2026F74FF}"/>
+              </a:ext>
+            </a:extLst>
+          </p:cNvPr>
+          <p:cNvSpPr txBox="1"/>
+          <p:nvPr/>
+        </p:nvSpPr>
+        <p:spPr>
+          <a:xfrm>
+            <a:off x="8421280" y="4089888"/>
+            <a:ext cx="3423843" cy="1600438"/>
+          </a:xfrm>
+          <a:prstGeom prst="rect">
+            <a:avLst/>
+          </a:prstGeom>
+          <a:noFill/>
+        </p:spPr>
+        <p:txBody>
+          <a:bodyPr wrap="square" rtlCol="0">
+            <a:spAutoFit/>
+          </a:bodyPr>
+          <a:lstStyle/>
+          <a:p>
+            <a:pPr marL="285750" indent="-285750">
+              <a:buFont typeface="Arial" panose="020B0604020202020204" pitchFamily="34" charset="0"/>
+              <a:buChar char="•"/>
+            </a:pPr>
+            <a:r>
+              <a:rPr lang="en-US" sz="1400" dirty="0"/>
+              <a:t>This KNN model does very well, allowing us to classify the beers with a 71% accuracy. </a:t>
+            </a:r>
+          </a:p>
+          <a:p>
+            <a:endParaRPr lang="en-US" sz="1400" dirty="0"/>
+          </a:p>
+          <a:p>
+            <a:pPr marL="285750" indent="-285750">
+              <a:buFont typeface="Arial" panose="020B0604020202020204" pitchFamily="34" charset="0"/>
+              <a:buChar char="•"/>
+            </a:pPr>
+            <a:r>
+              <a:rPr lang="en-US" sz="1400" dirty="0"/>
+              <a:t>Considering that there are 7 categories, this is a very usable result.</a:t>
+            </a:r>
+          </a:p>
+        </p:txBody>
+      </p:sp>
+      <p:sp>
+        <p:nvSpPr>
+          <p:cNvPr id="5" name="Rectangle 4">
+            <a:extLst>
+              <a:ext uri="{FF2B5EF4-FFF2-40B4-BE49-F238E27FC236}">
+                <a16:creationId xmlns:a16="http://schemas.microsoft.com/office/drawing/2014/main" id="{99BDF971-0EB2-F427-F9A6-F11DBC91EBB7}"/>
+              </a:ext>
+            </a:extLst>
+          </p:cNvPr>
+          <p:cNvSpPr/>
+          <p:nvPr/>
+        </p:nvSpPr>
+        <p:spPr>
+          <a:xfrm>
+            <a:off x="8266135" y="3291840"/>
+            <a:ext cx="3734135" cy="541471"/>
+          </a:xfrm>
+          <a:prstGeom prst="rect">
+            <a:avLst/>
+          </a:prstGeom>
+          <a:solidFill>
+            <a:schemeClr val="bg1"/>
+          </a:solidFill>
+          <a:ln>
+            <a:noFill/>
+          </a:ln>
+        </p:spPr>
+        <p:style>
+          <a:lnRef idx="2">
+            <a:schemeClr val="accent1">
+              <a:shade val="50000"/>
+            </a:schemeClr>
+          </a:lnRef>
+          <a:fillRef idx="1">
+            <a:schemeClr val="accent1"/>
+          </a:fillRef>
+          <a:effectRef idx="0">
+            <a:schemeClr val="accent1"/>
+          </a:effectRef>
+          <a:fontRef idx="minor">
+            <a:schemeClr val="lt1"/>
+          </a:fontRef>
+        </p:style>
+        <p:txBody>
+          <a:bodyPr rtlCol="0" anchor="ctr"/>
+          <a:lstStyle/>
+          <a:p>
+            <a:pPr algn="ctr"/>
+            <a:endParaRPr lang="en-US"/>
+          </a:p>
+        </p:txBody>
+      </p:sp>
+      <p:sp>
+        <p:nvSpPr>
+          <p:cNvPr id="7" name="Oval 6">
+            <a:extLst>
+              <a:ext uri="{FF2B5EF4-FFF2-40B4-BE49-F238E27FC236}">
+                <a16:creationId xmlns:a16="http://schemas.microsoft.com/office/drawing/2014/main" id="{C31A410C-FBF7-1564-EBC6-59E427C1D0E7}"/>
+              </a:ext>
+            </a:extLst>
+          </p:cNvPr>
+          <p:cNvSpPr/>
+          <p:nvPr/>
+        </p:nvSpPr>
+        <p:spPr>
+          <a:xfrm>
+            <a:off x="9265920" y="3094647"/>
+            <a:ext cx="1196340" cy="334353"/>
+          </a:xfrm>
+          <a:prstGeom prst="ellipse">
+            <a:avLst/>
+          </a:prstGeom>
+          <a:noFill/>
+          <a:ln>
+            <a:solidFill>
+              <a:srgbClr val="FF0000"/>
+            </a:solidFill>
+          </a:ln>
+        </p:spPr>
+        <p:style>
+          <a:lnRef idx="2">
+            <a:schemeClr val="accent1">
+              <a:shade val="50000"/>
+            </a:schemeClr>
+          </a:lnRef>
+          <a:fillRef idx="1">
+            <a:schemeClr val="accent1"/>
+          </a:fillRef>
+          <a:effectRef idx="0">
+            <a:schemeClr val="accent1"/>
+          </a:effectRef>
+          <a:fontRef idx="minor">
+            <a:schemeClr val="lt1"/>
+          </a:fontRef>
+        </p:style>
+        <p:txBody>
+          <a:bodyPr rtlCol="0" anchor="ctr"/>
+          <a:lstStyle/>
+          <a:p>
+            <a:pPr algn="ctr"/>
+            <a:endParaRPr lang="en-US"/>
           </a:p>
         </p:txBody>
       </p:sp>
@@ -18616,7 +19243,7 @@
                                           </p:stCondLst>
                                         </p:cTn>
                                         <p:tgtEl>
-                                          <p:spTgt spid="11"/>
+                                          <p:spTgt spid="3"/>
                                         </p:tgtEl>
                                         <p:attrNameLst>
                                           <p:attrName>style.visibility</p:attrName>
@@ -18643,7 +19270,151 @@
                                           </p:stCondLst>
                                         </p:cTn>
                                         <p:tgtEl>
+                                          <p:spTgt spid="8"/>
+                                        </p:tgtEl>
+                                        <p:attrNameLst>
+                                          <p:attrName>style.visibility</p:attrName>
+                                        </p:attrNameLst>
+                                      </p:cBhvr>
+                                      <p:to>
+                                        <p:strVal val="visible"/>
+                                      </p:to>
+                                    </p:set>
+                                  </p:childTnLst>
+                                </p:cTn>
+                              </p:par>
+                            </p:childTnLst>
+                          </p:cTn>
+                        </p:par>
+                      </p:childTnLst>
+                    </p:cTn>
+                  </p:par>
+                  <p:par>
+                    <p:cTn id="9" fill="hold">
+                      <p:stCondLst>
+                        <p:cond delay="indefinite"/>
+                      </p:stCondLst>
+                      <p:childTnLst>
+                        <p:par>
+                          <p:cTn id="10" fill="hold">
+                            <p:stCondLst>
+                              <p:cond delay="0"/>
+                            </p:stCondLst>
+                            <p:childTnLst>
+                              <p:par>
+                                <p:cTn id="11" presetID="1" presetClass="entr" presetSubtype="0" fill="hold" nodeType="clickEffect">
+                                  <p:stCondLst>
+                                    <p:cond delay="0"/>
+                                  </p:stCondLst>
+                                  <p:childTnLst>
+                                    <p:set>
+                                      <p:cBhvr>
+                                        <p:cTn id="12" dur="1" fill="hold">
+                                          <p:stCondLst>
+                                            <p:cond delay="0"/>
+                                          </p:stCondLst>
+                                        </p:cTn>
+                                        <p:tgtEl>
+                                          <p:spTgt spid="11"/>
+                                        </p:tgtEl>
+                                        <p:attrNameLst>
+                                          <p:attrName>style.visibility</p:attrName>
+                                        </p:attrNameLst>
+                                      </p:cBhvr>
+                                      <p:to>
+                                        <p:strVal val="visible"/>
+                                      </p:to>
+                                    </p:set>
+                                  </p:childTnLst>
+                                </p:cTn>
+                              </p:par>
+                              <p:par>
+                                <p:cTn id="13" presetID="1" presetClass="entr" presetSubtype="0" fill="hold" grpId="0" nodeType="withEffect">
+                                  <p:stCondLst>
+                                    <p:cond delay="0"/>
+                                  </p:stCondLst>
+                                  <p:childTnLst>
+                                    <p:set>
+                                      <p:cBhvr>
+                                        <p:cTn id="14" dur="1" fill="hold">
+                                          <p:stCondLst>
+                                            <p:cond delay="0"/>
+                                          </p:stCondLst>
+                                        </p:cTn>
+                                        <p:tgtEl>
+                                          <p:spTgt spid="5"/>
+                                        </p:tgtEl>
+                                        <p:attrNameLst>
+                                          <p:attrName>style.visibility</p:attrName>
+                                        </p:attrNameLst>
+                                      </p:cBhvr>
+                                      <p:to>
+                                        <p:strVal val="visible"/>
+                                      </p:to>
+                                    </p:set>
+                                  </p:childTnLst>
+                                </p:cTn>
+                              </p:par>
+                            </p:childTnLst>
+                          </p:cTn>
+                        </p:par>
+                      </p:childTnLst>
+                    </p:cTn>
+                  </p:par>
+                  <p:par>
+                    <p:cTn id="15" fill="hold">
+                      <p:stCondLst>
+                        <p:cond delay="indefinite"/>
+                      </p:stCondLst>
+                      <p:childTnLst>
+                        <p:par>
+                          <p:cTn id="16" fill="hold">
+                            <p:stCondLst>
+                              <p:cond delay="0"/>
+                            </p:stCondLst>
+                            <p:childTnLst>
+                              <p:par>
+                                <p:cTn id="17" presetID="1" presetClass="entr" presetSubtype="0" fill="hold" grpId="0" nodeType="clickEffect">
+                                  <p:stCondLst>
+                                    <p:cond delay="0"/>
+                                  </p:stCondLst>
+                                  <p:childTnLst>
+                                    <p:set>
+                                      <p:cBhvr>
+                                        <p:cTn id="18" dur="1" fill="hold">
+                                          <p:stCondLst>
+                                            <p:cond delay="0"/>
+                                          </p:stCondLst>
+                                        </p:cTn>
+                                        <p:tgtEl>
                                           <p:spTgt spid="12"/>
+                                        </p:tgtEl>
+                                        <p:attrNameLst>
+                                          <p:attrName>style.visibility</p:attrName>
+                                        </p:attrNameLst>
+                                      </p:cBhvr>
+                                      <p:to>
+                                        <p:strVal val="visible"/>
+                                      </p:to>
+                                    </p:set>
+                                  </p:childTnLst>
+                                </p:cTn>
+                              </p:par>
+                              <p:par>
+                                <p:cTn id="19" presetID="1" presetClass="entr" presetSubtype="0" fill="hold" grpId="0" nodeType="withEffect">
+                                  <p:stCondLst>
+                                    <p:cond delay="0"/>
+                                  </p:stCondLst>
+                                  <p:childTnLst>
+                                    <p:set>
+                                      <p:cBhvr>
+                                        <p:cTn id="20" dur="1" fill="hold">
+                                          <p:stCondLst>
+                                            <p:cond delay="0"/>
+                                          </p:stCondLst>
+                                        </p:cTn>
+                                        <p:tgtEl>
+                                          <p:spTgt spid="7"/>
                                         </p:tgtEl>
                                         <p:attrNameLst>
                                           <p:attrName>style.visibility</p:attrName>
@@ -18684,7 +19455,10 @@
       </p:par>
     </p:tnLst>
     <p:bldLst>
+      <p:bldP spid="8" grpId="0"/>
       <p:bldP spid="12" grpId="0"/>
+      <p:bldP spid="5" grpId="0" animBg="1"/>
+      <p:bldP spid="7" grpId="0" animBg="1"/>
     </p:bldLst>
   </p:timing>
 </p:sld>
@@ -18793,7 +19567,7 @@
         <p:spPr>
           <a:xfrm>
             <a:off x="104140" y="5380672"/>
-            <a:ext cx="11148060" cy="1200329"/>
+            <a:ext cx="11148060" cy="1477328"/>
           </a:xfrm>
           <a:prstGeom prst="rect">
             <a:avLst/>
@@ -18812,7 +19586,7 @@
             </a:pPr>
             <a:r>
               <a:rPr lang="en-US" dirty="0"/>
-              <a:t>Interesting to note that Budweiser's top offerings are all in the lower range of ABV and IBU for the market</a:t>
+              <a:t>Visualizing the relationship between the ABV and IBU for the different styles of beer, we can see the industry norms and predict where new products should fall on the graph. </a:t>
             </a:r>
           </a:p>
           <a:p>
@@ -18822,8 +19596,15 @@
             </a:pPr>
             <a:r>
               <a:rPr lang="en-US" dirty="0"/>
-              <a:t>Visualizing the relationship between the ABV and IBU for the different styles of beer, we can see the industry norms and predict where new products should fall on the graph. </a:t>
-            </a:r>
+              <a:t>Interesting to note that Budweiser's top offerings are all in the lower range of ABV and IBU for the market</a:t>
+            </a:r>
+          </a:p>
+          <a:p>
+            <a:pPr marL="285750" indent="-285750">
+              <a:buFont typeface="Arial" panose="020B0604020202020204" pitchFamily="34" charset="0"/>
+              <a:buChar char="•"/>
+            </a:pPr>
+            <a:endParaRPr lang="en-US" dirty="0"/>
           </a:p>
           <a:p>
             <a:pPr marL="285750" indent="-285750">
@@ -18849,7 +19630,7 @@
           <p:nvPr/>
         </p:nvPicPr>
         <p:blipFill>
-          <a:blip r:embed="rId2"/>
+          <a:blip r:embed="rId3"/>
           <a:stretch>
             <a:fillRect/>
           </a:stretch>
@@ -18864,6 +19645,95 @@
           </a:prstGeom>
         </p:spPr>
       </p:pic>
+      <p:sp>
+        <p:nvSpPr>
+          <p:cNvPr id="2" name="Isosceles Triangle 1">
+            <a:extLst>
+              <a:ext uri="{FF2B5EF4-FFF2-40B4-BE49-F238E27FC236}">
+                <a16:creationId xmlns:a16="http://schemas.microsoft.com/office/drawing/2014/main" id="{622E65F3-51CF-0096-DE5F-37AF57D8806B}"/>
+              </a:ext>
+            </a:extLst>
+          </p:cNvPr>
+          <p:cNvSpPr/>
+          <p:nvPr/>
+        </p:nvSpPr>
+        <p:spPr>
+          <a:xfrm>
+            <a:off x="9761220" y="4255930"/>
+            <a:ext cx="243840" cy="205740"/>
+          </a:xfrm>
+          <a:prstGeom prst="triangle">
+            <a:avLst/>
+          </a:prstGeom>
+          <a:solidFill>
+            <a:srgbClr val="1E17AB"/>
+          </a:solidFill>
+          <a:ln>
+            <a:solidFill>
+              <a:srgbClr val="1E17AB"/>
+            </a:solidFill>
+          </a:ln>
+        </p:spPr>
+        <p:style>
+          <a:lnRef idx="2">
+            <a:schemeClr val="accent1">
+              <a:shade val="50000"/>
+            </a:schemeClr>
+          </a:lnRef>
+          <a:fillRef idx="1">
+            <a:schemeClr val="accent1"/>
+          </a:fillRef>
+          <a:effectRef idx="0">
+            <a:schemeClr val="accent1"/>
+          </a:effectRef>
+          <a:fontRef idx="minor">
+            <a:schemeClr val="lt1"/>
+          </a:fontRef>
+        </p:style>
+        <p:txBody>
+          <a:bodyPr rtlCol="0" anchor="ctr"/>
+          <a:lstStyle/>
+          <a:p>
+            <a:pPr algn="ctr"/>
+            <a:endParaRPr lang="en-US" dirty="0"/>
+          </a:p>
+        </p:txBody>
+      </p:sp>
+      <p:sp>
+        <p:nvSpPr>
+          <p:cNvPr id="3" name="TextBox 2">
+            <a:extLst>
+              <a:ext uri="{FF2B5EF4-FFF2-40B4-BE49-F238E27FC236}">
+                <a16:creationId xmlns:a16="http://schemas.microsoft.com/office/drawing/2014/main" id="{6CA082A0-BB2A-B483-4BA0-BBDC5F3BCA07}"/>
+              </a:ext>
+            </a:extLst>
+          </p:cNvPr>
+          <p:cNvSpPr txBox="1"/>
+          <p:nvPr/>
+        </p:nvSpPr>
+        <p:spPr>
+          <a:xfrm>
+            <a:off x="10066019" y="4174134"/>
+            <a:ext cx="1287781" cy="369332"/>
+          </a:xfrm>
+          <a:prstGeom prst="rect">
+            <a:avLst/>
+          </a:prstGeom>
+          <a:noFill/>
+        </p:spPr>
+        <p:txBody>
+          <a:bodyPr wrap="square" rtlCol="0">
+            <a:spAutoFit/>
+          </a:bodyPr>
+          <a:lstStyle/>
+          <a:p>
+            <a:r>
+              <a:rPr lang="en-US" dirty="0"/>
+              <a:t>Budweiser</a:t>
+            </a:r>
+          </a:p>
+        </p:txBody>
+      </p:sp>
     </p:spTree>
     <p:extLst>
       <p:ext uri="{BB962C8B-B14F-4D97-AF65-F5344CB8AC3E}">
@@ -19114,7 +19984,7 @@
         </p:blipFill>
         <p:spPr>
           <a:xfrm>
-            <a:off x="1289493" y="971949"/>
+            <a:off x="2526847" y="2098618"/>
             <a:ext cx="3015601" cy="3015601"/>
           </a:xfrm>
         </p:spPr>
@@ -19142,7 +20012,7 @@
         </p:blipFill>
         <p:spPr>
           <a:xfrm>
-            <a:off x="7252986" y="971949"/>
+            <a:off x="6649552" y="2098619"/>
             <a:ext cx="3015601" cy="3015601"/>
           </a:xfrm>
         </p:spPr>
@@ -19161,7 +20031,7 @@
         </p:nvSpPr>
         <p:spPr>
           <a:xfrm>
-            <a:off x="7523431" y="4190205"/>
+            <a:off x="6919997" y="5381840"/>
             <a:ext cx="2474710" cy="584774"/>
           </a:xfrm>
           <a:prstGeom prst="rect">
@@ -19215,7 +20085,7 @@
         </p:nvSpPr>
         <p:spPr>
           <a:xfrm>
-            <a:off x="1559938" y="4229672"/>
+            <a:off x="2797292" y="5415069"/>
             <a:ext cx="2474710" cy="697927"/>
           </a:xfrm>
         </p:spPr>
@@ -19250,6 +20120,42 @@
           </a:p>
           <a:p>
             <a:endParaRPr lang="en-US" dirty="0"/>
+          </a:p>
+        </p:txBody>
+      </p:sp>
+      <p:sp>
+        <p:nvSpPr>
+          <p:cNvPr id="2" name="TextBox 1">
+            <a:extLst>
+              <a:ext uri="{FF2B5EF4-FFF2-40B4-BE49-F238E27FC236}">
+                <a16:creationId xmlns:a16="http://schemas.microsoft.com/office/drawing/2014/main" id="{32BFB8B9-D232-64CA-04E3-C69D6F37880D}"/>
+              </a:ext>
+            </a:extLst>
+          </p:cNvPr>
+          <p:cNvSpPr txBox="1"/>
+          <p:nvPr/>
+        </p:nvSpPr>
+        <p:spPr>
+          <a:xfrm>
+            <a:off x="0" y="338283"/>
+            <a:ext cx="12192000" cy="1200329"/>
+          </a:xfrm>
+          <a:prstGeom prst="rect">
+            <a:avLst/>
+          </a:prstGeom>
+          <a:noFill/>
+        </p:spPr>
+        <p:txBody>
+          <a:bodyPr wrap="square" rtlCol="0">
+            <a:spAutoFit/>
+          </a:bodyPr>
+          <a:lstStyle/>
+          <a:p>
+            <a:pPr algn="ctr"/>
+            <a:r>
+              <a:rPr lang="en-US" sz="7200" dirty="0"/>
+              <a:t>Thank You</a:t>
+            </a:r>
           </a:p>
         </p:txBody>
       </p:sp>
@@ -19334,7 +20240,7 @@
         </p:nvSpPr>
         <p:spPr>
           <a:xfrm>
-            <a:off x="3189480" y="2180162"/>
+            <a:off x="3189480" y="2938775"/>
             <a:ext cx="4294206" cy="755650"/>
           </a:xfrm>
         </p:spPr>
@@ -19371,7 +20277,7 @@
         </p:nvSpPr>
         <p:spPr>
           <a:xfrm>
-            <a:off x="3189480" y="2899188"/>
+            <a:off x="3165695" y="2180162"/>
             <a:ext cx="4294206" cy="755650"/>
           </a:xfrm>
         </p:spPr>
@@ -19384,10 +20290,9 @@
               <a:buChar char="v"/>
             </a:pPr>
             <a:r>
-              <a:rPr lang="en-US"/>
+              <a:rPr lang="en-US" dirty="0"/>
               <a:t>How many Breweries are there in the US?</a:t>
             </a:r>
-            <a:endParaRPr lang="en-US" dirty="0"/>
           </a:p>
         </p:txBody>
       </p:sp>
@@ -19524,7 +20429,7 @@
         </p:nvSpPr>
         <p:spPr>
           <a:xfrm>
-            <a:off x="7688134" y="2899716"/>
+            <a:off x="7640565" y="2935812"/>
             <a:ext cx="4294206" cy="755650"/>
           </a:xfrm>
           <a:prstGeom prst="rect">
@@ -19706,7 +20611,7 @@
             </a:pPr>
             <a:r>
               <a:rPr lang="en-US" dirty="0"/>
-              <a:t>Analysis of ABV and IBU focusing on Ales and IPAs</a:t>
+              <a:t>Modeling analysis of ABV and IBU focusing on Ales and IPAs</a:t>
             </a:r>
           </a:p>
         </p:txBody>
@@ -19727,7 +20632,7 @@
         </p:nvSpPr>
         <p:spPr>
           <a:xfrm>
-            <a:off x="7640565" y="3684177"/>
+            <a:off x="7640565" y="3694425"/>
             <a:ext cx="4294206" cy="755650"/>
           </a:xfrm>
           <a:prstGeom prst="rect">
@@ -19910,6 +20815,209 @@
             <a:r>
               <a:rPr lang="en-US" dirty="0"/>
               <a:t>How does each State rank when comparing Alcohol Content and Bitterness?  </a:t>
+            </a:r>
+          </a:p>
+        </p:txBody>
+      </p:sp>
+      <p:sp>
+        <p:nvSpPr>
+          <p:cNvPr id="2" name="Text Placeholder 13">
+            <a:extLst>
+              <a:ext uri="{FF2B5EF4-FFF2-40B4-BE49-F238E27FC236}">
+                <a16:creationId xmlns:a16="http://schemas.microsoft.com/office/drawing/2014/main" id="{7A0FFBC0-648E-C0AA-84B7-425281A0D9B7}"/>
+              </a:ext>
+            </a:extLst>
+          </p:cNvPr>
+          <p:cNvSpPr txBox="1">
+            <a:spLocks/>
+          </p:cNvSpPr>
+          <p:nvPr/>
+        </p:nvSpPr>
+        <p:spPr>
+          <a:xfrm>
+            <a:off x="7688134" y="4439827"/>
+            <a:ext cx="4294206" cy="755650"/>
+          </a:xfrm>
+          <a:prstGeom prst="rect">
+            <a:avLst/>
+          </a:prstGeom>
+        </p:spPr>
+        <p:txBody>
+          <a:bodyPr vert="horz" lIns="91440" tIns="45720" rIns="91440" bIns="45720" rtlCol="0" anchor="ctr">
+            <a:normAutofit/>
+          </a:bodyPr>
+          <a:lstStyle>
+            <a:lvl1pPr marL="0" indent="0" algn="l" defTabSz="914400" rtl="0" eaLnBrk="1" latinLnBrk="0" hangingPunct="1">
+              <a:lnSpc>
+                <a:spcPct val="90000"/>
+              </a:lnSpc>
+              <a:spcBef>
+                <a:spcPts val="0"/>
+              </a:spcBef>
+              <a:buFont typeface="Arial" panose="020B0604020202020204" pitchFamily="34" charset="0"/>
+              <a:buNone/>
+              <a:defRPr sz="1400" b="0" i="0" kern="1200">
+                <a:solidFill>
+                  <a:schemeClr val="tx2"/>
+                </a:solidFill>
+                <a:latin typeface="+mn-lt"/>
+                <a:ea typeface="+mn-ea"/>
+                <a:cs typeface="Arial" panose="020B0604020202020204" pitchFamily="34" charset="0"/>
+              </a:defRPr>
+            </a:lvl1pPr>
+            <a:lvl2pPr marL="457200" indent="0" algn="l" defTabSz="914400" rtl="0" eaLnBrk="1" latinLnBrk="0" hangingPunct="1">
+              <a:lnSpc>
+                <a:spcPct val="90000"/>
+              </a:lnSpc>
+              <a:spcBef>
+                <a:spcPts val="500"/>
+              </a:spcBef>
+              <a:buFont typeface="Arial" panose="020B0604020202020204" pitchFamily="34" charset="0"/>
+              <a:buNone/>
+              <a:defRPr sz="1800" b="0" i="0" kern="1200">
+                <a:solidFill>
+                  <a:schemeClr val="tx2"/>
+                </a:solidFill>
+                <a:latin typeface="+mn-lt"/>
+                <a:ea typeface="+mn-ea"/>
+                <a:cs typeface="Arial" panose="020B0604020202020204" pitchFamily="34" charset="0"/>
+              </a:defRPr>
+            </a:lvl2pPr>
+            <a:lvl3pPr marL="1143000" indent="-228600" algn="l" defTabSz="914400" rtl="0" eaLnBrk="1" latinLnBrk="0" hangingPunct="1">
+              <a:lnSpc>
+                <a:spcPct val="90000"/>
+              </a:lnSpc>
+              <a:spcBef>
+                <a:spcPts val="500"/>
+              </a:spcBef>
+              <a:buFont typeface="Arial" panose="020B0604020202020204" pitchFamily="34" charset="0"/>
+              <a:buChar char="•"/>
+              <a:defRPr sz="1600" b="0" i="0" kern="1200">
+                <a:solidFill>
+                  <a:schemeClr val="tx2"/>
+                </a:solidFill>
+                <a:latin typeface="+mn-lt"/>
+                <a:ea typeface="+mn-ea"/>
+                <a:cs typeface="Arial" panose="020B0604020202020204" pitchFamily="34" charset="0"/>
+              </a:defRPr>
+            </a:lvl3pPr>
+            <a:lvl4pPr marL="1600200" indent="-228600" algn="l" defTabSz="914400" rtl="0" eaLnBrk="1" latinLnBrk="0" hangingPunct="1">
+              <a:lnSpc>
+                <a:spcPct val="90000"/>
+              </a:lnSpc>
+              <a:spcBef>
+                <a:spcPts val="500"/>
+              </a:spcBef>
+              <a:buFont typeface="Arial" panose="020B0604020202020204" pitchFamily="34" charset="0"/>
+              <a:buChar char="•"/>
+              <a:defRPr sz="1400" b="0" i="0" kern="1200">
+                <a:solidFill>
+                  <a:schemeClr val="tx2"/>
+                </a:solidFill>
+                <a:latin typeface="+mn-lt"/>
+                <a:ea typeface="+mn-ea"/>
+                <a:cs typeface="Arial" panose="020B0604020202020204" pitchFamily="34" charset="0"/>
+              </a:defRPr>
+            </a:lvl4pPr>
+            <a:lvl5pPr marL="2057400" indent="-228600" algn="l" defTabSz="914400" rtl="0" eaLnBrk="1" latinLnBrk="0" hangingPunct="1">
+              <a:lnSpc>
+                <a:spcPct val="90000"/>
+              </a:lnSpc>
+              <a:spcBef>
+                <a:spcPts val="500"/>
+              </a:spcBef>
+              <a:buFont typeface="Arial" panose="020B0604020202020204" pitchFamily="34" charset="0"/>
+              <a:buChar char="•"/>
+              <a:defRPr sz="1400" b="0" i="0" kern="1200">
+                <a:solidFill>
+                  <a:schemeClr val="tx2"/>
+                </a:solidFill>
+                <a:latin typeface="+mn-lt"/>
+                <a:ea typeface="+mn-ea"/>
+                <a:cs typeface="Arial" panose="020B0604020202020204" pitchFamily="34" charset="0"/>
+              </a:defRPr>
+            </a:lvl5pPr>
+            <a:lvl6pPr marL="2514600" indent="-228600" algn="l" defTabSz="914400" rtl="0" eaLnBrk="1" latinLnBrk="0" hangingPunct="1">
+              <a:lnSpc>
+                <a:spcPct val="90000"/>
+              </a:lnSpc>
+              <a:spcBef>
+                <a:spcPts val="500"/>
+              </a:spcBef>
+              <a:buFont typeface="Arial" panose="020B0604020202020204" pitchFamily="34" charset="0"/>
+              <a:buChar char="•"/>
+              <a:defRPr sz="1800" kern="1200">
+                <a:solidFill>
+                  <a:schemeClr val="tx1"/>
+                </a:solidFill>
+                <a:latin typeface="+mn-lt"/>
+                <a:ea typeface="+mn-ea"/>
+                <a:cs typeface="+mn-cs"/>
+              </a:defRPr>
+            </a:lvl6pPr>
+            <a:lvl7pPr marL="2971800" indent="-228600" algn="l" defTabSz="914400" rtl="0" eaLnBrk="1" latinLnBrk="0" hangingPunct="1">
+              <a:lnSpc>
+                <a:spcPct val="90000"/>
+              </a:lnSpc>
+              <a:spcBef>
+                <a:spcPts val="500"/>
+              </a:spcBef>
+              <a:buFont typeface="Arial" panose="020B0604020202020204" pitchFamily="34" charset="0"/>
+              <a:buChar char="•"/>
+              <a:defRPr sz="1800" kern="1200">
+                <a:solidFill>
+                  <a:schemeClr val="tx1"/>
+                </a:solidFill>
+                <a:latin typeface="+mn-lt"/>
+                <a:ea typeface="+mn-ea"/>
+                <a:cs typeface="+mn-cs"/>
+              </a:defRPr>
+            </a:lvl7pPr>
+            <a:lvl8pPr marL="3429000" indent="-228600" algn="l" defTabSz="914400" rtl="0" eaLnBrk="1" latinLnBrk="0" hangingPunct="1">
+              <a:lnSpc>
+                <a:spcPct val="90000"/>
+              </a:lnSpc>
+              <a:spcBef>
+                <a:spcPts val="500"/>
+              </a:spcBef>
+              <a:buFont typeface="Arial" panose="020B0604020202020204" pitchFamily="34" charset="0"/>
+              <a:buChar char="•"/>
+              <a:defRPr sz="1800" kern="1200">
+                <a:solidFill>
+                  <a:schemeClr val="tx1"/>
+                </a:solidFill>
+                <a:latin typeface="+mn-lt"/>
+                <a:ea typeface="+mn-ea"/>
+                <a:cs typeface="+mn-cs"/>
+              </a:defRPr>
+            </a:lvl8pPr>
+            <a:lvl9pPr marL="3886200" indent="-228600" algn="l" defTabSz="914400" rtl="0" eaLnBrk="1" latinLnBrk="0" hangingPunct="1">
+              <a:lnSpc>
+                <a:spcPct val="90000"/>
+              </a:lnSpc>
+              <a:spcBef>
+                <a:spcPts val="500"/>
+              </a:spcBef>
+              <a:buFont typeface="Arial" panose="020B0604020202020204" pitchFamily="34" charset="0"/>
+              <a:buChar char="•"/>
+              <a:defRPr sz="1800" kern="1200">
+                <a:solidFill>
+                  <a:schemeClr val="tx1"/>
+                </a:solidFill>
+                <a:latin typeface="+mn-lt"/>
+                <a:ea typeface="+mn-ea"/>
+                <a:cs typeface="+mn-cs"/>
+              </a:defRPr>
+            </a:lvl9pPr>
+          </a:lstStyle>
+          <a:p>
+            <a:pPr marL="285750" indent="-285750">
+              <a:buFont typeface="Wingdings" pitchFamily="2" charset="2"/>
+              <a:buChar char="v"/>
+            </a:pPr>
+            <a:r>
+              <a:rPr lang="en-US" dirty="0"/>
+              <a:t>Additional modeling that we found exciting. </a:t>
             </a:r>
           </a:p>
         </p:txBody>
@@ -20007,7 +21115,7 @@
                                           </p:stCondLst>
                                         </p:cTn>
                                         <p:tgtEl>
-                                          <p:spTgt spid="12">
+                                          <p:spTgt spid="14">
                                             <p:txEl>
                                               <p:pRg st="0" end="0"/>
                                             </p:txEl>
@@ -20056,7 +21164,7 @@
                                           </p:stCondLst>
                                         </p:cTn>
                                         <p:tgtEl>
-                                          <p:spTgt spid="14">
+                                          <p:spTgt spid="13">
                                             <p:txEl>
                                               <p:pRg st="0" end="0"/>
                                             </p:txEl>
@@ -20105,7 +21213,7 @@
                                           </p:stCondLst>
                                         </p:cTn>
                                         <p:tgtEl>
-                                          <p:spTgt spid="13">
+                                          <p:spTgt spid="15">
                                             <p:txEl>
                                               <p:pRg st="0" end="0"/>
                                             </p:txEl>
@@ -20154,11 +21262,7 @@
                                           </p:stCondLst>
                                         </p:cTn>
                                         <p:tgtEl>
-                                          <p:spTgt spid="15">
-                                            <p:txEl>
-                                              <p:pRg st="0" end="0"/>
-                                            </p:txEl>
-                                          </p:spTgt>
+                                          <p:spTgt spid="6"/>
                                         </p:tgtEl>
                                         <p:attrNameLst>
                                           <p:attrName>style.visibility</p:attrName>
@@ -20203,7 +21307,7 @@
                                           </p:stCondLst>
                                         </p:cTn>
                                         <p:tgtEl>
-                                          <p:spTgt spid="6"/>
+                                          <p:spTgt spid="8"/>
                                         </p:tgtEl>
                                         <p:attrNameLst>
                                           <p:attrName>style.visibility</p:attrName>
@@ -20248,7 +21352,7 @@
                                           </p:stCondLst>
                                         </p:cTn>
                                         <p:tgtEl>
-                                          <p:spTgt spid="8"/>
+                                          <p:spTgt spid="2"/>
                                         </p:tgtEl>
                                         <p:attrNameLst>
                                           <p:attrName>style.visibility</p:attrName>
@@ -20290,12 +21394,12 @@
     </p:tnLst>
     <p:bldLst>
       <p:bldP spid="10" grpId="0" build="p"/>
-      <p:bldP spid="12" grpId="0" build="p"/>
       <p:bldP spid="13" grpId="0" build="p"/>
       <p:bldP spid="14" grpId="0" build="p"/>
       <p:bldP spid="15" grpId="0" build="p"/>
       <p:bldP spid="6" grpId="0"/>
       <p:bldP spid="8" grpId="0"/>
+      <p:bldP spid="2" grpId="0"/>
     </p:bldLst>
   </p:timing>
 </p:sld>
@@ -20514,45 +21618,73 @@
                 <a:latin typeface="Times New Roman" panose="02020603050405020304" pitchFamily="18" charset="0"/>
                 <a:cs typeface="Times New Roman" panose="02020603050405020304" pitchFamily="18" charset="0"/>
               </a:rPr>
-              <a:t>So with the duplicates merged, we are confident that there are 551 breweries  within the United States.  </a:t>
-            </a:r>
-          </a:p>
-        </p:txBody>
-      </p:sp>
-      <p:sp>
-        <p:nvSpPr>
-          <p:cNvPr id="7" name="Text Placeholder 6">
-            <a:extLst>
-              <a:ext uri="{FF2B5EF4-FFF2-40B4-BE49-F238E27FC236}">
-                <a16:creationId xmlns:a16="http://schemas.microsoft.com/office/drawing/2014/main" id="{87FCC6D1-213C-4A86-A2D0-742E15438C09}"/>
-              </a:ext>
-            </a:extLst>
-          </p:cNvPr>
-          <p:cNvSpPr>
-            <a:spLocks noGrp="1"/>
-          </p:cNvSpPr>
-          <p:nvPr>
-            <p:ph type="body" sz="quarter" idx="11"/>
-          </p:nvPr>
-        </p:nvSpPr>
-        <p:spPr>
-          <a:xfrm>
-            <a:off x="7718322" y="1100289"/>
-            <a:ext cx="3977648" cy="731694"/>
-          </a:xfrm>
-        </p:spPr>
-        <p:txBody>
-          <a:bodyPr>
-            <a:normAutofit/>
-          </a:bodyPr>
-          <a:lstStyle/>
-          <a:p>
+              <a:t>So…with the duplicates merged, we are confident that there are </a:t>
+            </a:r>
+            <a:r>
+              <a:rPr lang="en-US" sz="1600" b="1" dirty="0">
+                <a:latin typeface="Times New Roman" panose="02020603050405020304" pitchFamily="18" charset="0"/>
+                <a:cs typeface="Times New Roman" panose="02020603050405020304" pitchFamily="18" charset="0"/>
+              </a:rPr>
+              <a:t>551 breweries </a:t>
+            </a:r>
             <a:r>
               <a:rPr lang="en-US" dirty="0">
                 <a:latin typeface="Times New Roman" panose="02020603050405020304" pitchFamily="18" charset="0"/>
                 <a:cs typeface="Times New Roman" panose="02020603050405020304" pitchFamily="18" charset="0"/>
               </a:rPr>
-              <a:t>On initial investigation, it appeared that according to the data, there are approximately 558 breweries in the US.</a:t>
+              <a:t>within the United States.  </a:t>
+            </a:r>
+          </a:p>
+        </p:txBody>
+      </p:sp>
+      <p:sp>
+        <p:nvSpPr>
+          <p:cNvPr id="7" name="Text Placeholder 6">
+            <a:extLst>
+              <a:ext uri="{FF2B5EF4-FFF2-40B4-BE49-F238E27FC236}">
+                <a16:creationId xmlns:a16="http://schemas.microsoft.com/office/drawing/2014/main" id="{87FCC6D1-213C-4A86-A2D0-742E15438C09}"/>
+              </a:ext>
+            </a:extLst>
+          </p:cNvPr>
+          <p:cNvSpPr>
+            <a:spLocks noGrp="1"/>
+          </p:cNvSpPr>
+          <p:nvPr>
+            <p:ph type="body" sz="quarter" idx="11"/>
+          </p:nvPr>
+        </p:nvSpPr>
+        <p:spPr>
+          <a:xfrm>
+            <a:off x="7718322" y="1100289"/>
+            <a:ext cx="3977648" cy="731694"/>
+          </a:xfrm>
+        </p:spPr>
+        <p:txBody>
+          <a:bodyPr>
+            <a:normAutofit lnSpcReduction="10000"/>
+          </a:bodyPr>
+          <a:lstStyle/>
+          <a:p>
+            <a:r>
+              <a:rPr lang="en-US" dirty="0">
+                <a:latin typeface="Times New Roman" panose="02020603050405020304" pitchFamily="18" charset="0"/>
+                <a:cs typeface="Times New Roman" panose="02020603050405020304" pitchFamily="18" charset="0"/>
+              </a:rPr>
+              <a:t>On initial investigation, it appeared that according to the data, there are </a:t>
+            </a:r>
+            <a:r>
+              <a:rPr lang="en-US" sz="1600" b="1" dirty="0">
+                <a:latin typeface="Times New Roman" panose="02020603050405020304" pitchFamily="18" charset="0"/>
+                <a:cs typeface="Times New Roman" panose="02020603050405020304" pitchFamily="18" charset="0"/>
+              </a:rPr>
+              <a:t>approximately 558 breweries </a:t>
+            </a:r>
+            <a:r>
+              <a:rPr lang="en-US" dirty="0">
+                <a:latin typeface="Times New Roman" panose="02020603050405020304" pitchFamily="18" charset="0"/>
+                <a:cs typeface="Times New Roman" panose="02020603050405020304" pitchFamily="18" charset="0"/>
+              </a:rPr>
+              <a:t>in the US.</a:t>
             </a:r>
           </a:p>
         </p:txBody>
@@ -23221,7 +24353,7 @@
         </p:nvSpPr>
         <p:spPr>
           <a:xfrm>
-            <a:off x="307000" y="4792366"/>
+            <a:off x="307000" y="5196440"/>
             <a:ext cx="5664200" cy="923330"/>
           </a:xfrm>
           <a:prstGeom prst="rect">
@@ -23265,8 +24397,8 @@
         </p:nvSpPr>
         <p:spPr>
           <a:xfrm>
-            <a:off x="6096000" y="880930"/>
-            <a:ext cx="5122504" cy="2585323"/>
+            <a:off x="6239848" y="939090"/>
+            <a:ext cx="5122504" cy="2031325"/>
           </a:xfrm>
           <a:prstGeom prst="rect">
             <a:avLst/>
@@ -23279,13 +24411,34 @@
           </a:bodyPr>
           <a:lstStyle/>
           <a:p>
-            <a:r>
-              <a:rPr lang="en-US" sz="1800" dirty="0"/>
-              <a:t>There is not an excessive variation in median ABV across the states. The notable exception to this is the much lower median ABV for Utah, which may be an artifact of the state laws. ABV of all beer sold in Utah was previously limited to 3.2%. That law has been repealed and one of the authors, who lives in Utah, can confirm that the beer situation is slowly improving.</a:t>
-            </a:r>
-          </a:p>
-          <a:p>
-            <a:endParaRPr lang="en-US" dirty="0"/>
+            <a:pPr marL="285750" indent="-285750">
+              <a:buFont typeface="Arial" panose="020B0604020202020204" pitchFamily="34" charset="0"/>
+              <a:buChar char="•"/>
+            </a:pPr>
+            <a:r>
+              <a:rPr lang="en-US" dirty="0"/>
+              <a:t>There is not an excessive variation in median ABV across the states.</a:t>
+            </a:r>
+          </a:p>
+          <a:p>
+            <a:pPr marL="285750" indent="-285750">
+              <a:buFont typeface="Arial" panose="020B0604020202020204" pitchFamily="34" charset="0"/>
+              <a:buChar char="•"/>
+            </a:pPr>
+            <a:r>
+              <a:rPr lang="en-US" dirty="0"/>
+              <a:t>The notable exception to this is the much lower median ABV for Utah.</a:t>
+            </a:r>
+          </a:p>
+          <a:p>
+            <a:pPr marL="742950" lvl="1" indent="-285750">
+              <a:buFont typeface="Arial" panose="020B0604020202020204" pitchFamily="34" charset="0"/>
+              <a:buChar char="•"/>
+            </a:pPr>
+            <a:r>
+              <a:rPr lang="en-US" dirty="0"/>
+              <a:t>This abnormality may be an artifact of the state laws. ABV of all beer sold in Utah was previously limited to 3.2%.</a:t>
+            </a:r>
           </a:p>
         </p:txBody>
       </p:sp>
@@ -23311,7 +24464,7 @@
         </p:blipFill>
         <p:spPr>
           <a:xfrm>
-            <a:off x="5966800" y="880930"/>
+            <a:off x="5971200" y="880930"/>
             <a:ext cx="5659800" cy="3612968"/>
           </a:xfrm>
           <a:prstGeom prst="rect">
@@ -23333,7 +24486,7 @@
         </p:nvSpPr>
         <p:spPr>
           <a:xfrm>
-            <a:off x="6220802" y="4734775"/>
+            <a:off x="6220802" y="5196440"/>
             <a:ext cx="4764698" cy="923330"/>
           </a:xfrm>
           <a:prstGeom prst="rect">
@@ -23418,7 +24571,7 @@
         </p:nvSpPr>
         <p:spPr>
           <a:xfrm>
-            <a:off x="177800" y="5977070"/>
+            <a:off x="307000" y="4605877"/>
             <a:ext cx="10299700" cy="646331"/>
           </a:xfrm>
           <a:prstGeom prst="rect">
@@ -23541,46 +24694,32 @@
                                   </p:childTnLst>
                                 </p:cTn>
                               </p:par>
-                            </p:childTnLst>
-                          </p:cTn>
-                        </p:par>
-                      </p:childTnLst>
-                    </p:cTn>
-                  </p:par>
-                  <p:par>
-                    <p:cTn id="11" fill="hold">
-                      <p:stCondLst>
-                        <p:cond delay="indefinite"/>
-                      </p:stCondLst>
-                      <p:childTnLst>
-                        <p:par>
-                          <p:cTn id="12" fill="hold">
-                            <p:stCondLst>
-                              <p:cond delay="0"/>
-                            </p:stCondLst>
-                            <p:childTnLst>
                               <p:par>
-                                <p:cTn id="13" presetID="1" presetClass="exit" presetSubtype="0" fill="hold" grpId="1" nodeType="clickEffect">
+                                <p:cTn id="11" presetID="1" presetClass="entr" presetSubtype="0" fill="hold" nodeType="withEffect">
                                   <p:stCondLst>
                                     <p:cond delay="0"/>
                                   </p:stCondLst>
                                   <p:childTnLst>
                                     <p:set>
                                       <p:cBhvr>
-                                        <p:cTn id="14" dur="1" fill="hold">
+                                        <p:cTn id="12" dur="1" fill="hold">
                                           <p:stCondLst>
                                             <p:cond delay="0"/>
                                           </p:stCondLst>
                                         </p:cTn>
                                         <p:tgtEl>
-                                          <p:spTgt spid="25"/>
+                                          <p:spTgt spid="25">
+                                            <p:txEl>
+                                              <p:pRg st="0" end="0"/>
+                                            </p:txEl>
+                                          </p:spTgt>
                                         </p:tgtEl>
                                         <p:attrNameLst>
                                           <p:attrName>style.visibility</p:attrName>
                                         </p:attrNameLst>
                                       </p:cBhvr>
                                       <p:to>
-                                        <p:strVal val="hidden"/>
+                                        <p:strVal val="visible"/>
                                       </p:to>
                                     </p:set>
                                   </p:childTnLst>
@@ -23593,19 +24732,50 @@
                     </p:cTn>
                   </p:par>
                   <p:par>
-                    <p:cTn id="15" fill="hold">
+                    <p:cTn id="13" fill="hold">
                       <p:stCondLst>
                         <p:cond delay="indefinite"/>
                       </p:stCondLst>
                       <p:childTnLst>
                         <p:par>
-                          <p:cTn id="16" fill="hold">
+                          <p:cTn id="14" fill="hold">
                             <p:stCondLst>
                               <p:cond delay="0"/>
                             </p:stCondLst>
                             <p:childTnLst>
                               <p:par>
-                                <p:cTn id="17" presetID="1" presetClass="entr" presetSubtype="0" fill="hold" nodeType="clickEffect">
+                                <p:cTn id="15" presetID="1" presetClass="entr" presetSubtype="0" fill="hold" nodeType="clickEffect">
+                                  <p:stCondLst>
+                                    <p:cond delay="0"/>
+                                  </p:stCondLst>
+                                  <p:childTnLst>
+                                    <p:set>
+                                      <p:cBhvr>
+                                        <p:cTn id="16" dur="1" fill="hold">
+                                          <p:stCondLst>
+                                            <p:cond delay="0"/>
+                                          </p:stCondLst>
+                                        </p:cTn>
+                                        <p:tgtEl>
+                                          <p:spTgt spid="25">
+                                            <p:txEl>
+                                              <p:pRg st="1" end="1"/>
+                                            </p:txEl>
+                                          </p:spTgt>
+                                        </p:tgtEl>
+                                        <p:attrNameLst>
+                                          <p:attrName>style.visibility</p:attrName>
+                                        </p:attrNameLst>
+                                      </p:cBhvr>
+                                      <p:to>
+                                        <p:strVal val="visible"/>
+                                      </p:to>
+                                    </p:set>
+                                  </p:childTnLst>
+                                </p:cTn>
+                              </p:par>
+                              <p:par>
+                                <p:cTn id="17" presetID="1" presetClass="entr" presetSubtype="0" fill="hold" nodeType="withEffect">
                                   <p:stCondLst>
                                     <p:cond delay="0"/>
                                   </p:stCondLst>
@@ -23618,7 +24788,11 @@
                                           </p:stCondLst>
                                         </p:cTn>
                                         <p:tgtEl>
-                                          <p:spTgt spid="27"/>
+                                          <p:spTgt spid="25">
+                                            <p:txEl>
+                                              <p:pRg st="2" end="2"/>
+                                            </p:txEl>
+                                          </p:spTgt>
                                         </p:tgtEl>
                                         <p:attrNameLst>
                                           <p:attrName>style.visibility</p:attrName>
@@ -23650,7 +24824,7 @@
                             </p:stCondLst>
                             <p:childTnLst>
                               <p:par>
-                                <p:cTn id="21" presetID="1" presetClass="entr" presetSubtype="0" fill="hold" grpId="0" nodeType="clickEffect">
+                                <p:cTn id="21" presetID="1" presetClass="exit" presetSubtype="0" fill="hold" grpId="1" nodeType="clickEffect">
                                   <p:stCondLst>
                                     <p:cond delay="0"/>
                                   </p:stCondLst>
@@ -23663,7 +24837,34 @@
                                           </p:stCondLst>
                                         </p:cTn>
                                         <p:tgtEl>
-                                          <p:spTgt spid="30"/>
+                                          <p:spTgt spid="25"/>
+                                        </p:tgtEl>
+                                        <p:attrNameLst>
+                                          <p:attrName>style.visibility</p:attrName>
+                                        </p:attrNameLst>
+                                      </p:cBhvr>
+                                      <p:to>
+                                        <p:strVal val="hidden"/>
+                                      </p:to>
+                                    </p:set>
+                                  </p:childTnLst>
+                                </p:cTn>
+                              </p:par>
+                              <p:par>
+                                <p:cTn id="23" presetID="1" presetClass="entr" presetSubtype="0" fill="hold" nodeType="withEffect">
+                                  <p:stCondLst>
+                                    <p:cond delay="0"/>
+                                  </p:stCondLst>
+                                  <p:childTnLst>
+                                    <p:set>
+                                      <p:cBhvr>
+                                        <p:cTn id="24" dur="1" fill="hold">
+                                          <p:stCondLst>
+                                            <p:cond delay="0"/>
+                                          </p:stCondLst>
+                                        </p:cTn>
+                                        <p:tgtEl>
+                                          <p:spTgt spid="27"/>
                                         </p:tgtEl>
                                         <p:attrNameLst>
                                           <p:attrName>style.visibility</p:attrName>
@@ -23683,46 +24884,19 @@
                     </p:cTn>
                   </p:par>
                   <p:par>
-                    <p:cTn id="23" fill="hold">
+                    <p:cTn id="25" fill="hold">
                       <p:stCondLst>
                         <p:cond delay="indefinite"/>
                       </p:stCondLst>
                       <p:childTnLst>
                         <p:par>
-                          <p:cTn id="24" fill="hold">
+                          <p:cTn id="26" fill="hold">
                             <p:stCondLst>
                               <p:cond delay="0"/>
                             </p:stCondLst>
                             <p:childTnLst>
                               <p:par>
-                                <p:cTn id="25" presetID="1" presetClass="entr" presetSubtype="0" fill="hold" grpId="0" nodeType="clickEffect">
-                                  <p:stCondLst>
-                                    <p:cond delay="0"/>
-                                  </p:stCondLst>
-                                  <p:childTnLst>
-                                    <p:set>
-                                      <p:cBhvr>
-                                        <p:cTn id="26" dur="1" fill="hold">
-                                          <p:stCondLst>
-                                            <p:cond delay="0"/>
-                                          </p:stCondLst>
-                                        </p:cTn>
-                                        <p:tgtEl>
-                                          <p:spTgt spid="23"/>
-                                        </p:tgtEl>
-                                        <p:attrNameLst>
-                                          <p:attrName>style.visibility</p:attrName>
-                                        </p:attrNameLst>
-                                      </p:cBhvr>
-                                      <p:to>
-                                        <p:strVal val="visible"/>
-                                      </p:to>
-                                    </p:set>
-                                  </p:childTnLst>
-                                </p:cTn>
-                              </p:par>
-                              <p:par>
-                                <p:cTn id="27" presetID="1" presetClass="entr" presetSubtype="0" fill="hold" grpId="0" nodeType="withEffect">
+                                <p:cTn id="27" presetID="1" presetClass="entr" presetSubtype="0" fill="hold" grpId="0" nodeType="clickEffect">
                                   <p:stCondLst>
                                     <p:cond delay="0"/>
                                   </p:stCondLst>
@@ -23735,7 +24909,7 @@
                                           </p:stCondLst>
                                         </p:cTn>
                                         <p:tgtEl>
-                                          <p:spTgt spid="24"/>
+                                          <p:spTgt spid="30"/>
                                         </p:tgtEl>
                                         <p:attrNameLst>
                                           <p:attrName>style.visibility</p:attrName>
@@ -23780,7 +24954,7 @@
                                           </p:stCondLst>
                                         </p:cTn>
                                         <p:tgtEl>
-                                          <p:spTgt spid="29"/>
+                                          <p:spTgt spid="23"/>
                                         </p:tgtEl>
                                         <p:attrNameLst>
                                           <p:attrName>style.visibility</p:attrName>
@@ -23802,6 +24976,78 @@
                                     <p:set>
                                       <p:cBhvr>
                                         <p:cTn id="34" dur="1" fill="hold">
+                                          <p:stCondLst>
+                                            <p:cond delay="0"/>
+                                          </p:stCondLst>
+                                        </p:cTn>
+                                        <p:tgtEl>
+                                          <p:spTgt spid="24"/>
+                                        </p:tgtEl>
+                                        <p:attrNameLst>
+                                          <p:attrName>style.visibility</p:attrName>
+                                        </p:attrNameLst>
+                                      </p:cBhvr>
+                                      <p:to>
+                                        <p:strVal val="visible"/>
+                                      </p:to>
+                                    </p:set>
+                                  </p:childTnLst>
+                                </p:cTn>
+                              </p:par>
+                            </p:childTnLst>
+                          </p:cTn>
+                        </p:par>
+                      </p:childTnLst>
+                    </p:cTn>
+                  </p:par>
+                  <p:par>
+                    <p:cTn id="35" fill="hold">
+                      <p:stCondLst>
+                        <p:cond delay="indefinite"/>
+                      </p:stCondLst>
+                      <p:childTnLst>
+                        <p:par>
+                          <p:cTn id="36" fill="hold">
+                            <p:stCondLst>
+                              <p:cond delay="0"/>
+                            </p:stCondLst>
+                            <p:childTnLst>
+                              <p:par>
+                                <p:cTn id="37" presetID="1" presetClass="entr" presetSubtype="0" fill="hold" grpId="0" nodeType="clickEffect">
+                                  <p:stCondLst>
+                                    <p:cond delay="0"/>
+                                  </p:stCondLst>
+                                  <p:childTnLst>
+                                    <p:set>
+                                      <p:cBhvr>
+                                        <p:cTn id="38" dur="1" fill="hold">
+                                          <p:stCondLst>
+                                            <p:cond delay="0"/>
+                                          </p:stCondLst>
+                                        </p:cTn>
+                                        <p:tgtEl>
+                                          <p:spTgt spid="29"/>
+                                        </p:tgtEl>
+                                        <p:attrNameLst>
+                                          <p:attrName>style.visibility</p:attrName>
+                                        </p:attrNameLst>
+                                      </p:cBhvr>
+                                      <p:to>
+                                        <p:strVal val="visible"/>
+                                      </p:to>
+                                    </p:set>
+                                  </p:childTnLst>
+                                </p:cTn>
+                              </p:par>
+                              <p:par>
+                                <p:cTn id="39" presetID="1" presetClass="entr" presetSubtype="0" fill="hold" grpId="0" nodeType="withEffect">
+                                  <p:stCondLst>
+                                    <p:cond delay="0"/>
+                                  </p:stCondLst>
+                                  <p:childTnLst>
+                                    <p:set>
+                                      <p:cBhvr>
+                                        <p:cTn id="40" dur="1" fill="hold">
                                           <p:stCondLst>
                                             <p:cond delay="0"/>
                                           </p:stCondLst>
@@ -23928,7 +25174,7 @@
           </p:nvPr>
         </p:nvPicPr>
         <p:blipFill>
-          <a:blip r:embed="rId2"/>
+          <a:blip r:embed="rId3"/>
           <a:stretch>
             <a:fillRect/>
           </a:stretch>
@@ -24131,6 +25377,251 @@
                                     <p:set>
                                       <p:cBhvr>
                                         <p:cTn id="6" dur="1" fill="hold">
+                                          <p:stCondLst>
+                                            <p:cond delay="0"/>
+                                          </p:stCondLst>
+                                        </p:cTn>
+                                        <p:tgtEl>
+                                          <p:spTgt spid="7">
+                                            <p:txEl>
+                                              <p:pRg st="0" end="0"/>
+                                            </p:txEl>
+                                          </p:spTgt>
+                                        </p:tgtEl>
+                                        <p:attrNameLst>
+                                          <p:attrName>style.visibility</p:attrName>
+                                        </p:attrNameLst>
+                                      </p:cBhvr>
+                                      <p:to>
+                                        <p:strVal val="visible"/>
+                                      </p:to>
+                                    </p:set>
+                                  </p:childTnLst>
+                                </p:cTn>
+                              </p:par>
+                            </p:childTnLst>
+                          </p:cTn>
+                        </p:par>
+                      </p:childTnLst>
+                    </p:cTn>
+                  </p:par>
+                  <p:par>
+                    <p:cTn id="7" fill="hold">
+                      <p:stCondLst>
+                        <p:cond delay="indefinite"/>
+                      </p:stCondLst>
+                      <p:childTnLst>
+                        <p:par>
+                          <p:cTn id="8" fill="hold">
+                            <p:stCondLst>
+                              <p:cond delay="0"/>
+                            </p:stCondLst>
+                            <p:childTnLst>
+                              <p:par>
+                                <p:cTn id="9" presetID="1" presetClass="entr" presetSubtype="0" fill="hold" nodeType="clickEffect">
+                                  <p:stCondLst>
+                                    <p:cond delay="0"/>
+                                  </p:stCondLst>
+                                  <p:childTnLst>
+                                    <p:set>
+                                      <p:cBhvr>
+                                        <p:cTn id="10" dur="1" fill="hold">
+                                          <p:stCondLst>
+                                            <p:cond delay="0"/>
+                                          </p:stCondLst>
+                                        </p:cTn>
+                                        <p:tgtEl>
+                                          <p:spTgt spid="7">
+                                            <p:txEl>
+                                              <p:pRg st="1" end="1"/>
+                                            </p:txEl>
+                                          </p:spTgt>
+                                        </p:tgtEl>
+                                        <p:attrNameLst>
+                                          <p:attrName>style.visibility</p:attrName>
+                                        </p:attrNameLst>
+                                      </p:cBhvr>
+                                      <p:to>
+                                        <p:strVal val="visible"/>
+                                      </p:to>
+                                    </p:set>
+                                  </p:childTnLst>
+                                </p:cTn>
+                              </p:par>
+                            </p:childTnLst>
+                          </p:cTn>
+                        </p:par>
+                      </p:childTnLst>
+                    </p:cTn>
+                  </p:par>
+                  <p:par>
+                    <p:cTn id="11" fill="hold">
+                      <p:stCondLst>
+                        <p:cond delay="indefinite"/>
+                      </p:stCondLst>
+                      <p:childTnLst>
+                        <p:par>
+                          <p:cTn id="12" fill="hold">
+                            <p:stCondLst>
+                              <p:cond delay="0"/>
+                            </p:stCondLst>
+                            <p:childTnLst>
+                              <p:par>
+                                <p:cTn id="13" presetID="1" presetClass="entr" presetSubtype="0" fill="hold" nodeType="clickEffect">
+                                  <p:stCondLst>
+                                    <p:cond delay="0"/>
+                                  </p:stCondLst>
+                                  <p:childTnLst>
+                                    <p:set>
+                                      <p:cBhvr>
+                                        <p:cTn id="14" dur="1" fill="hold">
+                                          <p:stCondLst>
+                                            <p:cond delay="0"/>
+                                          </p:stCondLst>
+                                        </p:cTn>
+                                        <p:tgtEl>
+                                          <p:spTgt spid="7">
+                                            <p:txEl>
+                                              <p:pRg st="2" end="2"/>
+                                            </p:txEl>
+                                          </p:spTgt>
+                                        </p:tgtEl>
+                                        <p:attrNameLst>
+                                          <p:attrName>style.visibility</p:attrName>
+                                        </p:attrNameLst>
+                                      </p:cBhvr>
+                                      <p:to>
+                                        <p:strVal val="visible"/>
+                                      </p:to>
+                                    </p:set>
+                                  </p:childTnLst>
+                                </p:cTn>
+                              </p:par>
+                            </p:childTnLst>
+                          </p:cTn>
+                        </p:par>
+                      </p:childTnLst>
+                    </p:cTn>
+                  </p:par>
+                  <p:par>
+                    <p:cTn id="15" fill="hold">
+                      <p:stCondLst>
+                        <p:cond delay="indefinite"/>
+                      </p:stCondLst>
+                      <p:childTnLst>
+                        <p:par>
+                          <p:cTn id="16" fill="hold">
+                            <p:stCondLst>
+                              <p:cond delay="0"/>
+                            </p:stCondLst>
+                            <p:childTnLst>
+                              <p:par>
+                                <p:cTn id="17" presetID="1" presetClass="entr" presetSubtype="0" fill="hold" nodeType="clickEffect">
+                                  <p:stCondLst>
+                                    <p:cond delay="0"/>
+                                  </p:stCondLst>
+                                  <p:childTnLst>
+                                    <p:set>
+                                      <p:cBhvr>
+                                        <p:cTn id="18" dur="1" fill="hold">
+                                          <p:stCondLst>
+                                            <p:cond delay="0"/>
+                                          </p:stCondLst>
+                                        </p:cTn>
+                                        <p:tgtEl>
+                                          <p:spTgt spid="7">
+                                            <p:txEl>
+                                              <p:pRg st="3" end="3"/>
+                                            </p:txEl>
+                                          </p:spTgt>
+                                        </p:tgtEl>
+                                        <p:attrNameLst>
+                                          <p:attrName>style.visibility</p:attrName>
+                                        </p:attrNameLst>
+                                      </p:cBhvr>
+                                      <p:to>
+                                        <p:strVal val="visible"/>
+                                      </p:to>
+                                    </p:set>
+                                  </p:childTnLst>
+                                </p:cTn>
+                              </p:par>
+                            </p:childTnLst>
+                          </p:cTn>
+                        </p:par>
+                      </p:childTnLst>
+                    </p:cTn>
+                  </p:par>
+                  <p:par>
+                    <p:cTn id="19" fill="hold">
+                      <p:stCondLst>
+                        <p:cond delay="indefinite"/>
+                      </p:stCondLst>
+                      <p:childTnLst>
+                        <p:par>
+                          <p:cTn id="20" fill="hold">
+                            <p:stCondLst>
+                              <p:cond delay="0"/>
+                            </p:stCondLst>
+                            <p:childTnLst>
+                              <p:par>
+                                <p:cTn id="21" presetID="1" presetClass="entr" presetSubtype="0" fill="hold" nodeType="clickEffect">
+                                  <p:stCondLst>
+                                    <p:cond delay="0"/>
+                                  </p:stCondLst>
+                                  <p:childTnLst>
+                                    <p:set>
+                                      <p:cBhvr>
+                                        <p:cTn id="22" dur="1" fill="hold">
+                                          <p:stCondLst>
+                                            <p:cond delay="0"/>
+                                          </p:stCondLst>
+                                        </p:cTn>
+                                        <p:tgtEl>
+                                          <p:spTgt spid="7">
+                                            <p:txEl>
+                                              <p:pRg st="4" end="4"/>
+                                            </p:txEl>
+                                          </p:spTgt>
+                                        </p:tgtEl>
+                                        <p:attrNameLst>
+                                          <p:attrName>style.visibility</p:attrName>
+                                        </p:attrNameLst>
+                                      </p:cBhvr>
+                                      <p:to>
+                                        <p:strVal val="visible"/>
+                                      </p:to>
+                                    </p:set>
+                                  </p:childTnLst>
+                                </p:cTn>
+                              </p:par>
+                            </p:childTnLst>
+                          </p:cTn>
+                        </p:par>
+                      </p:childTnLst>
+                    </p:cTn>
+                  </p:par>
+                  <p:par>
+                    <p:cTn id="23" fill="hold">
+                      <p:stCondLst>
+                        <p:cond delay="indefinite"/>
+                      </p:stCondLst>
+                      <p:childTnLst>
+                        <p:par>
+                          <p:cTn id="24" fill="hold">
+                            <p:stCondLst>
+                              <p:cond delay="0"/>
+                            </p:stCondLst>
+                            <p:childTnLst>
+                              <p:par>
+                                <p:cTn id="25" presetID="1" presetClass="entr" presetSubtype="0" fill="hold" nodeType="clickEffect">
+                                  <p:stCondLst>
+                                    <p:cond delay="0"/>
+                                  </p:stCondLst>
+                                  <p:childTnLst>
+                                    <p:set>
+                                      <p:cBhvr>
+                                        <p:cTn id="26" dur="1" fill="hold">
                                           <p:stCondLst>
                                             <p:cond delay="0"/>
                                           </p:stCondLst>
@@ -24227,7 +25718,7 @@
           <p:nvPr/>
         </p:nvPicPr>
         <p:blipFill>
-          <a:blip r:embed="rId2"/>
+          <a:blip r:embed="rId3"/>
           <a:stretch>
             <a:fillRect/>
           </a:stretch>
@@ -24572,7 +26063,7 @@
         </p:blipFill>
         <p:spPr>
           <a:xfrm>
-            <a:off x="508000" y="1652825"/>
+            <a:off x="271440" y="1652825"/>
             <a:ext cx="6983341" cy="4457858"/>
           </a:xfrm>
           <a:prstGeom prst="rect">
@@ -24647,6 +26138,266 @@
           </a:prstGeom>
         </p:spPr>
       </p:pic>
+      <p:sp>
+        <p:nvSpPr>
+          <p:cNvPr id="3" name="Oval 2">
+            <a:extLst>
+              <a:ext uri="{FF2B5EF4-FFF2-40B4-BE49-F238E27FC236}">
+                <a16:creationId xmlns:a16="http://schemas.microsoft.com/office/drawing/2014/main" id="{7FBC2DDA-7096-BC10-79E5-EEB8016C739F}"/>
+              </a:ext>
+            </a:extLst>
+          </p:cNvPr>
+          <p:cNvSpPr/>
+          <p:nvPr/>
+        </p:nvSpPr>
+        <p:spPr>
+          <a:xfrm>
+            <a:off x="8879840" y="2753360"/>
+            <a:ext cx="1412240" cy="254000"/>
+          </a:xfrm>
+          <a:prstGeom prst="ellipse">
+            <a:avLst/>
+          </a:prstGeom>
+          <a:noFill/>
+          <a:ln>
+            <a:solidFill>
+              <a:srgbClr val="C00000"/>
+            </a:solidFill>
+          </a:ln>
+        </p:spPr>
+        <p:style>
+          <a:lnRef idx="2">
+            <a:schemeClr val="accent1">
+              <a:shade val="50000"/>
+            </a:schemeClr>
+          </a:lnRef>
+          <a:fillRef idx="1">
+            <a:schemeClr val="accent1"/>
+          </a:fillRef>
+          <a:effectRef idx="0">
+            <a:schemeClr val="accent1"/>
+          </a:effectRef>
+          <a:fontRef idx="minor">
+            <a:schemeClr val="lt1"/>
+          </a:fontRef>
+        </p:style>
+        <p:txBody>
+          <a:bodyPr rtlCol="0" anchor="ctr"/>
+          <a:lstStyle/>
+          <a:p>
+            <a:pPr algn="ctr"/>
+            <a:endParaRPr lang="en-US"/>
+          </a:p>
+        </p:txBody>
+      </p:sp>
+      <p:sp>
+        <p:nvSpPr>
+          <p:cNvPr id="4" name="Oval 3">
+            <a:extLst>
+              <a:ext uri="{FF2B5EF4-FFF2-40B4-BE49-F238E27FC236}">
+                <a16:creationId xmlns:a16="http://schemas.microsoft.com/office/drawing/2014/main" id="{7A605261-B90F-625C-FE39-C9B22BA8612B}"/>
+              </a:ext>
+            </a:extLst>
+          </p:cNvPr>
+          <p:cNvSpPr/>
+          <p:nvPr/>
+        </p:nvSpPr>
+        <p:spPr>
+          <a:xfrm>
+            <a:off x="9056318" y="2295395"/>
+            <a:ext cx="280722" cy="221372"/>
+          </a:xfrm>
+          <a:prstGeom prst="ellipse">
+            <a:avLst/>
+          </a:prstGeom>
+          <a:noFill/>
+          <a:ln>
+            <a:solidFill>
+              <a:srgbClr val="FF0000"/>
+            </a:solidFill>
+          </a:ln>
+        </p:spPr>
+        <p:style>
+          <a:lnRef idx="2">
+            <a:schemeClr val="accent1">
+              <a:shade val="50000"/>
+            </a:schemeClr>
+          </a:lnRef>
+          <a:fillRef idx="1">
+            <a:schemeClr val="accent1"/>
+          </a:fillRef>
+          <a:effectRef idx="0">
+            <a:schemeClr val="accent1"/>
+          </a:effectRef>
+          <a:fontRef idx="minor">
+            <a:schemeClr val="lt1"/>
+          </a:fontRef>
+        </p:style>
+        <p:txBody>
+          <a:bodyPr rtlCol="0" anchor="ctr"/>
+          <a:lstStyle/>
+          <a:p>
+            <a:pPr algn="ctr"/>
+            <a:endParaRPr lang="en-US"/>
+          </a:p>
+        </p:txBody>
+      </p:sp>
+      <p:sp>
+        <p:nvSpPr>
+          <p:cNvPr id="5" name="Oval 4">
+            <a:extLst>
+              <a:ext uri="{FF2B5EF4-FFF2-40B4-BE49-F238E27FC236}">
+                <a16:creationId xmlns:a16="http://schemas.microsoft.com/office/drawing/2014/main" id="{B10E36CC-EB06-3746-B028-0E5A059CD729}"/>
+              </a:ext>
+            </a:extLst>
+          </p:cNvPr>
+          <p:cNvSpPr/>
+          <p:nvPr/>
+        </p:nvSpPr>
+        <p:spPr>
+          <a:xfrm>
+            <a:off x="9690899" y="4208744"/>
+            <a:ext cx="511549" cy="184759"/>
+          </a:xfrm>
+          <a:prstGeom prst="ellipse">
+            <a:avLst/>
+          </a:prstGeom>
+          <a:noFill/>
+          <a:ln>
+            <a:solidFill>
+              <a:srgbClr val="FF0000"/>
+            </a:solidFill>
+          </a:ln>
+        </p:spPr>
+        <p:style>
+          <a:lnRef idx="2">
+            <a:schemeClr val="accent1">
+              <a:shade val="50000"/>
+            </a:schemeClr>
+          </a:lnRef>
+          <a:fillRef idx="1">
+            <a:schemeClr val="accent1"/>
+          </a:fillRef>
+          <a:effectRef idx="0">
+            <a:schemeClr val="accent1"/>
+          </a:effectRef>
+          <a:fontRef idx="minor">
+            <a:schemeClr val="lt1"/>
+          </a:fontRef>
+        </p:style>
+        <p:txBody>
+          <a:bodyPr rtlCol="0" anchor="ctr"/>
+          <a:lstStyle/>
+          <a:p>
+            <a:pPr algn="ctr"/>
+            <a:endParaRPr lang="en-US"/>
+          </a:p>
+        </p:txBody>
+      </p:sp>
+      <p:sp>
+        <p:nvSpPr>
+          <p:cNvPr id="6" name="Oval 5">
+            <a:extLst>
+              <a:ext uri="{FF2B5EF4-FFF2-40B4-BE49-F238E27FC236}">
+                <a16:creationId xmlns:a16="http://schemas.microsoft.com/office/drawing/2014/main" id="{2D583C4F-3B35-2A3E-58A4-F5B008C1316C}"/>
+              </a:ext>
+            </a:extLst>
+          </p:cNvPr>
+          <p:cNvSpPr/>
+          <p:nvPr/>
+        </p:nvSpPr>
+        <p:spPr>
+          <a:xfrm>
+            <a:off x="9309970" y="2470759"/>
+            <a:ext cx="307792" cy="221372"/>
+          </a:xfrm>
+          <a:prstGeom prst="ellipse">
+            <a:avLst/>
+          </a:prstGeom>
+          <a:noFill/>
+          <a:ln>
+            <a:solidFill>
+              <a:srgbClr val="FFC000"/>
+            </a:solidFill>
+          </a:ln>
+        </p:spPr>
+        <p:style>
+          <a:lnRef idx="2">
+            <a:schemeClr val="accent1">
+              <a:shade val="50000"/>
+            </a:schemeClr>
+          </a:lnRef>
+          <a:fillRef idx="1">
+            <a:schemeClr val="accent1"/>
+          </a:fillRef>
+          <a:effectRef idx="0">
+            <a:schemeClr val="accent1"/>
+          </a:effectRef>
+          <a:fontRef idx="minor">
+            <a:schemeClr val="lt1"/>
+          </a:fontRef>
+        </p:style>
+        <p:txBody>
+          <a:bodyPr rtlCol="0" anchor="ctr"/>
+          <a:lstStyle/>
+          <a:p>
+            <a:pPr algn="ctr"/>
+            <a:endParaRPr lang="en-US"/>
+          </a:p>
+        </p:txBody>
+      </p:sp>
+      <p:sp>
+        <p:nvSpPr>
+          <p:cNvPr id="9" name="Oval 8">
+            <a:extLst>
+              <a:ext uri="{FF2B5EF4-FFF2-40B4-BE49-F238E27FC236}">
+                <a16:creationId xmlns:a16="http://schemas.microsoft.com/office/drawing/2014/main" id="{DA6E1D34-68D5-C2F2-91FD-F09E9214041F}"/>
+              </a:ext>
+            </a:extLst>
+          </p:cNvPr>
+          <p:cNvSpPr/>
+          <p:nvPr/>
+        </p:nvSpPr>
+        <p:spPr>
+          <a:xfrm>
+            <a:off x="9690899" y="4383582"/>
+            <a:ext cx="539734" cy="184759"/>
+          </a:xfrm>
+          <a:prstGeom prst="ellipse">
+            <a:avLst/>
+          </a:prstGeom>
+          <a:noFill/>
+          <a:ln>
+            <a:solidFill>
+              <a:srgbClr val="FFC000"/>
+            </a:solidFill>
+          </a:ln>
+        </p:spPr>
+        <p:style>
+          <a:lnRef idx="2">
+            <a:schemeClr val="accent1">
+              <a:shade val="50000"/>
+            </a:schemeClr>
+          </a:lnRef>
+          <a:fillRef idx="1">
+            <a:schemeClr val="accent1"/>
+          </a:fillRef>
+          <a:effectRef idx="0">
+            <a:schemeClr val="accent1"/>
+          </a:effectRef>
+          <a:fontRef idx="minor">
+            <a:schemeClr val="lt1"/>
+          </a:fontRef>
+        </p:style>
+        <p:txBody>
+          <a:bodyPr rtlCol="0" anchor="ctr"/>
+          <a:lstStyle/>
+          <a:p>
+            <a:pPr algn="ctr"/>
+            <a:endParaRPr lang="en-US"/>
+          </a:p>
+        </p:txBody>
+      </p:sp>
     </p:spTree>
     <p:extLst>
       <p:ext uri="{BB962C8B-B14F-4D97-AF65-F5344CB8AC3E}">
@@ -24657,6 +26408,277 @@
   <p:clrMapOvr>
     <a:masterClrMapping/>
   </p:clrMapOvr>
+  <p:timing>
+    <p:tnLst>
+      <p:par>
+        <p:cTn id="1" dur="indefinite" restart="never" nodeType="tmRoot">
+          <p:childTnLst>
+            <p:seq concurrent="1" nextAc="seek">
+              <p:cTn id="2" dur="indefinite" nodeType="mainSeq">
+                <p:childTnLst>
+                  <p:par>
+                    <p:cTn id="3" fill="hold">
+                      <p:stCondLst>
+                        <p:cond delay="indefinite"/>
+                      </p:stCondLst>
+                      <p:childTnLst>
+                        <p:par>
+                          <p:cTn id="4" fill="hold">
+                            <p:stCondLst>
+                              <p:cond delay="0"/>
+                            </p:stCondLst>
+                            <p:childTnLst>
+                              <p:par>
+                                <p:cTn id="5" presetID="1" presetClass="entr" presetSubtype="0" fill="hold" nodeType="clickEffect">
+                                  <p:stCondLst>
+                                    <p:cond delay="0"/>
+                                  </p:stCondLst>
+                                  <p:childTnLst>
+                                    <p:set>
+                                      <p:cBhvr>
+                                        <p:cTn id="6" dur="1" fill="hold">
+                                          <p:stCondLst>
+                                            <p:cond delay="0"/>
+                                          </p:stCondLst>
+                                        </p:cTn>
+                                        <p:tgtEl>
+                                          <p:spTgt spid="7"/>
+                                        </p:tgtEl>
+                                        <p:attrNameLst>
+                                          <p:attrName>style.visibility</p:attrName>
+                                        </p:attrNameLst>
+                                      </p:cBhvr>
+                                      <p:to>
+                                        <p:strVal val="visible"/>
+                                      </p:to>
+                                    </p:set>
+                                  </p:childTnLst>
+                                </p:cTn>
+                              </p:par>
+                            </p:childTnLst>
+                          </p:cTn>
+                        </p:par>
+                      </p:childTnLst>
+                    </p:cTn>
+                  </p:par>
+                  <p:par>
+                    <p:cTn id="7" fill="hold">
+                      <p:stCondLst>
+                        <p:cond delay="indefinite"/>
+                      </p:stCondLst>
+                      <p:childTnLst>
+                        <p:par>
+                          <p:cTn id="8" fill="hold">
+                            <p:stCondLst>
+                              <p:cond delay="0"/>
+                            </p:stCondLst>
+                            <p:childTnLst>
+                              <p:par>
+                                <p:cTn id="9" presetID="1" presetClass="entr" presetSubtype="0" fill="hold" grpId="0" nodeType="clickEffect">
+                                  <p:stCondLst>
+                                    <p:cond delay="0"/>
+                                  </p:stCondLst>
+                                  <p:childTnLst>
+                                    <p:set>
+                                      <p:cBhvr>
+                                        <p:cTn id="10" dur="1" fill="hold">
+                                          <p:stCondLst>
+                                            <p:cond delay="0"/>
+                                          </p:stCondLst>
+                                        </p:cTn>
+                                        <p:tgtEl>
+                                          <p:spTgt spid="3"/>
+                                        </p:tgtEl>
+                                        <p:attrNameLst>
+                                          <p:attrName>style.visibility</p:attrName>
+                                        </p:attrNameLst>
+                                      </p:cBhvr>
+                                      <p:to>
+                                        <p:strVal val="visible"/>
+                                      </p:to>
+                                    </p:set>
+                                  </p:childTnLst>
+                                </p:cTn>
+                              </p:par>
+                            </p:childTnLst>
+                          </p:cTn>
+                        </p:par>
+                      </p:childTnLst>
+                    </p:cTn>
+                  </p:par>
+                  <p:par>
+                    <p:cTn id="11" fill="hold">
+                      <p:stCondLst>
+                        <p:cond delay="indefinite"/>
+                      </p:stCondLst>
+                      <p:childTnLst>
+                        <p:par>
+                          <p:cTn id="12" fill="hold">
+                            <p:stCondLst>
+                              <p:cond delay="0"/>
+                            </p:stCondLst>
+                            <p:childTnLst>
+                              <p:par>
+                                <p:cTn id="13" presetID="1" presetClass="entr" presetSubtype="0" fill="hold" grpId="0" nodeType="clickEffect">
+                                  <p:stCondLst>
+                                    <p:cond delay="0"/>
+                                  </p:stCondLst>
+                                  <p:childTnLst>
+                                    <p:set>
+                                      <p:cBhvr>
+                                        <p:cTn id="14" dur="1" fill="hold">
+                                          <p:stCondLst>
+                                            <p:cond delay="0"/>
+                                          </p:stCondLst>
+                                        </p:cTn>
+                                        <p:tgtEl>
+                                          <p:spTgt spid="4"/>
+                                        </p:tgtEl>
+                                        <p:attrNameLst>
+                                          <p:attrName>style.visibility</p:attrName>
+                                        </p:attrNameLst>
+                                      </p:cBhvr>
+                                      <p:to>
+                                        <p:strVal val="visible"/>
+                                      </p:to>
+                                    </p:set>
+                                  </p:childTnLst>
+                                </p:cTn>
+                              </p:par>
+                              <p:par>
+                                <p:cTn id="15" presetID="1" presetClass="entr" presetSubtype="0" fill="hold" grpId="0" nodeType="withEffect">
+                                  <p:stCondLst>
+                                    <p:cond delay="0"/>
+                                  </p:stCondLst>
+                                  <p:childTnLst>
+                                    <p:set>
+                                      <p:cBhvr>
+                                        <p:cTn id="16" dur="1" fill="hold">
+                                          <p:stCondLst>
+                                            <p:cond delay="0"/>
+                                          </p:stCondLst>
+                                        </p:cTn>
+                                        <p:tgtEl>
+                                          <p:spTgt spid="5"/>
+                                        </p:tgtEl>
+                                        <p:attrNameLst>
+                                          <p:attrName>style.visibility</p:attrName>
+                                        </p:attrNameLst>
+                                      </p:cBhvr>
+                                      <p:to>
+                                        <p:strVal val="visible"/>
+                                      </p:to>
+                                    </p:set>
+                                  </p:childTnLst>
+                                </p:cTn>
+                              </p:par>
+                            </p:childTnLst>
+                          </p:cTn>
+                        </p:par>
+                      </p:childTnLst>
+                    </p:cTn>
+                  </p:par>
+                  <p:par>
+                    <p:cTn id="17" fill="hold">
+                      <p:stCondLst>
+                        <p:cond delay="indefinite"/>
+                      </p:stCondLst>
+                      <p:childTnLst>
+                        <p:par>
+                          <p:cTn id="18" fill="hold">
+                            <p:stCondLst>
+                              <p:cond delay="0"/>
+                            </p:stCondLst>
+                            <p:childTnLst>
+                              <p:par>
+                                <p:cTn id="19" presetID="1" presetClass="entr" presetSubtype="0" fill="hold" grpId="0" nodeType="clickEffect">
+                                  <p:stCondLst>
+                                    <p:cond delay="0"/>
+                                  </p:stCondLst>
+                                  <p:childTnLst>
+                                    <p:set>
+                                      <p:cBhvr>
+                                        <p:cTn id="20" dur="1" fill="hold">
+                                          <p:stCondLst>
+                                            <p:cond delay="0"/>
+                                          </p:stCondLst>
+                                        </p:cTn>
+                                        <p:tgtEl>
+                                          <p:spTgt spid="9"/>
+                                        </p:tgtEl>
+                                        <p:attrNameLst>
+                                          <p:attrName>style.visibility</p:attrName>
+                                        </p:attrNameLst>
+                                      </p:cBhvr>
+                                      <p:to>
+                                        <p:strVal val="visible"/>
+                                      </p:to>
+                                    </p:set>
+                                  </p:childTnLst>
+                                </p:cTn>
+                              </p:par>
+                              <p:par>
+                                <p:cTn id="21" presetID="1" presetClass="entr" presetSubtype="0" fill="hold" grpId="0" nodeType="withEffect">
+                                  <p:stCondLst>
+                                    <p:cond delay="0"/>
+                                  </p:stCondLst>
+                                  <p:childTnLst>
+                                    <p:set>
+                                      <p:cBhvr>
+                                        <p:cTn id="22" dur="1" fill="hold">
+                                          <p:stCondLst>
+                                            <p:cond delay="0"/>
+                                          </p:stCondLst>
+                                        </p:cTn>
+                                        <p:tgtEl>
+                                          <p:spTgt spid="6"/>
+                                        </p:tgtEl>
+                                        <p:attrNameLst>
+                                          <p:attrName>style.visibility</p:attrName>
+                                        </p:attrNameLst>
+                                      </p:cBhvr>
+                                      <p:to>
+                                        <p:strVal val="visible"/>
+                                      </p:to>
+                                    </p:set>
+                                  </p:childTnLst>
+                                </p:cTn>
+                              </p:par>
+                            </p:childTnLst>
+                          </p:cTn>
+                        </p:par>
+                      </p:childTnLst>
+                    </p:cTn>
+                  </p:par>
+                </p:childTnLst>
+              </p:cTn>
+              <p:prevCondLst>
+                <p:cond evt="onPrev" delay="0">
+                  <p:tgtEl>
+                    <p:sldTgt/>
+                  </p:tgtEl>
+                </p:cond>
+              </p:prevCondLst>
+              <p:nextCondLst>
+                <p:cond evt="onNext" delay="0">
+                  <p:tgtEl>
+                    <p:sldTgt/>
+                  </p:tgtEl>
+                </p:cond>
+              </p:nextCondLst>
+            </p:seq>
+          </p:childTnLst>
+        </p:cTn>
+      </p:par>
+    </p:tnLst>
+    <p:bldLst>
+      <p:bldP spid="3" grpId="0" animBg="1"/>
+      <p:bldP spid="4" grpId="0" animBg="1"/>
+      <p:bldP spid="5" grpId="0" animBg="1"/>
+      <p:bldP spid="6" grpId="0" animBg="1"/>
+      <p:bldP spid="9" grpId="0" animBg="1"/>
+    </p:bldLst>
+  </p:timing>
 </p:sld>
 </file>
 
@@ -25449,4 +27471,32 @@
     </a:ext>
   </a:extLst>
 </a:theme>
+</file>
+
+<file path=customXml/item1.xml><?xml version="1.0" encoding="utf-8"?>
+<WrappedLabelHistory xmlns:xsi="http://www.w3.org/2001/XMLSchema-instance" xmlns:xsd="http://www.w3.org/2001/XMLSchema" xmlns="http://www.boldonjames.com/2016/02/Classifier/internal/wrappedLabelHistory">
+  <Value>PD94bWwgdmVyc2lvbj0iMS4wIiBlbmNvZGluZz0idXMtYXNjaWkiPz48bGFiZWxIaXN0b3J5IHhtbG5zOnhzaT0iaHR0cDovL3d3dy53My5vcmcvMjAwMS9YTUxTY2hlbWEtaW5zdGFuY2UiIHhtbG5zOnhzZD0iaHR0cDovL3d3dy53My5vcmcvMjAwMS9YTUxTY2hlbWEiIHhtbG5zPSJodHRwOi8vd3d3LmJvbGRvbmphbWVzLmNvbS8yMDE2LzAyL0NsYXNzaWZpZXIvaW50ZXJuYWwvbGFiZWxIaXN0b3J5Ij48aXRlbT48c2lzbCBzaXNsVmVyc2lvbj0iMCIgcG9saWN5PSJjZGU1M2FjMS1iZjVmLTRhYWUtOWNmMS0wNzUwOWUyM2E0YjAiIG9yaWdpbj0idXNlclNlbGVjdGVkIiAvPjxVc2VyTmFtZT5VU1xFMjEwODE5NzQ8L1VzZXJOYW1lPjxEYXRlVGltZT4yLzI3LzIwMjMgODo0NzowNCBQTTwvRGF0ZVRpbWU+PExhYmVsU3RyaW5nPlRoaXMgYXJ0aWZhY3QgaGFzIG5vIGNsYXNzaWZpY2F0aW9uLjwvTGFiZWxTdHJpbmc+PC9pdGVtPjwvbGFiZWxIaXN0b3J5Pg==</Value>
+</WrappedLabelHistory>
+</file>
+
+<file path=customXml/item2.xml><?xml version="1.0" encoding="utf-8"?>
+<sisl xmlns:xsi="http://www.w3.org/2001/XMLSchema-instance" xmlns:xsd="http://www.w3.org/2001/XMLSchema" xmlns="http://www.boldonjames.com/2008/01/sie/internal/label" sislVersion="0" policy="cde53ac1-bf5f-4aae-9cf1-07509e23a4b0" origin="userSelected"/>
+</file>
+
+<file path=customXml/itemProps1.xml><?xml version="1.0" encoding="utf-8"?>
+<ds:datastoreItem xmlns:ds="http://schemas.openxmlformats.org/officeDocument/2006/customXml" ds:itemID="{268F4889-2DA5-4C13-8C14-55F24C864F62}">
+  <ds:schemaRefs>
+    <ds:schemaRef ds:uri="http://www.w3.org/2001/XMLSchema"/>
+    <ds:schemaRef ds:uri="http://www.boldonjames.com/2016/02/Classifier/internal/wrappedLabelHistory"/>
+  </ds:schemaRefs>
+</ds:datastoreItem>
+</file>
+
+<file path=customXml/itemProps2.xml><?xml version="1.0" encoding="utf-8"?>
+<ds:datastoreItem xmlns:ds="http://schemas.openxmlformats.org/officeDocument/2006/customXml" ds:itemID="{90563F63-61FD-46ED-8744-22EE441B0223}">
+  <ds:schemaRefs>
+    <ds:schemaRef ds:uri="http://www.w3.org/2001/XMLSchema"/>
+    <ds:schemaRef ds:uri="http://www.boldonjames.com/2008/01/sie/internal/label"/>
+  </ds:schemaRefs>
+</ds:datastoreItem>
 </file>
</xml_diff>

<commit_message>
updated ppt to help with timing
</commit_message>
<xml_diff>
--- a/Group4_CaseStudy1.pptx
+++ b/Group4_CaseStudy1.pptx
@@ -16,8 +16,8 @@
     <p:sldId id="2554" r:id="rId6"/>
     <p:sldId id="2575" r:id="rId7"/>
     <p:sldId id="2576" r:id="rId8"/>
-    <p:sldId id="2577" r:id="rId9"/>
-    <p:sldId id="2578" r:id="rId10"/>
+    <p:sldId id="2578" r:id="rId9"/>
+    <p:sldId id="2577" r:id="rId10"/>
     <p:sldId id="2579" r:id="rId11"/>
     <p:sldId id="2580" r:id="rId12"/>
     <p:sldId id="2581" r:id="rId13"/>
@@ -457,7 +457,7 @@
           <a:p>
             <a:fld id="{0248B25D-8766-427E-8C9E-4845048D8DFC}" type="datetimeFigureOut">
               <a:rPr lang="en-US" smtClean="0"/>
-              <a:t>2/27/2023</a:t>
+              <a:t>2/28/2023</a:t>
             </a:fld>
             <a:endParaRPr lang="en-US" dirty="0"/>
           </a:p>
@@ -634,7 +634,7 @@
           <a:p>
             <a:fld id="{426F439B-391B-4B41-826A-951FCF412C34}" type="datetimeFigureOut">
               <a:rPr lang="en-US" smtClean="0"/>
-              <a:t>2/27/2023</a:t>
+              <a:t>2/28/2023</a:t>
             </a:fld>
             <a:endParaRPr lang="en-US" dirty="0"/>
           </a:p>
@@ -951,7 +951,10 @@
           <a:bodyPr/>
           <a:lstStyle/>
           <a:p>
-            <a:endParaRPr lang="en-US" dirty="0"/>
+            <a:r>
+              <a:rPr lang="en-US" dirty="0"/>
+              <a:t>Hello and welcome to Team 4 Presentation on US Craft Beer and Brewery Analysis.  My name is Steven Cox and currently a student in the Data Science program at SMU.  </a:t>
+            </a:r>
           </a:p>
         </p:txBody>
       </p:sp>
@@ -1014,7 +1017,16 @@
           <a:p>
             <a:r>
               <a:rPr lang="en-US" dirty="0"/>
-              <a:t>We can see that the mean ABV of IPA's is significantly higher than the mean ABV of Ales. The error bars indicate that we can be 95% confident that their ranges are not even close to overlapping.</a:t>
+              <a:t>Using a slightly different visualization, we can see that the mean ABV of IPA's is significantly higher than the mean ABV of Ales.</a:t>
+            </a:r>
+          </a:p>
+          <a:p>
+            <a:endParaRPr lang="en-US" dirty="0"/>
+          </a:p>
+          <a:p>
+            <a:r>
+              <a:rPr lang="en-US" dirty="0"/>
+              <a:t>The error bars indicate that we can be 95% confidence interval and clearly their ranges are not close to overlapping.</a:t>
             </a:r>
           </a:p>
           <a:p>
@@ -1108,6 +1120,87 @@
           <a:bodyPr/>
           <a:lstStyle/>
           <a:p>
+            <a:pPr marL="0" marR="0" lvl="0" indent="0" algn="l" defTabSz="914400" rtl="0" eaLnBrk="1" fontAlgn="auto" latinLnBrk="0" hangingPunct="1">
+              <a:lnSpc>
+                <a:spcPct val="100000"/>
+              </a:lnSpc>
+              <a:spcBef>
+                <a:spcPts val="0"/>
+              </a:spcBef>
+              <a:spcAft>
+                <a:spcPts val="0"/>
+              </a:spcAft>
+              <a:buClrTx/>
+              <a:buSzTx/>
+              <a:buFontTx/>
+              <a:buNone/>
+              <a:tabLst/>
+              <a:defRPr/>
+            </a:pPr>
+            <a:r>
+              <a:rPr lang="en-US" sz="1200" dirty="0">
+                <a:solidFill>
+                  <a:srgbClr val="333333"/>
+                </a:solidFill>
+                <a:effectLst/>
+              </a:rPr>
+              <a:t>Starting with such a solid model, we ventured off and decided to investigate this even further by breaking up the beers into seven categories as shown.  We have a great number of observations, so modeling further modeling proved to be worthwhile.</a:t>
+            </a:r>
+          </a:p>
+          <a:p>
+            <a:pPr marL="0" marR="0" lvl="0" indent="0" algn="l" defTabSz="914400" rtl="0" eaLnBrk="1" fontAlgn="auto" latinLnBrk="0" hangingPunct="1">
+              <a:lnSpc>
+                <a:spcPct val="100000"/>
+              </a:lnSpc>
+              <a:spcBef>
+                <a:spcPts val="0"/>
+              </a:spcBef>
+              <a:spcAft>
+                <a:spcPts val="0"/>
+              </a:spcAft>
+              <a:buClrTx/>
+              <a:buSzTx/>
+              <a:buFontTx/>
+              <a:buNone/>
+              <a:tabLst/>
+              <a:defRPr/>
+            </a:pPr>
+            <a:endParaRPr lang="en-US" sz="1200" dirty="0">
+              <a:solidFill>
+                <a:srgbClr val="333333"/>
+              </a:solidFill>
+              <a:effectLst/>
+            </a:endParaRPr>
+          </a:p>
+          <a:p>
+            <a:pPr marL="0" marR="0" lvl="0" indent="0" algn="l" defTabSz="914400" rtl="0" eaLnBrk="1" fontAlgn="auto" latinLnBrk="0" hangingPunct="1">
+              <a:lnSpc>
+                <a:spcPct val="100000"/>
+              </a:lnSpc>
+              <a:spcBef>
+                <a:spcPts val="0"/>
+              </a:spcBef>
+              <a:spcAft>
+                <a:spcPts val="0"/>
+              </a:spcAft>
+              <a:buClrTx/>
+              <a:buSzTx/>
+              <a:buFontTx/>
+              <a:buNone/>
+              <a:tabLst/>
+              <a:defRPr/>
+            </a:pPr>
+            <a:r>
+              <a:rPr lang="en-US" sz="1200" dirty="0">
+                <a:solidFill>
+                  <a:srgbClr val="333333"/>
+                </a:solidFill>
+                <a:effectLst/>
+              </a:rPr>
+              <a:t> We believe this modeling may help in classifying new beers, or possibly even the reclassification of current beers. </a:t>
+            </a:r>
+          </a:p>
+          <a:p>
             <a:endParaRPr lang="en-US" sz="1200" dirty="0">
               <a:solidFill>
                 <a:srgbClr val="333333"/>
@@ -1197,30 +1290,49 @@
           <a:bodyPr/>
           <a:lstStyle/>
           <a:p>
-            <a:pPr marL="0" marR="0" lvl="0" indent="0" algn="l" defTabSz="914400" rtl="0" eaLnBrk="1" fontAlgn="auto" latinLnBrk="0" hangingPunct="1">
-              <a:lnSpc>
-                <a:spcPct val="100000"/>
-              </a:lnSpc>
-              <a:spcBef>
-                <a:spcPts val="0"/>
-              </a:spcBef>
-              <a:spcAft>
-                <a:spcPts val="0"/>
-              </a:spcAft>
-              <a:buClrTx/>
-              <a:buSzTx/>
-              <a:buFontTx/>
-              <a:buNone/>
-              <a:tabLst/>
-              <a:defRPr/>
-            </a:pPr>
             <a:r>
               <a:rPr lang="en-US" dirty="0"/>
-              <a:t>We can see that, while some categories have overlapping confidence intervals, most are different. The only categories that do not have a significant difference in their mean ABV values (p &gt; 0.05 including Bonferroni adjustment for post-hoc comparisons) are Ale and Other, IPA and Stout, Lager and Pilsner, and Other and Porter.</a:t>
+              <a:t>As we observed earlier with Ales and IPAs, </a:t>
+            </a:r>
+          </a:p>
+          <a:p>
+            <a:r>
+              <a:rPr lang="en-US" dirty="0"/>
+              <a:t>*now we can take a look after breaking it into the seven styles. </a:t>
+            </a:r>
+          </a:p>
+          <a:p>
+            <a:r>
+              <a:rPr lang="en-US" dirty="0"/>
+              <a:t>Statistically, Ales align with Others, while Lagers and Pilsners are relatively identical when only utilizing ABV values.  </a:t>
             </a:r>
           </a:p>
           <a:p>
             <a:endParaRPr lang="en-US" dirty="0"/>
+          </a:p>
+          <a:p>
+            <a:r>
+              <a:rPr lang="en-US" dirty="0"/>
+              <a:t>*When observing the IBU values, we can see the bitterness is more in line with Ales rather than IPAs.  </a:t>
+            </a:r>
+          </a:p>
+          <a:p>
+            <a:endParaRPr lang="en-US" dirty="0"/>
+          </a:p>
+          <a:p>
+            <a:r>
+              <a:rPr lang="en-US" dirty="0"/>
+              <a:t>* However when we use both ABV and IBU attributes to model this all together, we find that the KNN model does very well with a 71% overall accuracy.</a:t>
+            </a:r>
+          </a:p>
+          <a:p>
+            <a:endParaRPr lang="en-US" dirty="0"/>
+          </a:p>
+          <a:p>
+            <a:r>
+              <a:rPr lang="en-US" dirty="0"/>
+              <a:t>and correctly categorizing Ales 80%  and  87% of the time for IPAs.  This is a slight decrease from our previous model, however it is understandable since we’re now categorizing 7 different styles instead of 2. </a:t>
+            </a:r>
           </a:p>
         </p:txBody>
       </p:sp>
@@ -1342,7 +1454,62 @@
           <a:bodyPr/>
           <a:lstStyle/>
           <a:p>
-            <a:endParaRPr lang="en-US"/>
+            <a:r>
+              <a:rPr lang="en-US" dirty="0"/>
+              <a:t>Bringing this all full circle and graphing all the styles together as we did with Ales and IPAs, we can better visualize how all the styles relate.  As expected, the many styles are similar with that of the Ales, while the IPAs are very much predominate in the higher areas of ABV and IPUs.  </a:t>
+            </a:r>
+          </a:p>
+          <a:p>
+            <a:endParaRPr lang="en-US" dirty="0"/>
+          </a:p>
+          <a:p>
+            <a:pPr marL="0" marR="0" lvl="0" indent="0" algn="l" defTabSz="914400" rtl="0" eaLnBrk="1" fontAlgn="auto" latinLnBrk="0" hangingPunct="1">
+              <a:lnSpc>
+                <a:spcPct val="100000"/>
+              </a:lnSpc>
+              <a:spcBef>
+                <a:spcPts val="0"/>
+              </a:spcBef>
+              <a:spcAft>
+                <a:spcPts val="0"/>
+              </a:spcAft>
+              <a:buClrTx/>
+              <a:buSzTx/>
+              <a:buFontTx/>
+              <a:buNone/>
+              <a:tabLst/>
+              <a:defRPr/>
+            </a:pPr>
+            <a:r>
+              <a:rPr lang="en-US" dirty="0"/>
+              <a:t>We found it Interesting to note that Budweiser’s 6 top offerings are all in the lower range of ABV and IBUs, even when compared to similar style beers.  </a:t>
+            </a:r>
+          </a:p>
+          <a:p>
+            <a:pPr marL="0" marR="0" lvl="0" indent="0" algn="l" defTabSz="914400" rtl="0" eaLnBrk="1" fontAlgn="auto" latinLnBrk="0" hangingPunct="1">
+              <a:lnSpc>
+                <a:spcPct val="100000"/>
+              </a:lnSpc>
+              <a:spcBef>
+                <a:spcPts val="0"/>
+              </a:spcBef>
+              <a:spcAft>
+                <a:spcPts val="0"/>
+              </a:spcAft>
+              <a:buClrTx/>
+              <a:buSzTx/>
+              <a:buFontTx/>
+              <a:buNone/>
+              <a:tabLst/>
+              <a:defRPr/>
+            </a:pPr>
+            <a:endParaRPr lang="en-US" dirty="0"/>
+          </a:p>
+          <a:p>
+            <a:r>
+              <a:rPr lang="en-US" dirty="0"/>
+              <a:t>Further investigation and analysis on how these styles are brewed in each State may prove to be very enlightening.  </a:t>
+            </a:r>
           </a:p>
         </p:txBody>
       </p:sp>
@@ -1466,7 +1633,7 @@
           <a:p>
             <a:r>
               <a:rPr lang="en-US" dirty="0"/>
-              <a:t>Thank you for the opportunity to evaluate your beer data and we hope that we shed some insight into your questions</a:t>
+              <a:t>I want to thank you for the opportunity in presenting our analysis and we hope to have shed some insight into your questions.  For any additional questions about this analysis or proposals for more research, please feel free to contact Nick or myself. </a:t>
             </a:r>
           </a:p>
         </p:txBody>
@@ -1551,7 +1718,10 @@
           <a:bodyPr/>
           <a:lstStyle/>
           <a:p>
-            <a:endParaRPr lang="en-US" dirty="0"/>
+            <a:r>
+              <a:rPr lang="en-US" dirty="0"/>
+              <a:t>In this presentation, we will be addressing questions in regards to the Beers and Breweries data set.  The questions asked of us are …</a:t>
+            </a:r>
           </a:p>
         </p:txBody>
       </p:sp>
@@ -1635,6 +1805,86 @@
           <a:bodyPr/>
           <a:lstStyle/>
           <a:p>
+            <a:r>
+              <a:rPr lang="en-US" dirty="0"/>
+              <a:t>*</a:t>
+            </a:r>
+          </a:p>
+          <a:p>
+            <a:r>
+              <a:rPr lang="en-US" dirty="0"/>
+              <a:t>When addressing the question of how many breweries there are in each state, the data initially indicated that there are 558 breweries spread across the country.  </a:t>
+            </a:r>
+          </a:p>
+          <a:p>
+            <a:r>
+              <a:rPr lang="en-US" dirty="0"/>
+              <a:t>*</a:t>
+            </a:r>
+          </a:p>
+          <a:p>
+            <a:r>
+              <a:rPr lang="en-US" sz="1200" dirty="0">
+                <a:latin typeface="Times New Roman" panose="02020603050405020304" pitchFamily="18" charset="0"/>
+                <a:cs typeface="Times New Roman" panose="02020603050405020304" pitchFamily="18" charset="0"/>
+              </a:rPr>
+              <a:t>However, when we went to break down the number of breweries per State, we discovered that there were 7 breweries that had duplicate IDs</a:t>
+            </a:r>
+          </a:p>
+          <a:p>
+            <a:r>
+              <a:rPr lang="en-US" sz="1200" dirty="0">
+                <a:latin typeface="Times New Roman" panose="02020603050405020304" pitchFamily="18" charset="0"/>
+                <a:cs typeface="Times New Roman" panose="02020603050405020304" pitchFamily="18" charset="0"/>
+              </a:rPr>
+              <a:t>*</a:t>
+            </a:r>
+          </a:p>
+          <a:p>
+            <a:pPr marL="0" marR="0" lvl="0" indent="0" algn="l" defTabSz="914400" rtl="0" eaLnBrk="1" fontAlgn="auto" latinLnBrk="0" hangingPunct="1">
+              <a:lnSpc>
+                <a:spcPct val="100000"/>
+              </a:lnSpc>
+              <a:spcBef>
+                <a:spcPts val="0"/>
+              </a:spcBef>
+              <a:spcAft>
+                <a:spcPts val="0"/>
+              </a:spcAft>
+              <a:buClrTx/>
+              <a:buSzTx/>
+              <a:buFontTx/>
+              <a:buNone/>
+              <a:tabLst/>
+              <a:defRPr/>
+            </a:pPr>
+            <a:r>
+              <a:rPr lang="en-US" dirty="0">
+                <a:latin typeface="Times New Roman" panose="02020603050405020304" pitchFamily="18" charset="0"/>
+                <a:cs typeface="Times New Roman" panose="02020603050405020304" pitchFamily="18" charset="0"/>
+              </a:rPr>
+              <a:t>So…with the duplicates merged, we can confidently break down the </a:t>
+            </a:r>
+            <a:r>
+              <a:rPr lang="en-US" sz="1400" b="1" dirty="0">
+                <a:latin typeface="Times New Roman" panose="02020603050405020304" pitchFamily="18" charset="0"/>
+                <a:cs typeface="Times New Roman" panose="02020603050405020304" pitchFamily="18" charset="0"/>
+              </a:rPr>
+              <a:t>551 breweries </a:t>
+            </a:r>
+            <a:r>
+              <a:rPr lang="en-US" sz="1400" dirty="0">
+                <a:latin typeface="Times New Roman" panose="02020603050405020304" pitchFamily="18" charset="0"/>
+                <a:cs typeface="Times New Roman" panose="02020603050405020304" pitchFamily="18" charset="0"/>
+              </a:rPr>
+              <a:t> by State.  </a:t>
+            </a:r>
+            <a:endParaRPr lang="en-US" dirty="0">
+              <a:latin typeface="Times New Roman" panose="02020603050405020304" pitchFamily="18" charset="0"/>
+              <a:cs typeface="Times New Roman" panose="02020603050405020304" pitchFamily="18" charset="0"/>
+            </a:endParaRPr>
+          </a:p>
+          <a:p>
             <a:endParaRPr lang="en-US" dirty="0"/>
           </a:p>
         </p:txBody>
@@ -1724,6 +1974,57 @@
                 <a:effectLst/>
                 <a:latin typeface="IBM Plex Sans" panose="020F0502020204030204" pitchFamily="34" charset="0"/>
               </a:rPr>
+              <a:t>*Here we have a heatmap and a bar chart of the number of breweries per State.</a:t>
+            </a:r>
+          </a:p>
+          <a:p>
+            <a:r>
+              <a:rPr lang="en-US" b="0" i="0" dirty="0">
+                <a:effectLst/>
+                <a:latin typeface="IBM Plex Sans" panose="020F0502020204030204" pitchFamily="34" charset="0"/>
+              </a:rPr>
+              <a:t>*The top 5 States are</a:t>
+            </a:r>
+          </a:p>
+          <a:p>
+            <a:r>
+              <a:rPr lang="en-US" b="0" i="0" dirty="0">
+                <a:effectLst/>
+                <a:latin typeface="IBM Plex Sans" panose="020F0502020204030204" pitchFamily="34" charset="0"/>
+              </a:rPr>
+              <a:t>*The bottom 5 States are.</a:t>
+            </a:r>
+          </a:p>
+          <a:p>
+            <a:r>
+              <a:rPr lang="en-US" b="0" i="0" dirty="0">
+                <a:effectLst/>
+                <a:latin typeface="IBM Plex Sans" panose="020F0502020204030204" pitchFamily="34" charset="0"/>
+              </a:rPr>
+              <a:t>*Here are all the Budweiser Breweries laid out over the heatmap.</a:t>
+            </a:r>
+          </a:p>
+          <a:p>
+            <a:r>
+              <a:rPr lang="en-US" b="0" i="0" dirty="0">
+                <a:effectLst/>
+                <a:latin typeface="IBM Plex Sans" panose="020F0502020204030204" pitchFamily="34" charset="0"/>
+              </a:rPr>
+              <a:t>*Further analysis may prove beneficial if Budweiser is looking to add additional breweries into the north west.  </a:t>
+            </a:r>
+          </a:p>
+          <a:p>
+            <a:endParaRPr lang="en-US" b="0" i="0" dirty="0">
+              <a:effectLst/>
+              <a:latin typeface="IBM Plex Sans" panose="020F0502020204030204" pitchFamily="34" charset="0"/>
+            </a:endParaRPr>
+          </a:p>
+          <a:p>
+            <a:r>
+              <a:rPr lang="en-US" b="0" i="0" dirty="0">
+                <a:effectLst/>
+                <a:latin typeface="IBM Plex Sans" panose="020F0502020204030204" pitchFamily="34" charset="0"/>
+              </a:rPr>
               <a:t>In the United States, A-B owns 12 breweries: St Louis; Newark, New Jersey; Los Angeles; Houston; Columbus, Ohio; Jacksonville, Florida; Merrimack, New Hampshire; Williamsburg, Virginia; Fairfield, California; Baldwinsville, New York; Fort Collins, Colorado; and Cartersville, Georgia.</a:t>
             </a:r>
             <a:endParaRPr lang="en-US" dirty="0"/>
@@ -1810,15 +2111,168 @@
           <a:bodyPr/>
           <a:lstStyle/>
           <a:p>
+            <a:pPr marL="0" marR="0" lvl="0" indent="0" algn="l" defTabSz="914400" rtl="0" eaLnBrk="1" fontAlgn="auto" latinLnBrk="0" hangingPunct="1">
+              <a:lnSpc>
+                <a:spcPct val="100000"/>
+              </a:lnSpc>
+              <a:spcBef>
+                <a:spcPts val="0"/>
+              </a:spcBef>
+              <a:spcAft>
+                <a:spcPts val="0"/>
+              </a:spcAft>
+              <a:buClrTx/>
+              <a:buSzTx/>
+              <a:buFontTx/>
+              <a:buNone/>
+              <a:tabLst/>
+              <a:defRPr/>
+            </a:pPr>
+            <a:r>
+              <a:rPr lang="en-US" b="1" dirty="0"/>
+              <a:t>Out of the 2410 beers from our data: we found that 62 of them had missing ABV values, which is approx. 3% of the observations.</a:t>
+            </a:r>
+          </a:p>
+          <a:p>
+            <a:pPr marL="0" marR="0" lvl="0" indent="0" algn="l" defTabSz="914400" rtl="0" eaLnBrk="1" fontAlgn="auto" latinLnBrk="0" hangingPunct="1">
+              <a:lnSpc>
+                <a:spcPct val="100000"/>
+              </a:lnSpc>
+              <a:spcBef>
+                <a:spcPts val="0"/>
+              </a:spcBef>
+              <a:spcAft>
+                <a:spcPts val="0"/>
+              </a:spcAft>
+              <a:buClrTx/>
+              <a:buSzTx/>
+              <a:buFontTx/>
+              <a:buNone/>
+              <a:tabLst/>
+              <a:defRPr/>
+            </a:pPr>
+            <a:r>
+              <a:rPr lang="en-US" b="1" dirty="0"/>
+              <a:t>  </a:t>
+            </a:r>
+          </a:p>
+          <a:p>
+            <a:pPr marL="0" marR="0" lvl="0" indent="0" algn="l" defTabSz="914400" rtl="0" eaLnBrk="1" fontAlgn="auto" latinLnBrk="0" hangingPunct="1">
+              <a:lnSpc>
+                <a:spcPct val="100000"/>
+              </a:lnSpc>
+              <a:spcBef>
+                <a:spcPts val="0"/>
+              </a:spcBef>
+              <a:spcAft>
+                <a:spcPts val="0"/>
+              </a:spcAft>
+              <a:buClrTx/>
+              <a:buSzTx/>
+              <a:buFontTx/>
+              <a:buNone/>
+              <a:tabLst/>
+              <a:defRPr/>
+            </a:pPr>
+            <a:r>
+              <a:rPr lang="en-US" sz="1200" dirty="0"/>
+              <a:t>* With only a few missing ABV values, it was more efficient to simply search for the data online and replace those that were available.  In doing so, we were able to find 47 values and an additional 2 that were misrepresented as beers.</a:t>
+            </a:r>
+          </a:p>
+          <a:p>
+            <a:pPr marL="0" marR="0" lvl="0" indent="0" algn="l" defTabSz="914400" rtl="0" eaLnBrk="1" fontAlgn="auto" latinLnBrk="0" hangingPunct="1">
+              <a:lnSpc>
+                <a:spcPct val="100000"/>
+              </a:lnSpc>
+              <a:spcBef>
+                <a:spcPts val="0"/>
+              </a:spcBef>
+              <a:spcAft>
+                <a:spcPts val="0"/>
+              </a:spcAft>
+              <a:buClrTx/>
+              <a:buSzTx/>
+              <a:buFontTx/>
+              <a:buNone/>
+              <a:tabLst/>
+              <a:defRPr/>
+            </a:pPr>
+            <a:endParaRPr lang="en-US" sz="1200" dirty="0"/>
+          </a:p>
+          <a:p>
+            <a:pPr marL="0" marR="0" lvl="0" indent="0" algn="l" defTabSz="914400" rtl="0" eaLnBrk="1" fontAlgn="auto" latinLnBrk="0" hangingPunct="1">
+              <a:lnSpc>
+                <a:spcPct val="100000"/>
+              </a:lnSpc>
+              <a:spcBef>
+                <a:spcPts val="0"/>
+              </a:spcBef>
+              <a:spcAft>
+                <a:spcPts val="0"/>
+              </a:spcAft>
+              <a:buClrTx/>
+              <a:buSzTx/>
+              <a:buFontTx/>
+              <a:buNone/>
+              <a:tabLst/>
+              <a:defRPr/>
+            </a:pPr>
+            <a:r>
+              <a:rPr lang="en-US" sz="1200" dirty="0"/>
+              <a:t>In terms of IBU values, we found that 1005 had missing values equating to 42% of the observations.  </a:t>
+            </a:r>
+          </a:p>
+          <a:p>
             <a:r>
               <a:rPr lang="en-US" dirty="0"/>
-              <a:t>1.) It is understandable that the IBU values had so many missing values.  IBUs are often hard to measure and not required by law.  </a:t>
-            </a:r>
+              <a:t> It is understandable that the IBU values had so many missing values. As  IBUs are often hard to measure and not required by law.  </a:t>
+            </a:r>
+          </a:p>
+          <a:p>
+            <a:endParaRPr lang="en-US" dirty="0"/>
           </a:p>
           <a:p>
             <a:r>
               <a:rPr lang="en-US" dirty="0"/>
-              <a:t>2.) Out of the remaining missing IBU values, only 1 beer was an Ale which is what we are predominately concerned with. </a:t>
+              <a:t>*However, This is much more significant and requires further investigation</a:t>
+            </a:r>
+          </a:p>
+          <a:p>
+            <a:pPr marL="171450" indent="-171450">
+              <a:buFont typeface="Arial" panose="020B0604020202020204" pitchFamily="34" charset="0"/>
+              <a:buChar char="•"/>
+            </a:pPr>
+            <a:r>
+              <a:rPr lang="en-US" sz="1200" dirty="0"/>
+              <a:t>IBU values appear to be missing at random. The amount differs by style of beer, but we have no reason to believe it differs based on the actual value of IBU.</a:t>
+            </a:r>
+          </a:p>
+          <a:p>
+            <a:pPr marL="0" indent="0">
+              <a:buFont typeface="Arial" panose="020B0604020202020204" pitchFamily="34" charset="0"/>
+              <a:buNone/>
+            </a:pPr>
+            <a:r>
+              <a:rPr lang="en-US" sz="1200" dirty="0"/>
+              <a:t>So in handling this, we imputed the mean IBU by style to those with missing IBUs.</a:t>
+            </a:r>
+            <a:endParaRPr lang="en-US" dirty="0"/>
+          </a:p>
+          <a:p>
+            <a:endParaRPr lang="en-US" dirty="0"/>
+          </a:p>
+          <a:p>
+            <a:r>
+              <a:rPr lang="en-US" dirty="0"/>
+              <a:t>52 of the beers were unique, and therefore we could not impute the average IBU.  </a:t>
+            </a:r>
+            <a:r>
+              <a:rPr lang="en-US" dirty="0" err="1"/>
+              <a:t>Tthose</a:t>
+            </a:r>
+            <a:r>
+              <a:rPr lang="en-US" dirty="0"/>
+              <a:t> only accounted for 2% of the observations, and only 1 of which was an Ale or IPA  which is where our main focus lied. </a:t>
             </a:r>
           </a:p>
           <a:p>
@@ -1906,13 +2360,93 @@
           <a:bodyPr/>
           <a:lstStyle/>
           <a:p>
+            <a:r>
+              <a:rPr lang="en-US" dirty="0"/>
+              <a:t>One of the questions posed to our team was specifically in regards to Alcohol content by volume.  </a:t>
+            </a:r>
+          </a:p>
+          <a:p>
+            <a:r>
+              <a:rPr lang="en-US" dirty="0"/>
+              <a:t>What we found was that our of the 2400+ beers, </a:t>
+            </a:r>
+          </a:p>
+          <a:p>
+            <a:r>
+              <a:rPr lang="en-US" dirty="0"/>
+              <a:t>*the Average (or Mean) is right at 6% and right skewed </a:t>
+            </a:r>
+          </a:p>
+          <a:p>
+            <a:r>
+              <a:rPr lang="en-US" dirty="0"/>
+              <a:t>*with a median of 5.6% and </a:t>
+            </a:r>
+          </a:p>
+          <a:p>
+            <a:r>
+              <a:rPr lang="en-US" dirty="0"/>
+              <a:t>*The standard deviation is right at 1%.</a:t>
+            </a:r>
+          </a:p>
+          <a:p>
+            <a:r>
+              <a:rPr lang="en-US" dirty="0"/>
+              <a:t>*The non alcoholic beers showed to be the minimum at .1% and the highest ABV value reaching 12.8%.</a:t>
+            </a:r>
+          </a:p>
+          <a:p>
             <a:endParaRPr lang="en-US" dirty="0"/>
           </a:p>
-        </p:txBody>
-      </p:sp>
-      <p:sp>
-        <p:nvSpPr>
-          <p:cNvPr id="4" name="Slide Number Placeholder 3"/>
+          <a:p>
+            <a:r>
+              <a:rPr lang="en-US" dirty="0"/>
+              <a:t>*For comparison, Bud Light has an ABV value of 4.2% which is 2 std dev away from the average, and Budweiser at 1 standard dev away at 5%</a:t>
+            </a:r>
+          </a:p>
+        </p:txBody>
+      </p:sp>
+      <p:sp>
+        <p:nvSpPr>
+          <p:cNvPr id="4" name="Header Placeholder 3"/>
+          <p:cNvSpPr>
+            <a:spLocks noGrp="1"/>
+          </p:cNvSpPr>
+          <p:nvPr>
+            <p:ph type="hdr" sz="quarter"/>
+          </p:nvPr>
+        </p:nvSpPr>
+        <p:spPr/>
+        <p:txBody>
+          <a:bodyPr/>
+          <a:lstStyle/>
+          <a:p>
+            <a:endParaRPr lang="en-US" dirty="0"/>
+          </a:p>
+        </p:txBody>
+      </p:sp>
+      <p:sp>
+        <p:nvSpPr>
+          <p:cNvPr id="5" name="Footer Placeholder 4"/>
+          <p:cNvSpPr>
+            <a:spLocks noGrp="1"/>
+          </p:cNvSpPr>
+          <p:nvPr>
+            <p:ph type="ftr" sz="quarter" idx="4"/>
+          </p:nvPr>
+        </p:nvSpPr>
+        <p:spPr/>
+        <p:txBody>
+          <a:bodyPr/>
+          <a:lstStyle/>
+          <a:p>
+            <a:endParaRPr lang="en-US" dirty="0"/>
+          </a:p>
+        </p:txBody>
+      </p:sp>
+      <p:sp>
+        <p:nvSpPr>
+          <p:cNvPr id="6" name="Slide Number Placeholder 5"/>
           <p:cNvSpPr>
             <a:spLocks noGrp="1"/>
           </p:cNvSpPr>
@@ -1936,7 +2470,7 @@
     </p:spTree>
     <p:extLst>
       <p:ext uri="{BB962C8B-B14F-4D97-AF65-F5344CB8AC3E}">
-        <p14:creationId xmlns:p14="http://schemas.microsoft.com/office/powerpoint/2010/main" val="3832881476"/>
+        <p14:creationId xmlns:p14="http://schemas.microsoft.com/office/powerpoint/2010/main" val="997565212"/>
       </p:ext>
     </p:extLst>
   </p:cSld>
@@ -1990,51 +2524,84 @@
           <a:bodyPr/>
           <a:lstStyle/>
           <a:p>
-            <a:endParaRPr lang="en-US"/>
-          </a:p>
-        </p:txBody>
-      </p:sp>
-      <p:sp>
-        <p:nvSpPr>
-          <p:cNvPr id="4" name="Header Placeholder 3"/>
-          <p:cNvSpPr>
-            <a:spLocks noGrp="1"/>
-          </p:cNvSpPr>
-          <p:nvPr>
-            <p:ph type="hdr" sz="quarter"/>
-          </p:nvPr>
-        </p:nvSpPr>
-        <p:spPr/>
-        <p:txBody>
-          <a:bodyPr/>
-          <a:lstStyle/>
+            <a:r>
+              <a:rPr lang="en-US" dirty="0"/>
+              <a:t>Starting with the Median ABV by State, we can see that the relative ABV values are pretty close </a:t>
+            </a:r>
+          </a:p>
+          <a:p>
+            <a:r>
+              <a:rPr lang="en-US" dirty="0"/>
+              <a:t>*</a:t>
+            </a:r>
+          </a:p>
+          <a:p>
+            <a:r>
+              <a:rPr lang="en-US" dirty="0"/>
+              <a:t>with only one notable exception… Utah.  *</a:t>
+            </a:r>
+          </a:p>
           <a:p>
             <a:endParaRPr lang="en-US" dirty="0"/>
           </a:p>
-        </p:txBody>
-      </p:sp>
-      <p:sp>
-        <p:nvSpPr>
-          <p:cNvPr id="5" name="Footer Placeholder 4"/>
-          <p:cNvSpPr>
-            <a:spLocks noGrp="1"/>
-          </p:cNvSpPr>
-          <p:nvPr>
-            <p:ph type="ftr" sz="quarter" idx="4"/>
-          </p:nvPr>
-        </p:nvSpPr>
-        <p:spPr/>
-        <p:txBody>
-          <a:bodyPr/>
-          <a:lstStyle/>
+          <a:p>
+            <a:r>
+              <a:rPr lang="en-US" dirty="0"/>
+              <a:t>* Here we have the Bitterness heatmap, again we can see that there really isn’t any extreme instances.  </a:t>
+            </a:r>
+          </a:p>
           <a:p>
             <a:endParaRPr lang="en-US" dirty="0"/>
           </a:p>
-        </p:txBody>
-      </p:sp>
-      <p:sp>
-        <p:nvSpPr>
-          <p:cNvPr id="6" name="Slide Number Placeholder 5"/>
+          <a:p>
+            <a:pPr marL="0" marR="0" lvl="0" indent="0" algn="l" defTabSz="914400" rtl="0" eaLnBrk="1" fontAlgn="auto" latinLnBrk="0" hangingPunct="1">
+              <a:lnSpc>
+                <a:spcPct val="100000"/>
+              </a:lnSpc>
+              <a:spcBef>
+                <a:spcPts val="0"/>
+              </a:spcBef>
+              <a:spcAft>
+                <a:spcPts val="0"/>
+              </a:spcAft>
+              <a:buClrTx/>
+              <a:buSzTx/>
+              <a:buFontTx/>
+              <a:buNone/>
+              <a:tabLst/>
+              <a:defRPr/>
+            </a:pPr>
+            <a:r>
+              <a:rPr lang="en-US" dirty="0"/>
+              <a:t>*Though the heat maps provide a great visualization of ABV and IBU medians, we must recognize that some states like West Virginia and Delaware only had 2 observations. </a:t>
+            </a:r>
+          </a:p>
+          <a:p>
+            <a:endParaRPr lang="en-US" dirty="0"/>
+          </a:p>
+          <a:p>
+            <a:r>
+              <a:rPr lang="en-US" dirty="0"/>
+              <a:t>This begs the question of which state had the highest ABV…</a:t>
+            </a:r>
+          </a:p>
+          <a:p>
+            <a:r>
+              <a:rPr lang="en-US" dirty="0"/>
+              <a:t>*.That would be Colorado with a Belgian at 12.8%.</a:t>
+            </a:r>
+          </a:p>
+          <a:p>
+            <a:r>
+              <a:rPr lang="en-US" dirty="0"/>
+              <a:t>*And Oregon claims the most bitter beer at 138 IBUs.</a:t>
+            </a:r>
+          </a:p>
+        </p:txBody>
+      </p:sp>
+      <p:sp>
+        <p:nvSpPr>
+          <p:cNvPr id="4" name="Slide Number Placeholder 3"/>
           <p:cNvSpPr>
             <a:spLocks noGrp="1"/>
           </p:cNvSpPr>
@@ -2058,7 +2625,7 @@
     </p:spTree>
     <p:extLst>
       <p:ext uri="{BB962C8B-B14F-4D97-AF65-F5344CB8AC3E}">
-        <p14:creationId xmlns:p14="http://schemas.microsoft.com/office/powerpoint/2010/main" val="997565212"/>
+        <p14:creationId xmlns:p14="http://schemas.microsoft.com/office/powerpoint/2010/main" val="3832881476"/>
       </p:ext>
     </p:extLst>
   </p:cSld>
@@ -2112,7 +2679,48 @@
           <a:bodyPr/>
           <a:lstStyle/>
           <a:p>
-            <a:endParaRPr lang="en-US"/>
+            <a:r>
+              <a:rPr lang="en-US" dirty="0"/>
+              <a:t>Moving on, we were asked to investigate the relationship between Alcohol Content and Bitterness. </a:t>
+            </a:r>
+          </a:p>
+          <a:p>
+            <a:endParaRPr lang="en-US" dirty="0"/>
+          </a:p>
+          <a:p>
+            <a:r>
+              <a:rPr lang="en-US" dirty="0"/>
+              <a:t>*When the two are plotted against each other, we can see a positive correlation between ABV and IBU, meaning that the higher the ABV, the more bitter the beer.  </a:t>
+            </a:r>
+          </a:p>
+          <a:p>
+            <a:endParaRPr lang="en-US" dirty="0"/>
+          </a:p>
+          <a:p>
+            <a:pPr marL="0" marR="0" lvl="0" indent="0" algn="l" defTabSz="914400" rtl="0" eaLnBrk="1" fontAlgn="auto" latinLnBrk="0" hangingPunct="1">
+              <a:lnSpc>
+                <a:spcPct val="100000"/>
+              </a:lnSpc>
+              <a:spcBef>
+                <a:spcPts val="0"/>
+              </a:spcBef>
+              <a:spcAft>
+                <a:spcPts val="0"/>
+              </a:spcAft>
+              <a:buClrTx/>
+              <a:buSzTx/>
+              <a:buFontTx/>
+              <a:buNone/>
+              <a:tabLst/>
+              <a:defRPr/>
+            </a:pPr>
+            <a:r>
+              <a:rPr lang="en-US" dirty="0"/>
+              <a:t>*It is also very apparent that IPAs are considerably more bitter than the other types of Ales when comparing with the alcohol content. </a:t>
+            </a:r>
+          </a:p>
+          <a:p>
+            <a:endParaRPr lang="en-US" dirty="0"/>
           </a:p>
         </p:txBody>
       </p:sp>
@@ -2241,7 +2849,67 @@
                 </a:solidFill>
                 <a:effectLst/>
               </a:rPr>
-              <a:t>The KNN model using only Ales (IPAs and other Ales) has more than a 91% accuracy rate. 888 Ales were identified correctly giving us a sensitivity of 93% and 503 IPAs were also correctly identified, leading to a specificity of 88.3%. </a:t>
+              <a:t>Addressing this relationship, we created a KNN model as to be able to predict what style of beer we would have given both the ABV and IBU. </a:t>
+            </a:r>
+          </a:p>
+          <a:p>
+            <a:endParaRPr lang="en-US" sz="1200" dirty="0">
+              <a:solidFill>
+                <a:srgbClr val="333333"/>
+              </a:solidFill>
+              <a:effectLst/>
+            </a:endParaRPr>
+          </a:p>
+          <a:p>
+            <a:r>
+              <a:rPr lang="en-US" sz="1200" dirty="0">
+                <a:solidFill>
+                  <a:srgbClr val="333333"/>
+                </a:solidFill>
+                <a:effectLst/>
+              </a:rPr>
+              <a:t>*The KNN model using only Ales (IPAs and other Ales) has more than a </a:t>
+            </a:r>
+          </a:p>
+          <a:p>
+            <a:r>
+              <a:rPr lang="en-US" sz="1200" dirty="0">
+                <a:solidFill>
+                  <a:srgbClr val="333333"/>
+                </a:solidFill>
+                <a:effectLst/>
+              </a:rPr>
+              <a:t>*91% accuracy rate.</a:t>
+            </a:r>
+          </a:p>
+          <a:p>
+            <a:pPr marL="171450" indent="-171450">
+              <a:buFont typeface="Arial" panose="020B0604020202020204" pitchFamily="34" charset="0"/>
+              <a:buChar char="•"/>
+            </a:pPr>
+            <a:r>
+              <a:rPr lang="en-US" sz="1200" dirty="0">
+                <a:solidFill>
+                  <a:srgbClr val="333333"/>
+                </a:solidFill>
+                <a:effectLst/>
+              </a:rPr>
+              <a:t>Where 888 Ales were identified correctly giving us a sensitivity of 93% and </a:t>
+            </a:r>
+          </a:p>
+          <a:p>
+            <a:pPr marL="171450" indent="-171450">
+              <a:buFont typeface="Arial" panose="020B0604020202020204" pitchFamily="34" charset="0"/>
+              <a:buChar char="•"/>
+            </a:pPr>
+            <a:r>
+              <a:rPr lang="en-US" sz="1200" dirty="0">
+                <a:solidFill>
+                  <a:srgbClr val="333333"/>
+                </a:solidFill>
+                <a:effectLst/>
+              </a:rPr>
+              <a:t>*503 IPAs were also correctly identified, leading to a specificity of 88%. </a:t>
             </a:r>
           </a:p>
         </p:txBody>
@@ -18357,7 +19025,7 @@
         <p:spPr>
           <a:xfrm>
             <a:off x="3507657" y="5186859"/>
-            <a:ext cx="4968027" cy="369332"/>
+            <a:ext cx="2954655" cy="369332"/>
           </a:xfrm>
           <a:prstGeom prst="rect">
             <a:avLst/>
@@ -18372,7 +19040,7 @@
           <a:p>
             <a:r>
               <a:rPr lang="en-US" dirty="0"/>
-              <a:t>Presented By: Nicholas Sager and Steven Cox</a:t>
+              <a:t>Presented By: Steven Cox</a:t>
             </a:r>
           </a:p>
         </p:txBody>
@@ -18509,41 +19177,6 @@
             <a:r>
               <a:rPr lang="en-US" b="1" dirty="0"/>
               <a:t>Comparing the ABV and Bitterness  Between the Between Ales and IPAs</a:t>
-            </a:r>
-          </a:p>
-        </p:txBody>
-      </p:sp>
-      <p:sp>
-        <p:nvSpPr>
-          <p:cNvPr id="7" name="TextBox 6">
-            <a:extLst>
-              <a:ext uri="{FF2B5EF4-FFF2-40B4-BE49-F238E27FC236}">
-                <a16:creationId xmlns:a16="http://schemas.microsoft.com/office/drawing/2014/main" id="{8BD0DB13-E229-CDF1-11CD-D7D93D9FEF39}"/>
-              </a:ext>
-            </a:extLst>
-          </p:cNvPr>
-          <p:cNvSpPr txBox="1"/>
-          <p:nvPr/>
-        </p:nvSpPr>
-        <p:spPr>
-          <a:xfrm>
-            <a:off x="126998" y="4865985"/>
-            <a:ext cx="8229601" cy="646331"/>
-          </a:xfrm>
-          <a:prstGeom prst="rect">
-            <a:avLst/>
-          </a:prstGeom>
-          <a:noFill/>
-        </p:spPr>
-        <p:txBody>
-          <a:bodyPr wrap="square" rtlCol="0">
-            <a:spAutoFit/>
-          </a:bodyPr>
-          <a:lstStyle/>
-          <a:p>
-            <a:r>
-              <a:rPr lang="en-US" dirty="0"/>
-              <a:t>Here we can clearly see the difference in the ABV and IBU values between Ales and IPAs as we did previously.</a:t>
             </a:r>
           </a:p>
         </p:txBody>
@@ -18754,8 +19387,8 @@
         </p:nvSpPr>
         <p:spPr>
           <a:xfrm>
-            <a:off x="7848600" y="1422400"/>
-            <a:ext cx="3200400" cy="3970318"/>
+            <a:off x="8255000" y="1173182"/>
+            <a:ext cx="3200400" cy="3416320"/>
           </a:xfrm>
           <a:prstGeom prst="rect">
             <a:avLst/>
@@ -18768,6 +19401,10 @@
           </a:bodyPr>
           <a:lstStyle/>
           <a:p>
+            <a:pPr marL="285750" indent="-285750">
+              <a:buFont typeface="Arial" panose="020B0604020202020204" pitchFamily="34" charset="0"/>
+              <a:buChar char="•"/>
+            </a:pPr>
             <a:r>
               <a:rPr lang="en-US" sz="1800" dirty="0">
                 <a:solidFill>
@@ -18775,10 +19412,34 @@
                 </a:solidFill>
                 <a:effectLst/>
               </a:rPr>
-              <a:t>Since the analysis of Ales vs IPAs, was so effective, we decided to investigate the difference between other styles of beer. This may be useful for Budweiser to determine what specific profiles of ABV and IBU are associated with each style of beer. Such information could help with positioning their beers relative to the existing markets.</a:t>
-            </a:r>
-          </a:p>
-          <a:p>
+              <a:t>Since the analysis of Ales vs IPAs, was so effective, we decided to investigate the difference between the other styles of beer. </a:t>
+            </a:r>
+          </a:p>
+          <a:p>
+            <a:pPr marL="285750" indent="-285750">
+              <a:buFont typeface="Arial" panose="020B0604020202020204" pitchFamily="34" charset="0"/>
+              <a:buChar char="•"/>
+            </a:pPr>
+            <a:endParaRPr lang="en-US" dirty="0">
+              <a:solidFill>
+                <a:srgbClr val="333333"/>
+              </a:solidFill>
+            </a:endParaRPr>
+          </a:p>
+          <a:p>
+            <a:pPr marL="285750" indent="-285750">
+              <a:buFont typeface="Arial" panose="020B0604020202020204" pitchFamily="34" charset="0"/>
+              <a:buChar char="•"/>
+            </a:pPr>
+            <a:r>
+              <a:rPr lang="en-US" sz="1800" dirty="0">
+                <a:solidFill>
+                  <a:srgbClr val="333333"/>
+                </a:solidFill>
+                <a:effectLst/>
+              </a:rPr>
+              <a:t>This may be useful for Budweiser to determine what specific profiles of ABV and IBU are associated with each style of beer.</a:t>
+            </a:r>
             <a:endParaRPr lang="en-US" dirty="0"/>
           </a:p>
         </p:txBody>
@@ -18793,6 +19454,85 @@
   <p:clrMapOvr>
     <a:masterClrMapping/>
   </p:clrMapOvr>
+  <p:timing>
+    <p:tnLst>
+      <p:par>
+        <p:cTn id="1" dur="indefinite" restart="never" nodeType="tmRoot">
+          <p:childTnLst>
+            <p:seq concurrent="1" nextAc="seek">
+              <p:cTn id="2" dur="indefinite" nodeType="mainSeq">
+                <p:childTnLst>
+                  <p:par>
+                    <p:cTn id="3" fill="hold">
+                      <p:stCondLst>
+                        <p:cond delay="indefinite"/>
+                      </p:stCondLst>
+                      <p:childTnLst>
+                        <p:par>
+                          <p:cTn id="4" fill="hold">
+                            <p:stCondLst>
+                              <p:cond delay="0"/>
+                            </p:stCondLst>
+                            <p:childTnLst>
+                              <p:par>
+                                <p:cTn id="5" presetID="1" presetClass="entr" presetSubtype="0" fill="hold" nodeType="clickEffect">
+                                  <p:stCondLst>
+                                    <p:cond delay="0"/>
+                                  </p:stCondLst>
+                                  <p:childTnLst>
+                                    <p:set>
+                                      <p:cBhvr>
+                                        <p:cTn id="6" dur="1" fill="hold">
+                                          <p:stCondLst>
+                                            <p:cond delay="0"/>
+                                          </p:stCondLst>
+                                        </p:cTn>
+                                        <p:tgtEl>
+                                          <p:spTgt spid="9">
+                                            <p:txEl>
+                                              <p:pRg st="2" end="2"/>
+                                            </p:txEl>
+                                          </p:spTgt>
+                                        </p:tgtEl>
+                                        <p:attrNameLst>
+                                          <p:attrName>style.visibility</p:attrName>
+                                        </p:attrNameLst>
+                                      </p:cBhvr>
+                                      <p:to>
+                                        <p:strVal val="visible"/>
+                                      </p:to>
+                                    </p:set>
+                                  </p:childTnLst>
+                                </p:cTn>
+                              </p:par>
+                            </p:childTnLst>
+                          </p:cTn>
+                        </p:par>
+                      </p:childTnLst>
+                    </p:cTn>
+                  </p:par>
+                </p:childTnLst>
+              </p:cTn>
+              <p:prevCondLst>
+                <p:cond evt="onPrev" delay="0">
+                  <p:tgtEl>
+                    <p:sldTgt/>
+                  </p:tgtEl>
+                </p:cond>
+              </p:prevCondLst>
+              <p:nextCondLst>
+                <p:cond evt="onNext" delay="0">
+                  <p:tgtEl>
+                    <p:sldTgt/>
+                  </p:tgtEl>
+                </p:cond>
+              </p:nextCondLst>
+            </p:seq>
+          </p:childTnLst>
+        </p:cTn>
+      </p:par>
+    </p:tnLst>
+  </p:timing>
 </p:sld>
 </file>
 
@@ -19008,17 +19748,52 @@
           <a:p>
             <a:r>
               <a:rPr lang="en-US" sz="1400" dirty="0"/>
-              <a:t>After expanding the ABV’s over the different beer styles, we can better visualize how to group the alcohol content . </a:t>
+              <a:t>After expanding the ABV’s over the different beer styles, we can better visualize the similarities and differences in relation to ABV. </a:t>
+            </a:r>
+          </a:p>
+        </p:txBody>
+      </p:sp>
+      <p:sp>
+        <p:nvSpPr>
+          <p:cNvPr id="12" name="TextBox 11">
+            <a:extLst>
+              <a:ext uri="{FF2B5EF4-FFF2-40B4-BE49-F238E27FC236}">
+                <a16:creationId xmlns:a16="http://schemas.microsoft.com/office/drawing/2014/main" id="{653FB081-8D31-2BDC-9D87-ACE2026F74FF}"/>
+              </a:ext>
+            </a:extLst>
+          </p:cNvPr>
+          <p:cNvSpPr txBox="1"/>
+          <p:nvPr/>
+        </p:nvSpPr>
+        <p:spPr>
+          <a:xfrm>
+            <a:off x="8397277" y="3692076"/>
+            <a:ext cx="3423843" cy="738664"/>
+          </a:xfrm>
+          <a:prstGeom prst="rect">
+            <a:avLst/>
+          </a:prstGeom>
+          <a:noFill/>
+        </p:spPr>
+        <p:txBody>
+          <a:bodyPr wrap="square" rtlCol="0">
+            <a:spAutoFit/>
+          </a:bodyPr>
+          <a:lstStyle/>
+          <a:p>
+            <a:r>
+              <a:rPr lang="en-US" sz="1400" dirty="0"/>
+              <a:t>This KNN model does very well, allowing us to classify the beers with a 71% accuracy. </a:t>
             </a:r>
           </a:p>
         </p:txBody>
       </p:sp>
       <p:pic>
         <p:nvPicPr>
-          <p:cNvPr id="11" name="Picture 10" descr="Table&#10;&#10;Description automatically generated">
-            <a:extLst>
-              <a:ext uri="{FF2B5EF4-FFF2-40B4-BE49-F238E27FC236}">
-                <a16:creationId xmlns:a16="http://schemas.microsoft.com/office/drawing/2014/main" id="{0D03068F-D6C7-F755-FAE7-57A54A9AD174}"/>
+          <p:cNvPr id="13" name="Picture 12">
+            <a:extLst>
+              <a:ext uri="{FF2B5EF4-FFF2-40B4-BE49-F238E27FC236}">
+                <a16:creationId xmlns:a16="http://schemas.microsoft.com/office/drawing/2014/main" id="{1989BA91-4A11-1140-4277-BFBB2780F9D3}"/>
               </a:ext>
             </a:extLst>
           </p:cNvPr>
@@ -19035,8 +19810,8 @@
         </p:blipFill>
         <p:spPr>
           <a:xfrm>
-            <a:off x="8266135" y="1200150"/>
-            <a:ext cx="3734135" cy="2633161"/>
+            <a:off x="8242132" y="1193476"/>
+            <a:ext cx="3734135" cy="2377034"/>
           </a:xfrm>
           <a:prstGeom prst="rect">
             <a:avLst/>
@@ -19045,62 +19820,10 @@
       </p:pic>
       <p:sp>
         <p:nvSpPr>
-          <p:cNvPr id="12" name="TextBox 11">
-            <a:extLst>
-              <a:ext uri="{FF2B5EF4-FFF2-40B4-BE49-F238E27FC236}">
-                <a16:creationId xmlns:a16="http://schemas.microsoft.com/office/drawing/2014/main" id="{653FB081-8D31-2BDC-9D87-ACE2026F74FF}"/>
-              </a:ext>
-            </a:extLst>
-          </p:cNvPr>
-          <p:cNvSpPr txBox="1"/>
-          <p:nvPr/>
-        </p:nvSpPr>
-        <p:spPr>
-          <a:xfrm>
-            <a:off x="8421280" y="4089888"/>
-            <a:ext cx="3423843" cy="1600438"/>
-          </a:xfrm>
-          <a:prstGeom prst="rect">
-            <a:avLst/>
-          </a:prstGeom>
-          <a:noFill/>
-        </p:spPr>
-        <p:txBody>
-          <a:bodyPr wrap="square" rtlCol="0">
-            <a:spAutoFit/>
-          </a:bodyPr>
-          <a:lstStyle/>
-          <a:p>
-            <a:pPr marL="285750" indent="-285750">
-              <a:buFont typeface="Arial" panose="020B0604020202020204" pitchFamily="34" charset="0"/>
-              <a:buChar char="•"/>
-            </a:pPr>
-            <a:r>
-              <a:rPr lang="en-US" sz="1400" dirty="0"/>
-              <a:t>This KNN model does very well, allowing us to classify the beers with a 71% accuracy. </a:t>
-            </a:r>
-          </a:p>
-          <a:p>
-            <a:endParaRPr lang="en-US" sz="1400" dirty="0"/>
-          </a:p>
-          <a:p>
-            <a:pPr marL="285750" indent="-285750">
-              <a:buFont typeface="Arial" panose="020B0604020202020204" pitchFamily="34" charset="0"/>
-              <a:buChar char="•"/>
-            </a:pPr>
-            <a:r>
-              <a:rPr lang="en-US" sz="1400" dirty="0"/>
-              <a:t>Considering that there are 7 categories, this is a very usable result.</a:t>
-            </a:r>
-          </a:p>
-        </p:txBody>
-      </p:sp>
-      <p:sp>
-        <p:nvSpPr>
-          <p:cNvPr id="5" name="Rectangle 4">
-            <a:extLst>
-              <a:ext uri="{FF2B5EF4-FFF2-40B4-BE49-F238E27FC236}">
-                <a16:creationId xmlns:a16="http://schemas.microsoft.com/office/drawing/2014/main" id="{99BDF971-0EB2-F427-F9A6-F11DBC91EBB7}"/>
+          <p:cNvPr id="7" name="Oval 6">
+            <a:extLst>
+              <a:ext uri="{FF2B5EF4-FFF2-40B4-BE49-F238E27FC236}">
+                <a16:creationId xmlns:a16="http://schemas.microsoft.com/office/drawing/2014/main" id="{C31A410C-FBF7-1564-EBC6-59E427C1D0E7}"/>
               </a:ext>
             </a:extLst>
           </p:cNvPr>
@@ -19109,59 +19832,7 @@
         </p:nvSpPr>
         <p:spPr>
           <a:xfrm>
-            <a:off x="8266135" y="3291840"/>
-            <a:ext cx="3734135" cy="541471"/>
-          </a:xfrm>
-          <a:prstGeom prst="rect">
-            <a:avLst/>
-          </a:prstGeom>
-          <a:solidFill>
-            <a:schemeClr val="bg1"/>
-          </a:solidFill>
-          <a:ln>
-            <a:noFill/>
-          </a:ln>
-        </p:spPr>
-        <p:style>
-          <a:lnRef idx="2">
-            <a:schemeClr val="accent1">
-              <a:shade val="50000"/>
-            </a:schemeClr>
-          </a:lnRef>
-          <a:fillRef idx="1">
-            <a:schemeClr val="accent1"/>
-          </a:fillRef>
-          <a:effectRef idx="0">
-            <a:schemeClr val="accent1"/>
-          </a:effectRef>
-          <a:fontRef idx="minor">
-            <a:schemeClr val="lt1"/>
-          </a:fontRef>
-        </p:style>
-        <p:txBody>
-          <a:bodyPr rtlCol="0" anchor="ctr"/>
-          <a:lstStyle/>
-          <a:p>
-            <a:pPr algn="ctr"/>
-            <a:endParaRPr lang="en-US"/>
-          </a:p>
-        </p:txBody>
-      </p:sp>
-      <p:sp>
-        <p:nvSpPr>
-          <p:cNvPr id="7" name="Oval 6">
-            <a:extLst>
-              <a:ext uri="{FF2B5EF4-FFF2-40B4-BE49-F238E27FC236}">
-                <a16:creationId xmlns:a16="http://schemas.microsoft.com/office/drawing/2014/main" id="{C31A410C-FBF7-1564-EBC6-59E427C1D0E7}"/>
-              </a:ext>
-            </a:extLst>
-          </p:cNvPr>
-          <p:cNvSpPr/>
-          <p:nvPr/>
-        </p:nvSpPr>
-        <p:spPr>
-          <a:xfrm>
-            <a:off x="9265920" y="3094647"/>
+            <a:off x="9281031" y="3296940"/>
             <a:ext cx="1196340" cy="334353"/>
           </a:xfrm>
           <a:prstGeom prst="ellipse">
@@ -19315,34 +19986,7 @@
                                           </p:stCondLst>
                                         </p:cTn>
                                         <p:tgtEl>
-                                          <p:spTgt spid="11"/>
-                                        </p:tgtEl>
-                                        <p:attrNameLst>
-                                          <p:attrName>style.visibility</p:attrName>
-                                        </p:attrNameLst>
-                                      </p:cBhvr>
-                                      <p:to>
-                                        <p:strVal val="visible"/>
-                                      </p:to>
-                                    </p:set>
-                                  </p:childTnLst>
-                                </p:cTn>
-                              </p:par>
-                              <p:par>
-                                <p:cTn id="13" presetID="1" presetClass="entr" presetSubtype="0" fill="hold" grpId="0" nodeType="withEffect">
-                                  <p:stCondLst>
-                                    <p:cond delay="0"/>
-                                  </p:stCondLst>
-                                  <p:childTnLst>
-                                    <p:set>
-                                      <p:cBhvr>
-                                        <p:cTn id="14" dur="1" fill="hold">
-                                          <p:stCondLst>
-                                            <p:cond delay="0"/>
-                                          </p:stCondLst>
-                                        </p:cTn>
-                                        <p:tgtEl>
-                                          <p:spTgt spid="5"/>
+                                          <p:spTgt spid="13"/>
                                         </p:tgtEl>
                                         <p:attrNameLst>
                                           <p:attrName>style.visibility</p:attrName>
@@ -19362,26 +20006,26 @@
                     </p:cTn>
                   </p:par>
                   <p:par>
-                    <p:cTn id="15" fill="hold">
+                    <p:cTn id="13" fill="hold">
                       <p:stCondLst>
                         <p:cond delay="indefinite"/>
                       </p:stCondLst>
                       <p:childTnLst>
                         <p:par>
-                          <p:cTn id="16" fill="hold">
+                          <p:cTn id="14" fill="hold">
                             <p:stCondLst>
                               <p:cond delay="0"/>
                             </p:stCondLst>
                             <p:childTnLst>
                               <p:par>
-                                <p:cTn id="17" presetID="1" presetClass="entr" presetSubtype="0" fill="hold" grpId="0" nodeType="clickEffect">
+                                <p:cTn id="15" presetID="1" presetClass="entr" presetSubtype="0" fill="hold" grpId="0" nodeType="clickEffect">
                                   <p:stCondLst>
                                     <p:cond delay="0"/>
                                   </p:stCondLst>
                                   <p:childTnLst>
                                     <p:set>
                                       <p:cBhvr>
-                                        <p:cTn id="18" dur="1" fill="hold">
+                                        <p:cTn id="16" dur="1" fill="hold">
                                           <p:stCondLst>
                                             <p:cond delay="0"/>
                                           </p:stCondLst>
@@ -19401,14 +20045,14 @@
                                 </p:cTn>
                               </p:par>
                               <p:par>
-                                <p:cTn id="19" presetID="1" presetClass="entr" presetSubtype="0" fill="hold" grpId="0" nodeType="withEffect">
+                                <p:cTn id="17" presetID="1" presetClass="entr" presetSubtype="0" fill="hold" grpId="0" nodeType="withEffect">
                                   <p:stCondLst>
                                     <p:cond delay="0"/>
                                   </p:stCondLst>
                                   <p:childTnLst>
                                     <p:set>
                                       <p:cBhvr>
-                                        <p:cTn id="20" dur="1" fill="hold">
+                                        <p:cTn id="18" dur="1" fill="hold">
                                           <p:stCondLst>
                                             <p:cond delay="0"/>
                                           </p:stCondLst>
@@ -19457,7 +20101,6 @@
     <p:bldLst>
       <p:bldP spid="8" grpId="0"/>
       <p:bldP spid="12" grpId="0"/>
-      <p:bldP spid="5" grpId="0" animBg="1"/>
       <p:bldP spid="7" grpId="0" animBg="1"/>
     </p:bldLst>
   </p:timing>
@@ -19567,7 +20210,7 @@
         <p:spPr>
           <a:xfrm>
             <a:off x="104140" y="5380672"/>
-            <a:ext cx="11148060" cy="1477328"/>
+            <a:ext cx="9304020" cy="2031325"/>
           </a:xfrm>
           <a:prstGeom prst="rect">
             <a:avLst/>
@@ -19586,8 +20229,15 @@
             </a:pPr>
             <a:r>
               <a:rPr lang="en-US" dirty="0"/>
-              <a:t>Visualizing the relationship between the ABV and IBU for the different styles of beer, we can see the industry norms and predict where new products should fall on the graph. </a:t>
-            </a:r>
+              <a:t>Visualizing the relationship between the ABV and IBU for the different styles of beer, we can see the industry norms and use this to help classify newly created beers. </a:t>
+            </a:r>
+          </a:p>
+          <a:p>
+            <a:pPr marL="285750" indent="-285750">
+              <a:buFont typeface="Arial" panose="020B0604020202020204" pitchFamily="34" charset="0"/>
+              <a:buChar char="•"/>
+            </a:pPr>
+            <a:endParaRPr lang="en-US" dirty="0"/>
           </a:p>
           <a:p>
             <a:pPr marL="285750" indent="-285750">
@@ -19829,7 +20479,7 @@
                                         <p:tgtEl>
                                           <p:spTgt spid="7">
                                             <p:txEl>
-                                              <p:pRg st="1" end="1"/>
+                                              <p:pRg st="2" end="2"/>
                                             </p:txEl>
                                           </p:spTgt>
                                         </p:tgtEl>
@@ -20314,7 +20964,7 @@
         </p:nvSpPr>
         <p:spPr>
           <a:xfrm>
-            <a:off x="3189480" y="4469166"/>
+            <a:off x="3189480" y="3677793"/>
             <a:ext cx="4294206" cy="755650"/>
           </a:xfrm>
         </p:spPr>
@@ -20330,7 +20980,7 @@
               <a:rPr lang="en-US" dirty="0">
                 <a:effectLst/>
               </a:rPr>
-              <a:t>Deeper Dive into alcohol content by volume (ABV)</a:t>
+              <a:t>Analysis of Alcohol content by Volume (ABV)</a:t>
             </a:r>
             <a:endParaRPr lang="en-US" dirty="0"/>
           </a:p>
@@ -20354,7 +21004,7 @@
         </p:nvSpPr>
         <p:spPr>
           <a:xfrm>
-            <a:off x="3189480" y="3684177"/>
+            <a:off x="7436116" y="2265799"/>
             <a:ext cx="4294206" cy="755650"/>
           </a:xfrm>
         </p:spPr>
@@ -20394,7 +21044,7 @@
         </p:nvSpPr>
         <p:spPr>
           <a:xfrm>
-            <a:off x="7640565" y="2180162"/>
+            <a:off x="7459901" y="2939233"/>
             <a:ext cx="4294206" cy="755650"/>
           </a:xfrm>
         </p:spPr>
@@ -20429,7 +21079,7 @@
         </p:nvSpPr>
         <p:spPr>
           <a:xfrm>
-            <a:off x="7640565" y="2935812"/>
+            <a:off x="7459901" y="3681214"/>
             <a:ext cx="4294206" cy="755650"/>
           </a:xfrm>
           <a:prstGeom prst="rect">
@@ -20618,10 +21268,10 @@
       </p:sp>
       <p:sp>
         <p:nvSpPr>
-          <p:cNvPr id="8" name="Text Placeholder 13">
-            <a:extLst>
-              <a:ext uri="{FF2B5EF4-FFF2-40B4-BE49-F238E27FC236}">
-                <a16:creationId xmlns:a16="http://schemas.microsoft.com/office/drawing/2014/main" id="{7A2D1789-05D2-0353-CE04-01BA690A207F}"/>
+          <p:cNvPr id="2" name="Text Placeholder 13">
+            <a:extLst>
+              <a:ext uri="{FF2B5EF4-FFF2-40B4-BE49-F238E27FC236}">
+                <a16:creationId xmlns:a16="http://schemas.microsoft.com/office/drawing/2014/main" id="{7A0FFBC0-648E-C0AA-84B7-425281A0D9B7}"/>
               </a:ext>
             </a:extLst>
           </p:cNvPr>
@@ -20632,8 +21282,8 @@
         </p:nvSpPr>
         <p:spPr>
           <a:xfrm>
-            <a:off x="7640565" y="3694425"/>
-            <a:ext cx="4294206" cy="755650"/>
+            <a:off x="4852368" y="4511833"/>
+            <a:ext cx="5215066" cy="755650"/>
           </a:xfrm>
           <a:prstGeom prst="rect">
             <a:avLst/>
@@ -20814,215 +21464,15 @@
             </a:pPr>
             <a:r>
               <a:rPr lang="en-US" dirty="0"/>
-              <a:t>How does each State rank when comparing Alcohol Content and Bitterness?  </a:t>
-            </a:r>
-          </a:p>
-        </p:txBody>
-      </p:sp>
-      <p:sp>
-        <p:nvSpPr>
-          <p:cNvPr id="2" name="Text Placeholder 13">
-            <a:extLst>
-              <a:ext uri="{FF2B5EF4-FFF2-40B4-BE49-F238E27FC236}">
-                <a16:creationId xmlns:a16="http://schemas.microsoft.com/office/drawing/2014/main" id="{7A0FFBC0-648E-C0AA-84B7-425281A0D9B7}"/>
-              </a:ext>
-            </a:extLst>
-          </p:cNvPr>
-          <p:cNvSpPr txBox="1">
-            <a:spLocks/>
-          </p:cNvSpPr>
-          <p:nvPr/>
-        </p:nvSpPr>
-        <p:spPr>
-          <a:xfrm>
-            <a:off x="7688134" y="4439827"/>
-            <a:ext cx="4294206" cy="755650"/>
-          </a:xfrm>
-          <a:prstGeom prst="rect">
-            <a:avLst/>
-          </a:prstGeom>
-        </p:spPr>
-        <p:txBody>
-          <a:bodyPr vert="horz" lIns="91440" tIns="45720" rIns="91440" bIns="45720" rtlCol="0" anchor="ctr">
-            <a:normAutofit/>
-          </a:bodyPr>
-          <a:lstStyle>
-            <a:lvl1pPr marL="0" indent="0" algn="l" defTabSz="914400" rtl="0" eaLnBrk="1" latinLnBrk="0" hangingPunct="1">
-              <a:lnSpc>
-                <a:spcPct val="90000"/>
-              </a:lnSpc>
-              <a:spcBef>
-                <a:spcPts val="0"/>
-              </a:spcBef>
-              <a:buFont typeface="Arial" panose="020B0604020202020204" pitchFamily="34" charset="0"/>
-              <a:buNone/>
-              <a:defRPr sz="1400" b="0" i="0" kern="1200">
-                <a:solidFill>
-                  <a:schemeClr val="tx2"/>
-                </a:solidFill>
-                <a:latin typeface="+mn-lt"/>
-                <a:ea typeface="+mn-ea"/>
-                <a:cs typeface="Arial" panose="020B0604020202020204" pitchFamily="34" charset="0"/>
-              </a:defRPr>
-            </a:lvl1pPr>
-            <a:lvl2pPr marL="457200" indent="0" algn="l" defTabSz="914400" rtl="0" eaLnBrk="1" latinLnBrk="0" hangingPunct="1">
-              <a:lnSpc>
-                <a:spcPct val="90000"/>
-              </a:lnSpc>
-              <a:spcBef>
-                <a:spcPts val="500"/>
-              </a:spcBef>
-              <a:buFont typeface="Arial" panose="020B0604020202020204" pitchFamily="34" charset="0"/>
-              <a:buNone/>
-              <a:defRPr sz="1800" b="0" i="0" kern="1200">
-                <a:solidFill>
-                  <a:schemeClr val="tx2"/>
-                </a:solidFill>
-                <a:latin typeface="+mn-lt"/>
-                <a:ea typeface="+mn-ea"/>
-                <a:cs typeface="Arial" panose="020B0604020202020204" pitchFamily="34" charset="0"/>
-              </a:defRPr>
-            </a:lvl2pPr>
-            <a:lvl3pPr marL="1143000" indent="-228600" algn="l" defTabSz="914400" rtl="0" eaLnBrk="1" latinLnBrk="0" hangingPunct="1">
-              <a:lnSpc>
-                <a:spcPct val="90000"/>
-              </a:lnSpc>
-              <a:spcBef>
-                <a:spcPts val="500"/>
-              </a:spcBef>
-              <a:buFont typeface="Arial" panose="020B0604020202020204" pitchFamily="34" charset="0"/>
-              <a:buChar char="•"/>
-              <a:defRPr sz="1600" b="0" i="0" kern="1200">
-                <a:solidFill>
-                  <a:schemeClr val="tx2"/>
-                </a:solidFill>
-                <a:latin typeface="+mn-lt"/>
-                <a:ea typeface="+mn-ea"/>
-                <a:cs typeface="Arial" panose="020B0604020202020204" pitchFamily="34" charset="0"/>
-              </a:defRPr>
-            </a:lvl3pPr>
-            <a:lvl4pPr marL="1600200" indent="-228600" algn="l" defTabSz="914400" rtl="0" eaLnBrk="1" latinLnBrk="0" hangingPunct="1">
-              <a:lnSpc>
-                <a:spcPct val="90000"/>
-              </a:lnSpc>
-              <a:spcBef>
-                <a:spcPts val="500"/>
-              </a:spcBef>
-              <a:buFont typeface="Arial" panose="020B0604020202020204" pitchFamily="34" charset="0"/>
-              <a:buChar char="•"/>
-              <a:defRPr sz="1400" b="0" i="0" kern="1200">
-                <a:solidFill>
-                  <a:schemeClr val="tx2"/>
-                </a:solidFill>
-                <a:latin typeface="+mn-lt"/>
-                <a:ea typeface="+mn-ea"/>
-                <a:cs typeface="Arial" panose="020B0604020202020204" pitchFamily="34" charset="0"/>
-              </a:defRPr>
-            </a:lvl4pPr>
-            <a:lvl5pPr marL="2057400" indent="-228600" algn="l" defTabSz="914400" rtl="0" eaLnBrk="1" latinLnBrk="0" hangingPunct="1">
-              <a:lnSpc>
-                <a:spcPct val="90000"/>
-              </a:lnSpc>
-              <a:spcBef>
-                <a:spcPts val="500"/>
-              </a:spcBef>
-              <a:buFont typeface="Arial" panose="020B0604020202020204" pitchFamily="34" charset="0"/>
-              <a:buChar char="•"/>
-              <a:defRPr sz="1400" b="0" i="0" kern="1200">
-                <a:solidFill>
-                  <a:schemeClr val="tx2"/>
-                </a:solidFill>
-                <a:latin typeface="+mn-lt"/>
-                <a:ea typeface="+mn-ea"/>
-                <a:cs typeface="Arial" panose="020B0604020202020204" pitchFamily="34" charset="0"/>
-              </a:defRPr>
-            </a:lvl5pPr>
-            <a:lvl6pPr marL="2514600" indent="-228600" algn="l" defTabSz="914400" rtl="0" eaLnBrk="1" latinLnBrk="0" hangingPunct="1">
-              <a:lnSpc>
-                <a:spcPct val="90000"/>
-              </a:lnSpc>
-              <a:spcBef>
-                <a:spcPts val="500"/>
-              </a:spcBef>
-              <a:buFont typeface="Arial" panose="020B0604020202020204" pitchFamily="34" charset="0"/>
-              <a:buChar char="•"/>
-              <a:defRPr sz="1800" kern="1200">
-                <a:solidFill>
-                  <a:schemeClr val="tx1"/>
-                </a:solidFill>
-                <a:latin typeface="+mn-lt"/>
-                <a:ea typeface="+mn-ea"/>
-                <a:cs typeface="+mn-cs"/>
-              </a:defRPr>
-            </a:lvl6pPr>
-            <a:lvl7pPr marL="2971800" indent="-228600" algn="l" defTabSz="914400" rtl="0" eaLnBrk="1" latinLnBrk="0" hangingPunct="1">
-              <a:lnSpc>
-                <a:spcPct val="90000"/>
-              </a:lnSpc>
-              <a:spcBef>
-                <a:spcPts val="500"/>
-              </a:spcBef>
-              <a:buFont typeface="Arial" panose="020B0604020202020204" pitchFamily="34" charset="0"/>
-              <a:buChar char="•"/>
-              <a:defRPr sz="1800" kern="1200">
-                <a:solidFill>
-                  <a:schemeClr val="tx1"/>
-                </a:solidFill>
-                <a:latin typeface="+mn-lt"/>
-                <a:ea typeface="+mn-ea"/>
-                <a:cs typeface="+mn-cs"/>
-              </a:defRPr>
-            </a:lvl7pPr>
-            <a:lvl8pPr marL="3429000" indent="-228600" algn="l" defTabSz="914400" rtl="0" eaLnBrk="1" latinLnBrk="0" hangingPunct="1">
-              <a:lnSpc>
-                <a:spcPct val="90000"/>
-              </a:lnSpc>
-              <a:spcBef>
-                <a:spcPts val="500"/>
-              </a:spcBef>
-              <a:buFont typeface="Arial" panose="020B0604020202020204" pitchFamily="34" charset="0"/>
-              <a:buChar char="•"/>
-              <a:defRPr sz="1800" kern="1200">
-                <a:solidFill>
-                  <a:schemeClr val="tx1"/>
-                </a:solidFill>
-                <a:latin typeface="+mn-lt"/>
-                <a:ea typeface="+mn-ea"/>
-                <a:cs typeface="+mn-cs"/>
-              </a:defRPr>
-            </a:lvl8pPr>
-            <a:lvl9pPr marL="3886200" indent="-228600" algn="l" defTabSz="914400" rtl="0" eaLnBrk="1" latinLnBrk="0" hangingPunct="1">
-              <a:lnSpc>
-                <a:spcPct val="90000"/>
-              </a:lnSpc>
-              <a:spcBef>
-                <a:spcPts val="500"/>
-              </a:spcBef>
-              <a:buFont typeface="Arial" panose="020B0604020202020204" pitchFamily="34" charset="0"/>
-              <a:buChar char="•"/>
-              <a:defRPr sz="1800" kern="1200">
-                <a:solidFill>
-                  <a:schemeClr val="tx1"/>
-                </a:solidFill>
-                <a:latin typeface="+mn-lt"/>
-                <a:ea typeface="+mn-ea"/>
-                <a:cs typeface="+mn-cs"/>
-              </a:defRPr>
-            </a:lvl9pPr>
-          </a:lstStyle>
-          <a:p>
-            <a:pPr marL="285750" indent="-285750">
-              <a:buFont typeface="Wingdings" pitchFamily="2" charset="2"/>
-              <a:buChar char="v"/>
-            </a:pPr>
-            <a:r>
-              <a:rPr lang="en-US" dirty="0"/>
-              <a:t>Additional modeling that we found exciting. </a:t>
+              <a:t>Lastly, additional modeling that we found to be useful and exciting. </a:t>
             </a:r>
           </a:p>
         </p:txBody>
       </p:sp>
     </p:spTree>
+    <p:custDataLst>
+      <p:tags r:id="rId1"/>
+    </p:custDataLst>
     <p:extLst>
       <p:ext uri="{BB962C8B-B14F-4D97-AF65-F5344CB8AC3E}">
         <p14:creationId xmlns:p14="http://schemas.microsoft.com/office/powerpoint/2010/main" val="3073952723"/>
@@ -21066,7 +21516,7 @@
                                           </p:stCondLst>
                                         </p:cTn>
                                         <p:tgtEl>
-                                          <p:spTgt spid="10">
+                                          <p:spTgt spid="12">
                                             <p:txEl>
                                               <p:pRg st="0" end="0"/>
                                             </p:txEl>
@@ -21115,7 +21565,7 @@
                                           </p:stCondLst>
                                         </p:cTn>
                                         <p:tgtEl>
-                                          <p:spTgt spid="14">
+                                          <p:spTgt spid="10">
                                             <p:txEl>
                                               <p:pRg st="0" end="0"/>
                                             </p:txEl>
@@ -21213,7 +21663,7 @@
                                           </p:stCondLst>
                                         </p:cTn>
                                         <p:tgtEl>
-                                          <p:spTgt spid="15">
+                                          <p:spTgt spid="14">
                                             <p:txEl>
                                               <p:pRg st="0" end="0"/>
                                             </p:txEl>
@@ -21262,7 +21712,11 @@
                                           </p:stCondLst>
                                         </p:cTn>
                                         <p:tgtEl>
-                                          <p:spTgt spid="6"/>
+                                          <p:spTgt spid="15">
+                                            <p:txEl>
+                                              <p:pRg st="0" end="0"/>
+                                            </p:txEl>
+                                          </p:spTgt>
                                         </p:tgtEl>
                                         <p:attrNameLst>
                                           <p:attrName>style.visibility</p:attrName>
@@ -21307,7 +21761,7 @@
                                           </p:stCondLst>
                                         </p:cTn>
                                         <p:tgtEl>
-                                          <p:spTgt spid="8"/>
+                                          <p:spTgt spid="6"/>
                                         </p:tgtEl>
                                         <p:attrNameLst>
                                           <p:attrName>style.visibility</p:attrName>
@@ -21394,11 +21848,11 @@
     </p:tnLst>
     <p:bldLst>
       <p:bldP spid="10" grpId="0" build="p"/>
+      <p:bldP spid="12" grpId="0" build="p"/>
       <p:bldP spid="13" grpId="0" build="p"/>
       <p:bldP spid="14" grpId="0" build="p"/>
       <p:bldP spid="15" grpId="0" build="p"/>
       <p:bldP spid="6" grpId="0"/>
-      <p:bldP spid="8" grpId="0"/>
       <p:bldP spid="2" grpId="0"/>
     </p:bldLst>
   </p:timing>
@@ -21618,7 +22072,7 @@
                 <a:latin typeface="Times New Roman" panose="02020603050405020304" pitchFamily="18" charset="0"/>
                 <a:cs typeface="Times New Roman" panose="02020603050405020304" pitchFamily="18" charset="0"/>
               </a:rPr>
-              <a:t>So…with the duplicates merged, we are confident that there are </a:t>
+              <a:t>So…with the duplicates merged, we can confidently break down all </a:t>
             </a:r>
             <a:r>
               <a:rPr lang="en-US" sz="1600" b="1" dirty="0">
@@ -21628,49 +22082,53 @@
               <a:t>551 breweries </a:t>
             </a:r>
             <a:r>
+              <a:rPr lang="en-US" sz="1600" dirty="0">
+                <a:latin typeface="Times New Roman" panose="02020603050405020304" pitchFamily="18" charset="0"/>
+                <a:cs typeface="Times New Roman" panose="02020603050405020304" pitchFamily="18" charset="0"/>
+              </a:rPr>
+              <a:t>down by State.  </a:t>
+            </a:r>
+            <a:endParaRPr lang="en-US" dirty="0">
+              <a:latin typeface="Times New Roman" panose="02020603050405020304" pitchFamily="18" charset="0"/>
+              <a:cs typeface="Times New Roman" panose="02020603050405020304" pitchFamily="18" charset="0"/>
+            </a:endParaRPr>
+          </a:p>
+        </p:txBody>
+      </p:sp>
+      <p:sp>
+        <p:nvSpPr>
+          <p:cNvPr id="7" name="Text Placeholder 6">
+            <a:extLst>
+              <a:ext uri="{FF2B5EF4-FFF2-40B4-BE49-F238E27FC236}">
+                <a16:creationId xmlns:a16="http://schemas.microsoft.com/office/drawing/2014/main" id="{87FCC6D1-213C-4A86-A2D0-742E15438C09}"/>
+              </a:ext>
+            </a:extLst>
+          </p:cNvPr>
+          <p:cNvSpPr>
+            <a:spLocks noGrp="1"/>
+          </p:cNvSpPr>
+          <p:nvPr>
+            <p:ph type="body" sz="quarter" idx="11"/>
+          </p:nvPr>
+        </p:nvSpPr>
+        <p:spPr>
+          <a:xfrm>
+            <a:off x="7718322" y="1100289"/>
+            <a:ext cx="3977648" cy="731694"/>
+          </a:xfrm>
+        </p:spPr>
+        <p:txBody>
+          <a:bodyPr>
+            <a:normAutofit lnSpcReduction="10000"/>
+          </a:bodyPr>
+          <a:lstStyle/>
+          <a:p>
+            <a:r>
               <a:rPr lang="en-US" dirty="0">
                 <a:latin typeface="Times New Roman" panose="02020603050405020304" pitchFamily="18" charset="0"/>
                 <a:cs typeface="Times New Roman" panose="02020603050405020304" pitchFamily="18" charset="0"/>
               </a:rPr>
-              <a:t>within the United States.  </a:t>
-            </a:r>
-          </a:p>
-        </p:txBody>
-      </p:sp>
-      <p:sp>
-        <p:nvSpPr>
-          <p:cNvPr id="7" name="Text Placeholder 6">
-            <a:extLst>
-              <a:ext uri="{FF2B5EF4-FFF2-40B4-BE49-F238E27FC236}">
-                <a16:creationId xmlns:a16="http://schemas.microsoft.com/office/drawing/2014/main" id="{87FCC6D1-213C-4A86-A2D0-742E15438C09}"/>
-              </a:ext>
-            </a:extLst>
-          </p:cNvPr>
-          <p:cNvSpPr>
-            <a:spLocks noGrp="1"/>
-          </p:cNvSpPr>
-          <p:nvPr>
-            <p:ph type="body" sz="quarter" idx="11"/>
-          </p:nvPr>
-        </p:nvSpPr>
-        <p:spPr>
-          <a:xfrm>
-            <a:off x="7718322" y="1100289"/>
-            <a:ext cx="3977648" cy="731694"/>
-          </a:xfrm>
-        </p:spPr>
-        <p:txBody>
-          <a:bodyPr>
-            <a:normAutofit lnSpcReduction="10000"/>
-          </a:bodyPr>
-          <a:lstStyle/>
-          <a:p>
-            <a:r>
-              <a:rPr lang="en-US" dirty="0">
-                <a:latin typeface="Times New Roman" panose="02020603050405020304" pitchFamily="18" charset="0"/>
-                <a:cs typeface="Times New Roman" panose="02020603050405020304" pitchFamily="18" charset="0"/>
-              </a:rPr>
-              <a:t>On initial investigation, it appeared that according to the data, there are </a:t>
+              <a:t>On initial investigation, it appeared that the data represented </a:t>
             </a:r>
             <a:r>
               <a:rPr lang="en-US" sz="1600" b="1" dirty="0">
@@ -21727,7 +22185,7 @@
                 <a:latin typeface="Times New Roman" panose="02020603050405020304" pitchFamily="18" charset="0"/>
                 <a:cs typeface="Times New Roman" panose="02020603050405020304" pitchFamily="18" charset="0"/>
               </a:rPr>
-              <a:t>However, when we went to break down the number of breweries per State, we found that there were 7 breweries that had duplicate IDs.  </a:t>
+              <a:t>However, when we went to break down the number of breweries per State, we discovered that there were 7 breweries that had duplicate IDs.  </a:t>
             </a:r>
           </a:p>
         </p:txBody>
@@ -23700,8 +24158,8 @@
         </p:blipFill>
         <p:spPr>
           <a:xfrm>
-            <a:off x="254000" y="3355993"/>
-            <a:ext cx="7289800" cy="3259757"/>
+            <a:off x="153580" y="3355993"/>
+            <a:ext cx="7390219" cy="3304661"/>
           </a:xfrm>
           <a:prstGeom prst="rect">
             <a:avLst/>
@@ -24223,46 +24681,12 @@
           <a:chExt cx="0" cy="0"/>
         </a:xfrm>
       </p:grpSpPr>
-      <p:sp>
-        <p:nvSpPr>
-          <p:cNvPr id="11" name="Title 1">
-            <a:extLst>
-              <a:ext uri="{FF2B5EF4-FFF2-40B4-BE49-F238E27FC236}">
-                <a16:creationId xmlns:a16="http://schemas.microsoft.com/office/drawing/2014/main" id="{4993CC0D-EF5A-5917-3084-86B71BBD6E8F}"/>
-              </a:ext>
-            </a:extLst>
-          </p:cNvPr>
-          <p:cNvSpPr>
-            <a:spLocks noGrp="1"/>
-          </p:cNvSpPr>
-          <p:nvPr>
-            <p:ph type="title"/>
-          </p:nvPr>
-        </p:nvSpPr>
-        <p:spPr>
-          <a:xfrm>
-            <a:off x="671500" y="120797"/>
-            <a:ext cx="11380800" cy="876335"/>
-          </a:xfrm>
-        </p:spPr>
-        <p:txBody>
-          <a:bodyPr anchor="t"/>
-          <a:lstStyle/>
-          <a:p>
-            <a:pPr algn="ctr"/>
-            <a:r>
-              <a:rPr lang="en-US" dirty="0"/>
-              <a:t>Median ABV and IBU Value by State</a:t>
-            </a:r>
-          </a:p>
-        </p:txBody>
-      </p:sp>
       <p:pic>
         <p:nvPicPr>
-          <p:cNvPr id="22" name="Picture Placeholder 21" descr="Map&#10;&#10;Description automatically generated">
-            <a:extLst>
-              <a:ext uri="{FF2B5EF4-FFF2-40B4-BE49-F238E27FC236}">
-                <a16:creationId xmlns:a16="http://schemas.microsoft.com/office/drawing/2014/main" id="{D026E106-037F-E9F9-9ED9-B2166DAFF4CF}"/>
+          <p:cNvPr id="5" name="Picture Placeholder 4">
+            <a:extLst>
+              <a:ext uri="{FF2B5EF4-FFF2-40B4-BE49-F238E27FC236}">
+                <a16:creationId xmlns:a16="http://schemas.microsoft.com/office/drawing/2014/main" id="{CE35679F-63D8-52CC-8101-BFAB4BEB8899}"/>
               </a:ext>
             </a:extLst>
           </p:cNvPr>
@@ -24281,17 +24705,169 @@
         </p:blipFill>
         <p:spPr>
           <a:xfrm>
-            <a:off x="307000" y="880930"/>
-            <a:ext cx="5659800" cy="3612968"/>
-          </a:xfrm>
+            <a:off x="728773" y="1447798"/>
+            <a:ext cx="8137815" cy="5194825"/>
+          </a:xfrm>
+          <a:prstGeom prst="rect">
+            <a:avLst/>
+          </a:prstGeom>
         </p:spPr>
       </p:pic>
       <p:sp>
         <p:nvSpPr>
-          <p:cNvPr id="23" name="5-Point Star 22">
-            <a:extLst>
-              <a:ext uri="{FF2B5EF4-FFF2-40B4-BE49-F238E27FC236}">
-                <a16:creationId xmlns:a16="http://schemas.microsoft.com/office/drawing/2014/main" id="{FCA6505D-20D7-5015-86BE-A8929A960A44}"/>
+          <p:cNvPr id="4" name="Title 3">
+            <a:extLst>
+              <a:ext uri="{FF2B5EF4-FFF2-40B4-BE49-F238E27FC236}">
+                <a16:creationId xmlns:a16="http://schemas.microsoft.com/office/drawing/2014/main" id="{7194412D-F8B8-00D8-A0B3-C986C64670A5}"/>
+              </a:ext>
+            </a:extLst>
+          </p:cNvPr>
+          <p:cNvSpPr>
+            <a:spLocks noGrp="1"/>
+          </p:cNvSpPr>
+          <p:nvPr>
+            <p:ph type="title"/>
+          </p:nvPr>
+        </p:nvSpPr>
+        <p:spPr>
+          <a:xfrm>
+            <a:off x="728773" y="56809"/>
+            <a:ext cx="11272727" cy="1251291"/>
+          </a:xfrm>
+          <a:noFill/>
+        </p:spPr>
+        <p:txBody>
+          <a:bodyPr anchor="ctr"/>
+          <a:lstStyle/>
+          <a:p>
+            <a:pPr algn="ctr"/>
+            <a:r>
+              <a:rPr lang="en-US" dirty="0"/>
+              <a:t>Alcohol by Volume (ABV) Statistics</a:t>
+            </a:r>
+          </a:p>
+        </p:txBody>
+      </p:sp>
+      <p:sp>
+        <p:nvSpPr>
+          <p:cNvPr id="7" name="TextBox 6">
+            <a:extLst>
+              <a:ext uri="{FF2B5EF4-FFF2-40B4-BE49-F238E27FC236}">
+                <a16:creationId xmlns:a16="http://schemas.microsoft.com/office/drawing/2014/main" id="{71BF70B1-C1C1-495B-5488-3F45F154CF1D}"/>
+              </a:ext>
+            </a:extLst>
+          </p:cNvPr>
+          <p:cNvSpPr txBox="1"/>
+          <p:nvPr/>
+        </p:nvSpPr>
+        <p:spPr>
+          <a:xfrm>
+            <a:off x="8866588" y="1587500"/>
+            <a:ext cx="2753912" cy="1938992"/>
+          </a:xfrm>
+          <a:prstGeom prst="rect">
+            <a:avLst/>
+          </a:prstGeom>
+          <a:noFill/>
+        </p:spPr>
+        <p:txBody>
+          <a:bodyPr wrap="square" rtlCol="0">
+            <a:spAutoFit/>
+          </a:bodyPr>
+          <a:lstStyle/>
+          <a:p>
+            <a:pPr marL="285750" indent="-285750">
+              <a:buFont typeface="Arial" panose="020B0604020202020204" pitchFamily="34" charset="0"/>
+              <a:buChar char="•"/>
+            </a:pPr>
+            <a:r>
+              <a:rPr lang="en-US" sz="2400" dirty="0"/>
+              <a:t>Avg ~ 6.0%</a:t>
+            </a:r>
+          </a:p>
+          <a:p>
+            <a:pPr marL="285750" indent="-285750">
+              <a:buFont typeface="Arial" panose="020B0604020202020204" pitchFamily="34" charset="0"/>
+              <a:buChar char="•"/>
+            </a:pPr>
+            <a:r>
+              <a:rPr lang="en-US" sz="2400" dirty="0"/>
+              <a:t>Median ~ 5.6%</a:t>
+            </a:r>
+          </a:p>
+          <a:p>
+            <a:pPr marL="285750" indent="-285750">
+              <a:buFont typeface="Arial" panose="020B0604020202020204" pitchFamily="34" charset="0"/>
+              <a:buChar char="•"/>
+            </a:pPr>
+            <a:r>
+              <a:rPr lang="en-US" sz="2400" dirty="0"/>
+              <a:t>Std. Dev ~ 1.0%</a:t>
+            </a:r>
+          </a:p>
+          <a:p>
+            <a:pPr marL="285750" indent="-285750">
+              <a:buFont typeface="Arial" panose="020B0604020202020204" pitchFamily="34" charset="0"/>
+              <a:buChar char="•"/>
+            </a:pPr>
+            <a:r>
+              <a:rPr lang="en-US" sz="2400" dirty="0"/>
+              <a:t>Min ~  0.1%</a:t>
+            </a:r>
+          </a:p>
+          <a:p>
+            <a:pPr marL="285750" indent="-285750">
+              <a:buFont typeface="Arial" panose="020B0604020202020204" pitchFamily="34" charset="0"/>
+              <a:buChar char="•"/>
+            </a:pPr>
+            <a:r>
+              <a:rPr lang="en-US" sz="2400" dirty="0"/>
+              <a:t>Max ~ 12.8%</a:t>
+            </a:r>
+          </a:p>
+        </p:txBody>
+      </p:sp>
+      <p:sp>
+        <p:nvSpPr>
+          <p:cNvPr id="8" name="TextBox 7">
+            <a:extLst>
+              <a:ext uri="{FF2B5EF4-FFF2-40B4-BE49-F238E27FC236}">
+                <a16:creationId xmlns:a16="http://schemas.microsoft.com/office/drawing/2014/main" id="{F43DB58D-EC21-4EA9-CE95-784BC0C25505}"/>
+              </a:ext>
+            </a:extLst>
+          </p:cNvPr>
+          <p:cNvSpPr txBox="1"/>
+          <p:nvPr/>
+        </p:nvSpPr>
+        <p:spPr>
+          <a:xfrm>
+            <a:off x="9029700" y="4089400"/>
+            <a:ext cx="2324100" cy="1477328"/>
+          </a:xfrm>
+          <a:prstGeom prst="rect">
+            <a:avLst/>
+          </a:prstGeom>
+          <a:noFill/>
+        </p:spPr>
+        <p:txBody>
+          <a:bodyPr wrap="square" rtlCol="0">
+            <a:spAutoFit/>
+          </a:bodyPr>
+          <a:lstStyle/>
+          <a:p>
+            <a:r>
+              <a:rPr lang="en-US" b="1" i="1" dirty="0"/>
+              <a:t>For comparison, Bud Light has an ABV of 4.2% while Budweiser has around a 5.0%</a:t>
+            </a:r>
+          </a:p>
+        </p:txBody>
+      </p:sp>
+      <p:sp>
+        <p:nvSpPr>
+          <p:cNvPr id="9" name="Star: 5 Points 8">
+            <a:extLst>
+              <a:ext uri="{FF2B5EF4-FFF2-40B4-BE49-F238E27FC236}">
+                <a16:creationId xmlns:a16="http://schemas.microsoft.com/office/drawing/2014/main" id="{7DD272CA-2026-6ACE-B207-0790B204C397}"/>
               </a:ext>
             </a:extLst>
           </p:cNvPr>
@@ -24300,15 +24876,11 @@
         </p:nvSpPr>
         <p:spPr>
           <a:xfrm>
-            <a:off x="2057400" y="2389915"/>
-            <a:ext cx="292100" cy="241300"/>
+            <a:off x="3697224" y="4669568"/>
+            <a:ext cx="525824" cy="316992"/>
           </a:xfrm>
           <a:prstGeom prst="star5">
-            <a:avLst>
-              <a:gd name="adj" fmla="val 22448"/>
-              <a:gd name="hf" fmla="val 105146"/>
-              <a:gd name="vf" fmla="val 110557"/>
-            </a:avLst>
+            <a:avLst/>
           </a:prstGeom>
           <a:solidFill>
             <a:srgbClr val="FFFF00"/>
@@ -24339,198 +24911,79 @@
           </a:p>
         </p:txBody>
       </p:sp>
-      <p:sp>
-        <p:nvSpPr>
-          <p:cNvPr id="24" name="TextBox 23">
-            <a:extLst>
-              <a:ext uri="{FF2B5EF4-FFF2-40B4-BE49-F238E27FC236}">
-                <a16:creationId xmlns:a16="http://schemas.microsoft.com/office/drawing/2014/main" id="{00BAE97A-299B-A5BC-C162-B2818B355A02}"/>
-              </a:ext>
-            </a:extLst>
-          </p:cNvPr>
-          <p:cNvSpPr txBox="1"/>
+      <p:cxnSp>
+        <p:nvCxnSpPr>
+          <p:cNvPr id="11" name="Straight Connector 10">
+            <a:extLst>
+              <a:ext uri="{FF2B5EF4-FFF2-40B4-BE49-F238E27FC236}">
+                <a16:creationId xmlns:a16="http://schemas.microsoft.com/office/drawing/2014/main" id="{B8768B03-86F7-7DF4-6B4B-D07D3136E443}"/>
+              </a:ext>
+            </a:extLst>
+          </p:cNvPr>
+          <p:cNvCxnSpPr>
+            <a:cxnSpLocks/>
+          </p:cNvCxnSpPr>
           <p:nvPr/>
-        </p:nvSpPr>
-        <p:spPr>
-          <a:xfrm>
-            <a:off x="307000" y="5196440"/>
-            <a:ext cx="5664200" cy="923330"/>
+        </p:nvCxnSpPr>
+        <p:spPr>
+          <a:xfrm>
+            <a:off x="4535424" y="1975104"/>
+            <a:ext cx="0" cy="4229243"/>
+          </a:xfrm>
+          <a:prstGeom prst="line">
+            <a:avLst/>
+          </a:prstGeom>
+          <a:ln w="57150" cap="flat" cmpd="sng" algn="ctr">
+            <a:solidFill>
+              <a:srgbClr val="00B0F0"/>
+            </a:solidFill>
+            <a:prstDash val="dash"/>
+            <a:round/>
+            <a:headEnd type="none" w="med" len="med"/>
+            <a:tailEnd type="none" w="med" len="med"/>
+          </a:ln>
+        </p:spPr>
+        <p:style>
+          <a:lnRef idx="0">
+            <a:scrgbClr r="0" g="0" b="0"/>
+          </a:lnRef>
+          <a:fillRef idx="0">
+            <a:scrgbClr r="0" g="0" b="0"/>
+          </a:fillRef>
+          <a:effectRef idx="0">
+            <a:scrgbClr r="0" g="0" b="0"/>
+          </a:effectRef>
+          <a:fontRef idx="minor">
+            <a:schemeClr val="tx1"/>
+          </a:fontRef>
+        </p:style>
+      </p:cxnSp>
+      <p:sp>
+        <p:nvSpPr>
+          <p:cNvPr id="14" name="Rectangle 13">
+            <a:extLst>
+              <a:ext uri="{FF2B5EF4-FFF2-40B4-BE49-F238E27FC236}">
+                <a16:creationId xmlns:a16="http://schemas.microsoft.com/office/drawing/2014/main" id="{D6B99FED-E2A3-5166-88E8-6FEC0944A12D}"/>
+              </a:ext>
+            </a:extLst>
+          </p:cNvPr>
+          <p:cNvSpPr/>
+          <p:nvPr/>
+        </p:nvSpPr>
+        <p:spPr>
+          <a:xfrm>
+            <a:off x="7888224" y="3681984"/>
+            <a:ext cx="816862" cy="682752"/>
           </a:xfrm>
           <a:prstGeom prst="rect">
             <a:avLst/>
           </a:prstGeom>
-          <a:noFill/>
-        </p:spPr>
-        <p:txBody>
-          <a:bodyPr wrap="square" rtlCol="0">
-            <a:spAutoFit/>
-          </a:bodyPr>
-          <a:lstStyle/>
-          <a:p>
-            <a:r>
-              <a:rPr lang="en-US" b="1" dirty="0"/>
-              <a:t>The most alcoholic beer in the dataset is from Colorado. It is a Belgian </a:t>
-            </a:r>
-            <a:r>
-              <a:rPr lang="en-US" b="1" dirty="0" err="1"/>
-              <a:t>Quadrupel</a:t>
-            </a:r>
-            <a:r>
-              <a:rPr lang="en-US" b="1" dirty="0"/>
-              <a:t> with a 12.8% ABV </a:t>
-            </a:r>
-            <a:endParaRPr lang="en-US" dirty="0"/>
-          </a:p>
-        </p:txBody>
-      </p:sp>
-      <p:sp>
-        <p:nvSpPr>
-          <p:cNvPr id="25" name="TextBox 24">
-            <a:extLst>
-              <a:ext uri="{FF2B5EF4-FFF2-40B4-BE49-F238E27FC236}">
-                <a16:creationId xmlns:a16="http://schemas.microsoft.com/office/drawing/2014/main" id="{E3776241-9601-4323-9746-6A8E0AEB86F2}"/>
-              </a:ext>
-            </a:extLst>
-          </p:cNvPr>
-          <p:cNvSpPr txBox="1"/>
-          <p:nvPr/>
-        </p:nvSpPr>
-        <p:spPr>
-          <a:xfrm>
-            <a:off x="6239848" y="939090"/>
-            <a:ext cx="5122504" cy="2031325"/>
-          </a:xfrm>
-          <a:prstGeom prst="rect">
-            <a:avLst/>
-          </a:prstGeom>
-          <a:noFill/>
-        </p:spPr>
-        <p:txBody>
-          <a:bodyPr wrap="square" rtlCol="0">
-            <a:spAutoFit/>
-          </a:bodyPr>
-          <a:lstStyle/>
-          <a:p>
-            <a:pPr marL="285750" indent="-285750">
-              <a:buFont typeface="Arial" panose="020B0604020202020204" pitchFamily="34" charset="0"/>
-              <a:buChar char="•"/>
-            </a:pPr>
-            <a:r>
-              <a:rPr lang="en-US" dirty="0"/>
-              <a:t>There is not an excessive variation in median ABV across the states.</a:t>
-            </a:r>
-          </a:p>
-          <a:p>
-            <a:pPr marL="285750" indent="-285750">
-              <a:buFont typeface="Arial" panose="020B0604020202020204" pitchFamily="34" charset="0"/>
-              <a:buChar char="•"/>
-            </a:pPr>
-            <a:r>
-              <a:rPr lang="en-US" dirty="0"/>
-              <a:t>The notable exception to this is the much lower median ABV for Utah.</a:t>
-            </a:r>
-          </a:p>
-          <a:p>
-            <a:pPr marL="742950" lvl="1" indent="-285750">
-              <a:buFont typeface="Arial" panose="020B0604020202020204" pitchFamily="34" charset="0"/>
-              <a:buChar char="•"/>
-            </a:pPr>
-            <a:r>
-              <a:rPr lang="en-US" dirty="0"/>
-              <a:t>This abnormality may be an artifact of the state laws. ABV of all beer sold in Utah was previously limited to 3.2%.</a:t>
-            </a:r>
-          </a:p>
-        </p:txBody>
-      </p:sp>
-      <p:pic>
-        <p:nvPicPr>
-          <p:cNvPr id="27" name="Picture 26">
-            <a:extLst>
-              <a:ext uri="{FF2B5EF4-FFF2-40B4-BE49-F238E27FC236}">
-                <a16:creationId xmlns:a16="http://schemas.microsoft.com/office/drawing/2014/main" id="{B136E2BB-9621-AE7B-9829-F3B9D6AE5800}"/>
-              </a:ext>
-            </a:extLst>
-          </p:cNvPr>
-          <p:cNvPicPr>
-            <a:picLocks noChangeAspect="1"/>
-          </p:cNvPicPr>
-          <p:nvPr/>
-        </p:nvPicPr>
-        <p:blipFill>
-          <a:blip r:embed="rId4"/>
-          <a:stretch>
-            <a:fillRect/>
-          </a:stretch>
-        </p:blipFill>
-        <p:spPr>
-          <a:xfrm>
-            <a:off x="5971200" y="880930"/>
-            <a:ext cx="5659800" cy="3612968"/>
-          </a:xfrm>
-          <a:prstGeom prst="rect">
-            <a:avLst/>
-          </a:prstGeom>
-        </p:spPr>
-      </p:pic>
-      <p:sp>
-        <p:nvSpPr>
-          <p:cNvPr id="28" name="TextBox 27">
-            <a:extLst>
-              <a:ext uri="{FF2B5EF4-FFF2-40B4-BE49-F238E27FC236}">
-                <a16:creationId xmlns:a16="http://schemas.microsoft.com/office/drawing/2014/main" id="{45B306BB-7395-CE48-7CD6-E05449D49DBB}"/>
-              </a:ext>
-            </a:extLst>
-          </p:cNvPr>
-          <p:cNvSpPr txBox="1"/>
-          <p:nvPr/>
-        </p:nvSpPr>
-        <p:spPr>
-          <a:xfrm>
-            <a:off x="6220802" y="5196440"/>
-            <a:ext cx="4764698" cy="923330"/>
-          </a:xfrm>
-          <a:prstGeom prst="rect">
-            <a:avLst/>
-          </a:prstGeom>
-          <a:noFill/>
-        </p:spPr>
-        <p:txBody>
-          <a:bodyPr wrap="square" rtlCol="0">
-            <a:spAutoFit/>
-          </a:bodyPr>
-          <a:lstStyle/>
-          <a:p>
-            <a:r>
-              <a:rPr lang="en-US" b="1" dirty="0"/>
-              <a:t>The most bitter beer is called “Bitter Bitch Imperial IPA”, which is from Oregon and has 138 IBU.</a:t>
-            </a:r>
-            <a:endParaRPr lang="en-US" dirty="0"/>
-          </a:p>
-        </p:txBody>
-      </p:sp>
-      <p:sp>
-        <p:nvSpPr>
-          <p:cNvPr id="29" name="5-Point Star 28">
-            <a:extLst>
-              <a:ext uri="{FF2B5EF4-FFF2-40B4-BE49-F238E27FC236}">
-                <a16:creationId xmlns:a16="http://schemas.microsoft.com/office/drawing/2014/main" id="{71856EAB-6CB8-0174-5EEF-B62EB483F216}"/>
-              </a:ext>
-            </a:extLst>
-          </p:cNvPr>
-          <p:cNvSpPr/>
-          <p:nvPr/>
-        </p:nvSpPr>
-        <p:spPr>
-          <a:xfrm>
-            <a:off x="6680200" y="1755442"/>
-            <a:ext cx="228600" cy="238458"/>
-          </a:xfrm>
-          <a:prstGeom prst="star5">
-            <a:avLst/>
-          </a:prstGeom>
           <a:solidFill>
-            <a:srgbClr val="FF0000"/>
+            <a:schemeClr val="bg1"/>
           </a:solidFill>
+          <a:ln>
+            <a:noFill/>
+          </a:ln>
         </p:spPr>
         <p:style>
           <a:lnRef idx="2">
@@ -24557,787 +25010,147 @@
           </a:p>
         </p:txBody>
       </p:sp>
-      <p:sp>
-        <p:nvSpPr>
-          <p:cNvPr id="30" name="TextBox 29">
-            <a:extLst>
-              <a:ext uri="{FF2B5EF4-FFF2-40B4-BE49-F238E27FC236}">
-                <a16:creationId xmlns:a16="http://schemas.microsoft.com/office/drawing/2014/main" id="{AAC5B41B-188B-3B14-B382-396EC33E3588}"/>
-              </a:ext>
-            </a:extLst>
-          </p:cNvPr>
-          <p:cNvSpPr txBox="1"/>
+      <p:cxnSp>
+        <p:nvCxnSpPr>
+          <p:cNvPr id="15" name="Straight Connector 14">
+            <a:extLst>
+              <a:ext uri="{FF2B5EF4-FFF2-40B4-BE49-F238E27FC236}">
+                <a16:creationId xmlns:a16="http://schemas.microsoft.com/office/drawing/2014/main" id="{EB3B1885-1AE5-D7E0-7B26-53FE276C8C00}"/>
+              </a:ext>
+            </a:extLst>
+          </p:cNvPr>
+          <p:cNvCxnSpPr>
+            <a:cxnSpLocks/>
+          </p:cNvCxnSpPr>
           <p:nvPr/>
-        </p:nvSpPr>
-        <p:spPr>
-          <a:xfrm>
-            <a:off x="307000" y="4605877"/>
-            <a:ext cx="10299700" cy="646331"/>
-          </a:xfrm>
-          <a:prstGeom prst="rect">
+        </p:nvCxnSpPr>
+        <p:spPr>
+          <a:xfrm>
+            <a:off x="4243622" y="1975104"/>
+            <a:ext cx="0" cy="4229243"/>
+          </a:xfrm>
+          <a:prstGeom prst="line">
             <a:avLst/>
           </a:prstGeom>
-          <a:noFill/>
-        </p:spPr>
-        <p:txBody>
-          <a:bodyPr wrap="square" rtlCol="0">
-            <a:spAutoFit/>
-          </a:bodyPr>
-          <a:lstStyle/>
-          <a:p>
-            <a:r>
-              <a:rPr lang="en-US" dirty="0"/>
-              <a:t>Though the heat maps provide a great visualization of ABV and IBU medians, we must recognize that some states like West Virginia and Delaware only had 2 observations. </a:t>
-            </a:r>
-          </a:p>
-        </p:txBody>
-      </p:sp>
-    </p:spTree>
-    <p:extLst>
-      <p:ext uri="{BB962C8B-B14F-4D97-AF65-F5344CB8AC3E}">
-        <p14:creationId xmlns:p14="http://schemas.microsoft.com/office/powerpoint/2010/main" val="1721731148"/>
-      </p:ext>
-    </p:extLst>
-  </p:cSld>
-  <p:clrMapOvr>
-    <a:masterClrMapping/>
-  </p:clrMapOvr>
-  <p:timing>
-    <p:tnLst>
-      <p:par>
-        <p:cTn id="1" dur="indefinite" restart="never" nodeType="tmRoot">
-          <p:childTnLst>
-            <p:seq concurrent="1" nextAc="seek">
-              <p:cTn id="2" dur="indefinite" nodeType="mainSeq">
-                <p:childTnLst>
-                  <p:par>
-                    <p:cTn id="3" fill="hold">
-                      <p:stCondLst>
-                        <p:cond delay="indefinite"/>
-                      </p:stCondLst>
-                      <p:childTnLst>
-                        <p:par>
-                          <p:cTn id="4" fill="hold">
-                            <p:stCondLst>
-                              <p:cond delay="0"/>
-                            </p:stCondLst>
-                            <p:childTnLst>
-                              <p:par>
-                                <p:cTn id="5" presetID="1" presetClass="entr" presetSubtype="0" fill="hold" nodeType="clickEffect">
-                                  <p:stCondLst>
-                                    <p:cond delay="0"/>
-                                  </p:stCondLst>
-                                  <p:childTnLst>
-                                    <p:set>
-                                      <p:cBhvr>
-                                        <p:cTn id="6" dur="1" fill="hold">
-                                          <p:stCondLst>
-                                            <p:cond delay="0"/>
-                                          </p:stCondLst>
-                                        </p:cTn>
-                                        <p:tgtEl>
-                                          <p:spTgt spid="22"/>
-                                        </p:tgtEl>
-                                        <p:attrNameLst>
-                                          <p:attrName>style.visibility</p:attrName>
-                                        </p:attrNameLst>
-                                      </p:cBhvr>
-                                      <p:to>
-                                        <p:strVal val="visible"/>
-                                      </p:to>
-                                    </p:set>
-                                  </p:childTnLst>
-                                </p:cTn>
-                              </p:par>
-                            </p:childTnLst>
-                          </p:cTn>
-                        </p:par>
-                      </p:childTnLst>
-                    </p:cTn>
-                  </p:par>
-                  <p:par>
-                    <p:cTn id="7" fill="hold">
-                      <p:stCondLst>
-                        <p:cond delay="indefinite"/>
-                      </p:stCondLst>
-                      <p:childTnLst>
-                        <p:par>
-                          <p:cTn id="8" fill="hold">
-                            <p:stCondLst>
-                              <p:cond delay="0"/>
-                            </p:stCondLst>
-                            <p:childTnLst>
-                              <p:par>
-                                <p:cTn id="9" presetID="1" presetClass="entr" presetSubtype="0" fill="hold" grpId="0" nodeType="clickEffect">
-                                  <p:stCondLst>
-                                    <p:cond delay="0"/>
-                                  </p:stCondLst>
-                                  <p:childTnLst>
-                                    <p:set>
-                                      <p:cBhvr>
-                                        <p:cTn id="10" dur="1" fill="hold">
-                                          <p:stCondLst>
-                                            <p:cond delay="0"/>
-                                          </p:stCondLst>
-                                        </p:cTn>
-                                        <p:tgtEl>
-                                          <p:spTgt spid="25"/>
-                                        </p:tgtEl>
-                                        <p:attrNameLst>
-                                          <p:attrName>style.visibility</p:attrName>
-                                        </p:attrNameLst>
-                                      </p:cBhvr>
-                                      <p:to>
-                                        <p:strVal val="visible"/>
-                                      </p:to>
-                                    </p:set>
-                                  </p:childTnLst>
-                                </p:cTn>
-                              </p:par>
-                              <p:par>
-                                <p:cTn id="11" presetID="1" presetClass="entr" presetSubtype="0" fill="hold" nodeType="withEffect">
-                                  <p:stCondLst>
-                                    <p:cond delay="0"/>
-                                  </p:stCondLst>
-                                  <p:childTnLst>
-                                    <p:set>
-                                      <p:cBhvr>
-                                        <p:cTn id="12" dur="1" fill="hold">
-                                          <p:stCondLst>
-                                            <p:cond delay="0"/>
-                                          </p:stCondLst>
-                                        </p:cTn>
-                                        <p:tgtEl>
-                                          <p:spTgt spid="25">
-                                            <p:txEl>
-                                              <p:pRg st="0" end="0"/>
-                                            </p:txEl>
-                                          </p:spTgt>
-                                        </p:tgtEl>
-                                        <p:attrNameLst>
-                                          <p:attrName>style.visibility</p:attrName>
-                                        </p:attrNameLst>
-                                      </p:cBhvr>
-                                      <p:to>
-                                        <p:strVal val="visible"/>
-                                      </p:to>
-                                    </p:set>
-                                  </p:childTnLst>
-                                </p:cTn>
-                              </p:par>
-                            </p:childTnLst>
-                          </p:cTn>
-                        </p:par>
-                      </p:childTnLst>
-                    </p:cTn>
-                  </p:par>
-                  <p:par>
-                    <p:cTn id="13" fill="hold">
-                      <p:stCondLst>
-                        <p:cond delay="indefinite"/>
-                      </p:stCondLst>
-                      <p:childTnLst>
-                        <p:par>
-                          <p:cTn id="14" fill="hold">
-                            <p:stCondLst>
-                              <p:cond delay="0"/>
-                            </p:stCondLst>
-                            <p:childTnLst>
-                              <p:par>
-                                <p:cTn id="15" presetID="1" presetClass="entr" presetSubtype="0" fill="hold" nodeType="clickEffect">
-                                  <p:stCondLst>
-                                    <p:cond delay="0"/>
-                                  </p:stCondLst>
-                                  <p:childTnLst>
-                                    <p:set>
-                                      <p:cBhvr>
-                                        <p:cTn id="16" dur="1" fill="hold">
-                                          <p:stCondLst>
-                                            <p:cond delay="0"/>
-                                          </p:stCondLst>
-                                        </p:cTn>
-                                        <p:tgtEl>
-                                          <p:spTgt spid="25">
-                                            <p:txEl>
-                                              <p:pRg st="1" end="1"/>
-                                            </p:txEl>
-                                          </p:spTgt>
-                                        </p:tgtEl>
-                                        <p:attrNameLst>
-                                          <p:attrName>style.visibility</p:attrName>
-                                        </p:attrNameLst>
-                                      </p:cBhvr>
-                                      <p:to>
-                                        <p:strVal val="visible"/>
-                                      </p:to>
-                                    </p:set>
-                                  </p:childTnLst>
-                                </p:cTn>
-                              </p:par>
-                              <p:par>
-                                <p:cTn id="17" presetID="1" presetClass="entr" presetSubtype="0" fill="hold" nodeType="withEffect">
-                                  <p:stCondLst>
-                                    <p:cond delay="0"/>
-                                  </p:stCondLst>
-                                  <p:childTnLst>
-                                    <p:set>
-                                      <p:cBhvr>
-                                        <p:cTn id="18" dur="1" fill="hold">
-                                          <p:stCondLst>
-                                            <p:cond delay="0"/>
-                                          </p:stCondLst>
-                                        </p:cTn>
-                                        <p:tgtEl>
-                                          <p:spTgt spid="25">
-                                            <p:txEl>
-                                              <p:pRg st="2" end="2"/>
-                                            </p:txEl>
-                                          </p:spTgt>
-                                        </p:tgtEl>
-                                        <p:attrNameLst>
-                                          <p:attrName>style.visibility</p:attrName>
-                                        </p:attrNameLst>
-                                      </p:cBhvr>
-                                      <p:to>
-                                        <p:strVal val="visible"/>
-                                      </p:to>
-                                    </p:set>
-                                  </p:childTnLst>
-                                </p:cTn>
-                              </p:par>
-                            </p:childTnLst>
-                          </p:cTn>
-                        </p:par>
-                      </p:childTnLst>
-                    </p:cTn>
-                  </p:par>
-                  <p:par>
-                    <p:cTn id="19" fill="hold">
-                      <p:stCondLst>
-                        <p:cond delay="indefinite"/>
-                      </p:stCondLst>
-                      <p:childTnLst>
-                        <p:par>
-                          <p:cTn id="20" fill="hold">
-                            <p:stCondLst>
-                              <p:cond delay="0"/>
-                            </p:stCondLst>
-                            <p:childTnLst>
-                              <p:par>
-                                <p:cTn id="21" presetID="1" presetClass="exit" presetSubtype="0" fill="hold" grpId="1" nodeType="clickEffect">
-                                  <p:stCondLst>
-                                    <p:cond delay="0"/>
-                                  </p:stCondLst>
-                                  <p:childTnLst>
-                                    <p:set>
-                                      <p:cBhvr>
-                                        <p:cTn id="22" dur="1" fill="hold">
-                                          <p:stCondLst>
-                                            <p:cond delay="0"/>
-                                          </p:stCondLst>
-                                        </p:cTn>
-                                        <p:tgtEl>
-                                          <p:spTgt spid="25"/>
-                                        </p:tgtEl>
-                                        <p:attrNameLst>
-                                          <p:attrName>style.visibility</p:attrName>
-                                        </p:attrNameLst>
-                                      </p:cBhvr>
-                                      <p:to>
-                                        <p:strVal val="hidden"/>
-                                      </p:to>
-                                    </p:set>
-                                  </p:childTnLst>
-                                </p:cTn>
-                              </p:par>
-                              <p:par>
-                                <p:cTn id="23" presetID="1" presetClass="entr" presetSubtype="0" fill="hold" nodeType="withEffect">
-                                  <p:stCondLst>
-                                    <p:cond delay="0"/>
-                                  </p:stCondLst>
-                                  <p:childTnLst>
-                                    <p:set>
-                                      <p:cBhvr>
-                                        <p:cTn id="24" dur="1" fill="hold">
-                                          <p:stCondLst>
-                                            <p:cond delay="0"/>
-                                          </p:stCondLst>
-                                        </p:cTn>
-                                        <p:tgtEl>
-                                          <p:spTgt spid="27"/>
-                                        </p:tgtEl>
-                                        <p:attrNameLst>
-                                          <p:attrName>style.visibility</p:attrName>
-                                        </p:attrNameLst>
-                                      </p:cBhvr>
-                                      <p:to>
-                                        <p:strVal val="visible"/>
-                                      </p:to>
-                                    </p:set>
-                                  </p:childTnLst>
-                                </p:cTn>
-                              </p:par>
-                            </p:childTnLst>
-                          </p:cTn>
-                        </p:par>
-                      </p:childTnLst>
-                    </p:cTn>
-                  </p:par>
-                  <p:par>
-                    <p:cTn id="25" fill="hold">
-                      <p:stCondLst>
-                        <p:cond delay="indefinite"/>
-                      </p:stCondLst>
-                      <p:childTnLst>
-                        <p:par>
-                          <p:cTn id="26" fill="hold">
-                            <p:stCondLst>
-                              <p:cond delay="0"/>
-                            </p:stCondLst>
-                            <p:childTnLst>
-                              <p:par>
-                                <p:cTn id="27" presetID="1" presetClass="entr" presetSubtype="0" fill="hold" grpId="0" nodeType="clickEffect">
-                                  <p:stCondLst>
-                                    <p:cond delay="0"/>
-                                  </p:stCondLst>
-                                  <p:childTnLst>
-                                    <p:set>
-                                      <p:cBhvr>
-                                        <p:cTn id="28" dur="1" fill="hold">
-                                          <p:stCondLst>
-                                            <p:cond delay="0"/>
-                                          </p:stCondLst>
-                                        </p:cTn>
-                                        <p:tgtEl>
-                                          <p:spTgt spid="30"/>
-                                        </p:tgtEl>
-                                        <p:attrNameLst>
-                                          <p:attrName>style.visibility</p:attrName>
-                                        </p:attrNameLst>
-                                      </p:cBhvr>
-                                      <p:to>
-                                        <p:strVal val="visible"/>
-                                      </p:to>
-                                    </p:set>
-                                  </p:childTnLst>
-                                </p:cTn>
-                              </p:par>
-                            </p:childTnLst>
-                          </p:cTn>
-                        </p:par>
-                      </p:childTnLst>
-                    </p:cTn>
-                  </p:par>
-                  <p:par>
-                    <p:cTn id="29" fill="hold">
-                      <p:stCondLst>
-                        <p:cond delay="indefinite"/>
-                      </p:stCondLst>
-                      <p:childTnLst>
-                        <p:par>
-                          <p:cTn id="30" fill="hold">
-                            <p:stCondLst>
-                              <p:cond delay="0"/>
-                            </p:stCondLst>
-                            <p:childTnLst>
-                              <p:par>
-                                <p:cTn id="31" presetID="1" presetClass="entr" presetSubtype="0" fill="hold" grpId="0" nodeType="clickEffect">
-                                  <p:stCondLst>
-                                    <p:cond delay="0"/>
-                                  </p:stCondLst>
-                                  <p:childTnLst>
-                                    <p:set>
-                                      <p:cBhvr>
-                                        <p:cTn id="32" dur="1" fill="hold">
-                                          <p:stCondLst>
-                                            <p:cond delay="0"/>
-                                          </p:stCondLst>
-                                        </p:cTn>
-                                        <p:tgtEl>
-                                          <p:spTgt spid="23"/>
-                                        </p:tgtEl>
-                                        <p:attrNameLst>
-                                          <p:attrName>style.visibility</p:attrName>
-                                        </p:attrNameLst>
-                                      </p:cBhvr>
-                                      <p:to>
-                                        <p:strVal val="visible"/>
-                                      </p:to>
-                                    </p:set>
-                                  </p:childTnLst>
-                                </p:cTn>
-                              </p:par>
-                              <p:par>
-                                <p:cTn id="33" presetID="1" presetClass="entr" presetSubtype="0" fill="hold" grpId="0" nodeType="withEffect">
-                                  <p:stCondLst>
-                                    <p:cond delay="0"/>
-                                  </p:stCondLst>
-                                  <p:childTnLst>
-                                    <p:set>
-                                      <p:cBhvr>
-                                        <p:cTn id="34" dur="1" fill="hold">
-                                          <p:stCondLst>
-                                            <p:cond delay="0"/>
-                                          </p:stCondLst>
-                                        </p:cTn>
-                                        <p:tgtEl>
-                                          <p:spTgt spid="24"/>
-                                        </p:tgtEl>
-                                        <p:attrNameLst>
-                                          <p:attrName>style.visibility</p:attrName>
-                                        </p:attrNameLst>
-                                      </p:cBhvr>
-                                      <p:to>
-                                        <p:strVal val="visible"/>
-                                      </p:to>
-                                    </p:set>
-                                  </p:childTnLst>
-                                </p:cTn>
-                              </p:par>
-                            </p:childTnLst>
-                          </p:cTn>
-                        </p:par>
-                      </p:childTnLst>
-                    </p:cTn>
-                  </p:par>
-                  <p:par>
-                    <p:cTn id="35" fill="hold">
-                      <p:stCondLst>
-                        <p:cond delay="indefinite"/>
-                      </p:stCondLst>
-                      <p:childTnLst>
-                        <p:par>
-                          <p:cTn id="36" fill="hold">
-                            <p:stCondLst>
-                              <p:cond delay="0"/>
-                            </p:stCondLst>
-                            <p:childTnLst>
-                              <p:par>
-                                <p:cTn id="37" presetID="1" presetClass="entr" presetSubtype="0" fill="hold" grpId="0" nodeType="clickEffect">
-                                  <p:stCondLst>
-                                    <p:cond delay="0"/>
-                                  </p:stCondLst>
-                                  <p:childTnLst>
-                                    <p:set>
-                                      <p:cBhvr>
-                                        <p:cTn id="38" dur="1" fill="hold">
-                                          <p:stCondLst>
-                                            <p:cond delay="0"/>
-                                          </p:stCondLst>
-                                        </p:cTn>
-                                        <p:tgtEl>
-                                          <p:spTgt spid="29"/>
-                                        </p:tgtEl>
-                                        <p:attrNameLst>
-                                          <p:attrName>style.visibility</p:attrName>
-                                        </p:attrNameLst>
-                                      </p:cBhvr>
-                                      <p:to>
-                                        <p:strVal val="visible"/>
-                                      </p:to>
-                                    </p:set>
-                                  </p:childTnLst>
-                                </p:cTn>
-                              </p:par>
-                              <p:par>
-                                <p:cTn id="39" presetID="1" presetClass="entr" presetSubtype="0" fill="hold" grpId="0" nodeType="withEffect">
-                                  <p:stCondLst>
-                                    <p:cond delay="0"/>
-                                  </p:stCondLst>
-                                  <p:childTnLst>
-                                    <p:set>
-                                      <p:cBhvr>
-                                        <p:cTn id="40" dur="1" fill="hold">
-                                          <p:stCondLst>
-                                            <p:cond delay="0"/>
-                                          </p:stCondLst>
-                                        </p:cTn>
-                                        <p:tgtEl>
-                                          <p:spTgt spid="28"/>
-                                        </p:tgtEl>
-                                        <p:attrNameLst>
-                                          <p:attrName>style.visibility</p:attrName>
-                                        </p:attrNameLst>
-                                      </p:cBhvr>
-                                      <p:to>
-                                        <p:strVal val="visible"/>
-                                      </p:to>
-                                    </p:set>
-                                  </p:childTnLst>
-                                </p:cTn>
-                              </p:par>
-                            </p:childTnLst>
-                          </p:cTn>
-                        </p:par>
-                      </p:childTnLst>
-                    </p:cTn>
-                  </p:par>
-                </p:childTnLst>
-              </p:cTn>
-              <p:prevCondLst>
-                <p:cond evt="onPrev" delay="0">
-                  <p:tgtEl>
-                    <p:sldTgt/>
-                  </p:tgtEl>
-                </p:cond>
-              </p:prevCondLst>
-              <p:nextCondLst>
-                <p:cond evt="onNext" delay="0">
-                  <p:tgtEl>
-                    <p:sldTgt/>
-                  </p:tgtEl>
-                </p:cond>
-              </p:nextCondLst>
-            </p:seq>
-          </p:childTnLst>
-        </p:cTn>
-      </p:par>
-    </p:tnLst>
-    <p:bldLst>
-      <p:bldP spid="23" grpId="0" animBg="1"/>
-      <p:bldP spid="24" grpId="0"/>
-      <p:bldP spid="25" grpId="0"/>
-      <p:bldP spid="25" grpId="1"/>
-      <p:bldP spid="28" grpId="0"/>
-      <p:bldP spid="29" grpId="0" animBg="1"/>
-      <p:bldP spid="30" grpId="0"/>
-    </p:bldLst>
-  </p:timing>
-</p:sld>
-</file>
-
-<file path=ppt/slides/slide7.xml><?xml version="1.0" encoding="utf-8"?>
-<p:sld xmlns:a="http://schemas.openxmlformats.org/drawingml/2006/main" xmlns:r="http://schemas.openxmlformats.org/officeDocument/2006/relationships" xmlns:p="http://schemas.openxmlformats.org/presentationml/2006/main">
-  <p:cSld>
-    <p:bg>
-      <p:bgPr>
-        <a:gradFill>
-          <a:gsLst>
-            <a:gs pos="0">
-              <a:schemeClr val="accent1">
-                <a:lumMod val="5000"/>
-                <a:lumOff val="95000"/>
-              </a:schemeClr>
-            </a:gs>
-            <a:gs pos="36000">
-              <a:schemeClr val="accent1">
-                <a:lumMod val="45000"/>
-                <a:lumOff val="55000"/>
-              </a:schemeClr>
-            </a:gs>
-            <a:gs pos="53000">
-              <a:schemeClr val="accent1">
-                <a:lumMod val="45000"/>
-                <a:lumOff val="55000"/>
-              </a:schemeClr>
-            </a:gs>
-            <a:gs pos="76000">
-              <a:schemeClr val="accent1">
-                <a:lumMod val="30000"/>
-                <a:lumOff val="70000"/>
-              </a:schemeClr>
-            </a:gs>
-          </a:gsLst>
-          <a:lin ang="5400000" scaled="1"/>
-        </a:gradFill>
-        <a:effectLst/>
-      </p:bgPr>
-    </p:bg>
-    <p:spTree>
-      <p:nvGrpSpPr>
-        <p:cNvPr id="1" name=""/>
-        <p:cNvGrpSpPr/>
-        <p:nvPr/>
-      </p:nvGrpSpPr>
-      <p:grpSpPr>
-        <a:xfrm>
-          <a:off x="0" y="0"/>
-          <a:ext cx="0" cy="0"/>
-          <a:chOff x="0" y="0"/>
-          <a:chExt cx="0" cy="0"/>
-        </a:xfrm>
-      </p:grpSpPr>
-      <p:pic>
-        <p:nvPicPr>
-          <p:cNvPr id="5" name="Picture Placeholder 4">
-            <a:extLst>
-              <a:ext uri="{FF2B5EF4-FFF2-40B4-BE49-F238E27FC236}">
-                <a16:creationId xmlns:a16="http://schemas.microsoft.com/office/drawing/2014/main" id="{CE35679F-63D8-52CC-8101-BFAB4BEB8899}"/>
-              </a:ext>
-            </a:extLst>
-          </p:cNvPr>
-          <p:cNvPicPr>
-            <a:picLocks noGrp="1" noChangeAspect="1"/>
-          </p:cNvPicPr>
-          <p:nvPr>
-            <p:ph type="pic" sz="quarter" idx="10"/>
-          </p:nvPr>
-        </p:nvPicPr>
-        <p:blipFill>
-          <a:blip r:embed="rId3"/>
-          <a:stretch>
-            <a:fillRect/>
-          </a:stretch>
-        </p:blipFill>
-        <p:spPr>
-          <a:xfrm>
-            <a:off x="728773" y="1447798"/>
-            <a:ext cx="8137815" cy="5194825"/>
-          </a:xfrm>
-          <a:prstGeom prst="rect">
+          <a:ln w="57150" cap="flat" cmpd="sng" algn="ctr">
+            <a:solidFill>
+              <a:srgbClr val="AAD3D6"/>
+            </a:solidFill>
+            <a:prstDash val="dash"/>
+            <a:round/>
+            <a:headEnd type="none" w="med" len="med"/>
+            <a:tailEnd type="none" w="med" len="med"/>
+          </a:ln>
+        </p:spPr>
+        <p:style>
+          <a:lnRef idx="0">
+            <a:scrgbClr r="0" g="0" b="0"/>
+          </a:lnRef>
+          <a:fillRef idx="0">
+            <a:scrgbClr r="0" g="0" b="0"/>
+          </a:fillRef>
+          <a:effectRef idx="0">
+            <a:scrgbClr r="0" g="0" b="0"/>
+          </a:effectRef>
+          <a:fontRef idx="minor">
+            <a:schemeClr val="tx1"/>
+          </a:fontRef>
+        </p:style>
+      </p:cxnSp>
+      <p:cxnSp>
+        <p:nvCxnSpPr>
+          <p:cNvPr id="16" name="Straight Connector 15">
+            <a:extLst>
+              <a:ext uri="{FF2B5EF4-FFF2-40B4-BE49-F238E27FC236}">
+                <a16:creationId xmlns:a16="http://schemas.microsoft.com/office/drawing/2014/main" id="{B13E2C87-EFEA-9987-DE67-629869214DA3}"/>
+              </a:ext>
+            </a:extLst>
+          </p:cNvPr>
+          <p:cNvCxnSpPr>
+            <a:cxnSpLocks/>
+          </p:cNvCxnSpPr>
+          <p:nvPr/>
+        </p:nvCxnSpPr>
+        <p:spPr>
+          <a:xfrm>
+            <a:off x="1814747" y="1870329"/>
+            <a:ext cx="0" cy="4229243"/>
+          </a:xfrm>
+          <a:prstGeom prst="line">
             <a:avLst/>
           </a:prstGeom>
-        </p:spPr>
-      </p:pic>
-      <p:sp>
-        <p:nvSpPr>
-          <p:cNvPr id="4" name="Title 3">
-            <a:extLst>
-              <a:ext uri="{FF2B5EF4-FFF2-40B4-BE49-F238E27FC236}">
-                <a16:creationId xmlns:a16="http://schemas.microsoft.com/office/drawing/2014/main" id="{7194412D-F8B8-00D8-A0B3-C986C64670A5}"/>
-              </a:ext>
-            </a:extLst>
-          </p:cNvPr>
-          <p:cNvSpPr>
-            <a:spLocks noGrp="1"/>
-          </p:cNvSpPr>
-          <p:nvPr>
-            <p:ph type="title"/>
-          </p:nvPr>
-        </p:nvSpPr>
-        <p:spPr>
-          <a:xfrm>
-            <a:off x="728773" y="56809"/>
-            <a:ext cx="11272727" cy="1251291"/>
-          </a:xfrm>
-          <a:noFill/>
-        </p:spPr>
-        <p:txBody>
-          <a:bodyPr anchor="ctr"/>
-          <a:lstStyle/>
-          <a:p>
-            <a:pPr algn="ctr"/>
-            <a:r>
-              <a:rPr lang="en-US" dirty="0"/>
-              <a:t>Alcohol by Volume (ABV) Statistics</a:t>
-            </a:r>
-          </a:p>
-        </p:txBody>
-      </p:sp>
-      <p:sp>
-        <p:nvSpPr>
-          <p:cNvPr id="7" name="TextBox 6">
-            <a:extLst>
-              <a:ext uri="{FF2B5EF4-FFF2-40B4-BE49-F238E27FC236}">
-                <a16:creationId xmlns:a16="http://schemas.microsoft.com/office/drawing/2014/main" id="{71BF70B1-C1C1-495B-5488-3F45F154CF1D}"/>
-              </a:ext>
-            </a:extLst>
-          </p:cNvPr>
-          <p:cNvSpPr txBox="1"/>
+          <a:ln w="57150" cap="flat" cmpd="sng" algn="ctr">
+            <a:solidFill>
+              <a:srgbClr val="7030A0"/>
+            </a:solidFill>
+            <a:prstDash val="dash"/>
+            <a:round/>
+            <a:headEnd type="none" w="med" len="med"/>
+            <a:tailEnd type="none" w="med" len="med"/>
+          </a:ln>
+        </p:spPr>
+        <p:style>
+          <a:lnRef idx="0">
+            <a:scrgbClr r="0" g="0" b="0"/>
+          </a:lnRef>
+          <a:fillRef idx="0">
+            <a:scrgbClr r="0" g="0" b="0"/>
+          </a:fillRef>
+          <a:effectRef idx="0">
+            <a:scrgbClr r="0" g="0" b="0"/>
+          </a:effectRef>
+          <a:fontRef idx="minor">
+            <a:schemeClr val="tx1"/>
+          </a:fontRef>
+        </p:style>
+      </p:cxnSp>
+      <p:cxnSp>
+        <p:nvCxnSpPr>
+          <p:cNvPr id="17" name="Straight Connector 16">
+            <a:extLst>
+              <a:ext uri="{FF2B5EF4-FFF2-40B4-BE49-F238E27FC236}">
+                <a16:creationId xmlns:a16="http://schemas.microsoft.com/office/drawing/2014/main" id="{C4963DA7-E495-D3DE-D573-93FE8E76DAFE}"/>
+              </a:ext>
+            </a:extLst>
+          </p:cNvPr>
+          <p:cNvCxnSpPr>
+            <a:cxnSpLocks/>
+          </p:cNvCxnSpPr>
           <p:nvPr/>
-        </p:nvSpPr>
-        <p:spPr>
-          <a:xfrm>
-            <a:off x="8866588" y="1587500"/>
-            <a:ext cx="2753912" cy="1938992"/>
-          </a:xfrm>
-          <a:prstGeom prst="rect">
+        </p:nvCxnSpPr>
+        <p:spPr>
+          <a:xfrm>
+            <a:off x="7301147" y="1683004"/>
+            <a:ext cx="0" cy="4229243"/>
+          </a:xfrm>
+          <a:prstGeom prst="line">
             <a:avLst/>
           </a:prstGeom>
-          <a:noFill/>
-        </p:spPr>
-        <p:txBody>
-          <a:bodyPr wrap="square" rtlCol="0">
-            <a:spAutoFit/>
-          </a:bodyPr>
-          <a:lstStyle/>
-          <a:p>
-            <a:pPr marL="285750" indent="-285750">
-              <a:buFont typeface="Arial" panose="020B0604020202020204" pitchFamily="34" charset="0"/>
-              <a:buChar char="•"/>
-            </a:pPr>
-            <a:r>
-              <a:rPr lang="en-US" sz="2400" dirty="0"/>
-              <a:t>Mean ~ 6.0%</a:t>
-            </a:r>
-          </a:p>
-          <a:p>
-            <a:pPr marL="285750" indent="-285750">
-              <a:buFont typeface="Arial" panose="020B0604020202020204" pitchFamily="34" charset="0"/>
-              <a:buChar char="•"/>
-            </a:pPr>
-            <a:r>
-              <a:rPr lang="en-US" sz="2400" dirty="0"/>
-              <a:t>Median ~ 5.6%</a:t>
-            </a:r>
-          </a:p>
-          <a:p>
-            <a:pPr marL="285750" indent="-285750">
-              <a:buFont typeface="Arial" panose="020B0604020202020204" pitchFamily="34" charset="0"/>
-              <a:buChar char="•"/>
-            </a:pPr>
-            <a:r>
-              <a:rPr lang="en-US" sz="2400" dirty="0"/>
-              <a:t>Std. Dev ~ 1.0%</a:t>
-            </a:r>
-          </a:p>
-          <a:p>
-            <a:pPr marL="285750" indent="-285750">
-              <a:buFont typeface="Arial" panose="020B0604020202020204" pitchFamily="34" charset="0"/>
-              <a:buChar char="•"/>
-            </a:pPr>
-            <a:r>
-              <a:rPr lang="en-US" sz="2400" dirty="0"/>
-              <a:t>Min ~  0.1%</a:t>
-            </a:r>
-          </a:p>
-          <a:p>
-            <a:pPr marL="285750" indent="-285750">
-              <a:buFont typeface="Arial" panose="020B0604020202020204" pitchFamily="34" charset="0"/>
-              <a:buChar char="•"/>
-            </a:pPr>
-            <a:r>
-              <a:rPr lang="en-US" sz="2400" dirty="0"/>
-              <a:t>Max ~ 12.8%</a:t>
-            </a:r>
-          </a:p>
-        </p:txBody>
-      </p:sp>
-      <p:sp>
-        <p:nvSpPr>
-          <p:cNvPr id="8" name="TextBox 7">
-            <a:extLst>
-              <a:ext uri="{FF2B5EF4-FFF2-40B4-BE49-F238E27FC236}">
-                <a16:creationId xmlns:a16="http://schemas.microsoft.com/office/drawing/2014/main" id="{F43DB58D-EC21-4EA9-CE95-784BC0C25505}"/>
-              </a:ext>
-            </a:extLst>
-          </p:cNvPr>
-          <p:cNvSpPr txBox="1"/>
-          <p:nvPr/>
-        </p:nvSpPr>
-        <p:spPr>
-          <a:xfrm>
-            <a:off x="9029700" y="4089400"/>
-            <a:ext cx="2324100" cy="1477328"/>
-          </a:xfrm>
-          <a:prstGeom prst="rect">
-            <a:avLst/>
-          </a:prstGeom>
-          <a:noFill/>
-        </p:spPr>
-        <p:txBody>
-          <a:bodyPr wrap="square" rtlCol="0">
-            <a:spAutoFit/>
-          </a:bodyPr>
-          <a:lstStyle/>
-          <a:p>
-            <a:r>
-              <a:rPr lang="en-US" b="1" i="1" dirty="0"/>
-              <a:t>For comparison, Bud Light has an ABV of 4.2% while Budweiser has around a 5.0%</a:t>
-            </a:r>
-          </a:p>
-        </p:txBody>
-      </p:sp>
+          <a:ln w="57150" cap="flat" cmpd="sng" algn="ctr">
+            <a:solidFill>
+              <a:srgbClr val="7030A0"/>
+            </a:solidFill>
+            <a:prstDash val="dash"/>
+            <a:round/>
+            <a:headEnd type="none" w="med" len="med"/>
+            <a:tailEnd type="none" w="med" len="med"/>
+          </a:ln>
+        </p:spPr>
+        <p:style>
+          <a:lnRef idx="0">
+            <a:scrgbClr r="0" g="0" b="0"/>
+          </a:lnRef>
+          <a:fillRef idx="0">
+            <a:scrgbClr r="0" g="0" b="0"/>
+          </a:fillRef>
+          <a:effectRef idx="0">
+            <a:scrgbClr r="0" g="0" b="0"/>
+          </a:effectRef>
+          <a:fontRef idx="minor">
+            <a:schemeClr val="tx1"/>
+          </a:fontRef>
+        </p:style>
+      </p:cxnSp>
     </p:spTree>
     <p:extLst>
       <p:ext uri="{BB962C8B-B14F-4D97-AF65-F5344CB8AC3E}">
@@ -25399,6 +25212,33 @@
                                   </p:childTnLst>
                                 </p:cTn>
                               </p:par>
+                              <p:par>
+                                <p:cTn id="7" presetID="1" presetClass="entr" presetSubtype="0" fill="hold" nodeType="withEffect">
+                                  <p:stCondLst>
+                                    <p:cond delay="0"/>
+                                  </p:stCondLst>
+                                  <p:childTnLst>
+                                    <p:set>
+                                      <p:cBhvr>
+                                        <p:cTn id="8" dur="1" fill="hold">
+                                          <p:stCondLst>
+                                            <p:cond delay="0"/>
+                                          </p:stCondLst>
+                                        </p:cTn>
+                                        <p:tgtEl>
+                                          <p:spTgt spid="11"/>
+                                        </p:tgtEl>
+                                        <p:attrNameLst>
+                                          <p:attrName>style.visibility</p:attrName>
+                                        </p:attrNameLst>
+                                      </p:cBhvr>
+                                      <p:to>
+                                        <p:strVal val="visible"/>
+                                      </p:to>
+                                    </p:set>
+                                  </p:childTnLst>
+                                </p:cTn>
+                              </p:par>
                             </p:childTnLst>
                           </p:cTn>
                         </p:par>
@@ -25406,26 +25246,26 @@
                     </p:cTn>
                   </p:par>
                   <p:par>
-                    <p:cTn id="7" fill="hold">
+                    <p:cTn id="9" fill="hold">
                       <p:stCondLst>
                         <p:cond delay="indefinite"/>
                       </p:stCondLst>
                       <p:childTnLst>
                         <p:par>
-                          <p:cTn id="8" fill="hold">
+                          <p:cTn id="10" fill="hold">
                             <p:stCondLst>
                               <p:cond delay="0"/>
                             </p:stCondLst>
                             <p:childTnLst>
                               <p:par>
-                                <p:cTn id="9" presetID="1" presetClass="entr" presetSubtype="0" fill="hold" nodeType="clickEffect">
+                                <p:cTn id="11" presetID="1" presetClass="entr" presetSubtype="0" fill="hold" nodeType="clickEffect">
                                   <p:stCondLst>
                                     <p:cond delay="0"/>
                                   </p:stCondLst>
                                   <p:childTnLst>
                                     <p:set>
                                       <p:cBhvr>
-                                        <p:cTn id="10" dur="1" fill="hold">
+                                        <p:cTn id="12" dur="1" fill="hold">
                                           <p:stCondLst>
                                             <p:cond delay="0"/>
                                           </p:stCondLst>
@@ -25448,26 +25288,8 @@
                                   </p:childTnLst>
                                 </p:cTn>
                               </p:par>
-                            </p:childTnLst>
-                          </p:cTn>
-                        </p:par>
-                      </p:childTnLst>
-                    </p:cTn>
-                  </p:par>
-                  <p:par>
-                    <p:cTn id="11" fill="hold">
-                      <p:stCondLst>
-                        <p:cond delay="indefinite"/>
-                      </p:stCondLst>
-                      <p:childTnLst>
-                        <p:par>
-                          <p:cTn id="12" fill="hold">
-                            <p:stCondLst>
-                              <p:cond delay="0"/>
-                            </p:stCondLst>
-                            <p:childTnLst>
                               <p:par>
-                                <p:cTn id="13" presetID="1" presetClass="entr" presetSubtype="0" fill="hold" nodeType="clickEffect">
+                                <p:cTn id="13" presetID="1" presetClass="entr" presetSubtype="0" fill="hold" nodeType="withEffect">
                                   <p:stCondLst>
                                     <p:cond delay="0"/>
                                   </p:stCondLst>
@@ -25480,11 +25302,7 @@
                                           </p:stCondLst>
                                         </p:cTn>
                                         <p:tgtEl>
-                                          <p:spTgt spid="7">
-                                            <p:txEl>
-                                              <p:pRg st="2" end="2"/>
-                                            </p:txEl>
-                                          </p:spTgt>
+                                          <p:spTgt spid="15"/>
                                         </p:tgtEl>
                                         <p:attrNameLst>
                                           <p:attrName>style.visibility</p:attrName>
@@ -25531,7 +25349,7 @@
                                         <p:tgtEl>
                                           <p:spTgt spid="7">
                                             <p:txEl>
-                                              <p:pRg st="3" end="3"/>
+                                              <p:pRg st="2" end="2"/>
                                             </p:txEl>
                                           </p:spTgt>
                                         </p:tgtEl>
@@ -25580,9 +25398,36 @@
                                         <p:tgtEl>
                                           <p:spTgt spid="7">
                                             <p:txEl>
-                                              <p:pRg st="4" end="4"/>
+                                              <p:pRg st="3" end="3"/>
                                             </p:txEl>
                                           </p:spTgt>
+                                        </p:tgtEl>
+                                        <p:attrNameLst>
+                                          <p:attrName>style.visibility</p:attrName>
+                                        </p:attrNameLst>
+                                      </p:cBhvr>
+                                      <p:to>
+                                        <p:strVal val="visible"/>
+                                      </p:to>
+                                    </p:set>
+                                  </p:childTnLst>
+                                </p:cTn>
+                              </p:par>
+                              <p:par>
+                                <p:cTn id="23" presetID="1" presetClass="entr" presetSubtype="0" fill="hold" nodeType="withEffect">
+                                  <p:stCondLst>
+                                    <p:cond delay="0"/>
+                                  </p:stCondLst>
+                                  <p:childTnLst>
+                                    <p:set>
+                                      <p:cBhvr>
+                                        <p:cTn id="24" dur="1" fill="hold">
+                                          <p:stCondLst>
+                                            <p:cond delay="0"/>
+                                          </p:stCondLst>
+                                        </p:cTn>
+                                        <p:tgtEl>
+                                          <p:spTgt spid="16"/>
                                         </p:tgtEl>
                                         <p:attrNameLst>
                                           <p:attrName>style.visibility</p:attrName>
@@ -25602,26 +25447,102 @@
                     </p:cTn>
                   </p:par>
                   <p:par>
-                    <p:cTn id="23" fill="hold">
+                    <p:cTn id="25" fill="hold">
                       <p:stCondLst>
                         <p:cond delay="indefinite"/>
                       </p:stCondLst>
                       <p:childTnLst>
                         <p:par>
-                          <p:cTn id="24" fill="hold">
+                          <p:cTn id="26" fill="hold">
                             <p:stCondLst>
                               <p:cond delay="0"/>
                             </p:stCondLst>
                             <p:childTnLst>
                               <p:par>
-                                <p:cTn id="25" presetID="1" presetClass="entr" presetSubtype="0" fill="hold" nodeType="clickEffect">
+                                <p:cTn id="27" presetID="1" presetClass="entr" presetSubtype="0" fill="hold" nodeType="clickEffect">
                                   <p:stCondLst>
                                     <p:cond delay="0"/>
                                   </p:stCondLst>
                                   <p:childTnLst>
                                     <p:set>
                                       <p:cBhvr>
-                                        <p:cTn id="26" dur="1" fill="hold">
+                                        <p:cTn id="28" dur="1" fill="hold">
+                                          <p:stCondLst>
+                                            <p:cond delay="0"/>
+                                          </p:stCondLst>
+                                        </p:cTn>
+                                        <p:tgtEl>
+                                          <p:spTgt spid="7">
+                                            <p:txEl>
+                                              <p:pRg st="4" end="4"/>
+                                            </p:txEl>
+                                          </p:spTgt>
+                                        </p:tgtEl>
+                                        <p:attrNameLst>
+                                          <p:attrName>style.visibility</p:attrName>
+                                        </p:attrNameLst>
+                                      </p:cBhvr>
+                                      <p:to>
+                                        <p:strVal val="visible"/>
+                                      </p:to>
+                                    </p:set>
+                                  </p:childTnLst>
+                                </p:cTn>
+                              </p:par>
+                              <p:par>
+                                <p:cTn id="29" presetID="1" presetClass="entr" presetSubtype="0" fill="hold" nodeType="withEffect">
+                                  <p:stCondLst>
+                                    <p:cond delay="0"/>
+                                  </p:stCondLst>
+                                  <p:childTnLst>
+                                    <p:set>
+                                      <p:cBhvr>
+                                        <p:cTn id="30" dur="1" fill="hold">
+                                          <p:stCondLst>
+                                            <p:cond delay="0"/>
+                                          </p:stCondLst>
+                                        </p:cTn>
+                                        <p:tgtEl>
+                                          <p:spTgt spid="17"/>
+                                        </p:tgtEl>
+                                        <p:attrNameLst>
+                                          <p:attrName>style.visibility</p:attrName>
+                                        </p:attrNameLst>
+                                      </p:cBhvr>
+                                      <p:to>
+                                        <p:strVal val="visible"/>
+                                      </p:to>
+                                    </p:set>
+                                  </p:childTnLst>
+                                </p:cTn>
+                              </p:par>
+                            </p:childTnLst>
+                          </p:cTn>
+                        </p:par>
+                      </p:childTnLst>
+                    </p:cTn>
+                  </p:par>
+                  <p:par>
+                    <p:cTn id="31" fill="hold">
+                      <p:stCondLst>
+                        <p:cond delay="indefinite"/>
+                      </p:stCondLst>
+                      <p:childTnLst>
+                        <p:par>
+                          <p:cTn id="32" fill="hold">
+                            <p:stCondLst>
+                              <p:cond delay="0"/>
+                            </p:stCondLst>
+                            <p:childTnLst>
+                              <p:par>
+                                <p:cTn id="33" presetID="1" presetClass="entr" presetSubtype="0" fill="hold" nodeType="clickEffect">
+                                  <p:stCondLst>
+                                    <p:cond delay="0"/>
+                                  </p:stCondLst>
+                                  <p:childTnLst>
+                                    <p:set>
+                                      <p:cBhvr>
+                                        <p:cTn id="34" dur="1" fill="hold">
                                           <p:stCondLst>
                                             <p:cond delay="0"/>
                                           </p:stCondLst>
@@ -25632,6 +25553,33 @@
                                               <p:pRg st="0" end="0"/>
                                             </p:txEl>
                                           </p:spTgt>
+                                        </p:tgtEl>
+                                        <p:attrNameLst>
+                                          <p:attrName>style.visibility</p:attrName>
+                                        </p:attrNameLst>
+                                      </p:cBhvr>
+                                      <p:to>
+                                        <p:strVal val="visible"/>
+                                      </p:to>
+                                    </p:set>
+                                  </p:childTnLst>
+                                </p:cTn>
+                              </p:par>
+                              <p:par>
+                                <p:cTn id="35" presetID="1" presetClass="entr" presetSubtype="0" fill="hold" grpId="0" nodeType="withEffect">
+                                  <p:stCondLst>
+                                    <p:cond delay="0"/>
+                                  </p:stCondLst>
+                                  <p:childTnLst>
+                                    <p:set>
+                                      <p:cBhvr>
+                                        <p:cTn id="36" dur="1" fill="hold">
+                                          <p:stCondLst>
+                                            <p:cond delay="0"/>
+                                          </p:stCondLst>
+                                        </p:cTn>
+                                        <p:tgtEl>
+                                          <p:spTgt spid="9"/>
                                         </p:tgtEl>
                                         <p:attrNameLst>
                                           <p:attrName>style.visibility</p:attrName>
@@ -25671,6 +25619,925 @@
         </p:cTn>
       </p:par>
     </p:tnLst>
+    <p:bldLst>
+      <p:bldP spid="9" grpId="0" animBg="1"/>
+    </p:bldLst>
+  </p:timing>
+</p:sld>
+</file>
+
+<file path=ppt/slides/slide7.xml><?xml version="1.0" encoding="utf-8"?>
+<p:sld xmlns:a="http://schemas.openxmlformats.org/drawingml/2006/main" xmlns:r="http://schemas.openxmlformats.org/officeDocument/2006/relationships" xmlns:p="http://schemas.openxmlformats.org/presentationml/2006/main">
+  <p:cSld>
+    <p:bg>
+      <p:bgPr>
+        <a:gradFill>
+          <a:gsLst>
+            <a:gs pos="0">
+              <a:schemeClr val="accent1">
+                <a:lumMod val="5000"/>
+                <a:lumOff val="95000"/>
+              </a:schemeClr>
+            </a:gs>
+            <a:gs pos="36000">
+              <a:schemeClr val="accent1">
+                <a:lumMod val="45000"/>
+                <a:lumOff val="55000"/>
+              </a:schemeClr>
+            </a:gs>
+            <a:gs pos="53000">
+              <a:schemeClr val="accent1">
+                <a:lumMod val="45000"/>
+                <a:lumOff val="55000"/>
+              </a:schemeClr>
+            </a:gs>
+            <a:gs pos="76000">
+              <a:schemeClr val="accent1">
+                <a:lumMod val="30000"/>
+                <a:lumOff val="70000"/>
+              </a:schemeClr>
+            </a:gs>
+          </a:gsLst>
+          <a:lin ang="5400000" scaled="1"/>
+        </a:gradFill>
+        <a:effectLst/>
+      </p:bgPr>
+    </p:bg>
+    <p:spTree>
+      <p:nvGrpSpPr>
+        <p:cNvPr id="1" name=""/>
+        <p:cNvGrpSpPr/>
+        <p:nvPr/>
+      </p:nvGrpSpPr>
+      <p:grpSpPr>
+        <a:xfrm>
+          <a:off x="0" y="0"/>
+          <a:ext cx="0" cy="0"/>
+          <a:chOff x="0" y="0"/>
+          <a:chExt cx="0" cy="0"/>
+        </a:xfrm>
+      </p:grpSpPr>
+      <p:sp>
+        <p:nvSpPr>
+          <p:cNvPr id="11" name="Title 1">
+            <a:extLst>
+              <a:ext uri="{FF2B5EF4-FFF2-40B4-BE49-F238E27FC236}">
+                <a16:creationId xmlns:a16="http://schemas.microsoft.com/office/drawing/2014/main" id="{4993CC0D-EF5A-5917-3084-86B71BBD6E8F}"/>
+              </a:ext>
+            </a:extLst>
+          </p:cNvPr>
+          <p:cNvSpPr>
+            <a:spLocks noGrp="1"/>
+          </p:cNvSpPr>
+          <p:nvPr>
+            <p:ph type="title"/>
+          </p:nvPr>
+        </p:nvSpPr>
+        <p:spPr>
+          <a:xfrm>
+            <a:off x="671500" y="120797"/>
+            <a:ext cx="11380800" cy="876335"/>
+          </a:xfrm>
+        </p:spPr>
+        <p:txBody>
+          <a:bodyPr anchor="t"/>
+          <a:lstStyle/>
+          <a:p>
+            <a:pPr algn="ctr"/>
+            <a:r>
+              <a:rPr lang="en-US" dirty="0"/>
+              <a:t>Median ABV and IBU Value by State</a:t>
+            </a:r>
+          </a:p>
+        </p:txBody>
+      </p:sp>
+      <p:pic>
+        <p:nvPicPr>
+          <p:cNvPr id="22" name="Picture Placeholder 21" descr="Map&#10;&#10;Description automatically generated">
+            <a:extLst>
+              <a:ext uri="{FF2B5EF4-FFF2-40B4-BE49-F238E27FC236}">
+                <a16:creationId xmlns:a16="http://schemas.microsoft.com/office/drawing/2014/main" id="{D026E106-037F-E9F9-9ED9-B2166DAFF4CF}"/>
+              </a:ext>
+            </a:extLst>
+          </p:cNvPr>
+          <p:cNvPicPr>
+            <a:picLocks noGrp="1" noChangeAspect="1"/>
+          </p:cNvPicPr>
+          <p:nvPr>
+            <p:ph type="pic" sz="quarter" idx="10"/>
+          </p:nvPr>
+        </p:nvPicPr>
+        <p:blipFill>
+          <a:blip r:embed="rId3"/>
+          <a:stretch>
+            <a:fillRect/>
+          </a:stretch>
+        </p:blipFill>
+        <p:spPr>
+          <a:xfrm>
+            <a:off x="307000" y="880930"/>
+            <a:ext cx="5659800" cy="3612968"/>
+          </a:xfrm>
+        </p:spPr>
+      </p:pic>
+      <p:sp>
+        <p:nvSpPr>
+          <p:cNvPr id="23" name="5-Point Star 22">
+            <a:extLst>
+              <a:ext uri="{FF2B5EF4-FFF2-40B4-BE49-F238E27FC236}">
+                <a16:creationId xmlns:a16="http://schemas.microsoft.com/office/drawing/2014/main" id="{FCA6505D-20D7-5015-86BE-A8929A960A44}"/>
+              </a:ext>
+            </a:extLst>
+          </p:cNvPr>
+          <p:cNvSpPr/>
+          <p:nvPr/>
+        </p:nvSpPr>
+        <p:spPr>
+          <a:xfrm>
+            <a:off x="2057400" y="2389915"/>
+            <a:ext cx="292100" cy="241300"/>
+          </a:xfrm>
+          <a:prstGeom prst="star5">
+            <a:avLst>
+              <a:gd name="adj" fmla="val 22448"/>
+              <a:gd name="hf" fmla="val 105146"/>
+              <a:gd name="vf" fmla="val 110557"/>
+            </a:avLst>
+          </a:prstGeom>
+          <a:solidFill>
+            <a:srgbClr val="FFFF00"/>
+          </a:solidFill>
+        </p:spPr>
+        <p:style>
+          <a:lnRef idx="2">
+            <a:schemeClr val="accent1">
+              <a:shade val="50000"/>
+            </a:schemeClr>
+          </a:lnRef>
+          <a:fillRef idx="1">
+            <a:schemeClr val="accent1"/>
+          </a:fillRef>
+          <a:effectRef idx="0">
+            <a:schemeClr val="accent1"/>
+          </a:effectRef>
+          <a:fontRef idx="minor">
+            <a:schemeClr val="lt1"/>
+          </a:fontRef>
+        </p:style>
+        <p:txBody>
+          <a:bodyPr rtlCol="0" anchor="ctr"/>
+          <a:lstStyle/>
+          <a:p>
+            <a:pPr algn="ctr"/>
+            <a:endParaRPr lang="en-US"/>
+          </a:p>
+        </p:txBody>
+      </p:sp>
+      <p:sp>
+        <p:nvSpPr>
+          <p:cNvPr id="24" name="TextBox 23">
+            <a:extLst>
+              <a:ext uri="{FF2B5EF4-FFF2-40B4-BE49-F238E27FC236}">
+                <a16:creationId xmlns:a16="http://schemas.microsoft.com/office/drawing/2014/main" id="{00BAE97A-299B-A5BC-C162-B2818B355A02}"/>
+              </a:ext>
+            </a:extLst>
+          </p:cNvPr>
+          <p:cNvSpPr txBox="1"/>
+          <p:nvPr/>
+        </p:nvSpPr>
+        <p:spPr>
+          <a:xfrm>
+            <a:off x="307000" y="5196440"/>
+            <a:ext cx="5664200" cy="923330"/>
+          </a:xfrm>
+          <a:prstGeom prst="rect">
+            <a:avLst/>
+          </a:prstGeom>
+          <a:noFill/>
+        </p:spPr>
+        <p:txBody>
+          <a:bodyPr wrap="square" rtlCol="0">
+            <a:spAutoFit/>
+          </a:bodyPr>
+          <a:lstStyle/>
+          <a:p>
+            <a:r>
+              <a:rPr lang="en-US" b="1" dirty="0"/>
+              <a:t>The most alcoholic beer in the dataset is from Colorado. It is a Belgian </a:t>
+            </a:r>
+            <a:r>
+              <a:rPr lang="en-US" b="1" dirty="0" err="1"/>
+              <a:t>Quadrupel</a:t>
+            </a:r>
+            <a:r>
+              <a:rPr lang="en-US" b="1" dirty="0"/>
+              <a:t> with a 12.8% ABV </a:t>
+            </a:r>
+            <a:endParaRPr lang="en-US" dirty="0"/>
+          </a:p>
+        </p:txBody>
+      </p:sp>
+      <p:sp>
+        <p:nvSpPr>
+          <p:cNvPr id="25" name="TextBox 24">
+            <a:extLst>
+              <a:ext uri="{FF2B5EF4-FFF2-40B4-BE49-F238E27FC236}">
+                <a16:creationId xmlns:a16="http://schemas.microsoft.com/office/drawing/2014/main" id="{E3776241-9601-4323-9746-6A8E0AEB86F2}"/>
+              </a:ext>
+            </a:extLst>
+          </p:cNvPr>
+          <p:cNvSpPr txBox="1"/>
+          <p:nvPr/>
+        </p:nvSpPr>
+        <p:spPr>
+          <a:xfrm>
+            <a:off x="6239848" y="939090"/>
+            <a:ext cx="5122504" cy="1754326"/>
+          </a:xfrm>
+          <a:prstGeom prst="rect">
+            <a:avLst/>
+          </a:prstGeom>
+          <a:noFill/>
+        </p:spPr>
+        <p:txBody>
+          <a:bodyPr wrap="square" rtlCol="0">
+            <a:spAutoFit/>
+          </a:bodyPr>
+          <a:lstStyle/>
+          <a:p>
+            <a:pPr marL="285750" indent="-285750">
+              <a:buFont typeface="Arial" panose="020B0604020202020204" pitchFamily="34" charset="0"/>
+              <a:buChar char="•"/>
+            </a:pPr>
+            <a:r>
+              <a:rPr lang="en-US" dirty="0"/>
+              <a:t>There is not an excessive variation in median ABV across the states.</a:t>
+            </a:r>
+          </a:p>
+          <a:p>
+            <a:pPr marL="285750" indent="-285750">
+              <a:buFont typeface="Arial" panose="020B0604020202020204" pitchFamily="34" charset="0"/>
+              <a:buChar char="•"/>
+            </a:pPr>
+            <a:r>
+              <a:rPr lang="en-US" dirty="0"/>
+              <a:t>The notable difference Utah.</a:t>
+            </a:r>
+          </a:p>
+          <a:p>
+            <a:pPr marL="742950" lvl="1" indent="-285750">
+              <a:buFont typeface="Arial" panose="020B0604020202020204" pitchFamily="34" charset="0"/>
+              <a:buChar char="•"/>
+            </a:pPr>
+            <a:r>
+              <a:rPr lang="en-US" dirty="0"/>
+              <a:t>This abnormality we believe is caused by a recently overturned law which limited beers to and ABV of 3.2%.</a:t>
+            </a:r>
+          </a:p>
+        </p:txBody>
+      </p:sp>
+      <p:pic>
+        <p:nvPicPr>
+          <p:cNvPr id="27" name="Picture 26">
+            <a:extLst>
+              <a:ext uri="{FF2B5EF4-FFF2-40B4-BE49-F238E27FC236}">
+                <a16:creationId xmlns:a16="http://schemas.microsoft.com/office/drawing/2014/main" id="{B136E2BB-9621-AE7B-9829-F3B9D6AE5800}"/>
+              </a:ext>
+            </a:extLst>
+          </p:cNvPr>
+          <p:cNvPicPr>
+            <a:picLocks noChangeAspect="1"/>
+          </p:cNvPicPr>
+          <p:nvPr/>
+        </p:nvPicPr>
+        <p:blipFill>
+          <a:blip r:embed="rId4"/>
+          <a:stretch>
+            <a:fillRect/>
+          </a:stretch>
+        </p:blipFill>
+        <p:spPr>
+          <a:xfrm>
+            <a:off x="5971200" y="886932"/>
+            <a:ext cx="5659800" cy="3612968"/>
+          </a:xfrm>
+          <a:prstGeom prst="rect">
+            <a:avLst/>
+          </a:prstGeom>
+        </p:spPr>
+      </p:pic>
+      <p:sp>
+        <p:nvSpPr>
+          <p:cNvPr id="28" name="TextBox 27">
+            <a:extLst>
+              <a:ext uri="{FF2B5EF4-FFF2-40B4-BE49-F238E27FC236}">
+                <a16:creationId xmlns:a16="http://schemas.microsoft.com/office/drawing/2014/main" id="{45B306BB-7395-CE48-7CD6-E05449D49DBB}"/>
+              </a:ext>
+            </a:extLst>
+          </p:cNvPr>
+          <p:cNvSpPr txBox="1"/>
+          <p:nvPr/>
+        </p:nvSpPr>
+        <p:spPr>
+          <a:xfrm>
+            <a:off x="6220802" y="5196440"/>
+            <a:ext cx="4764698" cy="923330"/>
+          </a:xfrm>
+          <a:prstGeom prst="rect">
+            <a:avLst/>
+          </a:prstGeom>
+          <a:noFill/>
+        </p:spPr>
+        <p:txBody>
+          <a:bodyPr wrap="square" rtlCol="0">
+            <a:spAutoFit/>
+          </a:bodyPr>
+          <a:lstStyle/>
+          <a:p>
+            <a:r>
+              <a:rPr lang="en-US" b="1" dirty="0"/>
+              <a:t>The most bitter beer is called “Bitter Bitch Imperial IPA”, which is from Oregon and has 138 IBU.</a:t>
+            </a:r>
+            <a:endParaRPr lang="en-US" dirty="0"/>
+          </a:p>
+        </p:txBody>
+      </p:sp>
+      <p:sp>
+        <p:nvSpPr>
+          <p:cNvPr id="29" name="5-Point Star 28">
+            <a:extLst>
+              <a:ext uri="{FF2B5EF4-FFF2-40B4-BE49-F238E27FC236}">
+                <a16:creationId xmlns:a16="http://schemas.microsoft.com/office/drawing/2014/main" id="{71856EAB-6CB8-0174-5EEF-B62EB483F216}"/>
+              </a:ext>
+            </a:extLst>
+          </p:cNvPr>
+          <p:cNvSpPr/>
+          <p:nvPr/>
+        </p:nvSpPr>
+        <p:spPr>
+          <a:xfrm>
+            <a:off x="6680200" y="1755442"/>
+            <a:ext cx="228600" cy="238458"/>
+          </a:xfrm>
+          <a:prstGeom prst="star5">
+            <a:avLst/>
+          </a:prstGeom>
+          <a:solidFill>
+            <a:srgbClr val="FF0000"/>
+          </a:solidFill>
+        </p:spPr>
+        <p:style>
+          <a:lnRef idx="2">
+            <a:schemeClr val="accent1">
+              <a:shade val="50000"/>
+            </a:schemeClr>
+          </a:lnRef>
+          <a:fillRef idx="1">
+            <a:schemeClr val="accent1"/>
+          </a:fillRef>
+          <a:effectRef idx="0">
+            <a:schemeClr val="accent1"/>
+          </a:effectRef>
+          <a:fontRef idx="minor">
+            <a:schemeClr val="lt1"/>
+          </a:fontRef>
+        </p:style>
+        <p:txBody>
+          <a:bodyPr rtlCol="0" anchor="ctr"/>
+          <a:lstStyle/>
+          <a:p>
+            <a:pPr algn="ctr"/>
+            <a:endParaRPr lang="en-US"/>
+          </a:p>
+        </p:txBody>
+      </p:sp>
+      <p:sp>
+        <p:nvSpPr>
+          <p:cNvPr id="30" name="TextBox 29">
+            <a:extLst>
+              <a:ext uri="{FF2B5EF4-FFF2-40B4-BE49-F238E27FC236}">
+                <a16:creationId xmlns:a16="http://schemas.microsoft.com/office/drawing/2014/main" id="{AAC5B41B-188B-3B14-B382-396EC33E3588}"/>
+              </a:ext>
+            </a:extLst>
+          </p:cNvPr>
+          <p:cNvSpPr txBox="1"/>
+          <p:nvPr/>
+        </p:nvSpPr>
+        <p:spPr>
+          <a:xfrm>
+            <a:off x="307000" y="4605877"/>
+            <a:ext cx="10299700" cy="646331"/>
+          </a:xfrm>
+          <a:prstGeom prst="rect">
+            <a:avLst/>
+          </a:prstGeom>
+          <a:noFill/>
+        </p:spPr>
+        <p:txBody>
+          <a:bodyPr wrap="square" rtlCol="0">
+            <a:spAutoFit/>
+          </a:bodyPr>
+          <a:lstStyle/>
+          <a:p>
+            <a:r>
+              <a:rPr lang="en-US" dirty="0"/>
+              <a:t>Though the heat maps provide a great visualization of ABV and IBU medians, we must recognize that some states like West Virginia and Delaware only had 2 observations. </a:t>
+            </a:r>
+          </a:p>
+        </p:txBody>
+      </p:sp>
+    </p:spTree>
+    <p:extLst>
+      <p:ext uri="{BB962C8B-B14F-4D97-AF65-F5344CB8AC3E}">
+        <p14:creationId xmlns:p14="http://schemas.microsoft.com/office/powerpoint/2010/main" val="1721731148"/>
+      </p:ext>
+    </p:extLst>
+  </p:cSld>
+  <p:clrMapOvr>
+    <a:masterClrMapping/>
+  </p:clrMapOvr>
+  <p:timing>
+    <p:tnLst>
+      <p:par>
+        <p:cTn id="1" dur="indefinite" restart="never" nodeType="tmRoot">
+          <p:childTnLst>
+            <p:seq concurrent="1" nextAc="seek">
+              <p:cTn id="2" dur="indefinite" nodeType="mainSeq">
+                <p:childTnLst>
+                  <p:par>
+                    <p:cTn id="3" fill="hold">
+                      <p:stCondLst>
+                        <p:cond delay="indefinite"/>
+                      </p:stCondLst>
+                      <p:childTnLst>
+                        <p:par>
+                          <p:cTn id="4" fill="hold">
+                            <p:stCondLst>
+                              <p:cond delay="0"/>
+                            </p:stCondLst>
+                            <p:childTnLst>
+                              <p:par>
+                                <p:cTn id="5" presetID="1" presetClass="entr" presetSubtype="0" fill="hold" nodeType="clickEffect">
+                                  <p:stCondLst>
+                                    <p:cond delay="0"/>
+                                  </p:stCondLst>
+                                  <p:childTnLst>
+                                    <p:set>
+                                      <p:cBhvr>
+                                        <p:cTn id="6" dur="1" fill="hold">
+                                          <p:stCondLst>
+                                            <p:cond delay="0"/>
+                                          </p:stCondLst>
+                                        </p:cTn>
+                                        <p:tgtEl>
+                                          <p:spTgt spid="22"/>
+                                        </p:tgtEl>
+                                        <p:attrNameLst>
+                                          <p:attrName>style.visibility</p:attrName>
+                                        </p:attrNameLst>
+                                      </p:cBhvr>
+                                      <p:to>
+                                        <p:strVal val="visible"/>
+                                      </p:to>
+                                    </p:set>
+                                  </p:childTnLst>
+                                </p:cTn>
+                              </p:par>
+                              <p:par>
+                                <p:cTn id="7" presetID="1" presetClass="entr" presetSubtype="0" fill="hold" grpId="0" nodeType="withEffect">
+                                  <p:stCondLst>
+                                    <p:cond delay="0"/>
+                                  </p:stCondLst>
+                                  <p:childTnLst>
+                                    <p:set>
+                                      <p:cBhvr>
+                                        <p:cTn id="8" dur="1" fill="hold">
+                                          <p:stCondLst>
+                                            <p:cond delay="0"/>
+                                          </p:stCondLst>
+                                        </p:cTn>
+                                        <p:tgtEl>
+                                          <p:spTgt spid="25"/>
+                                        </p:tgtEl>
+                                        <p:attrNameLst>
+                                          <p:attrName>style.visibility</p:attrName>
+                                        </p:attrNameLst>
+                                      </p:cBhvr>
+                                      <p:to>
+                                        <p:strVal val="visible"/>
+                                      </p:to>
+                                    </p:set>
+                                  </p:childTnLst>
+                                </p:cTn>
+                              </p:par>
+                              <p:par>
+                                <p:cTn id="9" presetID="1" presetClass="entr" presetSubtype="0" fill="hold" nodeType="withEffect">
+                                  <p:stCondLst>
+                                    <p:cond delay="0"/>
+                                  </p:stCondLst>
+                                  <p:childTnLst>
+                                    <p:set>
+                                      <p:cBhvr>
+                                        <p:cTn id="10" dur="1" fill="hold">
+                                          <p:stCondLst>
+                                            <p:cond delay="0"/>
+                                          </p:stCondLst>
+                                        </p:cTn>
+                                        <p:tgtEl>
+                                          <p:spTgt spid="25">
+                                            <p:txEl>
+                                              <p:pRg st="0" end="0"/>
+                                            </p:txEl>
+                                          </p:spTgt>
+                                        </p:tgtEl>
+                                        <p:attrNameLst>
+                                          <p:attrName>style.visibility</p:attrName>
+                                        </p:attrNameLst>
+                                      </p:cBhvr>
+                                      <p:to>
+                                        <p:strVal val="visible"/>
+                                      </p:to>
+                                    </p:set>
+                                  </p:childTnLst>
+                                </p:cTn>
+                              </p:par>
+                            </p:childTnLst>
+                          </p:cTn>
+                        </p:par>
+                      </p:childTnLst>
+                    </p:cTn>
+                  </p:par>
+                  <p:par>
+                    <p:cTn id="11" fill="hold">
+                      <p:stCondLst>
+                        <p:cond delay="indefinite"/>
+                      </p:stCondLst>
+                      <p:childTnLst>
+                        <p:par>
+                          <p:cTn id="12" fill="hold">
+                            <p:stCondLst>
+                              <p:cond delay="0"/>
+                            </p:stCondLst>
+                            <p:childTnLst>
+                              <p:par>
+                                <p:cTn id="13" presetID="1" presetClass="entr" presetSubtype="0" fill="hold" nodeType="clickEffect">
+                                  <p:stCondLst>
+                                    <p:cond delay="0"/>
+                                  </p:stCondLst>
+                                  <p:childTnLst>
+                                    <p:set>
+                                      <p:cBhvr>
+                                        <p:cTn id="14" dur="1" fill="hold">
+                                          <p:stCondLst>
+                                            <p:cond delay="0"/>
+                                          </p:stCondLst>
+                                        </p:cTn>
+                                        <p:tgtEl>
+                                          <p:spTgt spid="25">
+                                            <p:txEl>
+                                              <p:pRg st="1" end="1"/>
+                                            </p:txEl>
+                                          </p:spTgt>
+                                        </p:tgtEl>
+                                        <p:attrNameLst>
+                                          <p:attrName>style.visibility</p:attrName>
+                                        </p:attrNameLst>
+                                      </p:cBhvr>
+                                      <p:to>
+                                        <p:strVal val="visible"/>
+                                      </p:to>
+                                    </p:set>
+                                  </p:childTnLst>
+                                </p:cTn>
+                              </p:par>
+                              <p:par>
+                                <p:cTn id="15" presetID="1" presetClass="entr" presetSubtype="0" fill="hold" nodeType="withEffect">
+                                  <p:stCondLst>
+                                    <p:cond delay="0"/>
+                                  </p:stCondLst>
+                                  <p:childTnLst>
+                                    <p:set>
+                                      <p:cBhvr>
+                                        <p:cTn id="16" dur="1" fill="hold">
+                                          <p:stCondLst>
+                                            <p:cond delay="0"/>
+                                          </p:stCondLst>
+                                        </p:cTn>
+                                        <p:tgtEl>
+                                          <p:spTgt spid="25">
+                                            <p:txEl>
+                                              <p:pRg st="2" end="2"/>
+                                            </p:txEl>
+                                          </p:spTgt>
+                                        </p:tgtEl>
+                                        <p:attrNameLst>
+                                          <p:attrName>style.visibility</p:attrName>
+                                        </p:attrNameLst>
+                                      </p:cBhvr>
+                                      <p:to>
+                                        <p:strVal val="visible"/>
+                                      </p:to>
+                                    </p:set>
+                                  </p:childTnLst>
+                                </p:cTn>
+                              </p:par>
+                            </p:childTnLst>
+                          </p:cTn>
+                        </p:par>
+                      </p:childTnLst>
+                    </p:cTn>
+                  </p:par>
+                  <p:par>
+                    <p:cTn id="17" fill="hold">
+                      <p:stCondLst>
+                        <p:cond delay="indefinite"/>
+                      </p:stCondLst>
+                      <p:childTnLst>
+                        <p:par>
+                          <p:cTn id="18" fill="hold">
+                            <p:stCondLst>
+                              <p:cond delay="0"/>
+                            </p:stCondLst>
+                            <p:childTnLst>
+                              <p:par>
+                                <p:cTn id="19" presetID="1" presetClass="exit" presetSubtype="0" fill="hold" grpId="1" nodeType="clickEffect">
+                                  <p:stCondLst>
+                                    <p:cond delay="0"/>
+                                  </p:stCondLst>
+                                  <p:childTnLst>
+                                    <p:set>
+                                      <p:cBhvr>
+                                        <p:cTn id="20" dur="1" fill="hold">
+                                          <p:stCondLst>
+                                            <p:cond delay="0"/>
+                                          </p:stCondLst>
+                                        </p:cTn>
+                                        <p:tgtEl>
+                                          <p:spTgt spid="25"/>
+                                        </p:tgtEl>
+                                        <p:attrNameLst>
+                                          <p:attrName>style.visibility</p:attrName>
+                                        </p:attrNameLst>
+                                      </p:cBhvr>
+                                      <p:to>
+                                        <p:strVal val="hidden"/>
+                                      </p:to>
+                                    </p:set>
+                                  </p:childTnLst>
+                                </p:cTn>
+                              </p:par>
+                              <p:par>
+                                <p:cTn id="21" presetID="1" presetClass="entr" presetSubtype="0" fill="hold" nodeType="withEffect">
+                                  <p:stCondLst>
+                                    <p:cond delay="0"/>
+                                  </p:stCondLst>
+                                  <p:childTnLst>
+                                    <p:set>
+                                      <p:cBhvr>
+                                        <p:cTn id="22" dur="1" fill="hold">
+                                          <p:stCondLst>
+                                            <p:cond delay="0"/>
+                                          </p:stCondLst>
+                                        </p:cTn>
+                                        <p:tgtEl>
+                                          <p:spTgt spid="27"/>
+                                        </p:tgtEl>
+                                        <p:attrNameLst>
+                                          <p:attrName>style.visibility</p:attrName>
+                                        </p:attrNameLst>
+                                      </p:cBhvr>
+                                      <p:to>
+                                        <p:strVal val="visible"/>
+                                      </p:to>
+                                    </p:set>
+                                  </p:childTnLst>
+                                </p:cTn>
+                              </p:par>
+                            </p:childTnLst>
+                          </p:cTn>
+                        </p:par>
+                      </p:childTnLst>
+                    </p:cTn>
+                  </p:par>
+                  <p:par>
+                    <p:cTn id="23" fill="hold">
+                      <p:stCondLst>
+                        <p:cond delay="indefinite"/>
+                      </p:stCondLst>
+                      <p:childTnLst>
+                        <p:par>
+                          <p:cTn id="24" fill="hold">
+                            <p:stCondLst>
+                              <p:cond delay="0"/>
+                            </p:stCondLst>
+                            <p:childTnLst>
+                              <p:par>
+                                <p:cTn id="25" presetID="1" presetClass="entr" presetSubtype="0" fill="hold" grpId="0" nodeType="clickEffect">
+                                  <p:stCondLst>
+                                    <p:cond delay="0"/>
+                                  </p:stCondLst>
+                                  <p:childTnLst>
+                                    <p:set>
+                                      <p:cBhvr>
+                                        <p:cTn id="26" dur="1" fill="hold">
+                                          <p:stCondLst>
+                                            <p:cond delay="0"/>
+                                          </p:stCondLst>
+                                        </p:cTn>
+                                        <p:tgtEl>
+                                          <p:spTgt spid="30"/>
+                                        </p:tgtEl>
+                                        <p:attrNameLst>
+                                          <p:attrName>style.visibility</p:attrName>
+                                        </p:attrNameLst>
+                                      </p:cBhvr>
+                                      <p:to>
+                                        <p:strVal val="visible"/>
+                                      </p:to>
+                                    </p:set>
+                                  </p:childTnLst>
+                                </p:cTn>
+                              </p:par>
+                            </p:childTnLst>
+                          </p:cTn>
+                        </p:par>
+                      </p:childTnLst>
+                    </p:cTn>
+                  </p:par>
+                  <p:par>
+                    <p:cTn id="27" fill="hold">
+                      <p:stCondLst>
+                        <p:cond delay="indefinite"/>
+                      </p:stCondLst>
+                      <p:childTnLst>
+                        <p:par>
+                          <p:cTn id="28" fill="hold">
+                            <p:stCondLst>
+                              <p:cond delay="0"/>
+                            </p:stCondLst>
+                            <p:childTnLst>
+                              <p:par>
+                                <p:cTn id="29" presetID="1" presetClass="entr" presetSubtype="0" fill="hold" grpId="0" nodeType="clickEffect">
+                                  <p:stCondLst>
+                                    <p:cond delay="0"/>
+                                  </p:stCondLst>
+                                  <p:childTnLst>
+                                    <p:set>
+                                      <p:cBhvr>
+                                        <p:cTn id="30" dur="1" fill="hold">
+                                          <p:stCondLst>
+                                            <p:cond delay="0"/>
+                                          </p:stCondLst>
+                                        </p:cTn>
+                                        <p:tgtEl>
+                                          <p:spTgt spid="23"/>
+                                        </p:tgtEl>
+                                        <p:attrNameLst>
+                                          <p:attrName>style.visibility</p:attrName>
+                                        </p:attrNameLst>
+                                      </p:cBhvr>
+                                      <p:to>
+                                        <p:strVal val="visible"/>
+                                      </p:to>
+                                    </p:set>
+                                  </p:childTnLst>
+                                </p:cTn>
+                              </p:par>
+                              <p:par>
+                                <p:cTn id="31" presetID="1" presetClass="entr" presetSubtype="0" fill="hold" grpId="0" nodeType="withEffect">
+                                  <p:stCondLst>
+                                    <p:cond delay="0"/>
+                                  </p:stCondLst>
+                                  <p:childTnLst>
+                                    <p:set>
+                                      <p:cBhvr>
+                                        <p:cTn id="32" dur="1" fill="hold">
+                                          <p:stCondLst>
+                                            <p:cond delay="0"/>
+                                          </p:stCondLst>
+                                        </p:cTn>
+                                        <p:tgtEl>
+                                          <p:spTgt spid="24"/>
+                                        </p:tgtEl>
+                                        <p:attrNameLst>
+                                          <p:attrName>style.visibility</p:attrName>
+                                        </p:attrNameLst>
+                                      </p:cBhvr>
+                                      <p:to>
+                                        <p:strVal val="visible"/>
+                                      </p:to>
+                                    </p:set>
+                                  </p:childTnLst>
+                                </p:cTn>
+                              </p:par>
+                            </p:childTnLst>
+                          </p:cTn>
+                        </p:par>
+                      </p:childTnLst>
+                    </p:cTn>
+                  </p:par>
+                  <p:par>
+                    <p:cTn id="33" fill="hold">
+                      <p:stCondLst>
+                        <p:cond delay="indefinite"/>
+                      </p:stCondLst>
+                      <p:childTnLst>
+                        <p:par>
+                          <p:cTn id="34" fill="hold">
+                            <p:stCondLst>
+                              <p:cond delay="0"/>
+                            </p:stCondLst>
+                            <p:childTnLst>
+                              <p:par>
+                                <p:cTn id="35" presetID="1" presetClass="entr" presetSubtype="0" fill="hold" grpId="0" nodeType="clickEffect">
+                                  <p:stCondLst>
+                                    <p:cond delay="0"/>
+                                  </p:stCondLst>
+                                  <p:childTnLst>
+                                    <p:set>
+                                      <p:cBhvr>
+                                        <p:cTn id="36" dur="1" fill="hold">
+                                          <p:stCondLst>
+                                            <p:cond delay="0"/>
+                                          </p:stCondLst>
+                                        </p:cTn>
+                                        <p:tgtEl>
+                                          <p:spTgt spid="29"/>
+                                        </p:tgtEl>
+                                        <p:attrNameLst>
+                                          <p:attrName>style.visibility</p:attrName>
+                                        </p:attrNameLst>
+                                      </p:cBhvr>
+                                      <p:to>
+                                        <p:strVal val="visible"/>
+                                      </p:to>
+                                    </p:set>
+                                  </p:childTnLst>
+                                </p:cTn>
+                              </p:par>
+                              <p:par>
+                                <p:cTn id="37" presetID="1" presetClass="entr" presetSubtype="0" fill="hold" grpId="0" nodeType="withEffect">
+                                  <p:stCondLst>
+                                    <p:cond delay="0"/>
+                                  </p:stCondLst>
+                                  <p:childTnLst>
+                                    <p:set>
+                                      <p:cBhvr>
+                                        <p:cTn id="38" dur="1" fill="hold">
+                                          <p:stCondLst>
+                                            <p:cond delay="0"/>
+                                          </p:stCondLst>
+                                        </p:cTn>
+                                        <p:tgtEl>
+                                          <p:spTgt spid="28"/>
+                                        </p:tgtEl>
+                                        <p:attrNameLst>
+                                          <p:attrName>style.visibility</p:attrName>
+                                        </p:attrNameLst>
+                                      </p:cBhvr>
+                                      <p:to>
+                                        <p:strVal val="visible"/>
+                                      </p:to>
+                                    </p:set>
+                                  </p:childTnLst>
+                                </p:cTn>
+                              </p:par>
+                            </p:childTnLst>
+                          </p:cTn>
+                        </p:par>
+                      </p:childTnLst>
+                    </p:cTn>
+                  </p:par>
+                </p:childTnLst>
+              </p:cTn>
+              <p:prevCondLst>
+                <p:cond evt="onPrev" delay="0">
+                  <p:tgtEl>
+                    <p:sldTgt/>
+                  </p:tgtEl>
+                </p:cond>
+              </p:prevCondLst>
+              <p:nextCondLst>
+                <p:cond evt="onNext" delay="0">
+                  <p:tgtEl>
+                    <p:sldTgt/>
+                  </p:tgtEl>
+                </p:cond>
+              </p:nextCondLst>
+            </p:seq>
+          </p:childTnLst>
+        </p:cTn>
+      </p:par>
+    </p:tnLst>
+    <p:bldLst>
+      <p:bldP spid="23" grpId="0" animBg="1"/>
+      <p:bldP spid="24" grpId="0"/>
+      <p:bldP spid="25" grpId="0"/>
+      <p:bldP spid="25" grpId="1"/>
+      <p:bldP spid="28" grpId="0"/>
+      <p:bldP spid="29" grpId="0" animBg="1"/>
+      <p:bldP spid="30" grpId="0"/>
+    </p:bldLst>
   </p:timing>
 </p:sld>
 </file>
@@ -26680,6 +27547,12 @@
     </p:bldLst>
   </p:timing>
 </p:sld>
+</file>
+
+<file path=ppt/tags/tag1.xml><?xml version="1.0" encoding="utf-8"?>
+<p:tagLst xmlns:a="http://schemas.openxmlformats.org/drawingml/2006/main" xmlns:r="http://schemas.openxmlformats.org/officeDocument/2006/relationships" xmlns:p="http://schemas.openxmlformats.org/presentationml/2006/main">
+  <p:tag name="TIMING" val="|7.3|3.5|3.8|3.7|4.8"/>
+</p:tagLst>
 </file>
 
 <file path=ppt/theme/theme1.xml><?xml version="1.0" encoding="utf-8"?>
@@ -27493,7 +28366,7 @@
 </file>
 
 <file path=customXml/itemProps2.xml><?xml version="1.0" encoding="utf-8"?>
-<ds:datastoreItem xmlns:ds="http://schemas.openxmlformats.org/officeDocument/2006/customXml" ds:itemID="{90563F63-61FD-46ED-8744-22EE441B0223}">
+<ds:datastoreItem xmlns:ds="http://schemas.openxmlformats.org/officeDocument/2006/customXml" ds:itemID="{ED9B26E9-BA33-4B31-9C09-33D1BD8D9A80}">
   <ds:schemaRefs>
     <ds:schemaRef ds:uri="http://www.w3.org/2001/XMLSchema"/>
     <ds:schemaRef ds:uri="http://www.boldonjames.com/2008/01/sie/internal/label"/>

</xml_diff>